<commit_message>
Added yield examples to LINQ presentation
</commit_message>
<xml_diff>
--- a/Presentation/lesson-11-linq.pptx
+++ b/Presentation/lesson-11-linq.pptx
@@ -5,7 +5,7 @@
     <p:sldMasterId id="2147483648" r:id="rId1"/>
   </p:sldMasterIdLst>
   <p:notesMasterIdLst>
-    <p:notesMasterId r:id="rId15"/>
+    <p:notesMasterId r:id="rId17"/>
   </p:notesMasterIdLst>
   <p:sldIdLst>
     <p:sldId id="256" r:id="rId2"/>
@@ -13,14 +13,16 @@
     <p:sldId id="269" r:id="rId4"/>
     <p:sldId id="266" r:id="rId5"/>
     <p:sldId id="259" r:id="rId6"/>
-    <p:sldId id="265" r:id="rId7"/>
-    <p:sldId id="267" r:id="rId8"/>
-    <p:sldId id="261" r:id="rId9"/>
-    <p:sldId id="268" r:id="rId10"/>
-    <p:sldId id="260" r:id="rId11"/>
-    <p:sldId id="264" r:id="rId12"/>
-    <p:sldId id="262" r:id="rId13"/>
-    <p:sldId id="263" r:id="rId14"/>
+    <p:sldId id="270" r:id="rId7"/>
+    <p:sldId id="271" r:id="rId8"/>
+    <p:sldId id="265" r:id="rId9"/>
+    <p:sldId id="267" r:id="rId10"/>
+    <p:sldId id="261" r:id="rId11"/>
+    <p:sldId id="268" r:id="rId12"/>
+    <p:sldId id="260" r:id="rId13"/>
+    <p:sldId id="264" r:id="rId14"/>
+    <p:sldId id="262" r:id="rId15"/>
+    <p:sldId id="263" r:id="rId16"/>
   </p:sldIdLst>
   <p:sldSz cx="9144000" cy="6858000" type="screen4x3"/>
   <p:notesSz cx="6858000" cy="9144000"/>
@@ -204,7 +206,7 @@
           <a:p>
             <a:fld id="{B24A7054-7FFB-49F4-A126-5DF6E687FF53}" type="datetimeFigureOut">
               <a:rPr lang="ru-RU" smtClean="0"/>
-              <a:t>27.03.2013</a:t>
+              <a:t>24.06.2013</a:t>
             </a:fld>
             <a:endParaRPr lang="ru-RU"/>
           </a:p>
@@ -1486,7 +1488,7 @@
           <a:p>
             <a:fld id="{8E6E6A2A-E9D3-4A0D-B04A-ABDD367A1E08}" type="datetimeFigureOut">
               <a:rPr lang="ru-RU" smtClean="0"/>
-              <a:t>27.03.2013</a:t>
+              <a:t>24.06.2013</a:t>
             </a:fld>
             <a:endParaRPr lang="ru-RU"/>
           </a:p>
@@ -2931,7 +2933,7 @@
           <a:p>
             <a:fld id="{AC3D3127-B7C4-45E3-9797-C527EC9FDD78}" type="datetimeFigureOut">
               <a:rPr lang="ru-RU" smtClean="0"/>
-              <a:t>27.03.2013</a:t>
+              <a:t>24.06.2013</a:t>
             </a:fld>
             <a:endParaRPr lang="ru-RU"/>
           </a:p>
@@ -3520,6 +3522,422 @@
 <file path=ppt/slides/slide10.xml><?xml version="1.0" encoding="utf-8"?>
 <p:sld xmlns:a="http://schemas.openxmlformats.org/drawingml/2006/main" xmlns:r="http://schemas.openxmlformats.org/officeDocument/2006/relationships" xmlns:p="http://schemas.openxmlformats.org/presentationml/2006/main">
   <p:cSld>
+    <p:spTree>
+      <p:nvGrpSpPr>
+        <p:cNvPr id="1" name=""/>
+        <p:cNvGrpSpPr/>
+        <p:nvPr/>
+      </p:nvGrpSpPr>
+      <p:grpSpPr>
+        <a:xfrm>
+          <a:off x="0" y="0"/>
+          <a:ext cx="0" cy="0"/>
+          <a:chOff x="0" y="0"/>
+          <a:chExt cx="0" cy="0"/>
+        </a:xfrm>
+      </p:grpSpPr>
+      <p:sp>
+        <p:nvSpPr>
+          <p:cNvPr id="2" name="Title 1"/>
+          <p:cNvSpPr>
+            <a:spLocks noGrp="1"/>
+          </p:cNvSpPr>
+          <p:nvPr>
+            <p:ph type="title"/>
+          </p:nvPr>
+        </p:nvSpPr>
+        <p:spPr/>
+        <p:txBody>
+          <a:bodyPr/>
+          <a:lstStyle/>
+          <a:p>
+            <a:r>
+              <a:rPr lang="ru-RU" dirty="0" smtClean="0"/>
+              <a:t>Класс </a:t>
+            </a:r>
+            <a:r>
+              <a:rPr lang="en-US" dirty="0" err="1" smtClean="0"/>
+              <a:t>System.Linq.Enumerable</a:t>
+            </a:r>
+            <a:endParaRPr lang="en-US" dirty="0"/>
+          </a:p>
+        </p:txBody>
+      </p:sp>
+      <p:sp>
+        <p:nvSpPr>
+          <p:cNvPr id="3" name="Content Placeholder 2"/>
+          <p:cNvSpPr>
+            <a:spLocks noGrp="1"/>
+          </p:cNvSpPr>
+          <p:nvPr>
+            <p:ph idx="1"/>
+          </p:nvPr>
+        </p:nvSpPr>
+        <p:spPr/>
+        <p:txBody>
+          <a:bodyPr>
+            <a:normAutofit/>
+          </a:bodyPr>
+          <a:lstStyle/>
+          <a:p>
+            <a:pPr marL="0" indent="0">
+              <a:buNone/>
+            </a:pPr>
+            <a:r>
+              <a:rPr lang="ru-RU" dirty="0" smtClean="0"/>
+              <a:t>Содержит множество полезных </a:t>
+            </a:r>
+            <a:r>
+              <a:rPr lang="en-US" dirty="0" smtClean="0"/>
+              <a:t>extension </a:t>
+            </a:r>
+            <a:r>
+              <a:rPr lang="ru-RU" dirty="0" smtClean="0"/>
+              <a:t>методов для </a:t>
+            </a:r>
+            <a:r>
+              <a:rPr lang="en-US" dirty="0" smtClean="0"/>
+              <a:t>LINQ</a:t>
+            </a:r>
+            <a:r>
+              <a:rPr lang="ru-RU" dirty="0" smtClean="0"/>
+              <a:t>.</a:t>
+            </a:r>
+          </a:p>
+          <a:p>
+            <a:pPr marL="0" indent="0">
+              <a:buNone/>
+            </a:pPr>
+            <a:endParaRPr lang="en-US" dirty="0"/>
+          </a:p>
+        </p:txBody>
+      </p:sp>
+    </p:spTree>
+    <p:extLst>
+      <p:ext uri="{BB962C8B-B14F-4D97-AF65-F5344CB8AC3E}">
+        <p14:creationId xmlns:p14="http://schemas.microsoft.com/office/powerpoint/2010/main" val="2250229024"/>
+      </p:ext>
+    </p:extLst>
+  </p:cSld>
+  <p:clrMapOvr>
+    <a:masterClrMapping/>
+  </p:clrMapOvr>
+  <p:timing>
+    <p:tnLst>
+      <p:par>
+        <p:cTn id="1" dur="indefinite" restart="never" nodeType="tmRoot"/>
+      </p:par>
+    </p:tnLst>
+  </p:timing>
+</p:sld>
+</file>
+
+<file path=ppt/slides/slide11.xml><?xml version="1.0" encoding="utf-8"?>
+<p:sld xmlns:a="http://schemas.openxmlformats.org/drawingml/2006/main" xmlns:r="http://schemas.openxmlformats.org/officeDocument/2006/relationships" xmlns:p="http://schemas.openxmlformats.org/presentationml/2006/main">
+  <p:cSld>
+    <p:spTree>
+      <p:nvGrpSpPr>
+        <p:cNvPr id="1" name=""/>
+        <p:cNvGrpSpPr/>
+        <p:nvPr/>
+      </p:nvGrpSpPr>
+      <p:grpSpPr>
+        <a:xfrm>
+          <a:off x="0" y="0"/>
+          <a:ext cx="0" cy="0"/>
+          <a:chOff x="0" y="0"/>
+          <a:chExt cx="0" cy="0"/>
+        </a:xfrm>
+      </p:grpSpPr>
+      <p:sp>
+        <p:nvSpPr>
+          <p:cNvPr id="2" name="Title 1"/>
+          <p:cNvSpPr>
+            <a:spLocks noGrp="1"/>
+          </p:cNvSpPr>
+          <p:nvPr>
+            <p:ph type="title"/>
+          </p:nvPr>
+        </p:nvSpPr>
+        <p:spPr/>
+        <p:txBody>
+          <a:bodyPr/>
+          <a:lstStyle/>
+          <a:p>
+            <a:r>
+              <a:rPr lang="en-US" dirty="0" smtClean="0"/>
+              <a:t>Enumerable: First() </a:t>
+            </a:r>
+            <a:r>
+              <a:rPr lang="ru-RU" dirty="0" smtClean="0"/>
+              <a:t>и </a:t>
+            </a:r>
+            <a:r>
+              <a:rPr lang="en-US" dirty="0" smtClean="0"/>
+              <a:t>Single()</a:t>
+            </a:r>
+            <a:endParaRPr lang="en-US" dirty="0"/>
+          </a:p>
+        </p:txBody>
+      </p:sp>
+      <p:sp>
+        <p:nvSpPr>
+          <p:cNvPr id="3" name="Content Placeholder 2"/>
+          <p:cNvSpPr>
+            <a:spLocks noGrp="1"/>
+          </p:cNvSpPr>
+          <p:nvPr>
+            <p:ph idx="1"/>
+          </p:nvPr>
+        </p:nvSpPr>
+        <p:spPr/>
+        <p:txBody>
+          <a:bodyPr/>
+          <a:lstStyle/>
+          <a:p>
+            <a:pPr marL="0" indent="0">
+              <a:buNone/>
+            </a:pPr>
+            <a:r>
+              <a:rPr lang="en-US" dirty="0"/>
+              <a:t>First</a:t>
+            </a:r>
+            <a:r>
+              <a:rPr lang="en-US" dirty="0" smtClean="0"/>
+              <a:t>()</a:t>
+            </a:r>
+            <a:r>
+              <a:rPr lang="ru-RU" dirty="0" smtClean="0"/>
+              <a:t> </a:t>
+            </a:r>
+            <a:r>
+              <a:rPr lang="en-US" dirty="0" smtClean="0"/>
+              <a:t>/</a:t>
+            </a:r>
+            <a:r>
+              <a:rPr lang="ru-RU" dirty="0" smtClean="0"/>
+              <a:t> </a:t>
+            </a:r>
+            <a:r>
+              <a:rPr lang="en-US" dirty="0" smtClean="0"/>
+              <a:t>First(</a:t>
+            </a:r>
+            <a:r>
+              <a:rPr lang="en-US" dirty="0" err="1" smtClean="0"/>
+              <a:t>Func</a:t>
+            </a:r>
+            <a:r>
+              <a:rPr lang="en-US" dirty="0" smtClean="0"/>
+              <a:t>&lt;</a:t>
+            </a:r>
+            <a:r>
+              <a:rPr lang="en-US" dirty="0" err="1" smtClean="0"/>
+              <a:t>TSource</a:t>
+            </a:r>
+            <a:r>
+              <a:rPr lang="en-US" dirty="0"/>
+              <a:t>, </a:t>
+            </a:r>
+            <a:r>
+              <a:rPr lang="en-US" dirty="0" err="1"/>
+              <a:t>bool</a:t>
+            </a:r>
+            <a:r>
+              <a:rPr lang="en-US" dirty="0"/>
+              <a:t>&gt;)</a:t>
+            </a:r>
+          </a:p>
+          <a:p>
+            <a:pPr marL="0" indent="0">
+              <a:buNone/>
+            </a:pPr>
+            <a:r>
+              <a:rPr lang="en-US" dirty="0" err="1"/>
+              <a:t>FirstOrDefault</a:t>
+            </a:r>
+            <a:r>
+              <a:rPr lang="en-US" dirty="0" smtClean="0"/>
+              <a:t>()</a:t>
+            </a:r>
+            <a:r>
+              <a:rPr lang="ru-RU" dirty="0" smtClean="0"/>
+              <a:t> </a:t>
+            </a:r>
+            <a:r>
+              <a:rPr lang="en-US" dirty="0" smtClean="0"/>
+              <a:t>/</a:t>
+            </a:r>
+            <a:r>
+              <a:rPr lang="ru-RU" dirty="0" smtClean="0"/>
+              <a:t> </a:t>
+            </a:r>
+            <a:r>
+              <a:rPr lang="en-US" dirty="0" err="1" smtClean="0"/>
+              <a:t>FirstOrDefault</a:t>
+            </a:r>
+            <a:r>
+              <a:rPr lang="en-US" dirty="0" smtClean="0"/>
+              <a:t>(</a:t>
+            </a:r>
+            <a:r>
+              <a:rPr lang="en-US" dirty="0" err="1" smtClean="0"/>
+              <a:t>Func</a:t>
+            </a:r>
+            <a:r>
+              <a:rPr lang="en-US" dirty="0" smtClean="0"/>
+              <a:t>&lt;</a:t>
+            </a:r>
+            <a:r>
+              <a:rPr lang="en-US" dirty="0" err="1" smtClean="0"/>
+              <a:t>TSource</a:t>
+            </a:r>
+            <a:r>
+              <a:rPr lang="en-US" dirty="0"/>
+              <a:t>, </a:t>
+            </a:r>
+            <a:r>
+              <a:rPr lang="en-US" dirty="0" err="1"/>
+              <a:t>bool</a:t>
+            </a:r>
+            <a:r>
+              <a:rPr lang="en-US" dirty="0"/>
+              <a:t>&gt;)</a:t>
+            </a:r>
+          </a:p>
+          <a:p>
+            <a:pPr marL="0" indent="0">
+              <a:buNone/>
+            </a:pPr>
+            <a:r>
+              <a:rPr lang="en-US" dirty="0"/>
+              <a:t>Single</a:t>
+            </a:r>
+            <a:r>
+              <a:rPr lang="en-US" dirty="0" smtClean="0"/>
+              <a:t>()</a:t>
+            </a:r>
+            <a:r>
+              <a:rPr lang="ru-RU" dirty="0" smtClean="0"/>
+              <a:t> </a:t>
+            </a:r>
+            <a:r>
+              <a:rPr lang="en-US" dirty="0" smtClean="0"/>
+              <a:t>/</a:t>
+            </a:r>
+            <a:r>
+              <a:rPr lang="ru-RU" dirty="0" smtClean="0"/>
+              <a:t> </a:t>
+            </a:r>
+            <a:r>
+              <a:rPr lang="en-US" dirty="0" smtClean="0"/>
+              <a:t>Single(</a:t>
+            </a:r>
+            <a:r>
+              <a:rPr lang="en-US" dirty="0" err="1" smtClean="0"/>
+              <a:t>Func</a:t>
+            </a:r>
+            <a:r>
+              <a:rPr lang="en-US" dirty="0" smtClean="0"/>
+              <a:t>&lt;</a:t>
+            </a:r>
+            <a:r>
+              <a:rPr lang="en-US" dirty="0" err="1" smtClean="0"/>
+              <a:t>TSource</a:t>
+            </a:r>
+            <a:r>
+              <a:rPr lang="en-US" dirty="0"/>
+              <a:t>, </a:t>
+            </a:r>
+            <a:r>
+              <a:rPr lang="en-US" dirty="0" err="1"/>
+              <a:t>bool</a:t>
+            </a:r>
+            <a:r>
+              <a:rPr lang="en-US" dirty="0"/>
+              <a:t>&gt;)</a:t>
+            </a:r>
+          </a:p>
+          <a:p>
+            <a:pPr marL="0" indent="0">
+              <a:buNone/>
+            </a:pPr>
+            <a:r>
+              <a:rPr lang="en-US" dirty="0" err="1"/>
+              <a:t>SingleOrDefault</a:t>
+            </a:r>
+            <a:r>
+              <a:rPr lang="en-US" dirty="0" smtClean="0"/>
+              <a:t>()</a:t>
+            </a:r>
+            <a:r>
+              <a:rPr lang="ru-RU" dirty="0" smtClean="0"/>
+              <a:t> </a:t>
+            </a:r>
+            <a:r>
+              <a:rPr lang="en-US" dirty="0" smtClean="0"/>
+              <a:t>/</a:t>
+            </a:r>
+            <a:r>
+              <a:rPr lang="ru-RU" dirty="0" smtClean="0"/>
+              <a:t> </a:t>
+            </a:r>
+            <a:r>
+              <a:rPr lang="en-US" dirty="0" err="1" smtClean="0"/>
+              <a:t>SingleOrDefault</a:t>
+            </a:r>
+            <a:r>
+              <a:rPr lang="en-US" dirty="0" smtClean="0"/>
+              <a:t>(</a:t>
+            </a:r>
+            <a:r>
+              <a:rPr lang="en-US" dirty="0" err="1" smtClean="0"/>
+              <a:t>Func</a:t>
+            </a:r>
+            <a:r>
+              <a:rPr lang="en-US" dirty="0" smtClean="0"/>
+              <a:t>&lt;</a:t>
+            </a:r>
+            <a:r>
+              <a:rPr lang="en-US" dirty="0" err="1" smtClean="0"/>
+              <a:t>TSource</a:t>
+            </a:r>
+            <a:r>
+              <a:rPr lang="en-US" dirty="0"/>
+              <a:t>, </a:t>
+            </a:r>
+            <a:r>
+              <a:rPr lang="en-US" dirty="0" err="1"/>
+              <a:t>bool</a:t>
+            </a:r>
+            <a:r>
+              <a:rPr lang="en-US" dirty="0"/>
+              <a:t>&gt;)</a:t>
+            </a:r>
+          </a:p>
+          <a:p>
+            <a:pPr marL="0" indent="0">
+              <a:buNone/>
+            </a:pPr>
+            <a:endParaRPr lang="en-US" dirty="0"/>
+          </a:p>
+        </p:txBody>
+      </p:sp>
+    </p:spTree>
+    <p:extLst>
+      <p:ext uri="{BB962C8B-B14F-4D97-AF65-F5344CB8AC3E}">
+        <p14:creationId xmlns:p14="http://schemas.microsoft.com/office/powerpoint/2010/main" val="1166576302"/>
+      </p:ext>
+    </p:extLst>
+  </p:cSld>
+  <p:clrMapOvr>
+    <a:masterClrMapping/>
+  </p:clrMapOvr>
+</p:sld>
+</file>
+
+<file path=ppt/slides/slide12.xml><?xml version="1.0" encoding="utf-8"?>
+<p:sld xmlns:a="http://schemas.openxmlformats.org/drawingml/2006/main" xmlns:r="http://schemas.openxmlformats.org/officeDocument/2006/relationships" xmlns:p="http://schemas.openxmlformats.org/presentationml/2006/main">
+  <p:cSld>
     <p:bg>
       <p:bgPr>
         <a:solidFill>
@@ -3626,7 +4044,7 @@
 </p:sld>
 </file>
 
-<file path=ppt/slides/slide11.xml><?xml version="1.0" encoding="utf-8"?>
+<file path=ppt/slides/slide13.xml><?xml version="1.0" encoding="utf-8"?>
 <p:sld xmlns:a="http://schemas.openxmlformats.org/drawingml/2006/main" xmlns:r="http://schemas.openxmlformats.org/officeDocument/2006/relationships" xmlns:p="http://schemas.openxmlformats.org/presentationml/2006/main">
   <p:cSld>
     <p:spTree>
@@ -3785,7 +4203,7 @@
 </p:sld>
 </file>
 
-<file path=ppt/slides/slide12.xml><?xml version="1.0" encoding="utf-8"?>
+<file path=ppt/slides/slide14.xml><?xml version="1.0" encoding="utf-8"?>
 <p:sld xmlns:a="http://schemas.openxmlformats.org/drawingml/2006/main" xmlns:r="http://schemas.openxmlformats.org/officeDocument/2006/relationships" xmlns:p="http://schemas.openxmlformats.org/presentationml/2006/main">
   <p:cSld>
     <p:spTree>
@@ -6417,7 +6835,7 @@
 </p:sld>
 </file>
 
-<file path=ppt/slides/slide13.xml><?xml version="1.0" encoding="utf-8"?>
+<file path=ppt/slides/slide15.xml><?xml version="1.0" encoding="utf-8"?>
 <p:sld xmlns:a="http://schemas.openxmlformats.org/drawingml/2006/main" xmlns:r="http://schemas.openxmlformats.org/officeDocument/2006/relationships" xmlns:p="http://schemas.openxmlformats.org/presentationml/2006/main">
   <p:cSld>
     <p:spTree>
@@ -8969,12 +9387,8 @@
           <a:lstStyle/>
           <a:p>
             <a:r>
-              <a:rPr lang="en-US" dirty="0" smtClean="0"/>
-              <a:t>Extension </a:t>
-            </a:r>
-            <a:r>
               <a:rPr lang="ru-RU" dirty="0" smtClean="0"/>
-              <a:t>методы</a:t>
+              <a:t>Итераторы</a:t>
             </a:r>
             <a:endParaRPr lang="en-US" dirty="0"/>
           </a:p>
@@ -8990,10 +9404,14 @@
             <p:ph idx="1"/>
           </p:nvPr>
         </p:nvSpPr>
-        <p:spPr/>
+        <p:spPr>
+          <a:solidFill>
+            <a:schemeClr val="bg1"/>
+          </a:solidFill>
+        </p:spPr>
         <p:txBody>
           <a:bodyPr>
-            <a:normAutofit fontScale="92500" lnSpcReduction="20000"/>
+            <a:normAutofit/>
           </a:bodyPr>
           <a:lstStyle/>
           <a:p>
@@ -9001,227 +9419,339 @@
               <a:buNone/>
             </a:pPr>
             <a:r>
-              <a:rPr lang="ru-RU" dirty="0" smtClean="0"/>
-              <a:t>Позволяют добавлять методы к уже существующим классам без нарушения инкапсуляции.</a:t>
+              <a:rPr lang="en-US" sz="1500" dirty="0">
+                <a:solidFill>
+                  <a:srgbClr val="0000FF"/>
+                </a:solidFill>
+                <a:latin typeface="Consolas"/>
+              </a:rPr>
+              <a:t>public</a:t>
+            </a:r>
+            <a:r>
+              <a:rPr lang="en-US" sz="1500" dirty="0">
+                <a:solidFill>
+                  <a:srgbClr val="000000"/>
+                </a:solidFill>
+                <a:latin typeface="Consolas"/>
+              </a:rPr>
+              <a:t> </a:t>
+            </a:r>
+            <a:r>
+              <a:rPr lang="en-US" sz="1500" dirty="0">
+                <a:solidFill>
+                  <a:srgbClr val="0000FF"/>
+                </a:solidFill>
+                <a:latin typeface="Consolas"/>
+              </a:rPr>
+              <a:t>static</a:t>
+            </a:r>
+            <a:r>
+              <a:rPr lang="en-US" sz="1500" dirty="0">
+                <a:solidFill>
+                  <a:srgbClr val="000000"/>
+                </a:solidFill>
+                <a:latin typeface="Consolas"/>
+              </a:rPr>
+              <a:t> </a:t>
+            </a:r>
+            <a:r>
+              <a:rPr lang="en-US" sz="1500" dirty="0" err="1">
+                <a:solidFill>
+                  <a:srgbClr val="0000FF"/>
+                </a:solidFill>
+                <a:latin typeface="Consolas"/>
+              </a:rPr>
+              <a:t>int</a:t>
+            </a:r>
+            <a:r>
+              <a:rPr lang="en-US" sz="1500" dirty="0">
+                <a:solidFill>
+                  <a:srgbClr val="000000"/>
+                </a:solidFill>
+                <a:latin typeface="Consolas"/>
+              </a:rPr>
+              <a:t>[] </a:t>
+            </a:r>
+            <a:r>
+              <a:rPr lang="en-US" sz="1500" dirty="0" err="1">
+                <a:solidFill>
+                  <a:srgbClr val="000000"/>
+                </a:solidFill>
+                <a:latin typeface="Consolas"/>
+              </a:rPr>
+              <a:t>ArithmeticProgression</a:t>
+            </a:r>
+            <a:r>
+              <a:rPr lang="en-US" sz="1500" dirty="0">
+                <a:solidFill>
+                  <a:srgbClr val="000000"/>
+                </a:solidFill>
+                <a:latin typeface="Consolas"/>
+              </a:rPr>
+              <a:t>(</a:t>
+            </a:r>
+            <a:r>
+              <a:rPr lang="en-US" sz="1500" dirty="0" err="1">
+                <a:solidFill>
+                  <a:srgbClr val="0000FF"/>
+                </a:solidFill>
+                <a:latin typeface="Consolas"/>
+              </a:rPr>
+              <a:t>int</a:t>
+            </a:r>
+            <a:r>
+              <a:rPr lang="en-US" sz="1500" dirty="0">
+                <a:solidFill>
+                  <a:srgbClr val="000000"/>
+                </a:solidFill>
+                <a:latin typeface="Consolas"/>
+              </a:rPr>
+              <a:t> start, </a:t>
+            </a:r>
+            <a:r>
+              <a:rPr lang="en-US" sz="1500" dirty="0" err="1">
+                <a:solidFill>
+                  <a:srgbClr val="0000FF"/>
+                </a:solidFill>
+                <a:latin typeface="Consolas"/>
+              </a:rPr>
+              <a:t>int</a:t>
+            </a:r>
+            <a:r>
+              <a:rPr lang="en-US" sz="1500" dirty="0">
+                <a:solidFill>
+                  <a:srgbClr val="000000"/>
+                </a:solidFill>
+                <a:latin typeface="Consolas"/>
+              </a:rPr>
+              <a:t> step, </a:t>
+            </a:r>
+            <a:r>
+              <a:rPr lang="en-US" sz="1500" dirty="0" err="1">
+                <a:solidFill>
+                  <a:srgbClr val="0000FF"/>
+                </a:solidFill>
+                <a:latin typeface="Consolas"/>
+              </a:rPr>
+              <a:t>int</a:t>
+            </a:r>
+            <a:r>
+              <a:rPr lang="en-US" sz="1500" dirty="0">
+                <a:solidFill>
+                  <a:srgbClr val="000000"/>
+                </a:solidFill>
+                <a:latin typeface="Consolas"/>
+              </a:rPr>
+              <a:t> count)</a:t>
             </a:r>
           </a:p>
           <a:p>
             <a:pPr marL="0" indent="0">
               <a:buNone/>
             </a:pPr>
-            <a:endParaRPr lang="ru-RU" dirty="0"/>
+            <a:r>
+              <a:rPr lang="en-US" sz="1500" dirty="0">
+                <a:solidFill>
+                  <a:srgbClr val="000000"/>
+                </a:solidFill>
+                <a:latin typeface="Consolas"/>
+              </a:rPr>
+              <a:t>{</a:t>
+            </a:r>
           </a:p>
           <a:p>
             <a:pPr marL="0" indent="0">
               <a:buNone/>
             </a:pPr>
             <a:r>
-              <a:rPr lang="en-US" sz="1600" dirty="0" smtClean="0">
-                <a:solidFill>
-                  <a:srgbClr val="FFFF00"/>
-                </a:solidFill>
-                <a:latin typeface="Courier New" pitchFamily="49" charset="0"/>
-                <a:cs typeface="Courier New" pitchFamily="49" charset="0"/>
-              </a:rPr>
-              <a:t>static</a:t>
-            </a:r>
-            <a:r>
-              <a:rPr lang="en-US" sz="1600" dirty="0" smtClean="0">
-                <a:latin typeface="Courier New" pitchFamily="49" charset="0"/>
-                <a:cs typeface="Courier New" pitchFamily="49" charset="0"/>
-              </a:rPr>
-              <a:t> class </a:t>
-            </a:r>
-            <a:r>
-              <a:rPr lang="en-US" sz="1600" dirty="0" err="1" smtClean="0">
-                <a:latin typeface="Courier New" pitchFamily="49" charset="0"/>
-                <a:cs typeface="Courier New" pitchFamily="49" charset="0"/>
-              </a:rPr>
-              <a:t>DateTime</a:t>
-            </a:r>
-            <a:r>
-              <a:rPr lang="en-US" sz="1600" dirty="0" err="1" smtClean="0">
-                <a:solidFill>
-                  <a:srgbClr val="FFFF00"/>
-                </a:solidFill>
-                <a:latin typeface="Courier New" pitchFamily="49" charset="0"/>
-                <a:cs typeface="Courier New" pitchFamily="49" charset="0"/>
-              </a:rPr>
-              <a:t>Extensions</a:t>
-            </a:r>
-            <a:r>
-              <a:rPr lang="en-US" sz="1600" dirty="0" smtClean="0">
-                <a:latin typeface="Courier New" pitchFamily="49" charset="0"/>
-                <a:cs typeface="Courier New" pitchFamily="49" charset="0"/>
-              </a:rPr>
-              <a:t/>
-            </a:r>
-            <a:br>
-              <a:rPr lang="en-US" sz="1600" dirty="0" smtClean="0">
-                <a:latin typeface="Courier New" pitchFamily="49" charset="0"/>
-                <a:cs typeface="Courier New" pitchFamily="49" charset="0"/>
-              </a:rPr>
-            </a:br>
-            <a:r>
-              <a:rPr lang="en-US" sz="1600" dirty="0" smtClean="0">
-                <a:latin typeface="Courier New" pitchFamily="49" charset="0"/>
-                <a:cs typeface="Courier New" pitchFamily="49" charset="0"/>
-              </a:rPr>
-              <a:t>{</a:t>
-            </a:r>
-            <a:br>
-              <a:rPr lang="en-US" sz="1600" dirty="0" smtClean="0">
-                <a:latin typeface="Courier New" pitchFamily="49" charset="0"/>
-                <a:cs typeface="Courier New" pitchFamily="49" charset="0"/>
-              </a:rPr>
-            </a:br>
-            <a:r>
-              <a:rPr lang="en-US" sz="1600" dirty="0" smtClean="0">
-                <a:latin typeface="Courier New" pitchFamily="49" charset="0"/>
-                <a:cs typeface="Courier New" pitchFamily="49" charset="0"/>
-              </a:rPr>
-              <a:t>    ///&lt;summary&gt;</a:t>
-            </a:r>
-            <a:br>
-              <a:rPr lang="en-US" sz="1600" dirty="0" smtClean="0">
-                <a:latin typeface="Courier New" pitchFamily="49" charset="0"/>
-                <a:cs typeface="Courier New" pitchFamily="49" charset="0"/>
-              </a:rPr>
-            </a:br>
-            <a:r>
-              <a:rPr lang="en-US" sz="1600" dirty="0" smtClean="0">
-                <a:latin typeface="Courier New" pitchFamily="49" charset="0"/>
-                <a:cs typeface="Courier New" pitchFamily="49" charset="0"/>
-              </a:rPr>
-              <a:t>    ///</a:t>
-            </a:r>
-            <a:r>
-              <a:rPr lang="ru-RU" sz="1600" dirty="0" smtClean="0">
-                <a:latin typeface="Courier New" pitchFamily="49" charset="0"/>
-                <a:cs typeface="Courier New" pitchFamily="49" charset="0"/>
-              </a:rPr>
-              <a:t>Вернет строку вида </a:t>
-            </a:r>
-            <a:r>
-              <a:rPr lang="en-US" sz="1600" dirty="0">
-                <a:latin typeface="Courier New" pitchFamily="49" charset="0"/>
-                <a:cs typeface="Courier New" pitchFamily="49" charset="0"/>
-              </a:rPr>
-              <a:t>2008-04-10T06:30:00</a:t>
-            </a:r>
-            <a:endParaRPr lang="en-US" sz="1600" dirty="0" smtClean="0">
-              <a:latin typeface="Courier New" pitchFamily="49" charset="0"/>
-              <a:cs typeface="Courier New" pitchFamily="49" charset="0"/>
-            </a:endParaRPr>
+              <a:rPr lang="ru-RU" sz="1500" dirty="0" smtClean="0">
+                <a:solidFill>
+                  <a:srgbClr val="0000FF"/>
+                </a:solidFill>
+                <a:latin typeface="Consolas"/>
+              </a:rPr>
+              <a:t>    </a:t>
+            </a:r>
+            <a:r>
+              <a:rPr lang="en-US" sz="1500" dirty="0" err="1" smtClean="0">
+                <a:solidFill>
+                  <a:srgbClr val="0000FF"/>
+                </a:solidFill>
+                <a:latin typeface="Consolas"/>
+              </a:rPr>
+              <a:t>int</a:t>
+            </a:r>
+            <a:r>
+              <a:rPr lang="en-US" sz="1500" dirty="0">
+                <a:solidFill>
+                  <a:srgbClr val="000000"/>
+                </a:solidFill>
+                <a:latin typeface="Consolas"/>
+              </a:rPr>
+              <a:t>[] numbers = </a:t>
+            </a:r>
+            <a:r>
+              <a:rPr lang="en-US" sz="1500" dirty="0">
+                <a:solidFill>
+                  <a:srgbClr val="0000FF"/>
+                </a:solidFill>
+                <a:latin typeface="Consolas"/>
+              </a:rPr>
+              <a:t>new</a:t>
+            </a:r>
+            <a:r>
+              <a:rPr lang="en-US" sz="1500" dirty="0">
+                <a:solidFill>
+                  <a:srgbClr val="000000"/>
+                </a:solidFill>
+                <a:latin typeface="Consolas"/>
+              </a:rPr>
+              <a:t> </a:t>
+            </a:r>
+            <a:r>
+              <a:rPr lang="en-US" sz="1500" dirty="0" err="1">
+                <a:solidFill>
+                  <a:srgbClr val="0000FF"/>
+                </a:solidFill>
+                <a:latin typeface="Consolas"/>
+              </a:rPr>
+              <a:t>int</a:t>
+            </a:r>
+            <a:r>
+              <a:rPr lang="en-US" sz="1500" dirty="0">
+                <a:solidFill>
+                  <a:srgbClr val="000000"/>
+                </a:solidFill>
+                <a:latin typeface="Consolas"/>
+              </a:rPr>
+              <a:t>[count];</a:t>
+            </a:r>
           </a:p>
           <a:p>
             <a:pPr marL="0" indent="0">
               <a:buNone/>
             </a:pPr>
             <a:r>
-              <a:rPr lang="en-US" sz="1600" dirty="0" smtClean="0">
-                <a:latin typeface="Courier New" pitchFamily="49" charset="0"/>
-                <a:cs typeface="Courier New" pitchFamily="49" charset="0"/>
-              </a:rPr>
-              <a:t>    ///&lt;/summary</a:t>
-            </a:r>
-            <a:r>
-              <a:rPr lang="en-US" sz="1600" dirty="0">
-                <a:latin typeface="Courier New" pitchFamily="49" charset="0"/>
-                <a:cs typeface="Courier New" pitchFamily="49" charset="0"/>
-              </a:rPr>
-              <a:t>&gt;</a:t>
-            </a:r>
-            <a:endParaRPr lang="en-US" sz="1600" dirty="0" smtClean="0">
-              <a:latin typeface="Courier New" pitchFamily="49" charset="0"/>
-              <a:cs typeface="Courier New" pitchFamily="49" charset="0"/>
-            </a:endParaRPr>
+              <a:rPr lang="ru-RU" sz="1500" dirty="0">
+                <a:solidFill>
+                  <a:srgbClr val="0000FF"/>
+                </a:solidFill>
+                <a:latin typeface="Consolas"/>
+              </a:rPr>
+              <a:t> </a:t>
+            </a:r>
+            <a:r>
+              <a:rPr lang="ru-RU" sz="1500" dirty="0" smtClean="0">
+                <a:solidFill>
+                  <a:srgbClr val="0000FF"/>
+                </a:solidFill>
+                <a:latin typeface="Consolas"/>
+              </a:rPr>
+              <a:t>   </a:t>
+            </a:r>
+            <a:r>
+              <a:rPr lang="en-US" sz="1500" dirty="0" smtClean="0">
+                <a:solidFill>
+                  <a:srgbClr val="000000"/>
+                </a:solidFill>
+                <a:latin typeface="Consolas"/>
+              </a:rPr>
+              <a:t>numbers[</a:t>
+            </a:r>
+            <a:r>
+              <a:rPr lang="en-US" sz="1500" dirty="0" smtClean="0">
+                <a:solidFill>
+                  <a:srgbClr val="C81EFA"/>
+                </a:solidFill>
+                <a:latin typeface="Consolas"/>
+              </a:rPr>
+              <a:t>0</a:t>
+            </a:r>
+            <a:r>
+              <a:rPr lang="en-US" sz="1500" dirty="0">
+                <a:solidFill>
+                  <a:srgbClr val="000000"/>
+                </a:solidFill>
+                <a:latin typeface="Consolas"/>
+              </a:rPr>
+              <a:t>] = start;</a:t>
+            </a:r>
           </a:p>
           <a:p>
             <a:pPr marL="0" indent="0">
               <a:buNone/>
             </a:pPr>
             <a:r>
-              <a:rPr lang="en-US" sz="1600" dirty="0" smtClean="0">
-                <a:latin typeface="Courier New" pitchFamily="49" charset="0"/>
-                <a:cs typeface="Courier New" pitchFamily="49" charset="0"/>
-              </a:rPr>
-              <a:t>    public </a:t>
-            </a:r>
-            <a:r>
-              <a:rPr lang="en-US" sz="1600" dirty="0" smtClean="0">
-                <a:solidFill>
-                  <a:srgbClr val="FFFF00"/>
-                </a:solidFill>
-                <a:latin typeface="Courier New" pitchFamily="49" charset="0"/>
-                <a:cs typeface="Courier New" pitchFamily="49" charset="0"/>
-              </a:rPr>
-              <a:t>static</a:t>
-            </a:r>
-            <a:r>
-              <a:rPr lang="en-US" sz="1600" dirty="0" smtClean="0">
-                <a:latin typeface="Courier New" pitchFamily="49" charset="0"/>
-                <a:cs typeface="Courier New" pitchFamily="49" charset="0"/>
-              </a:rPr>
-              <a:t> string ToIso8601String(</a:t>
-            </a:r>
-            <a:r>
-              <a:rPr lang="en-US" sz="1600" dirty="0" smtClean="0">
-                <a:solidFill>
-                  <a:srgbClr val="FFFF00"/>
-                </a:solidFill>
-                <a:latin typeface="Courier New" pitchFamily="49" charset="0"/>
-                <a:cs typeface="Courier New" pitchFamily="49" charset="0"/>
-              </a:rPr>
-              <a:t>this</a:t>
-            </a:r>
-            <a:r>
-              <a:rPr lang="en-US" sz="1600" dirty="0" smtClean="0">
-                <a:latin typeface="Courier New" pitchFamily="49" charset="0"/>
-                <a:cs typeface="Courier New" pitchFamily="49" charset="0"/>
+              <a:rPr lang="ru-RU" sz="1500" dirty="0" smtClean="0">
+                <a:solidFill>
+                  <a:srgbClr val="0000FF"/>
+                </a:solidFill>
+                <a:latin typeface="Consolas"/>
+              </a:rPr>
+              <a:t>    </a:t>
+            </a:r>
+            <a:r>
+              <a:rPr lang="nn-NO" sz="1500" dirty="0" smtClean="0">
+                <a:solidFill>
+                  <a:srgbClr val="0000FF"/>
+                </a:solidFill>
+                <a:latin typeface="Consolas"/>
+              </a:rPr>
+              <a:t>for</a:t>
+            </a:r>
+            <a:r>
+              <a:rPr lang="nn-NO" sz="1500" dirty="0" smtClean="0">
+                <a:solidFill>
+                  <a:srgbClr val="000000"/>
+                </a:solidFill>
+                <a:latin typeface="Consolas"/>
               </a:rPr>
               <a:t> </a:t>
             </a:r>
             <a:r>
-              <a:rPr lang="en-US" sz="1600" dirty="0" err="1" smtClean="0">
-                <a:latin typeface="Courier New" pitchFamily="49" charset="0"/>
-                <a:cs typeface="Courier New" pitchFamily="49" charset="0"/>
-              </a:rPr>
-              <a:t>DateTime</a:t>
-            </a:r>
-            <a:r>
-              <a:rPr lang="en-US" sz="1600" dirty="0" smtClean="0">
-                <a:latin typeface="Courier New" pitchFamily="49" charset="0"/>
-                <a:cs typeface="Courier New" pitchFamily="49" charset="0"/>
-              </a:rPr>
-              <a:t> </a:t>
-            </a:r>
-            <a:r>
-              <a:rPr lang="en-US" sz="1600" dirty="0" err="1" smtClean="0">
-                <a:latin typeface="Courier New" pitchFamily="49" charset="0"/>
-                <a:cs typeface="Courier New" pitchFamily="49" charset="0"/>
-              </a:rPr>
-              <a:t>dt</a:t>
-            </a:r>
-            <a:r>
-              <a:rPr lang="en-US" sz="1600" dirty="0" smtClean="0">
-                <a:latin typeface="Courier New" pitchFamily="49" charset="0"/>
-                <a:cs typeface="Courier New" pitchFamily="49" charset="0"/>
-              </a:rPr>
-              <a:t>)</a:t>
-            </a:r>
-            <a:br>
-              <a:rPr lang="en-US" sz="1600" dirty="0" smtClean="0">
-                <a:latin typeface="Courier New" pitchFamily="49" charset="0"/>
-                <a:cs typeface="Courier New" pitchFamily="49" charset="0"/>
-              </a:rPr>
-            </a:br>
-            <a:r>
-              <a:rPr lang="en-US" sz="1600" dirty="0" smtClean="0">
-                <a:latin typeface="Courier New" pitchFamily="49" charset="0"/>
-                <a:cs typeface="Courier New" pitchFamily="49" charset="0"/>
-              </a:rPr>
-              <a:t>    {</a:t>
+              <a:rPr lang="nn-NO" sz="1500" dirty="0">
+                <a:solidFill>
+                  <a:srgbClr val="000000"/>
+                </a:solidFill>
+                <a:latin typeface="Consolas"/>
+              </a:rPr>
+              <a:t>(</a:t>
+            </a:r>
+            <a:r>
+              <a:rPr lang="nn-NO" sz="1500" dirty="0">
+                <a:solidFill>
+                  <a:srgbClr val="0000FF"/>
+                </a:solidFill>
+                <a:latin typeface="Consolas"/>
+              </a:rPr>
+              <a:t>int</a:t>
+            </a:r>
+            <a:r>
+              <a:rPr lang="nn-NO" sz="1500" dirty="0">
+                <a:solidFill>
+                  <a:srgbClr val="000000"/>
+                </a:solidFill>
+                <a:latin typeface="Consolas"/>
+              </a:rPr>
+              <a:t> i=</a:t>
+            </a:r>
+            <a:r>
+              <a:rPr lang="nn-NO" sz="1500" dirty="0">
+                <a:solidFill>
+                  <a:srgbClr val="C81EFA"/>
+                </a:solidFill>
+                <a:latin typeface="Consolas"/>
+              </a:rPr>
+              <a:t>1</a:t>
+            </a:r>
+            <a:r>
+              <a:rPr lang="nn-NO" sz="1500" dirty="0">
+                <a:solidFill>
+                  <a:srgbClr val="000000"/>
+                </a:solidFill>
+                <a:latin typeface="Consolas"/>
+              </a:rPr>
+              <a:t>; i&lt;count; i++)</a:t>
             </a:r>
           </a:p>
           <a:p>
@@ -9229,58 +9759,87 @@
               <a:buNone/>
             </a:pPr>
             <a:r>
-              <a:rPr lang="en-US" sz="1600" dirty="0">
-                <a:latin typeface="Courier New" pitchFamily="49" charset="0"/>
-                <a:cs typeface="Courier New" pitchFamily="49" charset="0"/>
-              </a:rPr>
-              <a:t> </a:t>
-            </a:r>
-            <a:r>
-              <a:rPr lang="en-US" sz="1600" dirty="0" smtClean="0">
-                <a:latin typeface="Courier New" pitchFamily="49" charset="0"/>
-                <a:cs typeface="Courier New" pitchFamily="49" charset="0"/>
-              </a:rPr>
-              <a:t>       return </a:t>
-            </a:r>
-            <a:r>
-              <a:rPr lang="en-US" sz="1600" dirty="0" err="1" smtClean="0">
-                <a:latin typeface="Courier New" pitchFamily="49" charset="0"/>
-                <a:cs typeface="Courier New" pitchFamily="49" charset="0"/>
-              </a:rPr>
-              <a:t>dt.ToString</a:t>
-            </a:r>
-            <a:r>
-              <a:rPr lang="en-US" sz="1600" dirty="0">
-                <a:latin typeface="Courier New" pitchFamily="49" charset="0"/>
-                <a:cs typeface="Courier New" pitchFamily="49" charset="0"/>
-              </a:rPr>
-              <a:t>("</a:t>
-            </a:r>
-            <a:r>
-              <a:rPr lang="en-US" sz="1600" dirty="0" smtClean="0">
-                <a:latin typeface="Courier New" pitchFamily="49" charset="0"/>
-                <a:cs typeface="Courier New" pitchFamily="49" charset="0"/>
-              </a:rPr>
-              <a:t>s");</a:t>
-            </a:r>
+              <a:rPr lang="ru-RU" sz="1500" dirty="0" smtClean="0">
+                <a:solidFill>
+                  <a:srgbClr val="000000"/>
+                </a:solidFill>
+                <a:latin typeface="Consolas"/>
+              </a:rPr>
+              <a:t>    </a:t>
+            </a:r>
+            <a:r>
+              <a:rPr lang="en-US" sz="1500" dirty="0" smtClean="0">
+                <a:solidFill>
+                  <a:srgbClr val="000000"/>
+                </a:solidFill>
+                <a:latin typeface="Consolas"/>
+              </a:rPr>
+              <a:t>{</a:t>
+            </a:r>
+            <a:endParaRPr lang="en-US" sz="1500" dirty="0">
+              <a:solidFill>
+                <a:srgbClr val="000000"/>
+              </a:solidFill>
+              <a:latin typeface="Consolas"/>
+            </a:endParaRPr>
           </a:p>
           <a:p>
             <a:pPr marL="0" indent="0">
               <a:buNone/>
             </a:pPr>
             <a:r>
-              <a:rPr lang="en-US" sz="1600" dirty="0">
-                <a:latin typeface="Courier New" pitchFamily="49" charset="0"/>
-                <a:cs typeface="Courier New" pitchFamily="49" charset="0"/>
-              </a:rPr>
-              <a:t> </a:t>
-            </a:r>
-            <a:r>
-              <a:rPr lang="en-US" sz="1600" dirty="0" smtClean="0">
-                <a:latin typeface="Courier New" pitchFamily="49" charset="0"/>
-                <a:cs typeface="Courier New" pitchFamily="49" charset="0"/>
-              </a:rPr>
-              <a:t>   }</a:t>
+              <a:rPr lang="ru-RU" sz="1500" dirty="0" smtClean="0">
+                <a:solidFill>
+                  <a:srgbClr val="000000"/>
+                </a:solidFill>
+                <a:latin typeface="Consolas"/>
+              </a:rPr>
+              <a:t>         </a:t>
+            </a:r>
+            <a:r>
+              <a:rPr lang="en-US" sz="1500" dirty="0" smtClean="0">
+                <a:solidFill>
+                  <a:srgbClr val="000000"/>
+                </a:solidFill>
+                <a:latin typeface="Consolas"/>
+              </a:rPr>
+              <a:t>numbers[</a:t>
+            </a:r>
+            <a:r>
+              <a:rPr lang="en-US" sz="1500" dirty="0" err="1" smtClean="0">
+                <a:solidFill>
+                  <a:srgbClr val="000000"/>
+                </a:solidFill>
+                <a:latin typeface="Consolas"/>
+              </a:rPr>
+              <a:t>i</a:t>
+            </a:r>
+            <a:r>
+              <a:rPr lang="en-US" sz="1500" dirty="0">
+                <a:solidFill>
+                  <a:srgbClr val="000000"/>
+                </a:solidFill>
+                <a:latin typeface="Consolas"/>
+              </a:rPr>
+              <a:t>] = numbers[i-</a:t>
+            </a:r>
+            <a:r>
+              <a:rPr lang="en-US" sz="1500" dirty="0">
+                <a:solidFill>
+                  <a:srgbClr val="C81EFA"/>
+                </a:solidFill>
+                <a:latin typeface="Consolas"/>
+              </a:rPr>
+              <a:t>1</a:t>
+            </a:r>
+            <a:r>
+              <a:rPr lang="en-US" sz="1500" dirty="0">
+                <a:solidFill>
+                  <a:srgbClr val="000000"/>
+                </a:solidFill>
+                <a:latin typeface="Consolas"/>
+              </a:rPr>
+              <a:t>] + step;</a:t>
             </a:r>
           </a:p>
           <a:p>
@@ -9288,57 +9847,347 @@
               <a:buNone/>
             </a:pPr>
             <a:r>
-              <a:rPr lang="en-US" sz="1600" dirty="0" smtClean="0">
-                <a:latin typeface="Courier New" pitchFamily="49" charset="0"/>
-                <a:cs typeface="Courier New" pitchFamily="49" charset="0"/>
+              <a:rPr lang="ru-RU" sz="1500" dirty="0" smtClean="0">
+                <a:solidFill>
+                  <a:srgbClr val="000000"/>
+                </a:solidFill>
+                <a:latin typeface="Consolas"/>
+              </a:rPr>
+              <a:t>    </a:t>
+            </a:r>
+            <a:r>
+              <a:rPr lang="en-US" sz="1500" dirty="0" smtClean="0">
+                <a:solidFill>
+                  <a:srgbClr val="000000"/>
+                </a:solidFill>
+                <a:latin typeface="Consolas"/>
               </a:rPr>
               <a:t>}</a:t>
             </a:r>
+            <a:endParaRPr lang="en-US" sz="1500" dirty="0">
+              <a:solidFill>
+                <a:srgbClr val="000000"/>
+              </a:solidFill>
+              <a:latin typeface="Consolas"/>
+            </a:endParaRPr>
           </a:p>
           <a:p>
             <a:pPr marL="0" indent="0">
               <a:buNone/>
             </a:pPr>
-            <a:endParaRPr lang="en-US" sz="1600" dirty="0" smtClean="0">
-              <a:latin typeface="Courier New" pitchFamily="49" charset="0"/>
-              <a:cs typeface="Courier New" pitchFamily="49" charset="0"/>
-            </a:endParaRPr>
+            <a:r>
+              <a:rPr lang="ru-RU" sz="1500" dirty="0" smtClean="0">
+                <a:solidFill>
+                  <a:srgbClr val="0000FF"/>
+                </a:solidFill>
+                <a:latin typeface="Consolas"/>
+              </a:rPr>
+              <a:t>    </a:t>
+            </a:r>
+            <a:r>
+              <a:rPr lang="en-US" sz="1500" dirty="0" smtClean="0">
+                <a:solidFill>
+                  <a:srgbClr val="0000FF"/>
+                </a:solidFill>
+                <a:latin typeface="Consolas"/>
+              </a:rPr>
+              <a:t>return</a:t>
+            </a:r>
+            <a:r>
+              <a:rPr lang="en-US" sz="1500" dirty="0" smtClean="0">
+                <a:solidFill>
+                  <a:srgbClr val="000000"/>
+                </a:solidFill>
+                <a:latin typeface="Consolas"/>
+              </a:rPr>
+              <a:t> </a:t>
+            </a:r>
+            <a:r>
+              <a:rPr lang="en-US" sz="1500" dirty="0">
+                <a:solidFill>
+                  <a:srgbClr val="000000"/>
+                </a:solidFill>
+                <a:latin typeface="Consolas"/>
+              </a:rPr>
+              <a:t>numbers;</a:t>
+            </a:r>
           </a:p>
           <a:p>
             <a:pPr marL="0" indent="0">
               <a:buNone/>
             </a:pPr>
             <a:r>
-              <a:rPr lang="en-US" sz="1600" dirty="0" smtClean="0">
-                <a:latin typeface="Courier New" pitchFamily="49" charset="0"/>
-                <a:cs typeface="Courier New" pitchFamily="49" charset="0"/>
-              </a:rPr>
-              <a:t>string today = DateTime.UtcNow.ToIso8601String();</a:t>
-            </a:r>
-            <a:endParaRPr lang="en-US" sz="1600" dirty="0">
-              <a:latin typeface="Courier New" pitchFamily="49" charset="0"/>
-              <a:cs typeface="Courier New" pitchFamily="49" charset="0"/>
+              <a:rPr lang="en-US" sz="1500" dirty="0" smtClean="0">
+                <a:solidFill>
+                  <a:srgbClr val="000000"/>
+                </a:solidFill>
+                <a:latin typeface="Consolas"/>
+              </a:rPr>
+              <a:t>}</a:t>
+            </a:r>
+          </a:p>
+          <a:p>
+            <a:pPr marL="0" indent="0">
+              <a:buNone/>
+            </a:pPr>
+            <a:endParaRPr lang="en-US" sz="1500" dirty="0" smtClean="0">
+              <a:solidFill>
+                <a:srgbClr val="000000"/>
+              </a:solidFill>
+              <a:latin typeface="Consolas"/>
             </a:endParaRPr>
+          </a:p>
+          <a:p>
+            <a:pPr marL="0" indent="0">
+              <a:buNone/>
+            </a:pPr>
+            <a:r>
+              <a:rPr lang="en-US" sz="1500" dirty="0" err="1">
+                <a:solidFill>
+                  <a:srgbClr val="0000FF"/>
+                </a:solidFill>
+                <a:latin typeface="Consolas"/>
+              </a:rPr>
+              <a:t>foreach</a:t>
+            </a:r>
+            <a:r>
+              <a:rPr lang="en-US" sz="1500" dirty="0">
+                <a:solidFill>
+                  <a:srgbClr val="000000"/>
+                </a:solidFill>
+                <a:latin typeface="Consolas"/>
+              </a:rPr>
+              <a:t> (</a:t>
+            </a:r>
+            <a:r>
+              <a:rPr lang="en-US" sz="1500" dirty="0" err="1">
+                <a:solidFill>
+                  <a:srgbClr val="0000FF"/>
+                </a:solidFill>
+                <a:latin typeface="Consolas"/>
+              </a:rPr>
+              <a:t>int</a:t>
+            </a:r>
+            <a:r>
+              <a:rPr lang="en-US" sz="1500" dirty="0">
+                <a:solidFill>
+                  <a:srgbClr val="000000"/>
+                </a:solidFill>
+                <a:latin typeface="Consolas"/>
+              </a:rPr>
+              <a:t> </a:t>
+            </a:r>
+            <a:r>
+              <a:rPr lang="en-US" sz="1500" dirty="0" err="1">
+                <a:solidFill>
+                  <a:srgbClr val="000000"/>
+                </a:solidFill>
+                <a:latin typeface="Consolas"/>
+              </a:rPr>
+              <a:t>num</a:t>
+            </a:r>
+            <a:r>
+              <a:rPr lang="en-US" sz="1500" dirty="0">
+                <a:solidFill>
+                  <a:srgbClr val="000000"/>
+                </a:solidFill>
+                <a:latin typeface="Consolas"/>
+              </a:rPr>
+              <a:t> </a:t>
+            </a:r>
+            <a:r>
+              <a:rPr lang="en-US" sz="1500" dirty="0">
+                <a:solidFill>
+                  <a:srgbClr val="0000FF"/>
+                </a:solidFill>
+                <a:latin typeface="Consolas"/>
+              </a:rPr>
+              <a:t>in</a:t>
+            </a:r>
+            <a:r>
+              <a:rPr lang="en-US" sz="1500" dirty="0">
+                <a:solidFill>
+                  <a:srgbClr val="000000"/>
+                </a:solidFill>
+                <a:latin typeface="Consolas"/>
+              </a:rPr>
+              <a:t> </a:t>
+            </a:r>
+            <a:r>
+              <a:rPr lang="en-US" sz="1500" dirty="0" err="1">
+                <a:solidFill>
+                  <a:srgbClr val="000000"/>
+                </a:solidFill>
+                <a:latin typeface="Consolas"/>
+              </a:rPr>
+              <a:t>ArithmeticProgression</a:t>
+            </a:r>
+            <a:r>
+              <a:rPr lang="en-US" sz="1500" dirty="0">
+                <a:solidFill>
+                  <a:srgbClr val="000000"/>
+                </a:solidFill>
+                <a:latin typeface="Consolas"/>
+              </a:rPr>
+              <a:t>(</a:t>
+            </a:r>
+            <a:r>
+              <a:rPr lang="en-US" sz="1500" dirty="0">
+                <a:solidFill>
+                  <a:srgbClr val="C81EFA"/>
+                </a:solidFill>
+                <a:latin typeface="Consolas"/>
+              </a:rPr>
+              <a:t>1</a:t>
+            </a:r>
+            <a:r>
+              <a:rPr lang="en-US" sz="1500" dirty="0">
+                <a:solidFill>
+                  <a:srgbClr val="000000"/>
+                </a:solidFill>
+                <a:latin typeface="Consolas"/>
+              </a:rPr>
+              <a:t>, </a:t>
+            </a:r>
+            <a:r>
+              <a:rPr lang="en-US" sz="1500" dirty="0">
+                <a:solidFill>
+                  <a:srgbClr val="C81EFA"/>
+                </a:solidFill>
+                <a:latin typeface="Consolas"/>
+              </a:rPr>
+              <a:t>3</a:t>
+            </a:r>
+            <a:r>
+              <a:rPr lang="en-US" sz="1500" dirty="0">
+                <a:solidFill>
+                  <a:srgbClr val="000000"/>
+                </a:solidFill>
+                <a:latin typeface="Consolas"/>
+              </a:rPr>
+              <a:t>, </a:t>
+            </a:r>
+            <a:r>
+              <a:rPr lang="en-US" sz="1500" dirty="0">
+                <a:solidFill>
+                  <a:srgbClr val="C81EFA"/>
+                </a:solidFill>
+                <a:latin typeface="Consolas"/>
+              </a:rPr>
+              <a:t>10</a:t>
+            </a:r>
+            <a:r>
+              <a:rPr lang="en-US" sz="1500" dirty="0" smtClean="0">
+                <a:solidFill>
+                  <a:srgbClr val="000000"/>
+                </a:solidFill>
+                <a:latin typeface="Consolas"/>
+              </a:rPr>
+              <a:t>))</a:t>
+            </a:r>
+            <a:endParaRPr lang="en-US" sz="1500" dirty="0">
+              <a:solidFill>
+                <a:srgbClr val="000000"/>
+              </a:solidFill>
+              <a:latin typeface="Consolas"/>
+            </a:endParaRPr>
+          </a:p>
+          <a:p>
+            <a:pPr marL="0" indent="0">
+              <a:buNone/>
+            </a:pPr>
+            <a:r>
+              <a:rPr lang="en-US" sz="1500" dirty="0">
+                <a:solidFill>
+                  <a:srgbClr val="000000"/>
+                </a:solidFill>
+                <a:latin typeface="Consolas"/>
+              </a:rPr>
+              <a:t>{</a:t>
+            </a:r>
+          </a:p>
+          <a:p>
+            <a:pPr marL="0" indent="0">
+              <a:buNone/>
+            </a:pPr>
+            <a:r>
+              <a:rPr lang="en-US" sz="1500" dirty="0" smtClean="0">
+                <a:solidFill>
+                  <a:srgbClr val="000000"/>
+                </a:solidFill>
+                <a:latin typeface="Consolas"/>
+              </a:rPr>
+              <a:t>    </a:t>
+            </a:r>
+            <a:r>
+              <a:rPr lang="en-US" sz="1500" dirty="0" err="1" smtClean="0">
+                <a:solidFill>
+                  <a:srgbClr val="000000"/>
+                </a:solidFill>
+                <a:latin typeface="Consolas"/>
+              </a:rPr>
+              <a:t>Console.WriteLine</a:t>
+            </a:r>
+            <a:r>
+              <a:rPr lang="en-US" sz="1500" dirty="0" smtClean="0">
+                <a:solidFill>
+                  <a:srgbClr val="000000"/>
+                </a:solidFill>
+                <a:latin typeface="Consolas"/>
+              </a:rPr>
+              <a:t>(</a:t>
+            </a:r>
+            <a:r>
+              <a:rPr lang="en-US" sz="1500" dirty="0" err="1" smtClean="0">
+                <a:solidFill>
+                  <a:srgbClr val="000000"/>
+                </a:solidFill>
+                <a:latin typeface="Consolas"/>
+              </a:rPr>
+              <a:t>num</a:t>
+            </a:r>
+            <a:r>
+              <a:rPr lang="en-US" sz="1500" dirty="0">
+                <a:solidFill>
+                  <a:srgbClr val="000000"/>
+                </a:solidFill>
+                <a:latin typeface="Consolas"/>
+              </a:rPr>
+              <a:t>);</a:t>
+            </a:r>
+          </a:p>
+          <a:p>
+            <a:pPr marL="0" indent="0">
+              <a:buNone/>
+            </a:pPr>
+            <a:r>
+              <a:rPr lang="en-US" sz="1500" dirty="0">
+                <a:solidFill>
+                  <a:srgbClr val="000000"/>
+                </a:solidFill>
+                <a:latin typeface="Consolas"/>
+              </a:rPr>
+              <a:t>}</a:t>
+            </a:r>
+          </a:p>
+          <a:p>
+            <a:pPr marL="0" indent="0">
+              <a:buNone/>
+            </a:pPr>
+            <a:endParaRPr lang="en-US" dirty="0"/>
           </a:p>
         </p:txBody>
       </p:sp>
     </p:spTree>
     <p:extLst>
       <p:ext uri="{BB962C8B-B14F-4D97-AF65-F5344CB8AC3E}">
-        <p14:creationId xmlns:p14="http://schemas.microsoft.com/office/powerpoint/2010/main" val="3545898277"/>
+        <p14:creationId xmlns:p14="http://schemas.microsoft.com/office/powerpoint/2010/main" val="1735524147"/>
       </p:ext>
     </p:extLst>
   </p:cSld>
   <p:clrMapOvr>
     <a:masterClrMapping/>
   </p:clrMapOvr>
-  <p:timing>
-    <p:tnLst>
-      <p:par>
-        <p:cTn id="1" dur="indefinite" restart="never" nodeType="tmRoot"/>
-      </p:par>
-    </p:tnLst>
-  </p:timing>
 </p:sld>
 </file>
 
@@ -9371,35 +10220,25 @@
         </p:nvSpPr>
         <p:spPr/>
         <p:txBody>
-          <a:bodyPr>
-            <a:normAutofit fontScale="90000"/>
-          </a:bodyPr>
+          <a:bodyPr/>
           <a:lstStyle/>
           <a:p>
             <a:r>
               <a:rPr lang="ru-RU" dirty="0" smtClean="0"/>
-              <a:t>Лямбда</a:t>
-            </a:r>
-            <a:r>
-              <a:rPr lang="en-US" dirty="0" smtClean="0"/>
-              <a:t>-</a:t>
+              <a:t>Итераторы</a:t>
+            </a:r>
+            <a:r>
+              <a:rPr lang="en-US" dirty="0"/>
+              <a:t> </a:t>
             </a:r>
             <a:r>
               <a:rPr lang="ru-RU" dirty="0" smtClean="0"/>
-              <a:t>выражения</a:t>
-            </a:r>
-            <a:r>
-              <a:rPr lang="en-US" dirty="0" smtClean="0"/>
-              <a:t/>
-            </a:r>
-            <a:br>
-              <a:rPr lang="en-US" dirty="0" smtClean="0"/>
-            </a:br>
-            <a:r>
-              <a:rPr lang="en-US" dirty="0" smtClean="0"/>
-              <a:t>(lambda expressions)</a:t>
-            </a:r>
-            <a:endParaRPr lang="en-US" dirty="0"/>
+              <a:t>и </a:t>
+            </a:r>
+            <a:r>
+              <a:rPr lang="en-US" dirty="0"/>
+              <a:t>yield</a:t>
+            </a:r>
           </a:p>
         </p:txBody>
       </p:sp>
@@ -9413,19 +10252,629 @@
             <p:ph idx="1"/>
           </p:nvPr>
         </p:nvSpPr>
-        <p:spPr/>
+        <p:spPr>
+          <a:xfrm>
+            <a:off x="457200" y="1600201"/>
+            <a:ext cx="8229600" cy="3412975"/>
+          </a:xfrm>
+          <a:solidFill>
+            <a:schemeClr val="bg1"/>
+          </a:solidFill>
+        </p:spPr>
         <p:txBody>
-          <a:bodyPr/>
+          <a:bodyPr>
+            <a:normAutofit/>
+          </a:bodyPr>
           <a:lstStyle/>
           <a:p>
+            <a:pPr marL="0" indent="0">
+              <a:buNone/>
+            </a:pPr>
+            <a:r>
+              <a:rPr lang="en-US" sz="1500" dirty="0">
+                <a:solidFill>
+                  <a:srgbClr val="0000FF"/>
+                </a:solidFill>
+                <a:latin typeface="Consolas"/>
+              </a:rPr>
+              <a:t>public</a:t>
+            </a:r>
+            <a:r>
+              <a:rPr lang="en-US" sz="1500" dirty="0">
+                <a:solidFill>
+                  <a:srgbClr val="000000"/>
+                </a:solidFill>
+                <a:latin typeface="Consolas"/>
+              </a:rPr>
+              <a:t> </a:t>
+            </a:r>
+            <a:r>
+              <a:rPr lang="en-US" sz="1500" dirty="0">
+                <a:solidFill>
+                  <a:srgbClr val="0000FF"/>
+                </a:solidFill>
+                <a:latin typeface="Consolas"/>
+              </a:rPr>
+              <a:t>static</a:t>
+            </a:r>
+            <a:r>
+              <a:rPr lang="en-US" sz="1500" dirty="0">
+                <a:solidFill>
+                  <a:srgbClr val="000000"/>
+                </a:solidFill>
+                <a:latin typeface="Consolas"/>
+              </a:rPr>
+              <a:t> </a:t>
+            </a:r>
+            <a:r>
+              <a:rPr lang="en-US" sz="1500" dirty="0" err="1" smtClean="0">
+                <a:solidFill>
+                  <a:srgbClr val="000000"/>
+                </a:solidFill>
+                <a:latin typeface="Consolas"/>
+              </a:rPr>
+              <a:t>IEnumerable</a:t>
+            </a:r>
+            <a:r>
+              <a:rPr lang="en-US" sz="1500" dirty="0" smtClean="0">
+                <a:solidFill>
+                  <a:srgbClr val="000000"/>
+                </a:solidFill>
+                <a:latin typeface="Consolas"/>
+              </a:rPr>
+              <a:t>&lt;</a:t>
+            </a:r>
+            <a:r>
+              <a:rPr lang="en-US" sz="1500" dirty="0" err="1" smtClean="0">
+                <a:solidFill>
+                  <a:srgbClr val="0000FF"/>
+                </a:solidFill>
+                <a:latin typeface="Consolas"/>
+              </a:rPr>
+              <a:t>int</a:t>
+            </a:r>
+            <a:r>
+              <a:rPr lang="en-US" sz="1500" dirty="0" smtClean="0">
+                <a:solidFill>
+                  <a:srgbClr val="0000FF"/>
+                </a:solidFill>
+                <a:latin typeface="Consolas"/>
+              </a:rPr>
+              <a:t>&gt;</a:t>
+            </a:r>
+            <a:r>
+              <a:rPr lang="en-US" sz="1500" dirty="0" smtClean="0">
+                <a:solidFill>
+                  <a:srgbClr val="000000"/>
+                </a:solidFill>
+                <a:latin typeface="Consolas"/>
+              </a:rPr>
+              <a:t> </a:t>
+            </a:r>
+            <a:r>
+              <a:rPr lang="en-US" sz="1500" dirty="0" err="1">
+                <a:solidFill>
+                  <a:srgbClr val="000000"/>
+                </a:solidFill>
+                <a:latin typeface="Consolas"/>
+              </a:rPr>
+              <a:t>ArithmeticProgression</a:t>
+            </a:r>
+            <a:r>
+              <a:rPr lang="en-US" sz="1500" dirty="0">
+                <a:solidFill>
+                  <a:srgbClr val="000000"/>
+                </a:solidFill>
+                <a:latin typeface="Consolas"/>
+              </a:rPr>
+              <a:t>(</a:t>
+            </a:r>
+            <a:r>
+              <a:rPr lang="en-US" sz="1500" dirty="0" err="1">
+                <a:solidFill>
+                  <a:srgbClr val="0000FF"/>
+                </a:solidFill>
+                <a:latin typeface="Consolas"/>
+              </a:rPr>
+              <a:t>int</a:t>
+            </a:r>
+            <a:r>
+              <a:rPr lang="en-US" sz="1500" dirty="0">
+                <a:solidFill>
+                  <a:srgbClr val="000000"/>
+                </a:solidFill>
+                <a:latin typeface="Consolas"/>
+              </a:rPr>
+              <a:t> start, </a:t>
+            </a:r>
+            <a:r>
+              <a:rPr lang="en-US" sz="1500" dirty="0" err="1">
+                <a:solidFill>
+                  <a:srgbClr val="0000FF"/>
+                </a:solidFill>
+                <a:latin typeface="Consolas"/>
+              </a:rPr>
+              <a:t>int</a:t>
+            </a:r>
+            <a:r>
+              <a:rPr lang="en-US" sz="1500" dirty="0">
+                <a:solidFill>
+                  <a:srgbClr val="000000"/>
+                </a:solidFill>
+                <a:latin typeface="Consolas"/>
+              </a:rPr>
+              <a:t> </a:t>
+            </a:r>
+            <a:r>
+              <a:rPr lang="en-US" sz="1500" dirty="0" smtClean="0">
+                <a:solidFill>
+                  <a:srgbClr val="000000"/>
+                </a:solidFill>
+                <a:latin typeface="Consolas"/>
+              </a:rPr>
+              <a:t>step)</a:t>
+            </a:r>
+            <a:endParaRPr lang="en-US" sz="1500" dirty="0">
+              <a:solidFill>
+                <a:srgbClr val="000000"/>
+              </a:solidFill>
+              <a:latin typeface="Consolas"/>
+            </a:endParaRPr>
+          </a:p>
+          <a:p>
+            <a:pPr marL="0" indent="0">
+              <a:buNone/>
+            </a:pPr>
+            <a:r>
+              <a:rPr lang="en-US" sz="1500" dirty="0">
+                <a:solidFill>
+                  <a:srgbClr val="000000"/>
+                </a:solidFill>
+                <a:latin typeface="Consolas"/>
+              </a:rPr>
+              <a:t>{</a:t>
+            </a:r>
+          </a:p>
+          <a:p>
+            <a:pPr marL="0" indent="0">
+              <a:buNone/>
+            </a:pPr>
+            <a:r>
+              <a:rPr lang="en-US" sz="1600" dirty="0" smtClean="0">
+                <a:solidFill>
+                  <a:srgbClr val="0000FF"/>
+                </a:solidFill>
+                <a:latin typeface="Consolas"/>
+              </a:rPr>
+              <a:t>    for</a:t>
+            </a:r>
+            <a:r>
+              <a:rPr lang="en-US" sz="1600" dirty="0" smtClean="0">
+                <a:solidFill>
+                  <a:srgbClr val="000000"/>
+                </a:solidFill>
+                <a:latin typeface="Consolas"/>
+              </a:rPr>
+              <a:t> </a:t>
+            </a:r>
+            <a:r>
+              <a:rPr lang="en-US" sz="1600" dirty="0">
+                <a:solidFill>
+                  <a:srgbClr val="000000"/>
+                </a:solidFill>
+                <a:latin typeface="Consolas"/>
+              </a:rPr>
+              <a:t>(</a:t>
+            </a:r>
+            <a:r>
+              <a:rPr lang="en-US" sz="1600" dirty="0" err="1">
+                <a:solidFill>
+                  <a:srgbClr val="0000FF"/>
+                </a:solidFill>
+                <a:latin typeface="Consolas"/>
+              </a:rPr>
+              <a:t>int</a:t>
+            </a:r>
+            <a:r>
+              <a:rPr lang="en-US" sz="1600" dirty="0">
+                <a:solidFill>
+                  <a:srgbClr val="000000"/>
+                </a:solidFill>
+                <a:latin typeface="Consolas"/>
+              </a:rPr>
+              <a:t> current=start; ; current += step)</a:t>
+            </a:r>
+          </a:p>
+          <a:p>
+            <a:pPr marL="0" indent="0">
+              <a:buNone/>
+            </a:pPr>
+            <a:r>
+              <a:rPr lang="en-US" sz="1600" dirty="0" smtClean="0">
+                <a:solidFill>
+                  <a:srgbClr val="000000"/>
+                </a:solidFill>
+                <a:latin typeface="Consolas"/>
+              </a:rPr>
+              <a:t>    {</a:t>
+            </a:r>
+            <a:endParaRPr lang="en-US" sz="1600" dirty="0">
+              <a:solidFill>
+                <a:srgbClr val="000000"/>
+              </a:solidFill>
+              <a:latin typeface="Consolas"/>
+            </a:endParaRPr>
+          </a:p>
+          <a:p>
+            <a:pPr marL="0" indent="0">
+              <a:buNone/>
+            </a:pPr>
+            <a:r>
+              <a:rPr lang="en-US" sz="1600" dirty="0" smtClean="0">
+                <a:solidFill>
+                  <a:srgbClr val="0000FF"/>
+                </a:solidFill>
+                <a:latin typeface="Consolas"/>
+              </a:rPr>
+              <a:t>        yield</a:t>
+            </a:r>
+            <a:r>
+              <a:rPr lang="en-US" sz="1600" dirty="0" smtClean="0">
+                <a:solidFill>
+                  <a:srgbClr val="000000"/>
+                </a:solidFill>
+                <a:latin typeface="Consolas"/>
+              </a:rPr>
+              <a:t> </a:t>
+            </a:r>
+            <a:r>
+              <a:rPr lang="en-US" sz="1600" dirty="0">
+                <a:solidFill>
+                  <a:srgbClr val="0000FF"/>
+                </a:solidFill>
+                <a:latin typeface="Consolas"/>
+              </a:rPr>
+              <a:t>return</a:t>
+            </a:r>
+            <a:r>
+              <a:rPr lang="en-US" sz="1600" dirty="0">
+                <a:solidFill>
+                  <a:srgbClr val="000000"/>
+                </a:solidFill>
+                <a:latin typeface="Consolas"/>
+              </a:rPr>
+              <a:t> current;</a:t>
+            </a:r>
+          </a:p>
+          <a:p>
+            <a:pPr marL="0" indent="0">
+              <a:buNone/>
+            </a:pPr>
+            <a:r>
+              <a:rPr lang="en-US" sz="1600" dirty="0" smtClean="0">
+                <a:solidFill>
+                  <a:srgbClr val="000000"/>
+                </a:solidFill>
+                <a:latin typeface="Consolas"/>
+              </a:rPr>
+              <a:t>    }</a:t>
+            </a:r>
+            <a:endParaRPr lang="en-US" sz="1600" dirty="0">
+              <a:solidFill>
+                <a:srgbClr val="000000"/>
+              </a:solidFill>
+              <a:latin typeface="Consolas"/>
+            </a:endParaRPr>
+          </a:p>
+          <a:p>
+            <a:pPr marL="0" indent="0">
+              <a:buNone/>
+            </a:pPr>
+            <a:r>
+              <a:rPr lang="en-US" sz="1500" dirty="0" smtClean="0">
+                <a:solidFill>
+                  <a:srgbClr val="000000"/>
+                </a:solidFill>
+                <a:latin typeface="Consolas"/>
+              </a:rPr>
+              <a:t>}</a:t>
+            </a:r>
+          </a:p>
+          <a:p>
+            <a:pPr marL="0" indent="0">
+              <a:buNone/>
+            </a:pPr>
+            <a:endParaRPr lang="en-US" sz="1500" dirty="0" smtClean="0">
+              <a:solidFill>
+                <a:srgbClr val="000000"/>
+              </a:solidFill>
+              <a:latin typeface="Consolas"/>
+            </a:endParaRPr>
+          </a:p>
+          <a:p>
+            <a:pPr marL="0" indent="0">
+              <a:buNone/>
+            </a:pPr>
+            <a:r>
+              <a:rPr lang="en-US" sz="1500" dirty="0" err="1">
+                <a:solidFill>
+                  <a:srgbClr val="0000FF"/>
+                </a:solidFill>
+                <a:latin typeface="Consolas"/>
+              </a:rPr>
+              <a:t>foreach</a:t>
+            </a:r>
+            <a:r>
+              <a:rPr lang="en-US" sz="1500" dirty="0">
+                <a:solidFill>
+                  <a:srgbClr val="000000"/>
+                </a:solidFill>
+                <a:latin typeface="Consolas"/>
+              </a:rPr>
+              <a:t> (</a:t>
+            </a:r>
+            <a:r>
+              <a:rPr lang="en-US" sz="1500" dirty="0" err="1">
+                <a:solidFill>
+                  <a:srgbClr val="0000FF"/>
+                </a:solidFill>
+                <a:latin typeface="Consolas"/>
+              </a:rPr>
+              <a:t>int</a:t>
+            </a:r>
+            <a:r>
+              <a:rPr lang="en-US" sz="1500" dirty="0">
+                <a:solidFill>
+                  <a:srgbClr val="000000"/>
+                </a:solidFill>
+                <a:latin typeface="Consolas"/>
+              </a:rPr>
+              <a:t> </a:t>
+            </a:r>
+            <a:r>
+              <a:rPr lang="en-US" sz="1500" dirty="0" err="1">
+                <a:solidFill>
+                  <a:srgbClr val="000000"/>
+                </a:solidFill>
+                <a:latin typeface="Consolas"/>
+              </a:rPr>
+              <a:t>num</a:t>
+            </a:r>
+            <a:r>
+              <a:rPr lang="en-US" sz="1500" dirty="0">
+                <a:solidFill>
+                  <a:srgbClr val="000000"/>
+                </a:solidFill>
+                <a:latin typeface="Consolas"/>
+              </a:rPr>
+              <a:t> </a:t>
+            </a:r>
+            <a:r>
+              <a:rPr lang="en-US" sz="1500" dirty="0">
+                <a:solidFill>
+                  <a:srgbClr val="0000FF"/>
+                </a:solidFill>
+                <a:latin typeface="Consolas"/>
+              </a:rPr>
+              <a:t>in</a:t>
+            </a:r>
+            <a:r>
+              <a:rPr lang="en-US" sz="1500" dirty="0">
+                <a:solidFill>
+                  <a:srgbClr val="000000"/>
+                </a:solidFill>
+                <a:latin typeface="Consolas"/>
+              </a:rPr>
+              <a:t> </a:t>
+            </a:r>
+            <a:r>
+              <a:rPr lang="en-US" sz="1500" dirty="0" err="1">
+                <a:solidFill>
+                  <a:srgbClr val="000000"/>
+                </a:solidFill>
+                <a:latin typeface="Consolas"/>
+              </a:rPr>
+              <a:t>ArithmeticProgression</a:t>
+            </a:r>
+            <a:r>
+              <a:rPr lang="en-US" sz="1500" dirty="0">
+                <a:solidFill>
+                  <a:srgbClr val="000000"/>
+                </a:solidFill>
+                <a:latin typeface="Consolas"/>
+              </a:rPr>
+              <a:t>(</a:t>
+            </a:r>
+            <a:r>
+              <a:rPr lang="en-US" sz="1500" dirty="0">
+                <a:solidFill>
+                  <a:srgbClr val="C81EFA"/>
+                </a:solidFill>
+                <a:latin typeface="Consolas"/>
+              </a:rPr>
+              <a:t>1</a:t>
+            </a:r>
+            <a:r>
+              <a:rPr lang="en-US" sz="1500" dirty="0">
+                <a:solidFill>
+                  <a:srgbClr val="000000"/>
+                </a:solidFill>
+                <a:latin typeface="Consolas"/>
+              </a:rPr>
+              <a:t>, </a:t>
+            </a:r>
+            <a:r>
+              <a:rPr lang="en-US" sz="1500" dirty="0" smtClean="0">
+                <a:solidFill>
+                  <a:srgbClr val="C81EFA"/>
+                </a:solidFill>
+                <a:latin typeface="Consolas"/>
+              </a:rPr>
+              <a:t>3</a:t>
+            </a:r>
+            <a:r>
+              <a:rPr lang="en-US" sz="1500" dirty="0" smtClean="0">
+                <a:solidFill>
+                  <a:srgbClr val="000000"/>
+                </a:solidFill>
+                <a:latin typeface="Consolas"/>
+              </a:rPr>
+              <a:t>).Take(10))</a:t>
+            </a:r>
+            <a:endParaRPr lang="en-US" sz="1500" dirty="0">
+              <a:solidFill>
+                <a:srgbClr val="000000"/>
+              </a:solidFill>
+              <a:latin typeface="Consolas"/>
+            </a:endParaRPr>
+          </a:p>
+          <a:p>
+            <a:pPr marL="0" indent="0">
+              <a:buNone/>
+            </a:pPr>
+            <a:r>
+              <a:rPr lang="en-US" sz="1500" dirty="0">
+                <a:solidFill>
+                  <a:srgbClr val="000000"/>
+                </a:solidFill>
+                <a:latin typeface="Consolas"/>
+              </a:rPr>
+              <a:t>{</a:t>
+            </a:r>
+          </a:p>
+          <a:p>
+            <a:pPr marL="0" indent="0">
+              <a:buNone/>
+            </a:pPr>
+            <a:r>
+              <a:rPr lang="en-US" sz="1500" dirty="0" smtClean="0">
+                <a:solidFill>
+                  <a:srgbClr val="000000"/>
+                </a:solidFill>
+                <a:latin typeface="Consolas"/>
+              </a:rPr>
+              <a:t>    </a:t>
+            </a:r>
+            <a:r>
+              <a:rPr lang="en-US" sz="1500" dirty="0" err="1" smtClean="0">
+                <a:solidFill>
+                  <a:srgbClr val="000000"/>
+                </a:solidFill>
+                <a:latin typeface="Consolas"/>
+              </a:rPr>
+              <a:t>Console.WriteLine</a:t>
+            </a:r>
+            <a:r>
+              <a:rPr lang="en-US" sz="1500" dirty="0" smtClean="0">
+                <a:solidFill>
+                  <a:srgbClr val="000000"/>
+                </a:solidFill>
+                <a:latin typeface="Consolas"/>
+              </a:rPr>
+              <a:t>(</a:t>
+            </a:r>
+            <a:r>
+              <a:rPr lang="en-US" sz="1500" dirty="0" err="1" smtClean="0">
+                <a:solidFill>
+                  <a:srgbClr val="000000"/>
+                </a:solidFill>
+                <a:latin typeface="Consolas"/>
+              </a:rPr>
+              <a:t>num</a:t>
+            </a:r>
+            <a:r>
+              <a:rPr lang="en-US" sz="1500" dirty="0">
+                <a:solidFill>
+                  <a:srgbClr val="000000"/>
+                </a:solidFill>
+                <a:latin typeface="Consolas"/>
+              </a:rPr>
+              <a:t>);</a:t>
+            </a:r>
+          </a:p>
+          <a:p>
+            <a:pPr marL="0" indent="0">
+              <a:buNone/>
+            </a:pPr>
+            <a:r>
+              <a:rPr lang="en-US" sz="1500" dirty="0">
+                <a:solidFill>
+                  <a:srgbClr val="000000"/>
+                </a:solidFill>
+                <a:latin typeface="Consolas"/>
+              </a:rPr>
+              <a:t>}</a:t>
+            </a:r>
+          </a:p>
+          <a:p>
+            <a:pPr marL="0" indent="0">
+              <a:buNone/>
+            </a:pPr>
             <a:endParaRPr lang="en-US" dirty="0"/>
+          </a:p>
+        </p:txBody>
+      </p:sp>
+      <p:sp>
+        <p:nvSpPr>
+          <p:cNvPr id="4" name="TextBox 3"/>
+          <p:cNvSpPr txBox="1"/>
+          <p:nvPr/>
+        </p:nvSpPr>
+        <p:spPr>
+          <a:xfrm>
+            <a:off x="467544" y="5157192"/>
+            <a:ext cx="8280920" cy="830997"/>
+          </a:xfrm>
+          <a:prstGeom prst="rect">
+            <a:avLst/>
+          </a:prstGeom>
+          <a:noFill/>
+        </p:spPr>
+        <p:txBody>
+          <a:bodyPr wrap="square" rtlCol="0">
+            <a:spAutoFit/>
+          </a:bodyPr>
+          <a:lstStyle/>
+          <a:p>
+            <a:pPr marL="285750" indent="-285750">
+              <a:buFont typeface="Arial" pitchFamily="34" charset="0"/>
+              <a:buChar char="•"/>
+            </a:pPr>
+            <a:r>
+              <a:rPr lang="en-US" sz="1600" dirty="0" smtClean="0"/>
+              <a:t>yield return </a:t>
+            </a:r>
+            <a:r>
+              <a:rPr lang="ru-RU" sz="1600" dirty="0" smtClean="0"/>
+              <a:t>возращает текущее значение из итерации. При следующеем обращении выполнение продолжится </a:t>
+            </a:r>
+            <a:r>
+              <a:rPr lang="ru-RU" sz="1600" smtClean="0"/>
+              <a:t>с последнего места.</a:t>
+            </a:r>
+            <a:endParaRPr lang="en-US" sz="1600" dirty="0" smtClean="0"/>
+          </a:p>
+          <a:p>
+            <a:pPr marL="285750" indent="-285750">
+              <a:buFont typeface="Arial" pitchFamily="34" charset="0"/>
+              <a:buChar char="•"/>
+            </a:pPr>
+            <a:r>
+              <a:rPr lang="en-US" sz="1600" dirty="0" smtClean="0"/>
+              <a:t>yield break </a:t>
+            </a:r>
+            <a:r>
+              <a:rPr lang="ru-RU" sz="1600" dirty="0" smtClean="0"/>
+              <a:t>служит сигналом конца последовательности.</a:t>
+            </a:r>
+            <a:endParaRPr lang="en-US" sz="1600" dirty="0" smtClean="0"/>
           </a:p>
         </p:txBody>
       </p:sp>
     </p:spTree>
     <p:extLst>
       <p:ext uri="{BB962C8B-B14F-4D97-AF65-F5344CB8AC3E}">
-        <p14:creationId xmlns:p14="http://schemas.microsoft.com/office/powerpoint/2010/main" val="375333521"/>
+        <p14:creationId xmlns:p14="http://schemas.microsoft.com/office/powerpoint/2010/main" val="844285275"/>
       </p:ext>
     </p:extLst>
   </p:cSld>
@@ -9468,12 +10917,12 @@
           <a:lstStyle/>
           <a:p>
             <a:r>
+              <a:rPr lang="en-US" dirty="0" smtClean="0"/>
+              <a:t>Extension </a:t>
+            </a:r>
+            <a:r>
               <a:rPr lang="ru-RU" dirty="0" smtClean="0"/>
-              <a:t>Класс </a:t>
-            </a:r>
-            <a:r>
-              <a:rPr lang="en-US" dirty="0" err="1" smtClean="0"/>
-              <a:t>System.Linq.Enumerable</a:t>
+              <a:t>методы</a:t>
             </a:r>
             <a:endParaRPr lang="en-US" dirty="0"/>
           </a:p>
@@ -9492,7 +10941,7 @@
         <p:spPr/>
         <p:txBody>
           <a:bodyPr>
-            <a:normAutofit/>
+            <a:normAutofit fontScale="92500" lnSpcReduction="20000"/>
           </a:bodyPr>
           <a:lstStyle/>
           <a:p>
@@ -9501,37 +10950,330 @@
             </a:pPr>
             <a:r>
               <a:rPr lang="ru-RU" dirty="0" smtClean="0"/>
-              <a:t>Содержит множество полезных </a:t>
-            </a:r>
-            <a:r>
-              <a:rPr lang="en-US" dirty="0" smtClean="0"/>
-              <a:t>extension </a:t>
-            </a:r>
-            <a:r>
-              <a:rPr lang="ru-RU" dirty="0" smtClean="0"/>
-              <a:t>методов для </a:t>
-            </a:r>
-            <a:r>
-              <a:rPr lang="en-US" dirty="0" smtClean="0"/>
-              <a:t>LINQ</a:t>
-            </a:r>
-            <a:r>
-              <a:rPr lang="ru-RU" dirty="0" smtClean="0"/>
-              <a:t>.</a:t>
+              <a:t>Позволяют добавлять методы к уже существующим классам без нарушения инкапсуляции.</a:t>
             </a:r>
           </a:p>
           <a:p>
             <a:pPr marL="0" indent="0">
               <a:buNone/>
             </a:pPr>
-            <a:endParaRPr lang="en-US" dirty="0"/>
+            <a:endParaRPr lang="ru-RU" dirty="0"/>
+          </a:p>
+          <a:p>
+            <a:pPr marL="0" indent="0">
+              <a:buNone/>
+            </a:pPr>
+            <a:r>
+              <a:rPr lang="en-US" sz="1600" dirty="0" smtClean="0">
+                <a:solidFill>
+                  <a:srgbClr val="FFFF00"/>
+                </a:solidFill>
+                <a:latin typeface="Courier New" pitchFamily="49" charset="0"/>
+                <a:cs typeface="Courier New" pitchFamily="49" charset="0"/>
+              </a:rPr>
+              <a:t>static</a:t>
+            </a:r>
+            <a:r>
+              <a:rPr lang="en-US" sz="1600" dirty="0" smtClean="0">
+                <a:latin typeface="Courier New" pitchFamily="49" charset="0"/>
+                <a:cs typeface="Courier New" pitchFamily="49" charset="0"/>
+              </a:rPr>
+              <a:t> class </a:t>
+            </a:r>
+            <a:r>
+              <a:rPr lang="en-US" sz="1600" dirty="0" err="1" smtClean="0">
+                <a:latin typeface="Courier New" pitchFamily="49" charset="0"/>
+                <a:cs typeface="Courier New" pitchFamily="49" charset="0"/>
+              </a:rPr>
+              <a:t>DateTime</a:t>
+            </a:r>
+            <a:r>
+              <a:rPr lang="en-US" sz="1600" dirty="0" err="1" smtClean="0">
+                <a:solidFill>
+                  <a:srgbClr val="FFFF00"/>
+                </a:solidFill>
+                <a:latin typeface="Courier New" pitchFamily="49" charset="0"/>
+                <a:cs typeface="Courier New" pitchFamily="49" charset="0"/>
+              </a:rPr>
+              <a:t>Extensions</a:t>
+            </a:r>
+            <a:r>
+              <a:rPr lang="en-US" sz="1600" dirty="0" smtClean="0">
+                <a:latin typeface="Courier New" pitchFamily="49" charset="0"/>
+                <a:cs typeface="Courier New" pitchFamily="49" charset="0"/>
+              </a:rPr>
+              <a:t/>
+            </a:r>
+            <a:br>
+              <a:rPr lang="en-US" sz="1600" dirty="0" smtClean="0">
+                <a:latin typeface="Courier New" pitchFamily="49" charset="0"/>
+                <a:cs typeface="Courier New" pitchFamily="49" charset="0"/>
+              </a:rPr>
+            </a:br>
+            <a:r>
+              <a:rPr lang="en-US" sz="1600" dirty="0" smtClean="0">
+                <a:latin typeface="Courier New" pitchFamily="49" charset="0"/>
+                <a:cs typeface="Courier New" pitchFamily="49" charset="0"/>
+              </a:rPr>
+              <a:t>{</a:t>
+            </a:r>
+            <a:br>
+              <a:rPr lang="en-US" sz="1600" dirty="0" smtClean="0">
+                <a:latin typeface="Courier New" pitchFamily="49" charset="0"/>
+                <a:cs typeface="Courier New" pitchFamily="49" charset="0"/>
+              </a:rPr>
+            </a:br>
+            <a:r>
+              <a:rPr lang="en-US" sz="1600" dirty="0" smtClean="0">
+                <a:latin typeface="Courier New" pitchFamily="49" charset="0"/>
+                <a:cs typeface="Courier New" pitchFamily="49" charset="0"/>
+              </a:rPr>
+              <a:t>    ///&lt;summary&gt;</a:t>
+            </a:r>
+            <a:br>
+              <a:rPr lang="en-US" sz="1600" dirty="0" smtClean="0">
+                <a:latin typeface="Courier New" pitchFamily="49" charset="0"/>
+                <a:cs typeface="Courier New" pitchFamily="49" charset="0"/>
+              </a:rPr>
+            </a:br>
+            <a:r>
+              <a:rPr lang="en-US" sz="1600" dirty="0" smtClean="0">
+                <a:latin typeface="Courier New" pitchFamily="49" charset="0"/>
+                <a:cs typeface="Courier New" pitchFamily="49" charset="0"/>
+              </a:rPr>
+              <a:t>    ///</a:t>
+            </a:r>
+            <a:r>
+              <a:rPr lang="ru-RU" sz="1600" dirty="0" smtClean="0">
+                <a:latin typeface="Courier New" pitchFamily="49" charset="0"/>
+                <a:cs typeface="Courier New" pitchFamily="49" charset="0"/>
+              </a:rPr>
+              <a:t>Вернет строку вида </a:t>
+            </a:r>
+            <a:r>
+              <a:rPr lang="en-US" sz="1600" dirty="0">
+                <a:latin typeface="Courier New" pitchFamily="49" charset="0"/>
+                <a:cs typeface="Courier New" pitchFamily="49" charset="0"/>
+              </a:rPr>
+              <a:t>2008-04-10T06:30:00</a:t>
+            </a:r>
+            <a:endParaRPr lang="en-US" sz="1600" dirty="0" smtClean="0">
+              <a:latin typeface="Courier New" pitchFamily="49" charset="0"/>
+              <a:cs typeface="Courier New" pitchFamily="49" charset="0"/>
+            </a:endParaRPr>
+          </a:p>
+          <a:p>
+            <a:pPr marL="0" indent="0">
+              <a:buNone/>
+            </a:pPr>
+            <a:r>
+              <a:rPr lang="en-US" sz="1600" dirty="0" smtClean="0">
+                <a:latin typeface="Courier New" pitchFamily="49" charset="0"/>
+                <a:cs typeface="Courier New" pitchFamily="49" charset="0"/>
+              </a:rPr>
+              <a:t>    ///&lt;/summary</a:t>
+            </a:r>
+            <a:r>
+              <a:rPr lang="en-US" sz="1600" dirty="0">
+                <a:latin typeface="Courier New" pitchFamily="49" charset="0"/>
+                <a:cs typeface="Courier New" pitchFamily="49" charset="0"/>
+              </a:rPr>
+              <a:t>&gt;</a:t>
+            </a:r>
+            <a:endParaRPr lang="en-US" sz="1600" dirty="0" smtClean="0">
+              <a:latin typeface="Courier New" pitchFamily="49" charset="0"/>
+              <a:cs typeface="Courier New" pitchFamily="49" charset="0"/>
+            </a:endParaRPr>
+          </a:p>
+          <a:p>
+            <a:pPr marL="0" indent="0">
+              <a:buNone/>
+            </a:pPr>
+            <a:r>
+              <a:rPr lang="en-US" sz="1600" dirty="0" smtClean="0">
+                <a:latin typeface="Courier New" pitchFamily="49" charset="0"/>
+                <a:cs typeface="Courier New" pitchFamily="49" charset="0"/>
+              </a:rPr>
+              <a:t>    public </a:t>
+            </a:r>
+            <a:r>
+              <a:rPr lang="en-US" sz="1600" dirty="0" smtClean="0">
+                <a:solidFill>
+                  <a:srgbClr val="FFFF00"/>
+                </a:solidFill>
+                <a:latin typeface="Courier New" pitchFamily="49" charset="0"/>
+                <a:cs typeface="Courier New" pitchFamily="49" charset="0"/>
+              </a:rPr>
+              <a:t>static</a:t>
+            </a:r>
+            <a:r>
+              <a:rPr lang="en-US" sz="1600" dirty="0" smtClean="0">
+                <a:latin typeface="Courier New" pitchFamily="49" charset="0"/>
+                <a:cs typeface="Courier New" pitchFamily="49" charset="0"/>
+              </a:rPr>
+              <a:t> string ToIso8601String(</a:t>
+            </a:r>
+            <a:r>
+              <a:rPr lang="en-US" sz="1600" dirty="0" smtClean="0">
+                <a:solidFill>
+                  <a:srgbClr val="FFFF00"/>
+                </a:solidFill>
+                <a:latin typeface="Courier New" pitchFamily="49" charset="0"/>
+                <a:cs typeface="Courier New" pitchFamily="49" charset="0"/>
+              </a:rPr>
+              <a:t>this</a:t>
+            </a:r>
+            <a:r>
+              <a:rPr lang="en-US" sz="1600" dirty="0" smtClean="0">
+                <a:latin typeface="Courier New" pitchFamily="49" charset="0"/>
+                <a:cs typeface="Courier New" pitchFamily="49" charset="0"/>
+              </a:rPr>
+              <a:t> </a:t>
+            </a:r>
+            <a:r>
+              <a:rPr lang="en-US" sz="1600" dirty="0" err="1" smtClean="0">
+                <a:latin typeface="Courier New" pitchFamily="49" charset="0"/>
+                <a:cs typeface="Courier New" pitchFamily="49" charset="0"/>
+              </a:rPr>
+              <a:t>DateTime</a:t>
+            </a:r>
+            <a:r>
+              <a:rPr lang="en-US" sz="1600" dirty="0" smtClean="0">
+                <a:latin typeface="Courier New" pitchFamily="49" charset="0"/>
+                <a:cs typeface="Courier New" pitchFamily="49" charset="0"/>
+              </a:rPr>
+              <a:t> </a:t>
+            </a:r>
+            <a:r>
+              <a:rPr lang="en-US" sz="1600" dirty="0" err="1" smtClean="0">
+                <a:latin typeface="Courier New" pitchFamily="49" charset="0"/>
+                <a:cs typeface="Courier New" pitchFamily="49" charset="0"/>
+              </a:rPr>
+              <a:t>dt</a:t>
+            </a:r>
+            <a:r>
+              <a:rPr lang="en-US" sz="1600" dirty="0" smtClean="0">
+                <a:latin typeface="Courier New" pitchFamily="49" charset="0"/>
+                <a:cs typeface="Courier New" pitchFamily="49" charset="0"/>
+              </a:rPr>
+              <a:t>)</a:t>
+            </a:r>
+            <a:br>
+              <a:rPr lang="en-US" sz="1600" dirty="0" smtClean="0">
+                <a:latin typeface="Courier New" pitchFamily="49" charset="0"/>
+                <a:cs typeface="Courier New" pitchFamily="49" charset="0"/>
+              </a:rPr>
+            </a:br>
+            <a:r>
+              <a:rPr lang="en-US" sz="1600" dirty="0" smtClean="0">
+                <a:latin typeface="Courier New" pitchFamily="49" charset="0"/>
+                <a:cs typeface="Courier New" pitchFamily="49" charset="0"/>
+              </a:rPr>
+              <a:t>    {</a:t>
+            </a:r>
+          </a:p>
+          <a:p>
+            <a:pPr marL="0" indent="0">
+              <a:buNone/>
+            </a:pPr>
+            <a:r>
+              <a:rPr lang="en-US" sz="1600" dirty="0">
+                <a:latin typeface="Courier New" pitchFamily="49" charset="0"/>
+                <a:cs typeface="Courier New" pitchFamily="49" charset="0"/>
+              </a:rPr>
+              <a:t> </a:t>
+            </a:r>
+            <a:r>
+              <a:rPr lang="en-US" sz="1600" dirty="0" smtClean="0">
+                <a:latin typeface="Courier New" pitchFamily="49" charset="0"/>
+                <a:cs typeface="Courier New" pitchFamily="49" charset="0"/>
+              </a:rPr>
+              <a:t>       return </a:t>
+            </a:r>
+            <a:r>
+              <a:rPr lang="en-US" sz="1600" dirty="0" err="1" smtClean="0">
+                <a:latin typeface="Courier New" pitchFamily="49" charset="0"/>
+                <a:cs typeface="Courier New" pitchFamily="49" charset="0"/>
+              </a:rPr>
+              <a:t>dt.ToString</a:t>
+            </a:r>
+            <a:r>
+              <a:rPr lang="en-US" sz="1600" dirty="0">
+                <a:latin typeface="Courier New" pitchFamily="49" charset="0"/>
+                <a:cs typeface="Courier New" pitchFamily="49" charset="0"/>
+              </a:rPr>
+              <a:t>("</a:t>
+            </a:r>
+            <a:r>
+              <a:rPr lang="en-US" sz="1600" dirty="0" smtClean="0">
+                <a:latin typeface="Courier New" pitchFamily="49" charset="0"/>
+                <a:cs typeface="Courier New" pitchFamily="49" charset="0"/>
+              </a:rPr>
+              <a:t>s");</a:t>
+            </a:r>
+          </a:p>
+          <a:p>
+            <a:pPr marL="0" indent="0">
+              <a:buNone/>
+            </a:pPr>
+            <a:r>
+              <a:rPr lang="en-US" sz="1600" dirty="0">
+                <a:latin typeface="Courier New" pitchFamily="49" charset="0"/>
+                <a:cs typeface="Courier New" pitchFamily="49" charset="0"/>
+              </a:rPr>
+              <a:t> </a:t>
+            </a:r>
+            <a:r>
+              <a:rPr lang="en-US" sz="1600" dirty="0" smtClean="0">
+                <a:latin typeface="Courier New" pitchFamily="49" charset="0"/>
+                <a:cs typeface="Courier New" pitchFamily="49" charset="0"/>
+              </a:rPr>
+              <a:t>   }</a:t>
+            </a:r>
+          </a:p>
+          <a:p>
+            <a:pPr marL="0" indent="0">
+              <a:buNone/>
+            </a:pPr>
+            <a:r>
+              <a:rPr lang="en-US" sz="1600" dirty="0" smtClean="0">
+                <a:latin typeface="Courier New" pitchFamily="49" charset="0"/>
+                <a:cs typeface="Courier New" pitchFamily="49" charset="0"/>
+              </a:rPr>
+              <a:t>}</a:t>
+            </a:r>
+          </a:p>
+          <a:p>
+            <a:pPr marL="0" indent="0">
+              <a:buNone/>
+            </a:pPr>
+            <a:endParaRPr lang="en-US" sz="1600" dirty="0" smtClean="0">
+              <a:latin typeface="Courier New" pitchFamily="49" charset="0"/>
+              <a:cs typeface="Courier New" pitchFamily="49" charset="0"/>
+            </a:endParaRPr>
+          </a:p>
+          <a:p>
+            <a:pPr marL="0" indent="0">
+              <a:buNone/>
+            </a:pPr>
+            <a:r>
+              <a:rPr lang="en-US" sz="1600" dirty="0" smtClean="0">
+                <a:latin typeface="Courier New" pitchFamily="49" charset="0"/>
+                <a:cs typeface="Courier New" pitchFamily="49" charset="0"/>
+              </a:rPr>
+              <a:t>string today = DateTime.UtcNow.ToIso8601String();</a:t>
+            </a:r>
+            <a:endParaRPr lang="en-US" sz="1600" dirty="0">
+              <a:latin typeface="Courier New" pitchFamily="49" charset="0"/>
+              <a:cs typeface="Courier New" pitchFamily="49" charset="0"/>
+            </a:endParaRPr>
           </a:p>
         </p:txBody>
       </p:sp>
     </p:spTree>
     <p:extLst>
       <p:ext uri="{BB962C8B-B14F-4D97-AF65-F5344CB8AC3E}">
-        <p14:creationId xmlns:p14="http://schemas.microsoft.com/office/powerpoint/2010/main" val="2250229024"/>
+        <p14:creationId xmlns:p14="http://schemas.microsoft.com/office/powerpoint/2010/main" val="3545898277"/>
       </p:ext>
     </p:extLst>
   </p:cSld>
@@ -9577,20 +11319,33 @@
         </p:nvSpPr>
         <p:spPr/>
         <p:txBody>
-          <a:bodyPr/>
+          <a:bodyPr>
+            <a:normAutofit fontScale="90000"/>
+          </a:bodyPr>
           <a:lstStyle/>
           <a:p>
             <a:r>
+              <a:rPr lang="ru-RU" dirty="0" smtClean="0"/>
+              <a:t>Лямбда</a:t>
+            </a:r>
+            <a:r>
               <a:rPr lang="en-US" dirty="0" smtClean="0"/>
-              <a:t>Enumerable: First() </a:t>
+              <a:t>-</a:t>
             </a:r>
             <a:r>
               <a:rPr lang="ru-RU" dirty="0" smtClean="0"/>
-              <a:t>и </a:t>
+              <a:t>выражения</a:t>
             </a:r>
             <a:r>
               <a:rPr lang="en-US" dirty="0" smtClean="0"/>
-              <a:t>Single()</a:t>
+              <a:t/>
+            </a:r>
+            <a:br>
+              <a:rPr lang="en-US" dirty="0" smtClean="0"/>
+            </a:br>
+            <a:r>
+              <a:rPr lang="en-US" dirty="0" smtClean="0"/>
+              <a:t>(lambda expressions)</a:t>
             </a:r>
             <a:endParaRPr lang="en-US" dirty="0"/>
           </a:p>
@@ -9611,229 +11366,6 @@
           <a:bodyPr/>
           <a:lstStyle/>
           <a:p>
-            <a:pPr marL="0" indent="0">
-              <a:buNone/>
-            </a:pPr>
-            <a:r>
-              <a:rPr lang="en-US" dirty="0"/>
-              <a:t>First</a:t>
-            </a:r>
-            <a:r>
-              <a:rPr lang="en-US" dirty="0" smtClean="0"/>
-              <a:t>()</a:t>
-            </a:r>
-            <a:r>
-              <a:rPr lang="ru-RU" dirty="0" smtClean="0"/>
-              <a:t> </a:t>
-            </a:r>
-            <a:r>
-              <a:rPr lang="en-US" dirty="0" smtClean="0"/>
-              <a:t>/</a:t>
-            </a:r>
-            <a:r>
-              <a:rPr lang="ru-RU" dirty="0" smtClean="0"/>
-              <a:t> </a:t>
-            </a:r>
-            <a:r>
-              <a:rPr lang="en-US" dirty="0" smtClean="0"/>
-              <a:t>First(</a:t>
-            </a:r>
-            <a:r>
-              <a:rPr lang="en-US" dirty="0" err="1" smtClean="0"/>
-              <a:t>Func</a:t>
-            </a:r>
-            <a:r>
-              <a:rPr lang="en-US" dirty="0" smtClean="0"/>
-              <a:t>&lt;</a:t>
-            </a:r>
-            <a:r>
-              <a:rPr lang="en-US" dirty="0" err="1" smtClean="0"/>
-              <a:t>TSource</a:t>
-            </a:r>
-            <a:r>
-              <a:rPr lang="en-US" dirty="0"/>
-              <a:t>, </a:t>
-            </a:r>
-            <a:r>
-              <a:rPr lang="en-US" dirty="0" err="1"/>
-              <a:t>bool</a:t>
-            </a:r>
-            <a:r>
-              <a:rPr lang="en-US" dirty="0"/>
-              <a:t>&gt;)</a:t>
-            </a:r>
-          </a:p>
-          <a:p>
-            <a:pPr marL="0" indent="0">
-              <a:buNone/>
-            </a:pPr>
-            <a:r>
-              <a:rPr lang="en-US" dirty="0" err="1"/>
-              <a:t>FirstOrDefault</a:t>
-            </a:r>
-            <a:r>
-              <a:rPr lang="en-US" dirty="0" smtClean="0"/>
-              <a:t>()</a:t>
-            </a:r>
-            <a:r>
-              <a:rPr lang="ru-RU" dirty="0" smtClean="0"/>
-              <a:t> </a:t>
-            </a:r>
-            <a:r>
-              <a:rPr lang="en-US" dirty="0" smtClean="0"/>
-              <a:t>/</a:t>
-            </a:r>
-            <a:r>
-              <a:rPr lang="ru-RU" dirty="0" smtClean="0"/>
-              <a:t> </a:t>
-            </a:r>
-            <a:r>
-              <a:rPr lang="en-US" dirty="0" err="1" smtClean="0"/>
-              <a:t>FirstOrDefault</a:t>
-            </a:r>
-            <a:r>
-              <a:rPr lang="en-US" dirty="0" smtClean="0"/>
-              <a:t>(</a:t>
-            </a:r>
-            <a:r>
-              <a:rPr lang="en-US" dirty="0" err="1" smtClean="0"/>
-              <a:t>Func</a:t>
-            </a:r>
-            <a:r>
-              <a:rPr lang="en-US" dirty="0" smtClean="0"/>
-              <a:t>&lt;</a:t>
-            </a:r>
-            <a:r>
-              <a:rPr lang="en-US" dirty="0" err="1" smtClean="0"/>
-              <a:t>TSource</a:t>
-            </a:r>
-            <a:r>
-              <a:rPr lang="en-US" dirty="0"/>
-              <a:t>, </a:t>
-            </a:r>
-            <a:r>
-              <a:rPr lang="en-US" dirty="0" err="1"/>
-              <a:t>bool</a:t>
-            </a:r>
-            <a:r>
-              <a:rPr lang="en-US" dirty="0"/>
-              <a:t>&gt;)</a:t>
-            </a:r>
-          </a:p>
-          <a:p>
-            <a:pPr marL="0" indent="0">
-              <a:buNone/>
-            </a:pPr>
-            <a:r>
-              <a:rPr lang="en-US" dirty="0"/>
-              <a:t>Single</a:t>
-            </a:r>
-            <a:r>
-              <a:rPr lang="en-US" dirty="0" smtClean="0"/>
-              <a:t>()</a:t>
-            </a:r>
-            <a:r>
-              <a:rPr lang="ru-RU" dirty="0" smtClean="0"/>
-              <a:t> </a:t>
-            </a:r>
-            <a:r>
-              <a:rPr lang="en-US" dirty="0" smtClean="0"/>
-              <a:t>/</a:t>
-            </a:r>
-            <a:r>
-              <a:rPr lang="ru-RU" dirty="0" smtClean="0"/>
-              <a:t> </a:t>
-            </a:r>
-            <a:r>
-              <a:rPr lang="en-US" dirty="0" smtClean="0"/>
-              <a:t>Single(</a:t>
-            </a:r>
-            <a:r>
-              <a:rPr lang="en-US" dirty="0" err="1" smtClean="0"/>
-              <a:t>Func</a:t>
-            </a:r>
-            <a:r>
-              <a:rPr lang="en-US" dirty="0" smtClean="0"/>
-              <a:t>&lt;</a:t>
-            </a:r>
-            <a:r>
-              <a:rPr lang="en-US" dirty="0" err="1" smtClean="0"/>
-              <a:t>TSource</a:t>
-            </a:r>
-            <a:r>
-              <a:rPr lang="en-US" dirty="0"/>
-              <a:t>, </a:t>
-            </a:r>
-            <a:r>
-              <a:rPr lang="en-US" dirty="0" err="1"/>
-              <a:t>bool</a:t>
-            </a:r>
-            <a:r>
-              <a:rPr lang="en-US" dirty="0"/>
-              <a:t>&gt;)</a:t>
-            </a:r>
-          </a:p>
-          <a:p>
-            <a:pPr marL="0" indent="0">
-              <a:buNone/>
-            </a:pPr>
-            <a:r>
-              <a:rPr lang="en-US" dirty="0" err="1"/>
-              <a:t>SingleOrDefault</a:t>
-            </a:r>
-            <a:r>
-              <a:rPr lang="en-US" dirty="0" smtClean="0"/>
-              <a:t>()</a:t>
-            </a:r>
-            <a:r>
-              <a:rPr lang="ru-RU" dirty="0" smtClean="0"/>
-              <a:t> </a:t>
-            </a:r>
-            <a:r>
-              <a:rPr lang="en-US" dirty="0" smtClean="0"/>
-              <a:t>/</a:t>
-            </a:r>
-            <a:r>
-              <a:rPr lang="ru-RU" dirty="0" smtClean="0"/>
-              <a:t> </a:t>
-            </a:r>
-            <a:r>
-              <a:rPr lang="en-US" dirty="0" err="1" smtClean="0"/>
-              <a:t>SingleOrDefault</a:t>
-            </a:r>
-            <a:r>
-              <a:rPr lang="en-US" dirty="0" smtClean="0"/>
-              <a:t>(</a:t>
-            </a:r>
-            <a:r>
-              <a:rPr lang="en-US" dirty="0" err="1" smtClean="0"/>
-              <a:t>Func</a:t>
-            </a:r>
-            <a:r>
-              <a:rPr lang="en-US" dirty="0" smtClean="0"/>
-              <a:t>&lt;</a:t>
-            </a:r>
-            <a:r>
-              <a:rPr lang="en-US" dirty="0" err="1" smtClean="0"/>
-              <a:t>TSource</a:t>
-            </a:r>
-            <a:r>
-              <a:rPr lang="en-US" dirty="0"/>
-              <a:t>, </a:t>
-            </a:r>
-            <a:r>
-              <a:rPr lang="en-US" dirty="0" err="1"/>
-              <a:t>bool</a:t>
-            </a:r>
-            <a:r>
-              <a:rPr lang="en-US" dirty="0"/>
-              <a:t>&gt;)</a:t>
-            </a:r>
-          </a:p>
-          <a:p>
-            <a:pPr marL="0" indent="0">
-              <a:buNone/>
-            </a:pPr>
             <a:endParaRPr lang="en-US" dirty="0"/>
           </a:p>
         </p:txBody>
@@ -9841,7 +11373,7 @@
     </p:spTree>
     <p:extLst>
       <p:ext uri="{BB962C8B-B14F-4D97-AF65-F5344CB8AC3E}">
-        <p14:creationId xmlns:p14="http://schemas.microsoft.com/office/powerpoint/2010/main" val="1166576302"/>
+        <p14:creationId xmlns:p14="http://schemas.microsoft.com/office/powerpoint/2010/main" val="375333521"/>
       </p:ext>
     </p:extLst>
   </p:cSld>

</xml_diff>

<commit_message>
Added self control task on extension methods
</commit_message>
<xml_diff>
--- a/Presentation/lesson-11-linq.pptx
+++ b/Presentation/lesson-11-linq.pptx
@@ -5,7 +5,7 @@
     <p:sldMasterId id="2147483648" r:id="rId1"/>
   </p:sldMasterIdLst>
   <p:notesMasterIdLst>
-    <p:notesMasterId r:id="rId17"/>
+    <p:notesMasterId r:id="rId18"/>
   </p:notesMasterIdLst>
   <p:sldIdLst>
     <p:sldId id="256" r:id="rId2"/>
@@ -16,13 +16,14 @@
     <p:sldId id="270" r:id="rId7"/>
     <p:sldId id="271" r:id="rId8"/>
     <p:sldId id="265" r:id="rId9"/>
-    <p:sldId id="267" r:id="rId10"/>
-    <p:sldId id="261" r:id="rId11"/>
-    <p:sldId id="268" r:id="rId12"/>
-    <p:sldId id="260" r:id="rId13"/>
-    <p:sldId id="264" r:id="rId14"/>
-    <p:sldId id="262" r:id="rId15"/>
-    <p:sldId id="263" r:id="rId16"/>
+    <p:sldId id="272" r:id="rId10"/>
+    <p:sldId id="267" r:id="rId11"/>
+    <p:sldId id="261" r:id="rId12"/>
+    <p:sldId id="268" r:id="rId13"/>
+    <p:sldId id="260" r:id="rId14"/>
+    <p:sldId id="264" r:id="rId15"/>
+    <p:sldId id="262" r:id="rId16"/>
+    <p:sldId id="263" r:id="rId17"/>
   </p:sldIdLst>
   <p:sldSz cx="9144000" cy="6858000" type="screen4x3"/>
   <p:notesSz cx="6858000" cy="9144000"/>
@@ -206,7 +207,7 @@
           <a:p>
             <a:fld id="{B24A7054-7FFB-49F4-A126-5DF6E687FF53}" type="datetimeFigureOut">
               <a:rPr lang="ru-RU" smtClean="0"/>
-              <a:t>24.06.2013</a:t>
+              <a:t>10.10.2013</a:t>
             </a:fld>
             <a:endParaRPr lang="ru-RU"/>
           </a:p>
@@ -1488,7 +1489,7 @@
           <a:p>
             <a:fld id="{8E6E6A2A-E9D3-4A0D-B04A-ABDD367A1E08}" type="datetimeFigureOut">
               <a:rPr lang="ru-RU" smtClean="0"/>
-              <a:t>24.06.2013</a:t>
+              <a:t>10.10.2013</a:t>
             </a:fld>
             <a:endParaRPr lang="ru-RU"/>
           </a:p>
@@ -2933,7 +2934,7 @@
           <a:p>
             <a:fld id="{AC3D3127-B7C4-45E3-9797-C527EC9FDD78}" type="datetimeFigureOut">
               <a:rPr lang="ru-RU" smtClean="0"/>
-              <a:t>24.06.2013</a:t>
+              <a:t>10.10.2013</a:t>
             </a:fld>
             <a:endParaRPr lang="ru-RU"/>
           </a:p>
@@ -3548,16 +3549,33 @@
         </p:nvSpPr>
         <p:spPr/>
         <p:txBody>
-          <a:bodyPr/>
+          <a:bodyPr>
+            <a:normAutofit fontScale="90000"/>
+          </a:bodyPr>
           <a:lstStyle/>
           <a:p>
             <a:r>
               <a:rPr lang="ru-RU" dirty="0" smtClean="0"/>
-              <a:t>Класс </a:t>
-            </a:r>
-            <a:r>
-              <a:rPr lang="en-US" dirty="0" err="1" smtClean="0"/>
-              <a:t>System.Linq.Enumerable</a:t>
+              <a:t>Лямбда</a:t>
+            </a:r>
+            <a:r>
+              <a:rPr lang="en-US" dirty="0" smtClean="0"/>
+              <a:t>-</a:t>
+            </a:r>
+            <a:r>
+              <a:rPr lang="ru-RU" dirty="0" smtClean="0"/>
+              <a:t>выражения</a:t>
+            </a:r>
+            <a:r>
+              <a:rPr lang="en-US" dirty="0" smtClean="0"/>
+              <a:t/>
+            </a:r>
+            <a:br>
+              <a:rPr lang="en-US" dirty="0" smtClean="0"/>
+            </a:br>
+            <a:r>
+              <a:rPr lang="en-US" dirty="0" smtClean="0"/>
+              <a:t>(lambda expressions)</a:t>
             </a:r>
             <a:endParaRPr lang="en-US" dirty="0"/>
           </a:p>
@@ -3575,39 +3593,9 @@
         </p:nvSpPr>
         <p:spPr/>
         <p:txBody>
-          <a:bodyPr>
-            <a:normAutofit/>
-          </a:bodyPr>
+          <a:bodyPr/>
           <a:lstStyle/>
           <a:p>
-            <a:pPr marL="0" indent="0">
-              <a:buNone/>
-            </a:pPr>
-            <a:r>
-              <a:rPr lang="ru-RU" dirty="0" smtClean="0"/>
-              <a:t>Содержит множество полезных </a:t>
-            </a:r>
-            <a:r>
-              <a:rPr lang="en-US" dirty="0" smtClean="0"/>
-              <a:t>extension </a:t>
-            </a:r>
-            <a:r>
-              <a:rPr lang="ru-RU" dirty="0" smtClean="0"/>
-              <a:t>методов для </a:t>
-            </a:r>
-            <a:r>
-              <a:rPr lang="en-US" dirty="0" smtClean="0"/>
-              <a:t>LINQ</a:t>
-            </a:r>
-            <a:r>
-              <a:rPr lang="ru-RU" dirty="0" smtClean="0"/>
-              <a:t>.</a:t>
-            </a:r>
-          </a:p>
-          <a:p>
-            <a:pPr marL="0" indent="0">
-              <a:buNone/>
-            </a:pPr>
             <a:endParaRPr lang="en-US" dirty="0"/>
           </a:p>
         </p:txBody>
@@ -3615,20 +3603,13 @@
     </p:spTree>
     <p:extLst>
       <p:ext uri="{BB962C8B-B14F-4D97-AF65-F5344CB8AC3E}">
-        <p14:creationId xmlns:p14="http://schemas.microsoft.com/office/powerpoint/2010/main" val="2250229024"/>
+        <p14:creationId xmlns:p14="http://schemas.microsoft.com/office/powerpoint/2010/main" val="375333521"/>
       </p:ext>
     </p:extLst>
   </p:cSld>
   <p:clrMapOvr>
     <a:masterClrMapping/>
   </p:clrMapOvr>
-  <p:timing>
-    <p:tnLst>
-      <p:par>
-        <p:cTn id="1" dur="indefinite" restart="never" nodeType="tmRoot"/>
-      </p:par>
-    </p:tnLst>
-  </p:timing>
 </p:sld>
 </file>
 
@@ -3665,6 +3646,119 @@
           <a:lstStyle/>
           <a:p>
             <a:r>
+              <a:rPr lang="ru-RU" dirty="0" smtClean="0"/>
+              <a:t>Класс </a:t>
+            </a:r>
+            <a:r>
+              <a:rPr lang="en-US" dirty="0" err="1" smtClean="0"/>
+              <a:t>System.Linq.Enumerable</a:t>
+            </a:r>
+            <a:endParaRPr lang="en-US" dirty="0"/>
+          </a:p>
+        </p:txBody>
+      </p:sp>
+      <p:sp>
+        <p:nvSpPr>
+          <p:cNvPr id="3" name="Content Placeholder 2"/>
+          <p:cNvSpPr>
+            <a:spLocks noGrp="1"/>
+          </p:cNvSpPr>
+          <p:nvPr>
+            <p:ph idx="1"/>
+          </p:nvPr>
+        </p:nvSpPr>
+        <p:spPr/>
+        <p:txBody>
+          <a:bodyPr>
+            <a:normAutofit/>
+          </a:bodyPr>
+          <a:lstStyle/>
+          <a:p>
+            <a:pPr marL="0" indent="0">
+              <a:buNone/>
+            </a:pPr>
+            <a:r>
+              <a:rPr lang="ru-RU" dirty="0" smtClean="0"/>
+              <a:t>Содержит множество полезных </a:t>
+            </a:r>
+            <a:r>
+              <a:rPr lang="en-US" dirty="0" smtClean="0"/>
+              <a:t>extension </a:t>
+            </a:r>
+            <a:r>
+              <a:rPr lang="ru-RU" dirty="0" smtClean="0"/>
+              <a:t>методов для </a:t>
+            </a:r>
+            <a:r>
+              <a:rPr lang="en-US" dirty="0" smtClean="0"/>
+              <a:t>LINQ</a:t>
+            </a:r>
+            <a:r>
+              <a:rPr lang="ru-RU" dirty="0" smtClean="0"/>
+              <a:t>.</a:t>
+            </a:r>
+          </a:p>
+          <a:p>
+            <a:pPr marL="0" indent="0">
+              <a:buNone/>
+            </a:pPr>
+            <a:endParaRPr lang="en-US" dirty="0"/>
+          </a:p>
+        </p:txBody>
+      </p:sp>
+    </p:spTree>
+    <p:extLst>
+      <p:ext uri="{BB962C8B-B14F-4D97-AF65-F5344CB8AC3E}">
+        <p14:creationId xmlns:p14="http://schemas.microsoft.com/office/powerpoint/2010/main" val="2250229024"/>
+      </p:ext>
+    </p:extLst>
+  </p:cSld>
+  <p:clrMapOvr>
+    <a:masterClrMapping/>
+  </p:clrMapOvr>
+  <p:timing>
+    <p:tnLst>
+      <p:par>
+        <p:cTn id="1" dur="indefinite" restart="never" nodeType="tmRoot"/>
+      </p:par>
+    </p:tnLst>
+  </p:timing>
+</p:sld>
+</file>
+
+<file path=ppt/slides/slide12.xml><?xml version="1.0" encoding="utf-8"?>
+<p:sld xmlns:a="http://schemas.openxmlformats.org/drawingml/2006/main" xmlns:r="http://schemas.openxmlformats.org/officeDocument/2006/relationships" xmlns:p="http://schemas.openxmlformats.org/presentationml/2006/main">
+  <p:cSld>
+    <p:spTree>
+      <p:nvGrpSpPr>
+        <p:cNvPr id="1" name=""/>
+        <p:cNvGrpSpPr/>
+        <p:nvPr/>
+      </p:nvGrpSpPr>
+      <p:grpSpPr>
+        <a:xfrm>
+          <a:off x="0" y="0"/>
+          <a:ext cx="0" cy="0"/>
+          <a:chOff x="0" y="0"/>
+          <a:chExt cx="0" cy="0"/>
+        </a:xfrm>
+      </p:grpSpPr>
+      <p:sp>
+        <p:nvSpPr>
+          <p:cNvPr id="2" name="Title 1"/>
+          <p:cNvSpPr>
+            <a:spLocks noGrp="1"/>
+          </p:cNvSpPr>
+          <p:nvPr>
+            <p:ph type="title"/>
+          </p:nvPr>
+        </p:nvSpPr>
+        <p:spPr/>
+        <p:txBody>
+          <a:bodyPr/>
+          <a:lstStyle/>
+          <a:p>
+            <a:r>
               <a:rPr lang="en-US" dirty="0" smtClean="0"/>
               <a:t>Enumerable: First() </a:t>
             </a:r>
@@ -3935,7 +4029,7 @@
 </p:sld>
 </file>
 
-<file path=ppt/slides/slide12.xml><?xml version="1.0" encoding="utf-8"?>
+<file path=ppt/slides/slide13.xml><?xml version="1.0" encoding="utf-8"?>
 <p:sld xmlns:a="http://schemas.openxmlformats.org/drawingml/2006/main" xmlns:r="http://schemas.openxmlformats.org/officeDocument/2006/relationships" xmlns:p="http://schemas.openxmlformats.org/presentationml/2006/main">
   <p:cSld>
     <p:bg>
@@ -4044,7 +4138,7 @@
 </p:sld>
 </file>
 
-<file path=ppt/slides/slide13.xml><?xml version="1.0" encoding="utf-8"?>
+<file path=ppt/slides/slide14.xml><?xml version="1.0" encoding="utf-8"?>
 <p:sld xmlns:a="http://schemas.openxmlformats.org/drawingml/2006/main" xmlns:r="http://schemas.openxmlformats.org/officeDocument/2006/relationships" xmlns:p="http://schemas.openxmlformats.org/presentationml/2006/main">
   <p:cSld>
     <p:spTree>
@@ -4203,7 +4297,7 @@
 </p:sld>
 </file>
 
-<file path=ppt/slides/slide14.xml><?xml version="1.0" encoding="utf-8"?>
+<file path=ppt/slides/slide15.xml><?xml version="1.0" encoding="utf-8"?>
 <p:sld xmlns:a="http://schemas.openxmlformats.org/drawingml/2006/main" xmlns:r="http://schemas.openxmlformats.org/officeDocument/2006/relationships" xmlns:p="http://schemas.openxmlformats.org/presentationml/2006/main">
   <p:cSld>
     <p:spTree>
@@ -6835,7 +6929,7 @@
 </p:sld>
 </file>
 
-<file path=ppt/slides/slide15.xml><?xml version="1.0" encoding="utf-8"?>
+<file path=ppt/slides/slide16.xml><?xml version="1.0" encoding="utf-8"?>
 <p:sld xmlns:a="http://schemas.openxmlformats.org/drawingml/2006/main" xmlns:r="http://schemas.openxmlformats.org/officeDocument/2006/relationships" xmlns:p="http://schemas.openxmlformats.org/presentationml/2006/main">
   <p:cSld>
     <p:spTree>
@@ -11293,6 +11387,14 @@
 <file path=ppt/slides/slide9.xml><?xml version="1.0" encoding="utf-8"?>
 <p:sld xmlns:a="http://schemas.openxmlformats.org/drawingml/2006/main" xmlns:r="http://schemas.openxmlformats.org/officeDocument/2006/relationships" xmlns:p="http://schemas.openxmlformats.org/presentationml/2006/main">
   <p:cSld>
+    <p:bg>
+      <p:bgPr>
+        <a:solidFill>
+          <a:srgbClr val="6600CC"/>
+        </a:solidFill>
+        <a:effectLst/>
+      </p:bgPr>
+    </p:bg>
     <p:spTree>
       <p:nvGrpSpPr>
         <p:cNvPr id="1" name=""/>
@@ -11319,33 +11421,17 @@
         </p:nvSpPr>
         <p:spPr/>
         <p:txBody>
-          <a:bodyPr>
-            <a:normAutofit fontScale="90000"/>
-          </a:bodyPr>
+          <a:bodyPr/>
           <a:lstStyle/>
           <a:p>
             <a:r>
-              <a:rPr lang="ru-RU" dirty="0" smtClean="0"/>
-              <a:t>Лямбда</a:t>
-            </a:r>
-            <a:r>
-              <a:rPr lang="en-US" dirty="0" smtClean="0"/>
-              <a:t>-</a:t>
-            </a:r>
-            <a:r>
-              <a:rPr lang="ru-RU" dirty="0" smtClean="0"/>
-              <a:t>выражения</a:t>
-            </a:r>
-            <a:r>
-              <a:rPr lang="en-US" dirty="0" smtClean="0"/>
-              <a:t/>
-            </a:r>
-            <a:br>
-              <a:rPr lang="en-US" dirty="0" smtClean="0"/>
-            </a:br>
-            <a:r>
-              <a:rPr lang="en-US" dirty="0" smtClean="0"/>
-              <a:t>(lambda expressions)</a:t>
+              <a:rPr lang="ru-RU" b="1" dirty="0">
+                <a:solidFill>
+                  <a:schemeClr val="bg1"/>
+                </a:solidFill>
+                <a:cs typeface="Times New Roman" pitchFamily="18" charset="0"/>
+              </a:rPr>
+              <a:t>Самостоятельное задание</a:t>
             </a:r>
             <a:endParaRPr lang="en-US" dirty="0"/>
           </a:p>
@@ -11363,9 +11449,94 @@
         </p:nvSpPr>
         <p:spPr/>
         <p:txBody>
-          <a:bodyPr/>
+          <a:bodyPr>
+            <a:normAutofit/>
+          </a:bodyPr>
           <a:lstStyle/>
           <a:p>
+            <a:pPr marL="0" indent="0">
+              <a:buNone/>
+            </a:pPr>
+            <a:r>
+              <a:rPr lang="ru-RU" dirty="0" smtClean="0"/>
+              <a:t>Напишите </a:t>
+            </a:r>
+            <a:r>
+              <a:rPr lang="en-US" dirty="0" smtClean="0"/>
+              <a:t>extension </a:t>
+            </a:r>
+            <a:r>
+              <a:rPr lang="ru-RU" dirty="0" smtClean="0"/>
+              <a:t>методы для класса </a:t>
+            </a:r>
+            <a:r>
+              <a:rPr lang="en-US" dirty="0" err="1" smtClean="0"/>
+              <a:t>StringBuilder</a:t>
+            </a:r>
+            <a:r>
+              <a:rPr lang="en-US" dirty="0" smtClean="0"/>
+              <a:t>:</a:t>
+            </a:r>
+          </a:p>
+          <a:p>
+            <a:r>
+              <a:rPr lang="en-US" dirty="0" err="1" smtClean="0"/>
+              <a:t>AppendLine</a:t>
+            </a:r>
+            <a:r>
+              <a:rPr lang="en-US" dirty="0" smtClean="0"/>
+              <a:t>() – </a:t>
+            </a:r>
+            <a:r>
+              <a:rPr lang="ru-RU" dirty="0" smtClean="0"/>
+              <a:t>добавляет перевод строки</a:t>
+            </a:r>
+            <a:endParaRPr lang="en-US" dirty="0" smtClean="0"/>
+          </a:p>
+          <a:p>
+            <a:r>
+              <a:rPr lang="en-US" dirty="0" err="1" smtClean="0"/>
+              <a:t>AppendLine</a:t>
+            </a:r>
+            <a:r>
+              <a:rPr lang="en-US" dirty="0" smtClean="0"/>
+              <a:t>(string)</a:t>
+            </a:r>
+            <a:r>
+              <a:rPr lang="ru-RU" dirty="0" smtClean="0"/>
+              <a:t> – добавляет строку и перевод строки</a:t>
+            </a:r>
+            <a:endParaRPr lang="en-US" dirty="0" smtClean="0"/>
+          </a:p>
+          <a:p>
+            <a:r>
+              <a:rPr lang="en-US" dirty="0" err="1" smtClean="0"/>
+              <a:t>AppendFormatLine</a:t>
+            </a:r>
+            <a:r>
+              <a:rPr lang="en-US" dirty="0" smtClean="0"/>
+              <a:t>(string format, object[] </a:t>
+            </a:r>
+            <a:r>
+              <a:rPr lang="en-US" dirty="0" err="1" smtClean="0"/>
+              <a:t>args</a:t>
+            </a:r>
+            <a:r>
+              <a:rPr lang="en-US" dirty="0" smtClean="0"/>
+              <a:t>)</a:t>
+            </a:r>
+            <a:r>
+              <a:rPr lang="ru-RU" dirty="0" smtClean="0"/>
+              <a:t> – форматированный вывод строки заканчивающийся переводом </a:t>
+            </a:r>
+            <a:r>
+              <a:rPr lang="ru-RU" smtClean="0"/>
+              <a:t>строки</a:t>
+            </a:r>
+            <a:r>
+              <a:rPr lang="ru-RU" smtClean="0"/>
+              <a:t>.</a:t>
+            </a:r>
             <a:endParaRPr lang="en-US" dirty="0"/>
           </a:p>
         </p:txBody>
@@ -11373,7 +11544,7 @@
     </p:spTree>
     <p:extLst>
       <p:ext uri="{BB962C8B-B14F-4D97-AF65-F5344CB8AC3E}">
-        <p14:creationId xmlns:p14="http://schemas.microsoft.com/office/powerpoint/2010/main" val="375333521"/>
+        <p14:creationId xmlns:p14="http://schemas.microsoft.com/office/powerpoint/2010/main" val="3539412357"/>
       </p:ext>
     </p:extLst>
   </p:cSld>

</xml_diff>

<commit_message>
LINQ presentation. More Enumerable methods.
</commit_message>
<xml_diff>
--- a/Presentation/lesson-11-linq.pptx
+++ b/Presentation/lesson-11-linq.pptx
@@ -5,7 +5,7 @@
     <p:sldMasterId id="2147483648" r:id="rId1"/>
   </p:sldMasterIdLst>
   <p:notesMasterIdLst>
-    <p:notesMasterId r:id="rId18"/>
+    <p:notesMasterId r:id="rId21"/>
   </p:notesMasterIdLst>
   <p:sldIdLst>
     <p:sldId id="256" r:id="rId2"/>
@@ -19,11 +19,14 @@
     <p:sldId id="272" r:id="rId10"/>
     <p:sldId id="267" r:id="rId11"/>
     <p:sldId id="261" r:id="rId12"/>
-    <p:sldId id="268" r:id="rId13"/>
-    <p:sldId id="260" r:id="rId14"/>
-    <p:sldId id="264" r:id="rId15"/>
-    <p:sldId id="262" r:id="rId16"/>
-    <p:sldId id="263" r:id="rId17"/>
+    <p:sldId id="274" r:id="rId13"/>
+    <p:sldId id="275" r:id="rId14"/>
+    <p:sldId id="268" r:id="rId15"/>
+    <p:sldId id="273" r:id="rId16"/>
+    <p:sldId id="260" r:id="rId17"/>
+    <p:sldId id="264" r:id="rId18"/>
+    <p:sldId id="262" r:id="rId19"/>
+    <p:sldId id="263" r:id="rId20"/>
   </p:sldIdLst>
   <p:sldSz cx="9144000" cy="6858000" type="screen4x3"/>
   <p:notesSz cx="6858000" cy="9144000"/>
@@ -207,7 +210,7 @@
           <a:p>
             <a:fld id="{B24A7054-7FFB-49F4-A126-5DF6E687FF53}" type="datetimeFigureOut">
               <a:rPr lang="ru-RU" smtClean="0"/>
-              <a:t>10.10.2013</a:t>
+              <a:t>30.10.2013</a:t>
             </a:fld>
             <a:endParaRPr lang="ru-RU"/>
           </a:p>
@@ -1489,7 +1492,7 @@
           <a:p>
             <a:fld id="{8E6E6A2A-E9D3-4A0D-B04A-ABDD367A1E08}" type="datetimeFigureOut">
               <a:rPr lang="ru-RU" smtClean="0"/>
-              <a:t>10.10.2013</a:t>
+              <a:t>30.10.2013</a:t>
             </a:fld>
             <a:endParaRPr lang="ru-RU"/>
           </a:p>
@@ -2934,7 +2937,7 @@
           <a:p>
             <a:fld id="{AC3D3127-B7C4-45E3-9797-C527EC9FDD78}" type="datetimeFigureOut">
               <a:rPr lang="ru-RU" smtClean="0"/>
-              <a:t>10.10.2013</a:t>
+              <a:t>30.10.2013</a:t>
             </a:fld>
             <a:endParaRPr lang="ru-RU"/>
           </a:p>
@@ -3469,7 +3472,7 @@
               <a:t>№</a:t>
             </a:r>
             <a:r>
-              <a:rPr lang="en-US" sz="2400" smtClean="0">
+              <a:rPr lang="en-US" sz="2400" dirty="0" smtClean="0">
                 <a:solidFill>
                   <a:schemeClr val="bg1"/>
                 </a:solidFill>
@@ -3759,16 +3762,12 @@
           <a:lstStyle/>
           <a:p>
             <a:r>
+              <a:rPr lang="en-US" dirty="0" err="1" smtClean="0"/>
+              <a:t>Enumerable.Where</a:t>
+            </a:r>
+            <a:r>
               <a:rPr lang="en-US" dirty="0" smtClean="0"/>
-              <a:t>Enumerable: First() </a:t>
-            </a:r>
-            <a:r>
-              <a:rPr lang="ru-RU" dirty="0" smtClean="0"/>
-              <a:t>и </a:t>
-            </a:r>
-            <a:r>
-              <a:rPr lang="en-US" dirty="0" smtClean="0"/>
-              <a:t>Single()</a:t>
+              <a:t>()</a:t>
             </a:r>
             <a:endParaRPr lang="en-US" dirty="0"/>
           </a:p>
@@ -3793,6 +3792,384 @@
               <a:buNone/>
             </a:pPr>
             <a:r>
+              <a:rPr lang="ru-RU" dirty="0" smtClean="0"/>
+              <a:t>Метод </a:t>
+            </a:r>
+            <a:r>
+              <a:rPr lang="en-US" dirty="0" smtClean="0"/>
+              <a:t>Where() </a:t>
+            </a:r>
+            <a:r>
+              <a:rPr lang="ru-RU" dirty="0" smtClean="0"/>
+              <a:t>позволяет выбирать из последовательности данные удовлетворяющие заданному условию.</a:t>
+            </a:r>
+            <a:endParaRPr lang="en-US" dirty="0"/>
+          </a:p>
+        </p:txBody>
+      </p:sp>
+    </p:spTree>
+    <p:extLst>
+      <p:ext uri="{BB962C8B-B14F-4D97-AF65-F5344CB8AC3E}">
+        <p14:creationId xmlns:p14="http://schemas.microsoft.com/office/powerpoint/2010/main" val="3785344664"/>
+      </p:ext>
+    </p:extLst>
+  </p:cSld>
+  <p:clrMapOvr>
+    <a:masterClrMapping/>
+  </p:clrMapOvr>
+</p:sld>
+</file>
+
+<file path=ppt/slides/slide13.xml><?xml version="1.0" encoding="utf-8"?>
+<p:sld xmlns:a="http://schemas.openxmlformats.org/drawingml/2006/main" xmlns:r="http://schemas.openxmlformats.org/officeDocument/2006/relationships" xmlns:p="http://schemas.openxmlformats.org/presentationml/2006/main">
+  <p:cSld>
+    <p:spTree>
+      <p:nvGrpSpPr>
+        <p:cNvPr id="1" name=""/>
+        <p:cNvGrpSpPr/>
+        <p:nvPr/>
+      </p:nvGrpSpPr>
+      <p:grpSpPr>
+        <a:xfrm>
+          <a:off x="0" y="0"/>
+          <a:ext cx="0" cy="0"/>
+          <a:chOff x="0" y="0"/>
+          <a:chExt cx="0" cy="0"/>
+        </a:xfrm>
+      </p:grpSpPr>
+      <p:sp>
+        <p:nvSpPr>
+          <p:cNvPr id="2" name="Title 1"/>
+          <p:cNvSpPr>
+            <a:spLocks noGrp="1"/>
+          </p:cNvSpPr>
+          <p:nvPr>
+            <p:ph type="title"/>
+          </p:nvPr>
+        </p:nvSpPr>
+        <p:spPr/>
+        <p:txBody>
+          <a:bodyPr/>
+          <a:lstStyle/>
+          <a:p>
+            <a:r>
+              <a:rPr lang="en-US" dirty="0" smtClean="0"/>
+              <a:t>Enumerable: Any() </a:t>
+            </a:r>
+            <a:r>
+              <a:rPr lang="ru-RU" dirty="0" smtClean="0"/>
+              <a:t>и </a:t>
+            </a:r>
+            <a:r>
+              <a:rPr lang="en-US" dirty="0" smtClean="0"/>
+              <a:t>All()</a:t>
+            </a:r>
+            <a:endParaRPr lang="en-US" dirty="0"/>
+          </a:p>
+        </p:txBody>
+      </p:sp>
+      <p:sp>
+        <p:nvSpPr>
+          <p:cNvPr id="3" name="Content Placeholder 2"/>
+          <p:cNvSpPr>
+            <a:spLocks noGrp="1"/>
+          </p:cNvSpPr>
+          <p:nvPr>
+            <p:ph idx="1"/>
+          </p:nvPr>
+        </p:nvSpPr>
+        <p:spPr/>
+        <p:txBody>
+          <a:bodyPr>
+            <a:normAutofit fontScale="85000" lnSpcReduction="20000"/>
+          </a:bodyPr>
+          <a:lstStyle/>
+          <a:p>
+            <a:r>
+              <a:rPr lang="en-US" dirty="0" smtClean="0"/>
+              <a:t>Any()</a:t>
+            </a:r>
+          </a:p>
+          <a:p>
+            <a:pPr lvl="1"/>
+            <a:r>
+              <a:rPr lang="ru-RU" dirty="0" smtClean="0"/>
+              <a:t>Метод </a:t>
+            </a:r>
+            <a:r>
+              <a:rPr lang="en-US" dirty="0" smtClean="0"/>
+              <a:t>Any() </a:t>
+            </a:r>
+            <a:r>
+              <a:rPr lang="ru-RU" dirty="0" smtClean="0"/>
+              <a:t>вызванный без аргументов вернет </a:t>
+            </a:r>
+            <a:r>
+              <a:rPr lang="en-US" dirty="0" smtClean="0"/>
+              <a:t>true </a:t>
+            </a:r>
+            <a:r>
+              <a:rPr lang="ru-RU" dirty="0" smtClean="0"/>
+              <a:t>если последовательность содержит хотя бы один элемент (то есть является не пустой) и </a:t>
+            </a:r>
+            <a:r>
+              <a:rPr lang="en-US" dirty="0" smtClean="0"/>
+              <a:t>false </a:t>
+            </a:r>
+            <a:r>
+              <a:rPr lang="ru-RU" dirty="0" smtClean="0"/>
+              <a:t>в </a:t>
+            </a:r>
+            <a:r>
+              <a:rPr lang="ru-RU" smtClean="0"/>
+              <a:t>противном случае;</a:t>
+            </a:r>
+            <a:endParaRPr lang="en-US" dirty="0" smtClean="0"/>
+          </a:p>
+          <a:p>
+            <a:pPr lvl="1"/>
+            <a:r>
+              <a:rPr lang="ru-RU" dirty="0" smtClean="0"/>
+              <a:t>Метод </a:t>
+            </a:r>
+            <a:r>
+              <a:rPr lang="en-US" dirty="0" smtClean="0"/>
+              <a:t>Any(</a:t>
+            </a:r>
+            <a:r>
+              <a:rPr lang="en-US" dirty="0" err="1"/>
+              <a:t>Func</a:t>
+            </a:r>
+            <a:r>
+              <a:rPr lang="en-US" dirty="0"/>
+              <a:t>&lt;</a:t>
+            </a:r>
+            <a:r>
+              <a:rPr lang="en-US" dirty="0" err="1"/>
+              <a:t>TSource</a:t>
+            </a:r>
+            <a:r>
+              <a:rPr lang="en-US" dirty="0"/>
+              <a:t>, </a:t>
+            </a:r>
+            <a:r>
+              <a:rPr lang="en-US" dirty="0" err="1"/>
+              <a:t>bool</a:t>
+            </a:r>
+            <a:r>
+              <a:rPr lang="en-US" dirty="0"/>
+              <a:t>&gt; predicate</a:t>
+            </a:r>
+            <a:r>
+              <a:rPr lang="en-US" dirty="0" smtClean="0"/>
+              <a:t>) </a:t>
+            </a:r>
+            <a:r>
+              <a:rPr lang="ru-RU" dirty="0" smtClean="0"/>
+              <a:t>вернет </a:t>
+            </a:r>
+            <a:r>
+              <a:rPr lang="en-US" dirty="0" smtClean="0"/>
+              <a:t>true </a:t>
+            </a:r>
+            <a:r>
+              <a:rPr lang="ru-RU" dirty="0" smtClean="0"/>
+              <a:t>если </a:t>
+            </a:r>
+            <a:r>
+              <a:rPr lang="ru-RU" dirty="0"/>
+              <a:t>последовательность содержит хотя бы один </a:t>
+            </a:r>
+            <a:r>
+              <a:rPr lang="ru-RU" dirty="0" smtClean="0"/>
+              <a:t>элемент для которого предикат вернул </a:t>
+            </a:r>
+            <a:r>
+              <a:rPr lang="en-US" dirty="0" smtClean="0"/>
+              <a:t>true </a:t>
+            </a:r>
+            <a:r>
+              <a:rPr lang="ru-RU" dirty="0"/>
+              <a:t>и </a:t>
+            </a:r>
+            <a:r>
+              <a:rPr lang="en-US" dirty="0"/>
+              <a:t>false </a:t>
+            </a:r>
+            <a:r>
+              <a:rPr lang="ru-RU" dirty="0"/>
+              <a:t>в противном </a:t>
+            </a:r>
+            <a:r>
+              <a:rPr lang="ru-RU" dirty="0" smtClean="0"/>
+              <a:t>случае.</a:t>
+            </a:r>
+            <a:endParaRPr lang="en-US" dirty="0" smtClean="0"/>
+          </a:p>
+          <a:p>
+            <a:r>
+              <a:rPr lang="en-US" dirty="0" smtClean="0"/>
+              <a:t>All()</a:t>
+            </a:r>
+          </a:p>
+          <a:p>
+            <a:pPr lvl="1"/>
+            <a:r>
+              <a:rPr lang="ru-RU" dirty="0" smtClean="0"/>
+              <a:t>Метод </a:t>
+            </a:r>
+            <a:r>
+              <a:rPr lang="en-US" dirty="0" smtClean="0"/>
+              <a:t>All(</a:t>
+            </a:r>
+            <a:r>
+              <a:rPr lang="en-US" dirty="0" err="1" smtClean="0"/>
+              <a:t>Func</a:t>
+            </a:r>
+            <a:r>
+              <a:rPr lang="en-US" dirty="0" smtClean="0"/>
+              <a:t>&lt;</a:t>
+            </a:r>
+            <a:r>
+              <a:rPr lang="en-US" dirty="0" err="1" smtClean="0"/>
+              <a:t>TSource</a:t>
+            </a:r>
+            <a:r>
+              <a:rPr lang="en-US" dirty="0"/>
+              <a:t>, </a:t>
+            </a:r>
+            <a:r>
+              <a:rPr lang="en-US" dirty="0" err="1"/>
+              <a:t>bool</a:t>
+            </a:r>
+            <a:r>
+              <a:rPr lang="en-US" dirty="0"/>
+              <a:t>&gt; predicate) </a:t>
+            </a:r>
+            <a:r>
+              <a:rPr lang="ru-RU" dirty="0"/>
+              <a:t>вернет </a:t>
+            </a:r>
+            <a:r>
+              <a:rPr lang="en-US" dirty="0"/>
+              <a:t>true </a:t>
+            </a:r>
+            <a:r>
+              <a:rPr lang="ru-RU" dirty="0"/>
+              <a:t>если </a:t>
+            </a:r>
+            <a:r>
+              <a:rPr lang="ru-RU" dirty="0" smtClean="0"/>
+              <a:t>для всех элементов последовательности предикат </a:t>
+            </a:r>
+            <a:r>
+              <a:rPr lang="ru-RU" dirty="0"/>
+              <a:t>вернул </a:t>
+            </a:r>
+            <a:r>
+              <a:rPr lang="en-US" dirty="0"/>
+              <a:t>true </a:t>
+            </a:r>
+            <a:r>
+              <a:rPr lang="ru-RU" dirty="0"/>
+              <a:t>и </a:t>
+            </a:r>
+            <a:r>
+              <a:rPr lang="en-US" dirty="0"/>
+              <a:t>false </a:t>
+            </a:r>
+            <a:r>
+              <a:rPr lang="ru-RU" dirty="0"/>
+              <a:t>в противном </a:t>
+            </a:r>
+            <a:r>
+              <a:rPr lang="ru-RU" dirty="0" smtClean="0"/>
+              <a:t>случае.</a:t>
+            </a:r>
+            <a:endParaRPr lang="en-US" dirty="0"/>
+          </a:p>
+        </p:txBody>
+      </p:sp>
+    </p:spTree>
+    <p:extLst>
+      <p:ext uri="{BB962C8B-B14F-4D97-AF65-F5344CB8AC3E}">
+        <p14:creationId xmlns:p14="http://schemas.microsoft.com/office/powerpoint/2010/main" val="1695211947"/>
+      </p:ext>
+    </p:extLst>
+  </p:cSld>
+  <p:clrMapOvr>
+    <a:masterClrMapping/>
+  </p:clrMapOvr>
+</p:sld>
+</file>
+
+<file path=ppt/slides/slide14.xml><?xml version="1.0" encoding="utf-8"?>
+<p:sld xmlns:a="http://schemas.openxmlformats.org/drawingml/2006/main" xmlns:r="http://schemas.openxmlformats.org/officeDocument/2006/relationships" xmlns:p="http://schemas.openxmlformats.org/presentationml/2006/main">
+  <p:cSld>
+    <p:spTree>
+      <p:nvGrpSpPr>
+        <p:cNvPr id="1" name=""/>
+        <p:cNvGrpSpPr/>
+        <p:nvPr/>
+      </p:nvGrpSpPr>
+      <p:grpSpPr>
+        <a:xfrm>
+          <a:off x="0" y="0"/>
+          <a:ext cx="0" cy="0"/>
+          <a:chOff x="0" y="0"/>
+          <a:chExt cx="0" cy="0"/>
+        </a:xfrm>
+      </p:grpSpPr>
+      <p:sp>
+        <p:nvSpPr>
+          <p:cNvPr id="2" name="Title 1"/>
+          <p:cNvSpPr>
+            <a:spLocks noGrp="1"/>
+          </p:cNvSpPr>
+          <p:nvPr>
+            <p:ph type="title"/>
+          </p:nvPr>
+        </p:nvSpPr>
+        <p:spPr/>
+        <p:txBody>
+          <a:bodyPr/>
+          <a:lstStyle/>
+          <a:p>
+            <a:r>
+              <a:rPr lang="en-US" dirty="0" smtClean="0"/>
+              <a:t>Enumerable: First() </a:t>
+            </a:r>
+            <a:r>
+              <a:rPr lang="ru-RU" dirty="0" smtClean="0"/>
+              <a:t>и </a:t>
+            </a:r>
+            <a:r>
+              <a:rPr lang="en-US" dirty="0" smtClean="0"/>
+              <a:t>Single()</a:t>
+            </a:r>
+            <a:endParaRPr lang="en-US" dirty="0"/>
+          </a:p>
+        </p:txBody>
+      </p:sp>
+      <p:sp>
+        <p:nvSpPr>
+          <p:cNvPr id="3" name="Content Placeholder 2"/>
+          <p:cNvSpPr>
+            <a:spLocks noGrp="1"/>
+          </p:cNvSpPr>
+          <p:nvPr>
+            <p:ph idx="1"/>
+          </p:nvPr>
+        </p:nvSpPr>
+        <p:spPr/>
+        <p:txBody>
+          <a:bodyPr/>
+          <a:lstStyle/>
+          <a:p>
+            <a:pPr marL="0" indent="0">
+              <a:buNone/>
+            </a:pPr>
+            <a:r>
               <a:rPr lang="en-US" dirty="0"/>
               <a:t>First</a:t>
             </a:r>
@@ -4029,7 +4406,173 @@
 </p:sld>
 </file>
 
-<file path=ppt/slides/slide13.xml><?xml version="1.0" encoding="utf-8"?>
+<file path=ppt/slides/slide15.xml><?xml version="1.0" encoding="utf-8"?>
+<p:sld xmlns:a="http://schemas.openxmlformats.org/drawingml/2006/main" xmlns:r="http://schemas.openxmlformats.org/officeDocument/2006/relationships" xmlns:p="http://schemas.openxmlformats.org/presentationml/2006/main">
+  <p:cSld>
+    <p:spTree>
+      <p:nvGrpSpPr>
+        <p:cNvPr id="1" name=""/>
+        <p:cNvGrpSpPr/>
+        <p:nvPr/>
+      </p:nvGrpSpPr>
+      <p:grpSpPr>
+        <a:xfrm>
+          <a:off x="0" y="0"/>
+          <a:ext cx="0" cy="0"/>
+          <a:chOff x="0" y="0"/>
+          <a:chExt cx="0" cy="0"/>
+        </a:xfrm>
+      </p:grpSpPr>
+      <p:sp>
+        <p:nvSpPr>
+          <p:cNvPr id="2" name="Title 1"/>
+          <p:cNvSpPr>
+            <a:spLocks noGrp="1"/>
+          </p:cNvSpPr>
+          <p:nvPr>
+            <p:ph type="title"/>
+          </p:nvPr>
+        </p:nvSpPr>
+        <p:spPr/>
+        <p:txBody>
+          <a:bodyPr/>
+          <a:lstStyle/>
+          <a:p>
+            <a:r>
+              <a:rPr lang="en-US" dirty="0" smtClean="0"/>
+              <a:t>Enumerable. </a:t>
+            </a:r>
+            <a:r>
+              <a:rPr lang="en-US" dirty="0" err="1" smtClean="0"/>
+              <a:t>ToXXX</a:t>
+            </a:r>
+            <a:r>
+              <a:rPr lang="en-US" dirty="0" smtClean="0"/>
+              <a:t>() </a:t>
+            </a:r>
+            <a:r>
+              <a:rPr lang="ru-RU" dirty="0" smtClean="0"/>
+              <a:t>методы</a:t>
+            </a:r>
+            <a:endParaRPr lang="en-US" dirty="0"/>
+          </a:p>
+        </p:txBody>
+      </p:sp>
+      <p:sp>
+        <p:nvSpPr>
+          <p:cNvPr id="3" name="Content Placeholder 2"/>
+          <p:cNvSpPr>
+            <a:spLocks noGrp="1"/>
+          </p:cNvSpPr>
+          <p:nvPr>
+            <p:ph idx="1"/>
+          </p:nvPr>
+        </p:nvSpPr>
+        <p:spPr/>
+        <p:txBody>
+          <a:bodyPr>
+            <a:normAutofit/>
+          </a:bodyPr>
+          <a:lstStyle/>
+          <a:p>
+            <a:r>
+              <a:rPr lang="en-US" sz="2800" dirty="0" err="1" smtClean="0"/>
+              <a:t>ToArray</a:t>
+            </a:r>
+            <a:r>
+              <a:rPr lang="en-US" sz="2800" dirty="0" smtClean="0"/>
+              <a:t>() </a:t>
+            </a:r>
+            <a:r>
+              <a:rPr lang="ru-RU" sz="2800" dirty="0" smtClean="0"/>
+              <a:t>– преобразование </a:t>
+            </a:r>
+            <a:r>
+              <a:rPr lang="en-US" sz="2800" dirty="0" smtClean="0"/>
+              <a:t>IEnumerable&lt;T&gt; </a:t>
+            </a:r>
+            <a:r>
+              <a:rPr lang="ru-RU" sz="2800" dirty="0" smtClean="0"/>
+              <a:t>в </a:t>
+            </a:r>
+            <a:r>
+              <a:rPr lang="en-US" sz="2800" dirty="0" smtClean="0"/>
+              <a:t>T[]</a:t>
+            </a:r>
+          </a:p>
+          <a:p>
+            <a:r>
+              <a:rPr lang="en-US" sz="2800" dirty="0" err="1" smtClean="0"/>
+              <a:t>ToList</a:t>
+            </a:r>
+            <a:r>
+              <a:rPr lang="en-US" sz="2800" dirty="0" smtClean="0"/>
+              <a:t>() </a:t>
+            </a:r>
+            <a:r>
+              <a:rPr lang="ru-RU" sz="2800" dirty="0"/>
+              <a:t>–</a:t>
+            </a:r>
+            <a:r>
+              <a:rPr lang="en-US" sz="2800" dirty="0" smtClean="0"/>
+              <a:t> </a:t>
+            </a:r>
+            <a:r>
+              <a:rPr lang="ru-RU" sz="2800" dirty="0" smtClean="0"/>
+              <a:t>преобразование </a:t>
+            </a:r>
+            <a:r>
+              <a:rPr lang="en-US" sz="2800" dirty="0" smtClean="0"/>
+              <a:t>IEnumerable&lt;T&gt; </a:t>
+            </a:r>
+            <a:r>
+              <a:rPr lang="ru-RU" sz="2800" dirty="0" smtClean="0"/>
+              <a:t>в </a:t>
+            </a:r>
+            <a:r>
+              <a:rPr lang="en-US" sz="2800" dirty="0" smtClean="0"/>
+              <a:t>List&lt;T&gt;</a:t>
+            </a:r>
+          </a:p>
+          <a:p>
+            <a:r>
+              <a:rPr lang="en-US" sz="2800" dirty="0" err="1" smtClean="0"/>
+              <a:t>ToDictionary</a:t>
+            </a:r>
+            <a:r>
+              <a:rPr lang="en-US" sz="2800" dirty="0" smtClean="0"/>
+              <a:t>() </a:t>
+            </a:r>
+          </a:p>
+          <a:p>
+            <a:r>
+              <a:rPr lang="en-US" sz="2800" dirty="0" err="1" smtClean="0"/>
+              <a:t>ToLookup</a:t>
+            </a:r>
+            <a:r>
+              <a:rPr lang="en-US" sz="2800" dirty="0" smtClean="0"/>
+              <a:t>()</a:t>
+            </a:r>
+          </a:p>
+          <a:p>
+            <a:endParaRPr lang="en-US" sz="2800" dirty="0"/>
+          </a:p>
+        </p:txBody>
+      </p:sp>
+    </p:spTree>
+    <p:extLst>
+      <p:ext uri="{BB962C8B-B14F-4D97-AF65-F5344CB8AC3E}">
+        <p14:creationId xmlns:p14="http://schemas.microsoft.com/office/powerpoint/2010/main" val="2294722203"/>
+      </p:ext>
+    </p:extLst>
+  </p:cSld>
+  <p:clrMapOvr>
+    <a:masterClrMapping/>
+  </p:clrMapOvr>
+</p:sld>
+</file>
+
+<file path=ppt/slides/slide16.xml><?xml version="1.0" encoding="utf-8"?>
 <p:sld xmlns:a="http://schemas.openxmlformats.org/drawingml/2006/main" xmlns:r="http://schemas.openxmlformats.org/officeDocument/2006/relationships" xmlns:p="http://schemas.openxmlformats.org/presentationml/2006/main">
   <p:cSld>
     <p:bg>
@@ -4138,7 +4681,7 @@
 </p:sld>
 </file>
 
-<file path=ppt/slides/slide14.xml><?xml version="1.0" encoding="utf-8"?>
+<file path=ppt/slides/slide17.xml><?xml version="1.0" encoding="utf-8"?>
 <p:sld xmlns:a="http://schemas.openxmlformats.org/drawingml/2006/main" xmlns:r="http://schemas.openxmlformats.org/officeDocument/2006/relationships" xmlns:p="http://schemas.openxmlformats.org/presentationml/2006/main">
   <p:cSld>
     <p:spTree>
@@ -4297,7 +4840,7 @@
 </p:sld>
 </file>
 
-<file path=ppt/slides/slide15.xml><?xml version="1.0" encoding="utf-8"?>
+<file path=ppt/slides/slide18.xml><?xml version="1.0" encoding="utf-8"?>
 <p:sld xmlns:a="http://schemas.openxmlformats.org/drawingml/2006/main" xmlns:r="http://schemas.openxmlformats.org/officeDocument/2006/relationships" xmlns:p="http://schemas.openxmlformats.org/presentationml/2006/main">
   <p:cSld>
     <p:spTree>
@@ -6929,7 +7472,7 @@
 </p:sld>
 </file>
 
-<file path=ppt/slides/slide16.xml><?xml version="1.0" encoding="utf-8"?>
+<file path=ppt/slides/slide19.xml><?xml version="1.0" encoding="utf-8"?>
 <p:sld xmlns:a="http://schemas.openxmlformats.org/drawingml/2006/main" xmlns:r="http://schemas.openxmlformats.org/officeDocument/2006/relationships" xmlns:p="http://schemas.openxmlformats.org/presentationml/2006/main">
   <p:cSld>
     <p:spTree>
@@ -8974,7 +9517,7 @@
           <a:lstStyle/>
           <a:p>
             <a:r>
-              <a:rPr lang="en-US" smtClean="0"/>
+              <a:rPr lang="en-US" dirty="0" smtClean="0"/>
               <a:t>LINQ in C# 2010</a:t>
             </a:r>
             <a:endParaRPr lang="en-US" dirty="0"/>
@@ -11531,11 +12074,7 @@
             </a:r>
             <a:r>
               <a:rPr lang="ru-RU" smtClean="0"/>
-              <a:t>строки</a:t>
-            </a:r>
-            <a:r>
-              <a:rPr lang="ru-RU" smtClean="0"/>
-              <a:t>.</a:t>
+              <a:t>строки.</a:t>
             </a:r>
             <a:endParaRPr lang="en-US" dirty="0"/>
           </a:p>

</xml_diff>

<commit_message>
Updated task in LINQ presentation
</commit_message>
<xml_diff>
--- a/Presentation/lesson-11-linq.pptx
+++ b/Presentation/lesson-11-linq.pptx
@@ -215,7 +215,7 @@
           <a:p>
             <a:fld id="{B24A7054-7FFB-49F4-A126-5DF6E687FF53}" type="datetimeFigureOut">
               <a:rPr lang="ru-RU" smtClean="0"/>
-              <a:t>21.11.2013</a:t>
+              <a:t>22.11.2013</a:t>
             </a:fld>
             <a:endParaRPr lang="ru-RU"/>
           </a:p>
@@ -1497,7 +1497,7 @@
           <a:p>
             <a:fld id="{8E6E6A2A-E9D3-4A0D-B04A-ABDD367A1E08}" type="datetimeFigureOut">
               <a:rPr lang="ru-RU" smtClean="0"/>
-              <a:t>21.11.2013</a:t>
+              <a:t>22.11.2013</a:t>
             </a:fld>
             <a:endParaRPr lang="ru-RU"/>
           </a:p>
@@ -2942,7 +2942,7 @@
           <a:p>
             <a:fld id="{AC3D3127-B7C4-45E3-9797-C527EC9FDD78}" type="datetimeFigureOut">
               <a:rPr lang="ru-RU" smtClean="0"/>
-              <a:t>21.11.2013</a:t>
+              <a:t>22.11.2013</a:t>
             </a:fld>
             <a:endParaRPr lang="ru-RU"/>
           </a:p>
@@ -3594,7 +3594,7 @@
         <p:spPr/>
         <p:txBody>
           <a:bodyPr>
-            <a:normAutofit/>
+            <a:normAutofit lnSpcReduction="10000"/>
           </a:bodyPr>
           <a:lstStyle/>
           <a:p>
@@ -3611,7 +3611,11 @@
             </a:r>
             <a:r>
               <a:rPr lang="ru-RU" dirty="0" smtClean="0"/>
-              <a:t>методы для класса </a:t>
+              <a:t>метод </a:t>
+            </a:r>
+            <a:r>
+              <a:rPr lang="ru-RU" dirty="0" smtClean="0"/>
+              <a:t>для класса </a:t>
             </a:r>
             <a:r>
               <a:rPr lang="en-US" dirty="0" err="1" smtClean="0"/>
@@ -3625,41 +3629,15 @@
           <a:p>
             <a:r>
               <a:rPr lang="en-US" dirty="0" err="1" smtClean="0"/>
-              <a:t>AppendLine</a:t>
+              <a:t>AppendFormatLine</a:t>
             </a:r>
             <a:r>
               <a:rPr lang="en-US" dirty="0" smtClean="0"/>
-              <a:t>() – </a:t>
-            </a:r>
-            <a:r>
-              <a:rPr lang="ru-RU" dirty="0" smtClean="0"/>
-              <a:t>добавляет перевод строки</a:t>
-            </a:r>
-            <a:endParaRPr lang="en-US" dirty="0" smtClean="0"/>
-          </a:p>
-          <a:p>
-            <a:r>
-              <a:rPr lang="en-US" dirty="0" err="1" smtClean="0"/>
-              <a:t>AppendLine</a:t>
+              <a:t>(string </a:t>
             </a:r>
             <a:r>
               <a:rPr lang="en-US" dirty="0" smtClean="0"/>
-              <a:t>(string)</a:t>
-            </a:r>
-            <a:r>
-              <a:rPr lang="ru-RU" dirty="0" smtClean="0"/>
-              <a:t> – добавляет строку и перевод строки</a:t>
-            </a:r>
-            <a:endParaRPr lang="en-US" dirty="0" smtClean="0"/>
-          </a:p>
-          <a:p>
-            <a:r>
-              <a:rPr lang="en-US" dirty="0" err="1" smtClean="0"/>
-              <a:t>AppendFormatLine</a:t>
-            </a:r>
-            <a:r>
-              <a:rPr lang="en-US" dirty="0" smtClean="0"/>
-              <a:t>(string format, object[] </a:t>
+              <a:t>format, object[] </a:t>
             </a:r>
             <a:r>
               <a:rPr lang="en-US" dirty="0" err="1" smtClean="0"/>
@@ -3671,11 +3649,39 @@
             </a:r>
             <a:r>
               <a:rPr lang="ru-RU" dirty="0" smtClean="0"/>
-              <a:t> – форматированный вывод строки заканчивающийся переводом </a:t>
-            </a:r>
-            <a:r>
-              <a:rPr lang="ru-RU" smtClean="0"/>
-              <a:t>строки.</a:t>
+              <a:t> – форматированный вывод строки заканчивающийся переводом строки</a:t>
+            </a:r>
+            <a:r>
+              <a:rPr lang="ru-RU" dirty="0" smtClean="0"/>
+              <a:t>.</a:t>
+            </a:r>
+            <a:r>
+              <a:rPr lang="en-US" dirty="0" smtClean="0"/>
+              <a:t> </a:t>
+            </a:r>
+            <a:r>
+              <a:rPr lang="ru-RU" dirty="0" smtClean="0"/>
+              <a:t>Он должен делать то же самое что и стандартный метод </a:t>
+            </a:r>
+            <a:r>
+              <a:rPr lang="en-US" dirty="0" err="1" smtClean="0"/>
+              <a:t>AppendFormat</a:t>
+            </a:r>
+            <a:r>
+              <a:rPr lang="ru-RU" dirty="0"/>
+              <a:t> </a:t>
+            </a:r>
+            <a:r>
+              <a:rPr lang="ru-RU" dirty="0" smtClean="0"/>
+              <a:t> с добавлением символов перевода строки </a:t>
+            </a:r>
+            <a:r>
+              <a:rPr lang="en-US" dirty="0" smtClean="0"/>
+              <a:t>(\r\n) </a:t>
+            </a:r>
+            <a:r>
+              <a:rPr lang="ru-RU" dirty="0" smtClean="0"/>
+              <a:t>в конце.</a:t>
             </a:r>
             <a:endParaRPr lang="en-US" dirty="0"/>
           </a:p>
@@ -4344,11 +4350,7 @@
             </a:pPr>
             <a:r>
               <a:rPr lang="ru-RU" dirty="0" smtClean="0"/>
-              <a:t>Возвращают первый или последний элемент</a:t>
-            </a:r>
-            <a:r>
-              <a:rPr lang="ru-RU" dirty="0" smtClean="0"/>
-              <a:t>.</a:t>
+              <a:t>Возвращают первый или последний элемент.</a:t>
             </a:r>
             <a:r>
               <a:rPr lang="en-US" dirty="0" smtClean="0"/>
@@ -4502,11 +4504,7 @@
             </a:pPr>
             <a:r>
               <a:rPr lang="ru-RU" dirty="0" smtClean="0"/>
-              <a:t>Метод</a:t>
-            </a:r>
-            <a:r>
-              <a:rPr lang="ru-RU" dirty="0" smtClean="0"/>
-              <a:t> </a:t>
+              <a:t>Метод </a:t>
             </a:r>
             <a:r>
               <a:rPr lang="en-US" dirty="0" smtClean="0"/>
@@ -4639,7 +4637,6 @@
               <a:rPr lang="ru-RU" dirty="0" smtClean="0"/>
               <a:t>минимальное значение</a:t>
             </a:r>
-            <a:endParaRPr lang="ru-RU" dirty="0" smtClean="0"/>
           </a:p>
           <a:p>
             <a:r>
@@ -4650,7 +4647,6 @@
               <a:rPr lang="ru-RU" dirty="0" smtClean="0"/>
               <a:t>() – максимальное значение</a:t>
             </a:r>
-            <a:endParaRPr lang="ru-RU" dirty="0" smtClean="0"/>
           </a:p>
           <a:p>
             <a:r>
@@ -4661,7 +4657,6 @@
               <a:rPr lang="ru-RU" dirty="0" smtClean="0"/>
               <a:t>() – среднее значение</a:t>
             </a:r>
-            <a:endParaRPr lang="ru-RU" dirty="0" smtClean="0"/>
           </a:p>
           <a:p>
             <a:r>
@@ -4891,11 +4886,7 @@
             </a:r>
             <a:r>
               <a:rPr lang="en-US" dirty="0" smtClean="0"/>
-              <a:t>&lt;T</a:t>
-            </a:r>
-            <a:r>
-              <a:rPr lang="en-US" dirty="0" smtClean="0"/>
-              <a:t>&gt;()</a:t>
+              <a:t>&lt;T&gt;()</a:t>
             </a:r>
             <a:endParaRPr lang="ru-RU" dirty="0" smtClean="0"/>
           </a:p>

</xml_diff>

<commit_message>
Added "checked" block to yield examples
</commit_message>
<xml_diff>
--- a/Presentation/lesson-11-linq.pptx
+++ b/Presentation/lesson-11-linq.pptx
@@ -217,7 +217,7 @@
             <a:fld id="{B24A7054-7FFB-49F4-A126-5DF6E687FF53}" type="datetimeFigureOut">
               <a:rPr lang="ru-RU" smtClean="0"/>
               <a:pPr/>
-              <a:t>26.03.2014</a:t>
+              <a:t>09.04.2014</a:t>
             </a:fld>
             <a:endParaRPr lang="ru-RU"/>
           </a:p>
@@ -386,7 +386,7 @@
     </p:spTree>
     <p:extLst>
       <p:ext uri="{BB962C8B-B14F-4D97-AF65-F5344CB8AC3E}">
-        <p14:creationId xmlns:p14="http://schemas.microsoft.com/office/powerpoint/2010/main" xmlns="" val="4256143093"/>
+        <p14:creationId xmlns:p14="http://schemas.microsoft.com/office/powerpoint/2010/main" val="4256143093"/>
       </p:ext>
     </p:extLst>
   </p:cSld>
@@ -561,7 +561,7 @@
           <a:blip r:embed="rId2" cstate="print">
             <a:extLst>
               <a:ext uri="{28A0092B-C50C-407E-A947-70E740481C1C}">
-                <a14:useLocalDpi xmlns:a14="http://schemas.microsoft.com/office/drawing/2010/main" xmlns="" val="0"/>
+                <a14:useLocalDpi xmlns:a14="http://schemas.microsoft.com/office/drawing/2010/main" val="0"/>
               </a:ext>
             </a:extLst>
           </a:blip>
@@ -585,14 +585,14 @@
           <a:effectLst/>
           <a:extLst>
             <a:ext uri="{909E8E84-426E-40DD-AFC4-6F175D3DCCD1}">
-              <a14:hiddenFill xmlns:a14="http://schemas.microsoft.com/office/drawing/2010/main" xmlns="">
+              <a14:hiddenFill xmlns:a14="http://schemas.microsoft.com/office/drawing/2010/main">
                 <a:solidFill>
                   <a:schemeClr val="accent1"/>
                 </a:solidFill>
               </a14:hiddenFill>
             </a:ext>
             <a:ext uri="{91240B29-F687-4F45-9708-019B960494DF}">
-              <a14:hiddenLine xmlns:a14="http://schemas.microsoft.com/office/drawing/2010/main" xmlns="" w="9525">
+              <a14:hiddenLine xmlns:a14="http://schemas.microsoft.com/office/drawing/2010/main" w="9525">
                 <a:solidFill>
                   <a:schemeClr val="tx1"/>
                 </a:solidFill>
@@ -602,7 +602,7 @@
               </a14:hiddenLine>
             </a:ext>
             <a:ext uri="{AF507438-7753-43E0-B8FC-AC1667EBCBE1}">
-              <a14:hiddenEffects xmlns:a14="http://schemas.microsoft.com/office/drawing/2010/main" xmlns="">
+              <a14:hiddenEffects xmlns:a14="http://schemas.microsoft.com/office/drawing/2010/main">
                 <a:effectLst>
                   <a:outerShdw dist="35921" dir="2700000" algn="ctr" rotWithShape="0">
                     <a:schemeClr val="bg2"/>
@@ -678,7 +678,7 @@
     </p:spTree>
     <p:extLst>
       <p:ext uri="{BB962C8B-B14F-4D97-AF65-F5344CB8AC3E}">
-        <p14:creationId xmlns:p14="http://schemas.microsoft.com/office/powerpoint/2010/main" xmlns="" val="2062725571"/>
+        <p14:creationId xmlns:p14="http://schemas.microsoft.com/office/powerpoint/2010/main" val="2062725571"/>
       </p:ext>
     </p:extLst>
   </p:cSld>
@@ -897,7 +897,7 @@
     </p:spTree>
     <p:extLst>
       <p:ext uri="{BB962C8B-B14F-4D97-AF65-F5344CB8AC3E}">
-        <p14:creationId xmlns:p14="http://schemas.microsoft.com/office/powerpoint/2010/main" xmlns="" val="4043488563"/>
+        <p14:creationId xmlns:p14="http://schemas.microsoft.com/office/powerpoint/2010/main" val="4043488563"/>
       </p:ext>
     </p:extLst>
   </p:cSld>
@@ -1089,7 +1089,7 @@
     </p:spTree>
     <p:extLst>
       <p:ext uri="{BB962C8B-B14F-4D97-AF65-F5344CB8AC3E}">
-        <p14:creationId xmlns:p14="http://schemas.microsoft.com/office/powerpoint/2010/main" xmlns="" val="2103675460"/>
+        <p14:creationId xmlns:p14="http://schemas.microsoft.com/office/powerpoint/2010/main" val="2103675460"/>
       </p:ext>
     </p:extLst>
   </p:cSld>
@@ -1194,7 +1194,7 @@
     </p:spTree>
     <p:extLst>
       <p:ext uri="{BB962C8B-B14F-4D97-AF65-F5344CB8AC3E}">
-        <p14:creationId xmlns:p14="http://schemas.microsoft.com/office/powerpoint/2010/main" xmlns="" val="2015559697"/>
+        <p14:creationId xmlns:p14="http://schemas.microsoft.com/office/powerpoint/2010/main" val="2015559697"/>
       </p:ext>
     </p:extLst>
   </p:cSld>
@@ -1309,7 +1309,7 @@
     </p:spTree>
     <p:extLst>
       <p:ext uri="{BB962C8B-B14F-4D97-AF65-F5344CB8AC3E}">
-        <p14:creationId xmlns:p14="http://schemas.microsoft.com/office/powerpoint/2010/main" xmlns="" val="370514854"/>
+        <p14:creationId xmlns:p14="http://schemas.microsoft.com/office/powerpoint/2010/main" val="370514854"/>
       </p:ext>
     </p:extLst>
   </p:cSld>
@@ -1501,7 +1501,7 @@
             <a:fld id="{8E6E6A2A-E9D3-4A0D-B04A-ABDD367A1E08}" type="datetimeFigureOut">
               <a:rPr lang="ru-RU" smtClean="0"/>
               <a:pPr/>
-              <a:t>26.03.2014</a:t>
+              <a:t>09.04.2014</a:t>
             </a:fld>
             <a:endParaRPr lang="ru-RU"/>
           </a:p>
@@ -1553,7 +1553,7 @@
     </p:spTree>
     <p:extLst>
       <p:ext uri="{BB962C8B-B14F-4D97-AF65-F5344CB8AC3E}">
-        <p14:creationId xmlns:p14="http://schemas.microsoft.com/office/powerpoint/2010/main" xmlns="" val="1104335692"/>
+        <p14:creationId xmlns:p14="http://schemas.microsoft.com/office/powerpoint/2010/main" val="1104335692"/>
       </p:ext>
     </p:extLst>
   </p:cSld>
@@ -1700,7 +1700,7 @@
           <a:blip r:embed="rId2" cstate="print">
             <a:extLst>
               <a:ext uri="{28A0092B-C50C-407E-A947-70E740481C1C}">
-                <a14:useLocalDpi xmlns:a14="http://schemas.microsoft.com/office/drawing/2010/main" xmlns="" val="0"/>
+                <a14:useLocalDpi xmlns:a14="http://schemas.microsoft.com/office/drawing/2010/main" val="0"/>
               </a:ext>
             </a:extLst>
           </a:blip>
@@ -1724,14 +1724,14 @@
           <a:effectLst/>
           <a:extLst>
             <a:ext uri="{909E8E84-426E-40DD-AFC4-6F175D3DCCD1}">
-              <a14:hiddenFill xmlns:a14="http://schemas.microsoft.com/office/drawing/2010/main" xmlns="">
+              <a14:hiddenFill xmlns:a14="http://schemas.microsoft.com/office/drawing/2010/main">
                 <a:solidFill>
                   <a:schemeClr val="accent1"/>
                 </a:solidFill>
               </a14:hiddenFill>
             </a:ext>
             <a:ext uri="{91240B29-F687-4F45-9708-019B960494DF}">
-              <a14:hiddenLine xmlns:a14="http://schemas.microsoft.com/office/drawing/2010/main" xmlns="" w="9525">
+              <a14:hiddenLine xmlns:a14="http://schemas.microsoft.com/office/drawing/2010/main" w="9525">
                 <a:solidFill>
                   <a:schemeClr val="tx1"/>
                 </a:solidFill>
@@ -1741,7 +1741,7 @@
               </a14:hiddenLine>
             </a:ext>
             <a:ext uri="{AF507438-7753-43E0-B8FC-AC1667EBCBE1}">
-              <a14:hiddenEffects xmlns:a14="http://schemas.microsoft.com/office/drawing/2010/main" xmlns="">
+              <a14:hiddenEffects xmlns:a14="http://schemas.microsoft.com/office/drawing/2010/main">
                 <a:effectLst>
                   <a:outerShdw dist="35921" dir="2700000" algn="ctr" rotWithShape="0">
                     <a:schemeClr val="bg2"/>
@@ -1755,7 +1755,7 @@
     </p:spTree>
     <p:extLst>
       <p:ext uri="{BB962C8B-B14F-4D97-AF65-F5344CB8AC3E}">
-        <p14:creationId xmlns:p14="http://schemas.microsoft.com/office/powerpoint/2010/main" xmlns="" val="3296324981"/>
+        <p14:creationId xmlns:p14="http://schemas.microsoft.com/office/powerpoint/2010/main" val="3296324981"/>
       </p:ext>
     </p:extLst>
   </p:cSld>
@@ -1867,7 +1867,7 @@
     </p:spTree>
     <p:extLst>
       <p:ext uri="{BB962C8B-B14F-4D97-AF65-F5344CB8AC3E}">
-        <p14:creationId xmlns:p14="http://schemas.microsoft.com/office/powerpoint/2010/main" xmlns="" val="3363467697"/>
+        <p14:creationId xmlns:p14="http://schemas.microsoft.com/office/powerpoint/2010/main" val="3363467697"/>
       </p:ext>
     </p:extLst>
   </p:cSld>
@@ -2048,7 +2048,7 @@
     </p:spTree>
     <p:extLst>
       <p:ext uri="{BB962C8B-B14F-4D97-AF65-F5344CB8AC3E}">
-        <p14:creationId xmlns:p14="http://schemas.microsoft.com/office/powerpoint/2010/main" xmlns="" val="1627150216"/>
+        <p14:creationId xmlns:p14="http://schemas.microsoft.com/office/powerpoint/2010/main" val="1627150216"/>
       </p:ext>
     </p:extLst>
   </p:cSld>
@@ -2271,7 +2271,7 @@
     </p:spTree>
     <p:extLst>
       <p:ext uri="{BB962C8B-B14F-4D97-AF65-F5344CB8AC3E}">
-        <p14:creationId xmlns:p14="http://schemas.microsoft.com/office/powerpoint/2010/main" xmlns="" val="1026234569"/>
+        <p14:creationId xmlns:p14="http://schemas.microsoft.com/office/powerpoint/2010/main" val="1026234569"/>
       </p:ext>
     </p:extLst>
   </p:cSld>
@@ -2628,7 +2628,7 @@
     </p:spTree>
     <p:extLst>
       <p:ext uri="{BB962C8B-B14F-4D97-AF65-F5344CB8AC3E}">
-        <p14:creationId xmlns:p14="http://schemas.microsoft.com/office/powerpoint/2010/main" xmlns="" val="4044979405"/>
+        <p14:creationId xmlns:p14="http://schemas.microsoft.com/office/powerpoint/2010/main" val="4044979405"/>
       </p:ext>
     </p:extLst>
   </p:cSld>
@@ -2681,7 +2681,7 @@
     </p:spTree>
     <p:extLst>
       <p:ext uri="{BB962C8B-B14F-4D97-AF65-F5344CB8AC3E}">
-        <p14:creationId xmlns:p14="http://schemas.microsoft.com/office/powerpoint/2010/main" xmlns="" val="125202666"/>
+        <p14:creationId xmlns:p14="http://schemas.microsoft.com/office/powerpoint/2010/main" val="125202666"/>
       </p:ext>
     </p:extLst>
   </p:cSld>
@@ -2746,7 +2746,7 @@
     </p:spTree>
     <p:extLst>
       <p:ext uri="{BB962C8B-B14F-4D97-AF65-F5344CB8AC3E}">
-        <p14:creationId xmlns:p14="http://schemas.microsoft.com/office/powerpoint/2010/main" xmlns="" val="3308008441"/>
+        <p14:creationId xmlns:p14="http://schemas.microsoft.com/office/powerpoint/2010/main" val="3308008441"/>
       </p:ext>
     </p:extLst>
   </p:cSld>
@@ -2776,7 +2776,7 @@
     </p:spTree>
     <p:extLst>
       <p:ext uri="{BB962C8B-B14F-4D97-AF65-F5344CB8AC3E}">
-        <p14:creationId xmlns:p14="http://schemas.microsoft.com/office/powerpoint/2010/main" xmlns="" val="2618453949"/>
+        <p14:creationId xmlns:p14="http://schemas.microsoft.com/office/powerpoint/2010/main" val="2618453949"/>
       </p:ext>
     </p:extLst>
   </p:cSld>
@@ -2948,7 +2948,7 @@
             <a:fld id="{AC3D3127-B7C4-45E3-9797-C527EC9FDD78}" type="datetimeFigureOut">
               <a:rPr lang="ru-RU" smtClean="0"/>
               <a:pPr/>
-              <a:t>26.03.2014</a:t>
+              <a:t>09.04.2014</a:t>
             </a:fld>
             <a:endParaRPr lang="ru-RU"/>
           </a:p>
@@ -3036,7 +3036,7 @@
     </p:spTree>
     <p:extLst>
       <p:ext uri="{BB962C8B-B14F-4D97-AF65-F5344CB8AC3E}">
-        <p14:creationId xmlns:p14="http://schemas.microsoft.com/office/powerpoint/2010/main" xmlns="" val="995537454"/>
+        <p14:creationId xmlns:p14="http://schemas.microsoft.com/office/powerpoint/2010/main" val="995537454"/>
       </p:ext>
     </p:extLst>
   </p:cSld>
@@ -3392,7 +3392,7 @@
           <a:blip r:embed="rId2" cstate="print">
             <a:extLst>
               <a:ext uri="{28A0092B-C50C-407E-A947-70E740481C1C}">
-                <a14:useLocalDpi xmlns:a14="http://schemas.microsoft.com/office/drawing/2010/main" xmlns="" val="0"/>
+                <a14:useLocalDpi xmlns:a14="http://schemas.microsoft.com/office/drawing/2010/main" val="0"/>
               </a:ext>
             </a:extLst>
           </a:blip>
@@ -3416,14 +3416,14 @@
           <a:effectLst/>
           <a:extLst>
             <a:ext uri="{909E8E84-426E-40DD-AFC4-6F175D3DCCD1}">
-              <a14:hiddenFill xmlns:a14="http://schemas.microsoft.com/office/drawing/2010/main" xmlns="">
+              <a14:hiddenFill xmlns:a14="http://schemas.microsoft.com/office/drawing/2010/main">
                 <a:solidFill>
                   <a:schemeClr val="accent1"/>
                 </a:solidFill>
               </a14:hiddenFill>
             </a:ext>
             <a:ext uri="{91240B29-F687-4F45-9708-019B960494DF}">
-              <a14:hiddenLine xmlns:a14="http://schemas.microsoft.com/office/drawing/2010/main" xmlns="" w="9525">
+              <a14:hiddenLine xmlns:a14="http://schemas.microsoft.com/office/drawing/2010/main" w="9525">
                 <a:solidFill>
                   <a:schemeClr val="tx1"/>
                 </a:solidFill>
@@ -3433,7 +3433,7 @@
               </a14:hiddenLine>
             </a:ext>
             <a:ext uri="{AF507438-7753-43E0-B8FC-AC1667EBCBE1}">
-              <a14:hiddenEffects xmlns:a14="http://schemas.microsoft.com/office/drawing/2010/main" xmlns="">
+              <a14:hiddenEffects xmlns:a14="http://schemas.microsoft.com/office/drawing/2010/main">
                 <a:effectLst>
                   <a:outerShdw dist="35921" dir="2700000" algn="ctr" rotWithShape="0">
                     <a:schemeClr val="bg2"/>
@@ -3518,7 +3518,7 @@
     </p:spTree>
     <p:extLst>
       <p:ext uri="{BB962C8B-B14F-4D97-AF65-F5344CB8AC3E}">
-        <p14:creationId xmlns:p14="http://schemas.microsoft.com/office/powerpoint/2010/main" xmlns="" val="2151619624"/>
+        <p14:creationId xmlns:p14="http://schemas.microsoft.com/office/powerpoint/2010/main" val="2151619624"/>
       </p:ext>
     </p:extLst>
   </p:cSld>
@@ -3685,7 +3685,7 @@
     </p:spTree>
     <p:extLst>
       <p:ext uri="{BB962C8B-B14F-4D97-AF65-F5344CB8AC3E}">
-        <p14:creationId xmlns:p14="http://schemas.microsoft.com/office/powerpoint/2010/main" xmlns="" val="3539412357"/>
+        <p14:creationId xmlns:p14="http://schemas.microsoft.com/office/powerpoint/2010/main" val="3539412357"/>
       </p:ext>
     </p:extLst>
   </p:cSld>
@@ -3785,7 +3785,7 @@
     </p:spTree>
     <p:extLst>
       <p:ext uri="{BB962C8B-B14F-4D97-AF65-F5344CB8AC3E}">
-        <p14:creationId xmlns:p14="http://schemas.microsoft.com/office/powerpoint/2010/main" xmlns="" val="375333521"/>
+        <p14:creationId xmlns:p14="http://schemas.microsoft.com/office/powerpoint/2010/main" val="375333521"/>
       </p:ext>
     </p:extLst>
   </p:cSld>
@@ -3898,7 +3898,7 @@
     </p:spTree>
     <p:extLst>
       <p:ext uri="{BB962C8B-B14F-4D97-AF65-F5344CB8AC3E}">
-        <p14:creationId xmlns:p14="http://schemas.microsoft.com/office/powerpoint/2010/main" xmlns="" val="2250229024"/>
+        <p14:creationId xmlns:p14="http://schemas.microsoft.com/office/powerpoint/2010/main" val="2250229024"/>
       </p:ext>
     </p:extLst>
   </p:cSld>
@@ -3996,7 +3996,7 @@
     </p:spTree>
     <p:extLst>
       <p:ext uri="{BB962C8B-B14F-4D97-AF65-F5344CB8AC3E}">
-        <p14:creationId xmlns:p14="http://schemas.microsoft.com/office/powerpoint/2010/main" xmlns="" val="3785344664"/>
+        <p14:creationId xmlns:p14="http://schemas.microsoft.com/office/powerpoint/2010/main" val="3785344664"/>
       </p:ext>
     </p:extLst>
   </p:cSld>
@@ -4086,7 +4086,7 @@
     </p:spTree>
     <p:extLst>
       <p:ext uri="{BB962C8B-B14F-4D97-AF65-F5344CB8AC3E}">
-        <p14:creationId xmlns:p14="http://schemas.microsoft.com/office/powerpoint/2010/main" xmlns="" val="3785344664"/>
+        <p14:creationId xmlns:p14="http://schemas.microsoft.com/office/powerpoint/2010/main" val="3785344664"/>
       </p:ext>
     </p:extLst>
   </p:cSld>
@@ -4376,7 +4376,7 @@
     </p:spTree>
     <p:extLst>
       <p:ext uri="{BB962C8B-B14F-4D97-AF65-F5344CB8AC3E}">
-        <p14:creationId xmlns:p14="http://schemas.microsoft.com/office/powerpoint/2010/main" xmlns="" val="1695211947"/>
+        <p14:creationId xmlns:p14="http://schemas.microsoft.com/office/powerpoint/2010/main" val="1695211947"/>
       </p:ext>
     </p:extLst>
   </p:cSld>
@@ -4545,7 +4545,7 @@
     </p:spTree>
     <p:extLst>
       <p:ext uri="{BB962C8B-B14F-4D97-AF65-F5344CB8AC3E}">
-        <p14:creationId xmlns:p14="http://schemas.microsoft.com/office/powerpoint/2010/main" xmlns="" val="821585920"/>
+        <p14:creationId xmlns:p14="http://schemas.microsoft.com/office/powerpoint/2010/main" val="821585920"/>
       </p:ext>
     </p:extLst>
   </p:cSld>
@@ -4672,7 +4672,7 @@
     </p:spTree>
     <p:extLst>
       <p:ext uri="{BB962C8B-B14F-4D97-AF65-F5344CB8AC3E}">
-        <p14:creationId xmlns:p14="http://schemas.microsoft.com/office/powerpoint/2010/main" xmlns="" val="1166576302"/>
+        <p14:creationId xmlns:p14="http://schemas.microsoft.com/office/powerpoint/2010/main" val="1166576302"/>
       </p:ext>
     </p:extLst>
   </p:cSld>
@@ -4773,11 +4773,7 @@
           <a:p>
             <a:r>
               <a:rPr lang="en-US" dirty="0" smtClean="0"/>
-              <a:t>Contains</a:t>
-            </a:r>
-            <a:r>
-              <a:rPr lang="en-US" dirty="0" smtClean="0"/>
-              <a:t>()</a:t>
+              <a:t>Contains()</a:t>
             </a:r>
             <a:endParaRPr lang="en-US" dirty="0"/>
           </a:p>
@@ -4786,7 +4782,7 @@
     </p:spTree>
     <p:extLst>
       <p:ext uri="{BB962C8B-B14F-4D97-AF65-F5344CB8AC3E}">
-        <p14:creationId xmlns:p14="http://schemas.microsoft.com/office/powerpoint/2010/main" xmlns="" val="1447848696"/>
+        <p14:creationId xmlns:p14="http://schemas.microsoft.com/office/powerpoint/2010/main" val="1447848696"/>
       </p:ext>
     </p:extLst>
   </p:cSld>
@@ -4915,7 +4911,7 @@
     </p:spTree>
     <p:extLst>
       <p:ext uri="{BB962C8B-B14F-4D97-AF65-F5344CB8AC3E}">
-        <p14:creationId xmlns:p14="http://schemas.microsoft.com/office/powerpoint/2010/main" xmlns="" val="384543663"/>
+        <p14:creationId xmlns:p14="http://schemas.microsoft.com/office/powerpoint/2010/main" val="384543663"/>
       </p:ext>
     </p:extLst>
   </p:cSld>
@@ -4998,7 +4994,7 @@
     </p:spTree>
     <p:extLst>
       <p:ext uri="{BB962C8B-B14F-4D97-AF65-F5344CB8AC3E}">
-        <p14:creationId xmlns:p14="http://schemas.microsoft.com/office/powerpoint/2010/main" xmlns="" val="4100190931"/>
+        <p14:creationId xmlns:p14="http://schemas.microsoft.com/office/powerpoint/2010/main" val="4100190931"/>
       </p:ext>
     </p:extLst>
   </p:cSld>
@@ -5096,11 +5092,7 @@
           <a:p>
             <a:r>
               <a:rPr lang="en-US" dirty="0" smtClean="0"/>
-              <a:t>Count</a:t>
-            </a:r>
-            <a:r>
-              <a:rPr lang="en-US" dirty="0" smtClean="0"/>
-              <a:t>()</a:t>
+              <a:t>Count()</a:t>
             </a:r>
             <a:r>
               <a:rPr lang="ru-RU" dirty="0" smtClean="0"/>
@@ -5199,7 +5191,7 @@
     </p:spTree>
     <p:extLst>
       <p:ext uri="{BB962C8B-B14F-4D97-AF65-F5344CB8AC3E}">
-        <p14:creationId xmlns:p14="http://schemas.microsoft.com/office/powerpoint/2010/main" xmlns="" val="2856452905"/>
+        <p14:creationId xmlns:p14="http://schemas.microsoft.com/office/powerpoint/2010/main" val="2856452905"/>
       </p:ext>
     </p:extLst>
   </p:cSld>
@@ -5460,7 +5452,7 @@
     </p:spTree>
     <p:extLst>
       <p:ext uri="{BB962C8B-B14F-4D97-AF65-F5344CB8AC3E}">
-        <p14:creationId xmlns:p14="http://schemas.microsoft.com/office/powerpoint/2010/main" xmlns="" val="2294722203"/>
+        <p14:creationId xmlns:p14="http://schemas.microsoft.com/office/powerpoint/2010/main" val="2294722203"/>
       </p:ext>
     </p:extLst>
   </p:cSld>
@@ -5514,7 +5506,7 @@
           <a:blip r:embed="rId2" cstate="print">
             <a:extLst>
               <a:ext uri="{28A0092B-C50C-407E-A947-70E740481C1C}">
-                <a14:useLocalDpi xmlns:a14="http://schemas.microsoft.com/office/drawing/2010/main" xmlns="" val="0"/>
+                <a14:useLocalDpi xmlns:a14="http://schemas.microsoft.com/office/drawing/2010/main" val="0"/>
               </a:ext>
             </a:extLst>
           </a:blip>
@@ -5538,14 +5530,14 @@
           <a:effectLst/>
           <a:extLst>
             <a:ext uri="{909E8E84-426E-40DD-AFC4-6F175D3DCCD1}">
-              <a14:hiddenFill xmlns:a14="http://schemas.microsoft.com/office/drawing/2010/main" xmlns="">
+              <a14:hiddenFill xmlns:a14="http://schemas.microsoft.com/office/drawing/2010/main">
                 <a:solidFill>
                   <a:schemeClr val="accent1"/>
                 </a:solidFill>
               </a14:hiddenFill>
             </a:ext>
             <a:ext uri="{91240B29-F687-4F45-9708-019B960494DF}">
-              <a14:hiddenLine xmlns:a14="http://schemas.microsoft.com/office/drawing/2010/main" xmlns="" w="9525">
+              <a14:hiddenLine xmlns:a14="http://schemas.microsoft.com/office/drawing/2010/main" w="9525">
                 <a:solidFill>
                   <a:schemeClr val="tx1"/>
                 </a:solidFill>
@@ -5555,7 +5547,7 @@
               </a14:hiddenLine>
             </a:ext>
             <a:ext uri="{AF507438-7753-43E0-B8FC-AC1667EBCBE1}">
-              <a14:hiddenEffects xmlns:a14="http://schemas.microsoft.com/office/drawing/2010/main" xmlns="">
+              <a14:hiddenEffects xmlns:a14="http://schemas.microsoft.com/office/drawing/2010/main">
                 <a:effectLst>
                   <a:outerShdw dist="35921" dir="2700000" algn="ctr" rotWithShape="0">
                     <a:schemeClr val="bg2"/>
@@ -5569,7 +5561,7 @@
     </p:spTree>
     <p:extLst>
       <p:ext uri="{BB962C8B-B14F-4D97-AF65-F5344CB8AC3E}">
-        <p14:creationId xmlns:p14="http://schemas.microsoft.com/office/powerpoint/2010/main" xmlns="" val="1377556597"/>
+        <p14:creationId xmlns:p14="http://schemas.microsoft.com/office/powerpoint/2010/main" val="1377556597"/>
       </p:ext>
     </p:extLst>
   </p:cSld>
@@ -5728,7 +5720,7 @@
     </p:spTree>
     <p:extLst>
       <p:ext uri="{BB962C8B-B14F-4D97-AF65-F5344CB8AC3E}">
-        <p14:creationId xmlns:p14="http://schemas.microsoft.com/office/powerpoint/2010/main" xmlns="" val="1834671459"/>
+        <p14:creationId xmlns:p14="http://schemas.microsoft.com/office/powerpoint/2010/main" val="1834671459"/>
       </p:ext>
     </p:extLst>
   </p:cSld>
@@ -5811,7 +5803,7 @@
           <p:nvPr>
             <p:extLst>
               <p:ext uri="{D42A27DB-BD31-4B8C-83A1-F6EECF244321}">
-                <p14:modId xmlns:p14="http://schemas.microsoft.com/office/powerpoint/2010/main" xmlns="" val="995054926"/>
+                <p14:modId xmlns:p14="http://schemas.microsoft.com/office/powerpoint/2010/main" val="995054926"/>
               </p:ext>
             </p:extLst>
           </p:nvPr>
@@ -8360,7 +8352,7 @@
     </p:spTree>
     <p:extLst>
       <p:ext uri="{BB962C8B-B14F-4D97-AF65-F5344CB8AC3E}">
-        <p14:creationId xmlns:p14="http://schemas.microsoft.com/office/powerpoint/2010/main" xmlns="" val="3913675265"/>
+        <p14:creationId xmlns:p14="http://schemas.microsoft.com/office/powerpoint/2010/main" val="3913675265"/>
       </p:ext>
     </p:extLst>
   </p:cSld>
@@ -8443,7 +8435,7 @@
           <p:nvPr>
             <p:extLst>
               <p:ext uri="{D42A27DB-BD31-4B8C-83A1-F6EECF244321}">
-                <p14:modId xmlns:p14="http://schemas.microsoft.com/office/powerpoint/2010/main" xmlns="" val="734462515"/>
+                <p14:modId xmlns:p14="http://schemas.microsoft.com/office/powerpoint/2010/main" val="734462515"/>
               </p:ext>
             </p:extLst>
           </p:nvPr>
@@ -10349,7 +10341,7 @@
     </p:spTree>
     <p:extLst>
       <p:ext uri="{BB962C8B-B14F-4D97-AF65-F5344CB8AC3E}">
-        <p14:creationId xmlns:p14="http://schemas.microsoft.com/office/powerpoint/2010/main" xmlns="" val="11906281"/>
+        <p14:creationId xmlns:p14="http://schemas.microsoft.com/office/powerpoint/2010/main" val="11906281"/>
       </p:ext>
     </p:extLst>
   </p:cSld>
@@ -10534,7 +10526,7 @@
     </p:spTree>
     <p:extLst>
       <p:ext uri="{BB962C8B-B14F-4D97-AF65-F5344CB8AC3E}">
-        <p14:creationId xmlns:p14="http://schemas.microsoft.com/office/powerpoint/2010/main" xmlns="" val="655218848"/>
+        <p14:creationId xmlns:p14="http://schemas.microsoft.com/office/powerpoint/2010/main" val="655218848"/>
       </p:ext>
     </p:extLst>
   </p:cSld>
@@ -10665,7 +10657,7 @@
     </p:spTree>
     <p:extLst>
       <p:ext uri="{BB962C8B-B14F-4D97-AF65-F5344CB8AC3E}">
-        <p14:creationId xmlns:p14="http://schemas.microsoft.com/office/powerpoint/2010/main" xmlns="" val="3577814463"/>
+        <p14:creationId xmlns:p14="http://schemas.microsoft.com/office/powerpoint/2010/main" val="3577814463"/>
       </p:ext>
     </p:extLst>
   </p:cSld>
@@ -10803,7 +10795,7 @@
     </p:spTree>
     <p:extLst>
       <p:ext uri="{BB962C8B-B14F-4D97-AF65-F5344CB8AC3E}">
-        <p14:creationId xmlns:p14="http://schemas.microsoft.com/office/powerpoint/2010/main" xmlns="" val="3831311100"/>
+        <p14:creationId xmlns:p14="http://schemas.microsoft.com/office/powerpoint/2010/main" val="3831311100"/>
       </p:ext>
     </p:extLst>
   </p:cSld>
@@ -11242,6 +11234,56 @@
               </a:rPr>
               <a:t>{</a:t>
             </a:r>
+          </a:p>
+          <a:p>
+            <a:pPr marL="0" indent="0">
+              <a:buNone/>
+            </a:pPr>
+            <a:r>
+              <a:rPr lang="en-US" sz="1400" dirty="0" smtClean="0">
+                <a:solidFill>
+                  <a:srgbClr val="008000"/>
+                </a:solidFill>
+                <a:latin typeface="Consolas"/>
+              </a:rPr>
+              <a:t>          </a:t>
+            </a:r>
+            <a:r>
+              <a:rPr lang="ru-RU" sz="1400" dirty="0" smtClean="0">
+                <a:solidFill>
+                  <a:srgbClr val="008000"/>
+                </a:solidFill>
+                <a:latin typeface="Consolas"/>
+              </a:rPr>
+              <a:t>// См. </a:t>
+            </a:r>
+            <a:r>
+              <a:rPr lang="ru-RU" sz="1400" dirty="0">
+                <a:solidFill>
+                  <a:srgbClr val="008000"/>
+                </a:solidFill>
+                <a:latin typeface="Consolas"/>
+              </a:rPr>
+              <a:t>к</a:t>
+            </a:r>
+            <a:r>
+              <a:rPr lang="ru-RU" sz="1400" dirty="0" smtClean="0">
+                <a:solidFill>
+                  <a:srgbClr val="008000"/>
+                </a:solidFill>
+                <a:latin typeface="Consolas"/>
+              </a:rPr>
+              <a:t>омментарий на следующем слайде о ключевом слове </a:t>
+            </a:r>
+            <a:r>
+              <a:rPr lang="en-US" sz="1400" dirty="0" smtClean="0">
+                <a:solidFill>
+                  <a:srgbClr val="008000"/>
+                </a:solidFill>
+                <a:latin typeface="Consolas"/>
+              </a:rPr>
+              <a:t>checked</a:t>
+            </a:r>
             <a:endParaRPr lang="en-US" sz="1500" dirty="0">
               <a:solidFill>
                 <a:srgbClr val="000000"/>
@@ -11287,11 +11329,29 @@
                 </a:solidFill>
                 <a:latin typeface="Consolas"/>
               </a:rPr>
-              <a:t>] = numbers[i-</a:t>
+              <a:t>] = </a:t>
             </a:r>
             <a:r>
               <a:rPr lang="en-US" sz="1500" dirty="0">
                 <a:solidFill>
+                  <a:srgbClr val="0000FF"/>
+                </a:solidFill>
+                <a:latin typeface="Consolas"/>
+              </a:rPr>
+              <a:t>checked</a:t>
+            </a:r>
+            <a:r>
+              <a:rPr lang="en-US" sz="1500" dirty="0" smtClean="0">
+                <a:solidFill>
+                  <a:srgbClr val="000000"/>
+                </a:solidFill>
+                <a:latin typeface="Consolas"/>
+              </a:rPr>
+              <a:t>(numbers[i-</a:t>
+            </a:r>
+            <a:r>
+              <a:rPr lang="en-US" sz="1500" dirty="0" smtClean="0">
+                <a:solidFill>
                   <a:srgbClr val="C81EFA"/>
                 </a:solidFill>
                 <a:latin typeface="Consolas"/>
@@ -11305,8 +11365,23 @@
                 </a:solidFill>
                 <a:latin typeface="Consolas"/>
               </a:rPr>
-              <a:t>] + step;</a:t>
-            </a:r>
+              <a:t>] + </a:t>
+            </a:r>
+            <a:r>
+              <a:rPr lang="en-US" sz="1500" dirty="0" smtClean="0">
+                <a:solidFill>
+                  <a:srgbClr val="000000"/>
+                </a:solidFill>
+                <a:latin typeface="Consolas"/>
+              </a:rPr>
+              <a:t>step);</a:t>
+            </a:r>
+            <a:endParaRPr lang="en-US" sz="1500" dirty="0">
+              <a:solidFill>
+                <a:srgbClr val="000000"/>
+              </a:solidFill>
+              <a:latin typeface="Consolas"/>
+            </a:endParaRPr>
           </a:p>
           <a:p>
             <a:pPr marL="0" indent="0">
@@ -11408,7 +11483,7 @@
               <a:buNone/>
             </a:pPr>
             <a:r>
-              <a:rPr lang="en-US" sz="1500" dirty="0" err="1">
+              <a:rPr lang="en-US" sz="1500" dirty="0" err="1" smtClean="0">
                 <a:solidFill>
                   <a:srgbClr val="0000FF"/>
                 </a:solidFill>
@@ -11417,7 +11492,7 @@
               <a:t>foreach</a:t>
             </a:r>
             <a:r>
-              <a:rPr lang="en-US" sz="1500" dirty="0">
+              <a:rPr lang="en-US" sz="1500" dirty="0" smtClean="0">
                 <a:solidFill>
                   <a:srgbClr val="000000"/>
                 </a:solidFill>
@@ -11426,7 +11501,7 @@
               <a:t> (</a:t>
             </a:r>
             <a:r>
-              <a:rPr lang="en-US" sz="1500" dirty="0" err="1">
+              <a:rPr lang="en-US" sz="1500" dirty="0" err="1" smtClean="0">
                 <a:solidFill>
                   <a:srgbClr val="0000FF"/>
                 </a:solidFill>
@@ -11435,7 +11510,7 @@
               <a:t>int</a:t>
             </a:r>
             <a:r>
-              <a:rPr lang="en-US" sz="1500" dirty="0">
+              <a:rPr lang="en-US" sz="1500" dirty="0" smtClean="0">
                 <a:solidFill>
                   <a:srgbClr val="000000"/>
                 </a:solidFill>
@@ -11444,7 +11519,7 @@
               <a:t> </a:t>
             </a:r>
             <a:r>
-              <a:rPr lang="en-US" sz="1500" dirty="0" err="1">
+              <a:rPr lang="en-US" sz="1500" dirty="0" err="1" smtClean="0">
                 <a:solidFill>
                   <a:srgbClr val="000000"/>
                 </a:solidFill>
@@ -11453,7 +11528,7 @@
               <a:t>num</a:t>
             </a:r>
             <a:r>
-              <a:rPr lang="en-US" sz="1500" dirty="0">
+              <a:rPr lang="en-US" sz="1500" dirty="0" smtClean="0">
                 <a:solidFill>
                   <a:srgbClr val="000000"/>
                 </a:solidFill>
@@ -11462,7 +11537,7 @@
               <a:t> </a:t>
             </a:r>
             <a:r>
-              <a:rPr lang="en-US" sz="1500" dirty="0">
+              <a:rPr lang="en-US" sz="1500" dirty="0" smtClean="0">
                 <a:solidFill>
                   <a:srgbClr val="0000FF"/>
                 </a:solidFill>
@@ -11471,7 +11546,7 @@
               <a:t>in</a:t>
             </a:r>
             <a:r>
-              <a:rPr lang="en-US" sz="1500" dirty="0">
+              <a:rPr lang="en-US" sz="1500" dirty="0" smtClean="0">
                 <a:solidFill>
                   <a:srgbClr val="000000"/>
                 </a:solidFill>
@@ -11480,7 +11555,7 @@
               <a:t> </a:t>
             </a:r>
             <a:r>
-              <a:rPr lang="en-US" sz="1500" dirty="0" err="1">
+              <a:rPr lang="en-US" sz="1500" dirty="0" err="1" smtClean="0">
                 <a:solidFill>
                   <a:srgbClr val="000000"/>
                 </a:solidFill>
@@ -11489,7 +11564,7 @@
               <a:t>ArithmeticProgression</a:t>
             </a:r>
             <a:r>
-              <a:rPr lang="en-US" sz="1500" dirty="0">
+              <a:rPr lang="en-US" sz="1500" dirty="0" smtClean="0">
                 <a:solidFill>
                   <a:srgbClr val="000000"/>
                 </a:solidFill>
@@ -11498,7 +11573,7 @@
               <a:t>(</a:t>
             </a:r>
             <a:r>
-              <a:rPr lang="en-US" sz="1500" dirty="0">
+              <a:rPr lang="en-US" sz="1500" dirty="0" smtClean="0">
                 <a:solidFill>
                   <a:srgbClr val="C81EFA"/>
                 </a:solidFill>
@@ -11507,7 +11582,7 @@
               <a:t>1</a:t>
             </a:r>
             <a:r>
-              <a:rPr lang="en-US" sz="1500" dirty="0">
+              <a:rPr lang="en-US" sz="1500" dirty="0" smtClean="0">
                 <a:solidFill>
                   <a:srgbClr val="000000"/>
                 </a:solidFill>
@@ -11516,7 +11591,7 @@
               <a:t>, </a:t>
             </a:r>
             <a:r>
-              <a:rPr lang="en-US" sz="1500" dirty="0">
+              <a:rPr lang="en-US" sz="1500" dirty="0" smtClean="0">
                 <a:solidFill>
                   <a:srgbClr val="C81EFA"/>
                 </a:solidFill>
@@ -11525,7 +11600,7 @@
               <a:t>3</a:t>
             </a:r>
             <a:r>
-              <a:rPr lang="en-US" sz="1500" dirty="0">
+              <a:rPr lang="en-US" sz="1500" dirty="0" smtClean="0">
                 <a:solidFill>
                   <a:srgbClr val="000000"/>
                 </a:solidFill>
@@ -11534,7 +11609,7 @@
               <a:t>, </a:t>
             </a:r>
             <a:r>
-              <a:rPr lang="en-US" sz="1500" dirty="0">
+              <a:rPr lang="en-US" sz="1500" dirty="0" smtClean="0">
                 <a:solidFill>
                   <a:srgbClr val="C81EFA"/>
                 </a:solidFill>
@@ -11551,19 +11626,13 @@
               </a:rPr>
               <a:t>))</a:t>
             </a:r>
-            <a:endParaRPr lang="en-US" sz="1500" dirty="0">
-              <a:solidFill>
-                <a:srgbClr val="000000"/>
-              </a:solidFill>
-              <a:latin typeface="Consolas"/>
-            </a:endParaRPr>
           </a:p>
           <a:p>
             <a:pPr marL="0" indent="0">
               <a:buNone/>
             </a:pPr>
             <a:r>
-              <a:rPr lang="en-US" sz="1500" dirty="0">
+              <a:rPr lang="en-US" sz="1500" dirty="0" smtClean="0">
                 <a:solidFill>
                   <a:srgbClr val="000000"/>
                 </a:solidFill>
@@ -11613,7 +11682,7 @@
               <a:t>num</a:t>
             </a:r>
             <a:r>
-              <a:rPr lang="en-US" sz="1500" dirty="0">
+              <a:rPr lang="en-US" sz="1500" dirty="0" smtClean="0">
                 <a:solidFill>
                   <a:srgbClr val="000000"/>
                 </a:solidFill>
@@ -11627,7 +11696,7 @@
               <a:buNone/>
             </a:pPr>
             <a:r>
-              <a:rPr lang="en-US" sz="1500" dirty="0">
+              <a:rPr lang="en-US" sz="1500" dirty="0" smtClean="0">
                 <a:solidFill>
                   <a:srgbClr val="000000"/>
                 </a:solidFill>
@@ -11647,7 +11716,7 @@
     </p:spTree>
     <p:extLst>
       <p:ext uri="{BB962C8B-B14F-4D97-AF65-F5344CB8AC3E}">
-        <p14:creationId xmlns:p14="http://schemas.microsoft.com/office/powerpoint/2010/main" xmlns="" val="1735524147"/>
+        <p14:creationId xmlns:p14="http://schemas.microsoft.com/office/powerpoint/2010/main" val="1735524147"/>
       </p:ext>
     </p:extLst>
   </p:cSld>
@@ -11728,7 +11797,7 @@
         <p:spPr>
           <a:xfrm>
             <a:off x="457200" y="1600201"/>
-            <a:ext cx="8229600" cy="3412975"/>
+            <a:ext cx="8229600" cy="3268959"/>
           </a:xfrm>
           <a:solidFill>
             <a:schemeClr val="bg1"/>
@@ -11736,7 +11805,7 @@
         </p:spPr>
         <p:txBody>
           <a:bodyPr>
-            <a:normAutofit/>
+            <a:normAutofit fontScale="62500" lnSpcReduction="20000"/>
           </a:bodyPr>
           <a:lstStyle/>
           <a:p>
@@ -11744,7 +11813,7 @@
               <a:buNone/>
             </a:pPr>
             <a:r>
-              <a:rPr lang="en-US" sz="1500" dirty="0">
+              <a:rPr lang="en-US" sz="1600" dirty="0">
                 <a:solidFill>
                   <a:srgbClr val="0000FF"/>
                 </a:solidFill>
@@ -11753,16 +11822,16 @@
               <a:t>public</a:t>
             </a:r>
             <a:r>
-              <a:rPr lang="en-US" sz="1500" dirty="0">
-                <a:solidFill>
-                  <a:srgbClr val="000000"/>
+              <a:rPr lang="en-US" sz="1600" dirty="0">
+                <a:solidFill>
+                  <a:prstClr val="black"/>
                 </a:solidFill>
                 <a:latin typeface="Consolas"/>
               </a:rPr>
               <a:t> </a:t>
             </a:r>
             <a:r>
-              <a:rPr lang="en-US" sz="1500" dirty="0">
+              <a:rPr lang="en-US" sz="1600" dirty="0">
                 <a:solidFill>
                   <a:srgbClr val="0000FF"/>
                 </a:solidFill>
@@ -11771,34 +11840,34 @@
               <a:t>static</a:t>
             </a:r>
             <a:r>
-              <a:rPr lang="en-US" sz="1500" dirty="0">
-                <a:solidFill>
-                  <a:srgbClr val="000000"/>
+              <a:rPr lang="en-US" sz="1600" dirty="0">
+                <a:solidFill>
+                  <a:prstClr val="black"/>
                 </a:solidFill>
                 <a:latin typeface="Consolas"/>
               </a:rPr>
               <a:t> </a:t>
             </a:r>
             <a:r>
-              <a:rPr lang="en-US" sz="1500" dirty="0" err="1" smtClean="0">
-                <a:solidFill>
-                  <a:srgbClr val="000000"/>
+              <a:rPr lang="en-US" sz="1600" dirty="0" err="1">
+                <a:solidFill>
+                  <a:srgbClr val="2B91AF"/>
                 </a:solidFill>
                 <a:latin typeface="Consolas"/>
               </a:rPr>
               <a:t>IEnumerable</a:t>
             </a:r>
             <a:r>
-              <a:rPr lang="en-US" sz="1500" dirty="0" smtClean="0">
-                <a:solidFill>
-                  <a:srgbClr val="000000"/>
+              <a:rPr lang="en-US" sz="1600" dirty="0">
+                <a:solidFill>
+                  <a:prstClr val="black"/>
                 </a:solidFill>
                 <a:latin typeface="Consolas"/>
               </a:rPr>
               <a:t>&lt;</a:t>
             </a:r>
             <a:r>
-              <a:rPr lang="en-US" sz="1500" dirty="0" err="1" smtClean="0">
+              <a:rPr lang="en-US" sz="1600" dirty="0" err="1">
                 <a:solidFill>
                   <a:srgbClr val="0000FF"/>
                 </a:solidFill>
@@ -11807,43 +11876,52 @@
               <a:t>int</a:t>
             </a:r>
             <a:r>
-              <a:rPr lang="en-US" sz="1500" dirty="0" smtClean="0">
+              <a:rPr lang="en-US" sz="1600" dirty="0">
+                <a:solidFill>
+                  <a:prstClr val="black"/>
+                </a:solidFill>
+                <a:latin typeface="Consolas"/>
+              </a:rPr>
+              <a:t>&gt; </a:t>
+            </a:r>
+            <a:r>
+              <a:rPr lang="en-US" sz="1600" dirty="0" err="1">
+                <a:solidFill>
+                  <a:prstClr val="black"/>
+                </a:solidFill>
+                <a:latin typeface="Consolas"/>
+              </a:rPr>
+              <a:t>ArithmeticProgression</a:t>
+            </a:r>
+            <a:r>
+              <a:rPr lang="en-US" sz="1600" dirty="0">
+                <a:solidFill>
+                  <a:prstClr val="black"/>
+                </a:solidFill>
+                <a:latin typeface="Consolas"/>
+              </a:rPr>
+              <a:t>(</a:t>
+            </a:r>
+            <a:r>
+              <a:rPr lang="en-US" sz="1600" dirty="0" err="1">
                 <a:solidFill>
                   <a:srgbClr val="0000FF"/>
                 </a:solidFill>
                 <a:latin typeface="Consolas"/>
               </a:rPr>
-              <a:t>&gt;</a:t>
-            </a:r>
-            <a:r>
-              <a:rPr lang="en-US" sz="1500" dirty="0" smtClean="0">
-                <a:solidFill>
-                  <a:srgbClr val="000000"/>
-                </a:solidFill>
-                <a:latin typeface="Consolas"/>
-              </a:rPr>
-              <a:t> </a:t>
-            </a:r>
-            <a:r>
-              <a:rPr lang="en-US" sz="1500" dirty="0" err="1">
-                <a:solidFill>
-                  <a:srgbClr val="000000"/>
-                </a:solidFill>
-                <a:latin typeface="Consolas"/>
-              </a:rPr>
-              <a:t>ArithmeticProgression</a:t>
-            </a:r>
-            <a:r>
-              <a:rPr lang="en-US" sz="1500" dirty="0">
-                <a:solidFill>
-                  <a:srgbClr val="000000"/>
-                </a:solidFill>
-                <a:latin typeface="Consolas"/>
-              </a:rPr>
-              <a:t>(</a:t>
-            </a:r>
-            <a:r>
-              <a:rPr lang="en-US" sz="1500" dirty="0" err="1">
+              <a:t>int</a:t>
+            </a:r>
+            <a:r>
+              <a:rPr lang="en-US" sz="1600" dirty="0">
+                <a:solidFill>
+                  <a:prstClr val="black"/>
+                </a:solidFill>
+                <a:latin typeface="Consolas"/>
+              </a:rPr>
+              <a:t> start, </a:t>
+            </a:r>
+            <a:r>
+              <a:rPr lang="en-US" sz="1600" dirty="0" err="1">
                 <a:solidFill>
                   <a:srgbClr val="0000FF"/>
                 </a:solidFill>
@@ -11852,44 +11930,54 @@
               <a:t>int</a:t>
             </a:r>
             <a:r>
-              <a:rPr lang="en-US" sz="1500" dirty="0">
-                <a:solidFill>
-                  <a:srgbClr val="000000"/>
-                </a:solidFill>
-                <a:latin typeface="Consolas"/>
-              </a:rPr>
-              <a:t> start, </a:t>
-            </a:r>
-            <a:r>
-              <a:rPr lang="en-US" sz="1500" dirty="0" err="1">
-                <a:solidFill>
-                  <a:srgbClr val="0000FF"/>
-                </a:solidFill>
-                <a:latin typeface="Consolas"/>
-              </a:rPr>
-              <a:t>int</a:t>
-            </a:r>
-            <a:r>
-              <a:rPr lang="en-US" sz="1500" dirty="0">
-                <a:solidFill>
-                  <a:srgbClr val="000000"/>
-                </a:solidFill>
-                <a:latin typeface="Consolas"/>
-              </a:rPr>
-              <a:t> </a:t>
-            </a:r>
-            <a:r>
-              <a:rPr lang="en-US" sz="1500" dirty="0" smtClean="0">
-                <a:solidFill>
-                  <a:srgbClr val="000000"/>
-                </a:solidFill>
-                <a:latin typeface="Consolas"/>
-              </a:rPr>
-              <a:t>step)</a:t>
-            </a:r>
-            <a:endParaRPr lang="en-US" sz="1500" dirty="0">
+              <a:rPr lang="en-US" sz="1600" dirty="0">
+                <a:solidFill>
+                  <a:prstClr val="black"/>
+                </a:solidFill>
+                <a:latin typeface="Consolas"/>
+              </a:rPr>
+              <a:t> step)</a:t>
+            </a:r>
+          </a:p>
+          <a:p>
+            <a:pPr marL="0" indent="0">
+              <a:buNone/>
+            </a:pPr>
+            <a:r>
+              <a:rPr lang="ru-RU" sz="1600" dirty="0">
+                <a:solidFill>
+                  <a:prstClr val="black"/>
+                </a:solidFill>
+                <a:latin typeface="Consolas"/>
+              </a:rPr>
+              <a:t>{</a:t>
+            </a:r>
+          </a:p>
+          <a:p>
+            <a:pPr marL="0" indent="0">
+              <a:buNone/>
+            </a:pPr>
+            <a:r>
+              <a:rPr lang="ru-RU" sz="1600" dirty="0">
+                <a:solidFill>
+                  <a:prstClr val="black"/>
+                </a:solidFill>
+                <a:latin typeface="Consolas"/>
+              </a:rPr>
+              <a:t>    </a:t>
+            </a:r>
+            <a:r>
+              <a:rPr lang="ru-RU" sz="1600" dirty="0">
+                <a:solidFill>
+                  <a:srgbClr val="008000"/>
+                </a:solidFill>
+                <a:latin typeface="Consolas"/>
+              </a:rPr>
+              <a:t>// По умолчанию компилятор C# игнорирует арифметическое переполнение</a:t>
+            </a:r>
+            <a:endParaRPr lang="ru-RU" sz="1600" dirty="0">
               <a:solidFill>
-                <a:srgbClr val="000000"/>
+                <a:prstClr val="black"/>
               </a:solidFill>
               <a:latin typeface="Consolas"/>
             </a:endParaRPr>
@@ -11899,81 +11987,84 @@
               <a:buNone/>
             </a:pPr>
             <a:r>
-              <a:rPr lang="en-US" sz="1500" dirty="0">
-                <a:solidFill>
-                  <a:srgbClr val="000000"/>
-                </a:solidFill>
-                <a:latin typeface="Consolas"/>
-              </a:rPr>
-              <a:t>{</a:t>
-            </a:r>
+              <a:rPr lang="ru-RU" sz="1600" dirty="0">
+                <a:solidFill>
+                  <a:prstClr val="black"/>
+                </a:solidFill>
+                <a:latin typeface="Consolas"/>
+              </a:rPr>
+              <a:t>    </a:t>
+            </a:r>
+            <a:r>
+              <a:rPr lang="ru-RU" sz="1600" dirty="0">
+                <a:solidFill>
+                  <a:srgbClr val="008000"/>
+                </a:solidFill>
+                <a:latin typeface="Consolas"/>
+              </a:rPr>
+              <a:t>// Использование checked блока заставляет выполнять проверку на переполнение</a:t>
+            </a:r>
+            <a:endParaRPr lang="ru-RU" sz="1600" dirty="0">
+              <a:solidFill>
+                <a:prstClr val="black"/>
+              </a:solidFill>
+              <a:latin typeface="Consolas"/>
+            </a:endParaRPr>
           </a:p>
           <a:p>
             <a:pPr marL="0" indent="0">
               <a:buNone/>
             </a:pPr>
             <a:r>
-              <a:rPr lang="en-US" sz="1600" dirty="0" smtClean="0">
-                <a:solidFill>
-                  <a:srgbClr val="0000FF"/>
-                </a:solidFill>
-                <a:latin typeface="Consolas"/>
-              </a:rPr>
-              <a:t>    for</a:t>
-            </a:r>
-            <a:r>
-              <a:rPr lang="en-US" sz="1600" dirty="0" smtClean="0">
-                <a:solidFill>
-                  <a:srgbClr val="000000"/>
-                </a:solidFill>
-                <a:latin typeface="Consolas"/>
-              </a:rPr>
-              <a:t> </a:t>
-            </a:r>
-            <a:r>
-              <a:rPr lang="en-US" sz="1600" dirty="0">
-                <a:solidFill>
-                  <a:srgbClr val="000000"/>
-                </a:solidFill>
-                <a:latin typeface="Consolas"/>
-              </a:rPr>
-              <a:t>(</a:t>
-            </a:r>
-            <a:r>
-              <a:rPr lang="en-US" sz="1600" dirty="0" err="1">
-                <a:solidFill>
-                  <a:srgbClr val="0000FF"/>
-                </a:solidFill>
-                <a:latin typeface="Consolas"/>
-              </a:rPr>
-              <a:t>int</a:t>
-            </a:r>
-            <a:r>
-              <a:rPr lang="en-US" sz="1600" dirty="0">
-                <a:solidFill>
-                  <a:srgbClr val="000000"/>
-                </a:solidFill>
-                <a:latin typeface="Consolas"/>
-              </a:rPr>
-              <a:t> current=start; ; current += step)</a:t>
-            </a:r>
+              <a:rPr lang="ru-RU" sz="1600" dirty="0">
+                <a:solidFill>
+                  <a:prstClr val="black"/>
+                </a:solidFill>
+                <a:latin typeface="Consolas"/>
+              </a:rPr>
+              <a:t>    </a:t>
+            </a:r>
+            <a:r>
+              <a:rPr lang="ru-RU" sz="1600" dirty="0">
+                <a:solidFill>
+                  <a:srgbClr val="008000"/>
+                </a:solidFill>
+                <a:latin typeface="Consolas"/>
+              </a:rPr>
+              <a:t>//     для всех операций внутри него</a:t>
+            </a:r>
+            <a:endParaRPr lang="ru-RU" sz="1600" dirty="0">
+              <a:solidFill>
+                <a:prstClr val="black"/>
+              </a:solidFill>
+              <a:latin typeface="Consolas"/>
+            </a:endParaRPr>
           </a:p>
           <a:p>
             <a:pPr marL="0" indent="0">
               <a:buNone/>
             </a:pPr>
             <a:r>
-              <a:rPr lang="en-US" sz="1600" dirty="0" smtClean="0">
-                <a:solidFill>
-                  <a:srgbClr val="000000"/>
-                </a:solidFill>
-                <a:latin typeface="Consolas"/>
-              </a:rPr>
-              <a:t>    {</a:t>
-            </a:r>
-            <a:endParaRPr lang="en-US" sz="1600" dirty="0">
+              <a:rPr lang="ru-RU" sz="1600" dirty="0">
+                <a:solidFill>
+                  <a:prstClr val="black"/>
+                </a:solidFill>
+                <a:latin typeface="Consolas"/>
+              </a:rPr>
+              <a:t>    </a:t>
+            </a:r>
+            <a:r>
+              <a:rPr lang="ru-RU" sz="1600" dirty="0">
+                <a:solidFill>
+                  <a:srgbClr val="008000"/>
+                </a:solidFill>
+                <a:latin typeface="Consolas"/>
+              </a:rPr>
+              <a:t>// Здесь это необходимо для правильной генерации последовательности</a:t>
+            </a:r>
+            <a:endParaRPr lang="ru-RU" sz="1600" dirty="0">
               <a:solidFill>
-                <a:srgbClr val="000000"/>
+                <a:prstClr val="black"/>
               </a:solidFill>
               <a:latin typeface="Consolas"/>
             </a:endParaRPr>
@@ -11983,58 +12074,55 @@
               <a:buNone/>
             </a:pPr>
             <a:r>
-              <a:rPr lang="en-US" sz="1600" dirty="0" smtClean="0">
-                <a:solidFill>
-                  <a:srgbClr val="0000FF"/>
-                </a:solidFill>
-                <a:latin typeface="Consolas"/>
-              </a:rPr>
-              <a:t>        yield</a:t>
-            </a:r>
-            <a:r>
-              <a:rPr lang="en-US" sz="1600" dirty="0" smtClean="0">
-                <a:solidFill>
-                  <a:srgbClr val="000000"/>
-                </a:solidFill>
-                <a:latin typeface="Consolas"/>
-              </a:rPr>
-              <a:t> </a:t>
-            </a:r>
-            <a:r>
-              <a:rPr lang="en-US" sz="1600" dirty="0">
-                <a:solidFill>
-                  <a:srgbClr val="0000FF"/>
-                </a:solidFill>
-                <a:latin typeface="Consolas"/>
-              </a:rPr>
-              <a:t>return</a:t>
-            </a:r>
-            <a:r>
-              <a:rPr lang="en-US" sz="1600" dirty="0">
-                <a:solidFill>
-                  <a:srgbClr val="000000"/>
-                </a:solidFill>
-                <a:latin typeface="Consolas"/>
-              </a:rPr>
-              <a:t> current;</a:t>
-            </a:r>
+              <a:rPr lang="ru-RU" sz="1600" dirty="0">
+                <a:solidFill>
+                  <a:prstClr val="black"/>
+                </a:solidFill>
+                <a:latin typeface="Consolas"/>
+              </a:rPr>
+              <a:t>    </a:t>
+            </a:r>
+            <a:r>
+              <a:rPr lang="ru-RU" sz="1600" dirty="0">
+                <a:solidFill>
+                  <a:srgbClr val="008000"/>
+                </a:solidFill>
+                <a:latin typeface="Consolas"/>
+              </a:rPr>
+              <a:t>// В случае переполнения генерируется System.OverflowException</a:t>
+            </a:r>
+            <a:endParaRPr lang="ru-RU" sz="1600" dirty="0">
+              <a:solidFill>
+                <a:prstClr val="black"/>
+              </a:solidFill>
+              <a:latin typeface="Consolas"/>
+            </a:endParaRPr>
           </a:p>
           <a:p>
             <a:pPr marL="0" indent="0">
               <a:buNone/>
             </a:pPr>
             <a:r>
-              <a:rPr lang="en-US" sz="1600" dirty="0" smtClean="0">
-                <a:solidFill>
-                  <a:srgbClr val="000000"/>
-                </a:solidFill>
-                <a:latin typeface="Consolas"/>
-              </a:rPr>
-              <a:t>    }</a:t>
+              <a:rPr lang="en-US" sz="1600" dirty="0">
+                <a:solidFill>
+                  <a:prstClr val="black"/>
+                </a:solidFill>
+                <a:latin typeface="Consolas"/>
+              </a:rPr>
+              <a:t>    </a:t>
+            </a:r>
+            <a:r>
+              <a:rPr lang="en-US" sz="1600" dirty="0">
+                <a:solidFill>
+                  <a:srgbClr val="0000FF"/>
+                </a:solidFill>
+                <a:latin typeface="Consolas"/>
+              </a:rPr>
+              <a:t>checked</a:t>
             </a:r>
             <a:endParaRPr lang="en-US" sz="1600" dirty="0">
               <a:solidFill>
-                <a:srgbClr val="000000"/>
+                <a:prstClr val="black"/>
               </a:solidFill>
               <a:latin typeface="Consolas"/>
             </a:endParaRPr>
@@ -12044,14 +12132,178 @@
               <a:buNone/>
             </a:pPr>
             <a:r>
-              <a:rPr lang="en-US" sz="1500" dirty="0" smtClean="0">
-                <a:solidFill>
-                  <a:srgbClr val="000000"/>
+              <a:rPr lang="ru-RU" sz="1600" dirty="0">
+                <a:solidFill>
+                  <a:prstClr val="black"/>
+                </a:solidFill>
+                <a:latin typeface="Consolas"/>
+              </a:rPr>
+              <a:t>    {</a:t>
+            </a:r>
+          </a:p>
+          <a:p>
+            <a:pPr marL="0" indent="0">
+              <a:buNone/>
+            </a:pPr>
+            <a:r>
+              <a:rPr lang="en-US" sz="1600" dirty="0">
+                <a:solidFill>
+                  <a:prstClr val="black"/>
+                </a:solidFill>
+                <a:latin typeface="Consolas"/>
+              </a:rPr>
+              <a:t>        </a:t>
+            </a:r>
+            <a:r>
+              <a:rPr lang="en-US" sz="1600" dirty="0">
+                <a:solidFill>
+                  <a:srgbClr val="0000FF"/>
+                </a:solidFill>
+                <a:latin typeface="Consolas"/>
+              </a:rPr>
+              <a:t>for</a:t>
+            </a:r>
+            <a:r>
+              <a:rPr lang="en-US" sz="1600" dirty="0">
+                <a:solidFill>
+                  <a:prstClr val="black"/>
+                </a:solidFill>
+                <a:latin typeface="Consolas"/>
+              </a:rPr>
+              <a:t> (</a:t>
+            </a:r>
+            <a:r>
+              <a:rPr lang="en-US" sz="1600" dirty="0" err="1">
+                <a:solidFill>
+                  <a:srgbClr val="0000FF"/>
+                </a:solidFill>
+                <a:latin typeface="Consolas"/>
+              </a:rPr>
+              <a:t>int</a:t>
+            </a:r>
+            <a:r>
+              <a:rPr lang="en-US" sz="1600" dirty="0">
+                <a:solidFill>
+                  <a:prstClr val="black"/>
+                </a:solidFill>
+                <a:latin typeface="Consolas"/>
+              </a:rPr>
+              <a:t> current = start;; current += step)</a:t>
+            </a:r>
+          </a:p>
+          <a:p>
+            <a:pPr marL="0" indent="0">
+              <a:buNone/>
+            </a:pPr>
+            <a:r>
+              <a:rPr lang="ru-RU" sz="1600" dirty="0">
+                <a:solidFill>
+                  <a:prstClr val="black"/>
+                </a:solidFill>
+                <a:latin typeface="Consolas"/>
+              </a:rPr>
+              <a:t>        {</a:t>
+            </a:r>
+          </a:p>
+          <a:p>
+            <a:pPr marL="0" indent="0">
+              <a:buNone/>
+            </a:pPr>
+            <a:r>
+              <a:rPr lang="en-US" sz="1600" dirty="0">
+                <a:solidFill>
+                  <a:prstClr val="black"/>
+                </a:solidFill>
+                <a:latin typeface="Consolas"/>
+              </a:rPr>
+              <a:t>            </a:t>
+            </a:r>
+            <a:r>
+              <a:rPr lang="en-US" sz="1600" dirty="0">
+                <a:solidFill>
+                  <a:srgbClr val="0000FF"/>
+                </a:solidFill>
+                <a:latin typeface="Consolas"/>
+              </a:rPr>
+              <a:t>yield</a:t>
+            </a:r>
+            <a:r>
+              <a:rPr lang="en-US" sz="1600" dirty="0">
+                <a:solidFill>
+                  <a:prstClr val="black"/>
+                </a:solidFill>
+                <a:latin typeface="Consolas"/>
+              </a:rPr>
+              <a:t> </a:t>
+            </a:r>
+            <a:r>
+              <a:rPr lang="en-US" sz="1600" dirty="0">
+                <a:solidFill>
+                  <a:srgbClr val="0000FF"/>
+                </a:solidFill>
+                <a:latin typeface="Consolas"/>
+              </a:rPr>
+              <a:t>return</a:t>
+            </a:r>
+            <a:r>
+              <a:rPr lang="en-US" sz="1600" dirty="0">
+                <a:solidFill>
+                  <a:prstClr val="black"/>
+                </a:solidFill>
+                <a:latin typeface="Consolas"/>
+              </a:rPr>
+              <a:t> current;</a:t>
+            </a:r>
+          </a:p>
+          <a:p>
+            <a:pPr marL="0" indent="0">
+              <a:buNone/>
+            </a:pPr>
+            <a:r>
+              <a:rPr lang="ru-RU" sz="1600" dirty="0">
+                <a:solidFill>
+                  <a:prstClr val="black"/>
+                </a:solidFill>
+                <a:latin typeface="Consolas"/>
+              </a:rPr>
+              <a:t>        }</a:t>
+            </a:r>
+          </a:p>
+          <a:p>
+            <a:pPr marL="0" indent="0">
+              <a:buNone/>
+            </a:pPr>
+            <a:r>
+              <a:rPr lang="ru-RU" sz="1600" dirty="0">
+                <a:solidFill>
+                  <a:prstClr val="black"/>
+                </a:solidFill>
+                <a:latin typeface="Consolas"/>
+              </a:rPr>
+              <a:t>    }</a:t>
+            </a:r>
+          </a:p>
+          <a:p>
+            <a:pPr marL="0" indent="0">
+              <a:buNone/>
+            </a:pPr>
+            <a:r>
+              <a:rPr lang="ru-RU" sz="1600" dirty="0">
+                <a:solidFill>
+                  <a:prstClr val="black"/>
                 </a:solidFill>
                 <a:latin typeface="Consolas"/>
               </a:rPr>
               <a:t>}</a:t>
             </a:r>
+          </a:p>
+          <a:p>
+            <a:endParaRPr lang="ru-RU" sz="1600" dirty="0">
+              <a:solidFill>
+                <a:prstClr val="black"/>
+              </a:solidFill>
+              <a:latin typeface="Consolas"/>
+            </a:endParaRPr>
           </a:p>
           <a:p>
             <a:pPr marL="0" indent="0">
@@ -12069,7 +12321,7 @@
               <a:buNone/>
             </a:pPr>
             <a:r>
-              <a:rPr lang="en-US" sz="1500" dirty="0" err="1">
+              <a:rPr lang="en-US" sz="1500" dirty="0" err="1" smtClean="0">
                 <a:solidFill>
                   <a:srgbClr val="0000FF"/>
                 </a:solidFill>
@@ -12078,13 +12330,22 @@
               <a:t>foreach</a:t>
             </a:r>
             <a:r>
+              <a:rPr lang="en-US" sz="1500" dirty="0" smtClean="0">
+                <a:solidFill>
+                  <a:srgbClr val="000000"/>
+                </a:solidFill>
+                <a:latin typeface="Consolas"/>
+              </a:rPr>
+              <a:t> </a:t>
+            </a:r>
+            <a:r>
               <a:rPr lang="en-US" sz="1500" dirty="0">
                 <a:solidFill>
                   <a:srgbClr val="000000"/>
                 </a:solidFill>
                 <a:latin typeface="Consolas"/>
               </a:rPr>
-              <a:t> (</a:t>
+              <a:t>(</a:t>
             </a:r>
             <a:r>
               <a:rPr lang="en-US" sz="1500" dirty="0" err="1">
@@ -12270,7 +12531,7 @@
               <a:buNone/>
             </a:pPr>
             <a:r>
-              <a:rPr lang="en-US" sz="1500" dirty="0">
+              <a:rPr lang="en-US" sz="1500" dirty="0" smtClean="0">
                 <a:solidFill>
                   <a:srgbClr val="000000"/>
                 </a:solidFill>
@@ -12278,11 +12539,6 @@
               </a:rPr>
               <a:t>}</a:t>
             </a:r>
-          </a:p>
-          <a:p>
-            <a:pPr marL="0" indent="0">
-              <a:buNone/>
-            </a:pPr>
             <a:endParaRPr lang="en-US" dirty="0"/>
           </a:p>
         </p:txBody>
@@ -12347,7 +12603,7 @@
     </p:spTree>
     <p:extLst>
       <p:ext uri="{BB962C8B-B14F-4D97-AF65-F5344CB8AC3E}">
-        <p14:creationId xmlns:p14="http://schemas.microsoft.com/office/powerpoint/2010/main" xmlns="" val="844285275"/>
+        <p14:creationId xmlns:p14="http://schemas.microsoft.com/office/powerpoint/2010/main" val="844285275"/>
       </p:ext>
     </p:extLst>
   </p:cSld>
@@ -12433,7 +12689,7 @@
     </p:spTree>
     <p:extLst>
       <p:ext uri="{BB962C8B-B14F-4D97-AF65-F5344CB8AC3E}">
-        <p14:creationId xmlns:p14="http://schemas.microsoft.com/office/powerpoint/2010/main" xmlns="" val="3311498388"/>
+        <p14:creationId xmlns:p14="http://schemas.microsoft.com/office/powerpoint/2010/main" val="3311498388"/>
       </p:ext>
     </p:extLst>
   </p:cSld>
@@ -12839,7 +13095,7 @@
     </p:spTree>
     <p:extLst>
       <p:ext uri="{BB962C8B-B14F-4D97-AF65-F5344CB8AC3E}">
-        <p14:creationId xmlns:p14="http://schemas.microsoft.com/office/powerpoint/2010/main" xmlns="" val="3545898277"/>
+        <p14:creationId xmlns:p14="http://schemas.microsoft.com/office/powerpoint/2010/main" val="3545898277"/>
       </p:ext>
     </p:extLst>
   </p:cSld>

</xml_diff>

<commit_message>
Added link to C# Little Wonders
</commit_message>
<xml_diff>
--- a/Presentation/lesson-11-linq.pptx
+++ b/Presentation/lesson-11-linq.pptx
@@ -229,7 +229,7 @@
             <a:fld id="{B24A7054-7FFB-49F4-A126-5DF6E687FF53}" type="datetimeFigureOut">
               <a:rPr lang="ru-RU" smtClean="0"/>
               <a:pPr/>
-              <a:t>31.08.2015</a:t>
+              <a:t>24.10.2015</a:t>
             </a:fld>
             <a:endParaRPr lang="ru-RU"/>
           </a:p>
@@ -1513,7 +1513,7 @@
             <a:fld id="{8E6E6A2A-E9D3-4A0D-B04A-ABDD367A1E08}" type="datetimeFigureOut">
               <a:rPr lang="ru-RU" smtClean="0"/>
               <a:pPr/>
-              <a:t>31.08.2015</a:t>
+              <a:t>24.10.2015</a:t>
             </a:fld>
             <a:endParaRPr lang="ru-RU"/>
           </a:p>
@@ -2960,7 +2960,7 @@
             <a:fld id="{AC3D3127-B7C4-45E3-9797-C527EC9FDD78}" type="datetimeFigureOut">
               <a:rPr lang="ru-RU" smtClean="0"/>
               <a:pPr/>
-              <a:t>31.08.2015</a:t>
+              <a:t>24.10.2015</a:t>
             </a:fld>
             <a:endParaRPr lang="ru-RU"/>
           </a:p>
@@ -4609,11 +4609,7 @@
             </a:pPr>
             <a:r>
               <a:rPr lang="ru-RU" sz="2400" dirty="0" smtClean="0"/>
-              <a:t>Позволяют добавлять методы к уже существующим классам без нарушения инкапсуляции</a:t>
-            </a:r>
-            <a:r>
-              <a:rPr lang="ru-RU" sz="2400" dirty="0" smtClean="0"/>
-              <a:t>.</a:t>
+              <a:t>Позволяют добавлять методы к уже существующим классам без нарушения инкапсуляции.</a:t>
             </a:r>
             <a:endParaRPr lang="en-US" sz="2400" dirty="0">
               <a:latin typeface="Courier New" pitchFamily="49" charset="0"/>
@@ -4791,15 +4787,6 @@
               </a:rPr>
               <a:t>();</a:t>
             </a:r>
-            <a:endParaRPr lang="en-US" sz="1600" dirty="0">
-              <a:solidFill>
-                <a:srgbClr val="000000"/>
-              </a:solidFill>
-              <a:highlight>
-                <a:srgbClr val="FFFFFF"/>
-              </a:highlight>
-              <a:latin typeface="Consolas"/>
-            </a:endParaRPr>
           </a:p>
         </p:txBody>
       </p:sp>
@@ -6209,12 +6196,379 @@
             <p:ph idx="1"/>
           </p:nvPr>
         </p:nvSpPr>
-        <p:spPr/>
+        <p:spPr>
+          <a:xfrm>
+            <a:off x="457200" y="1600201"/>
+            <a:ext cx="8229600" cy="1756792"/>
+          </a:xfrm>
+        </p:spPr>
         <p:txBody>
           <a:bodyPr/>
           <a:lstStyle/>
           <a:p>
+            <a:pPr marL="0" indent="0">
+              <a:buNone/>
+            </a:pPr>
+            <a:r>
+              <a:rPr lang="ru-RU" dirty="0" smtClean="0"/>
+              <a:t>Лямбда-выражение это</a:t>
+            </a:r>
+            <a:r>
+              <a:rPr lang="en-US" dirty="0" smtClean="0"/>
+              <a:t> </a:t>
+            </a:r>
+            <a:r>
+              <a:rPr lang="ru-RU" dirty="0" smtClean="0"/>
+              <a:t>форма записи анонимной функции. Имеет вид</a:t>
+            </a:r>
+          </a:p>
+          <a:p>
+            <a:pPr marL="0" indent="0">
+              <a:buNone/>
+            </a:pPr>
+            <a:r>
+              <a:rPr lang="ru-RU" dirty="0" smtClean="0"/>
+              <a:t>(параметры) =</a:t>
+            </a:r>
+            <a:r>
+              <a:rPr lang="en-US" dirty="0" smtClean="0"/>
+              <a:t>&gt; </a:t>
+            </a:r>
+            <a:r>
+              <a:rPr lang="ru-RU" dirty="0" smtClean="0"/>
+              <a:t>тело</a:t>
+            </a:r>
             <a:endParaRPr lang="en-US" dirty="0"/>
+          </a:p>
+        </p:txBody>
+      </p:sp>
+      <p:sp>
+        <p:nvSpPr>
+          <p:cNvPr id="5" name="Rectangle 4"/>
+          <p:cNvSpPr/>
+          <p:nvPr/>
+        </p:nvSpPr>
+        <p:spPr>
+          <a:xfrm>
+            <a:off x="457200" y="3861048"/>
+            <a:ext cx="8003232" cy="1077218"/>
+          </a:xfrm>
+          <a:prstGeom prst="rect">
+            <a:avLst/>
+          </a:prstGeom>
+          <a:solidFill>
+            <a:schemeClr val="bg1"/>
+          </a:solidFill>
+        </p:spPr>
+        <p:txBody>
+          <a:bodyPr wrap="square">
+            <a:spAutoFit/>
+          </a:bodyPr>
+          <a:lstStyle/>
+          <a:p>
+            <a:r>
+              <a:rPr lang="en-US" sz="1600" dirty="0">
+                <a:solidFill>
+                  <a:srgbClr val="2B91AF"/>
+                </a:solidFill>
+                <a:latin typeface="Consolas"/>
+              </a:rPr>
+              <a:t>List</a:t>
+            </a:r>
+            <a:r>
+              <a:rPr lang="en-US" sz="1600" dirty="0">
+                <a:solidFill>
+                  <a:prstClr val="black"/>
+                </a:solidFill>
+                <a:latin typeface="Consolas"/>
+              </a:rPr>
+              <a:t>&lt;</a:t>
+            </a:r>
+            <a:r>
+              <a:rPr lang="en-US" sz="1600" dirty="0">
+                <a:solidFill>
+                  <a:srgbClr val="0000FF"/>
+                </a:solidFill>
+                <a:latin typeface="Consolas"/>
+              </a:rPr>
+              <a:t>string</a:t>
+            </a:r>
+            <a:r>
+              <a:rPr lang="en-US" sz="1600" dirty="0">
+                <a:solidFill>
+                  <a:prstClr val="black"/>
+                </a:solidFill>
+                <a:latin typeface="Consolas"/>
+              </a:rPr>
+              <a:t>&gt; files = </a:t>
+            </a:r>
+            <a:r>
+              <a:rPr lang="en-US" sz="1600" dirty="0">
+                <a:solidFill>
+                  <a:srgbClr val="0000FF"/>
+                </a:solidFill>
+                <a:latin typeface="Consolas"/>
+              </a:rPr>
+              <a:t>new</a:t>
+            </a:r>
+            <a:r>
+              <a:rPr lang="en-US" sz="1600" dirty="0">
+                <a:solidFill>
+                  <a:prstClr val="black"/>
+                </a:solidFill>
+                <a:latin typeface="Consolas"/>
+              </a:rPr>
+              <a:t> </a:t>
+            </a:r>
+            <a:r>
+              <a:rPr lang="en-US" sz="1600" dirty="0">
+                <a:solidFill>
+                  <a:srgbClr val="2B91AF"/>
+                </a:solidFill>
+                <a:latin typeface="Consolas"/>
+              </a:rPr>
+              <a:t>List</a:t>
+            </a:r>
+            <a:r>
+              <a:rPr lang="en-US" sz="1600" dirty="0">
+                <a:solidFill>
+                  <a:prstClr val="black"/>
+                </a:solidFill>
+                <a:latin typeface="Consolas"/>
+              </a:rPr>
+              <a:t>&lt;</a:t>
+            </a:r>
+            <a:r>
+              <a:rPr lang="en-US" sz="1600" dirty="0">
+                <a:solidFill>
+                  <a:srgbClr val="0000FF"/>
+                </a:solidFill>
+                <a:latin typeface="Consolas"/>
+              </a:rPr>
+              <a:t>string</a:t>
+            </a:r>
+            <a:r>
+              <a:rPr lang="en-US" sz="1600" dirty="0">
+                <a:solidFill>
+                  <a:prstClr val="black"/>
+                </a:solidFill>
+                <a:latin typeface="Consolas"/>
+              </a:rPr>
+              <a:t>&gt;() { </a:t>
+            </a:r>
+            <a:r>
+              <a:rPr lang="en-US" sz="1600" dirty="0">
+                <a:solidFill>
+                  <a:srgbClr val="A31515"/>
+                </a:solidFill>
+                <a:latin typeface="Consolas"/>
+              </a:rPr>
+              <a:t>"regedit.exe</a:t>
+            </a:r>
+            <a:r>
+              <a:rPr lang="en-US" sz="1600" dirty="0" smtClean="0">
+                <a:solidFill>
+                  <a:srgbClr val="A31515"/>
+                </a:solidFill>
+                <a:latin typeface="Consolas"/>
+              </a:rPr>
+              <a:t>"</a:t>
+            </a:r>
+            <a:r>
+              <a:rPr lang="en-US" sz="1600" dirty="0" smtClean="0">
+                <a:solidFill>
+                  <a:prstClr val="black"/>
+                </a:solidFill>
+                <a:latin typeface="Consolas"/>
+              </a:rPr>
+              <a:t>,</a:t>
+            </a:r>
+            <a:endParaRPr lang="ru-RU" sz="1600" dirty="0" smtClean="0">
+              <a:solidFill>
+                <a:prstClr val="black"/>
+              </a:solidFill>
+              <a:latin typeface="Consolas"/>
+            </a:endParaRPr>
+          </a:p>
+          <a:p>
+            <a:r>
+              <a:rPr lang="ru-RU" sz="1600" dirty="0">
+                <a:solidFill>
+                  <a:prstClr val="black"/>
+                </a:solidFill>
+                <a:latin typeface="Consolas"/>
+              </a:rPr>
+              <a:t> </a:t>
+            </a:r>
+            <a:r>
+              <a:rPr lang="ru-RU" sz="1600" dirty="0" smtClean="0">
+                <a:solidFill>
+                  <a:prstClr val="black"/>
+                </a:solidFill>
+                <a:latin typeface="Consolas"/>
+              </a:rPr>
+              <a:t>       </a:t>
+            </a:r>
+            <a:r>
+              <a:rPr lang="en-US" sz="1600" dirty="0" smtClean="0">
+                <a:solidFill>
+                  <a:srgbClr val="A31515"/>
+                </a:solidFill>
+                <a:latin typeface="Consolas"/>
+              </a:rPr>
+              <a:t>"</a:t>
+            </a:r>
+            <a:r>
+              <a:rPr lang="en-US" sz="1600" dirty="0">
+                <a:solidFill>
+                  <a:srgbClr val="A31515"/>
+                </a:solidFill>
+                <a:latin typeface="Consolas"/>
+              </a:rPr>
+              <a:t>explorer.exe"</a:t>
+            </a:r>
+            <a:r>
+              <a:rPr lang="en-US" sz="1600" dirty="0">
+                <a:solidFill>
+                  <a:prstClr val="black"/>
+                </a:solidFill>
+                <a:latin typeface="Consolas"/>
+              </a:rPr>
+              <a:t>, </a:t>
+            </a:r>
+            <a:r>
+              <a:rPr lang="en-US" sz="1600" dirty="0">
+                <a:solidFill>
+                  <a:srgbClr val="A31515"/>
+                </a:solidFill>
+                <a:latin typeface="Consolas"/>
+              </a:rPr>
+              <a:t>"notepad.exe"</a:t>
+            </a:r>
+            <a:r>
+              <a:rPr lang="en-US" sz="1600" dirty="0">
+                <a:solidFill>
+                  <a:prstClr val="black"/>
+                </a:solidFill>
+                <a:latin typeface="Consolas"/>
+              </a:rPr>
+              <a:t>, </a:t>
+            </a:r>
+            <a:r>
+              <a:rPr lang="en-US" sz="1600" dirty="0">
+                <a:solidFill>
+                  <a:srgbClr val="A31515"/>
+                </a:solidFill>
+                <a:latin typeface="Consolas"/>
+              </a:rPr>
+              <a:t>"hh.exe"</a:t>
+            </a:r>
+            <a:r>
+              <a:rPr lang="en-US" sz="1600" dirty="0">
+                <a:solidFill>
+                  <a:prstClr val="black"/>
+                </a:solidFill>
+                <a:latin typeface="Consolas"/>
+              </a:rPr>
+              <a:t>, </a:t>
+            </a:r>
+            <a:r>
+              <a:rPr lang="en-US" sz="1600" dirty="0">
+                <a:solidFill>
+                  <a:srgbClr val="A31515"/>
+                </a:solidFill>
+                <a:latin typeface="Consolas"/>
+              </a:rPr>
+              <a:t>"sysmon.exe"</a:t>
+            </a:r>
+            <a:r>
+              <a:rPr lang="en-US" sz="1600" dirty="0">
+                <a:solidFill>
+                  <a:prstClr val="black"/>
+                </a:solidFill>
+                <a:latin typeface="Consolas"/>
+              </a:rPr>
+              <a:t> </a:t>
+            </a:r>
+            <a:r>
+              <a:rPr lang="en-US" sz="1600" dirty="0" smtClean="0">
+                <a:solidFill>
+                  <a:prstClr val="black"/>
+                </a:solidFill>
+                <a:latin typeface="Consolas"/>
+              </a:rPr>
+              <a:t>};</a:t>
+            </a:r>
+            <a:endParaRPr lang="ru-RU" sz="1600" dirty="0" smtClean="0">
+              <a:solidFill>
+                <a:prstClr val="black"/>
+              </a:solidFill>
+              <a:latin typeface="Consolas"/>
+            </a:endParaRPr>
+          </a:p>
+          <a:p>
+            <a:r>
+              <a:rPr lang="ru-RU" sz="1600" dirty="0">
+                <a:solidFill>
+                  <a:srgbClr val="008000"/>
+                </a:solidFill>
+                <a:latin typeface="Consolas"/>
+              </a:rPr>
+              <a:t>// Сортируем коллекцию по убыванию</a:t>
+            </a:r>
+          </a:p>
+          <a:p>
+            <a:r>
+              <a:rPr lang="en-US" sz="1600" dirty="0" err="1" smtClean="0">
+                <a:solidFill>
+                  <a:prstClr val="black"/>
+                </a:solidFill>
+                <a:latin typeface="Consolas"/>
+              </a:rPr>
+              <a:t>files.Sort</a:t>
+            </a:r>
+            <a:r>
+              <a:rPr lang="en-US" sz="1600" dirty="0">
+                <a:solidFill>
+                  <a:prstClr val="black"/>
+                </a:solidFill>
+                <a:latin typeface="Consolas"/>
+              </a:rPr>
+              <a:t>((x, y) =&gt; </a:t>
+            </a:r>
+            <a:r>
+              <a:rPr lang="en-US" sz="1600" dirty="0" err="1">
+                <a:solidFill>
+                  <a:prstClr val="black"/>
+                </a:solidFill>
+                <a:latin typeface="Consolas"/>
+              </a:rPr>
+              <a:t>y.CompareTo</a:t>
+            </a:r>
+            <a:r>
+              <a:rPr lang="en-US" sz="1600" dirty="0">
+                <a:solidFill>
+                  <a:prstClr val="black"/>
+                </a:solidFill>
+                <a:latin typeface="Consolas"/>
+              </a:rPr>
+              <a:t>(x</a:t>
+            </a:r>
+            <a:r>
+              <a:rPr lang="en-US" sz="1600" dirty="0" smtClean="0">
+                <a:solidFill>
+                  <a:prstClr val="black"/>
+                </a:solidFill>
+                <a:latin typeface="Consolas"/>
+              </a:rPr>
+              <a:t>));</a:t>
+            </a:r>
+            <a:endParaRPr lang="ru-RU" sz="1600" dirty="0">
+              <a:solidFill>
+                <a:prstClr val="black"/>
+              </a:solidFill>
+              <a:latin typeface="Consolas"/>
+            </a:endParaRPr>
           </a:p>
         </p:txBody>
       </p:sp>
@@ -7734,34 +8088,16 @@
           <a:lstStyle/>
           <a:p>
             <a:r>
-              <a:rPr lang="en-US" sz="1400" dirty="0">
+              <a:rPr lang="en-US" sz="1400" dirty="0" smtClean="0">
                 <a:solidFill>
                   <a:srgbClr val="0000FF"/>
                 </a:solidFill>
                 <a:latin typeface="Consolas"/>
               </a:rPr>
-              <a:t>private</a:t>
-            </a:r>
-            <a:r>
-              <a:rPr lang="en-US" sz="1400" dirty="0">
-                <a:solidFill>
-                  <a:prstClr val="black"/>
-                </a:solidFill>
-                <a:latin typeface="Consolas"/>
-              </a:rPr>
-              <a:t> </a:t>
-            </a:r>
-            <a:r>
-              <a:rPr lang="en-US" sz="1400" dirty="0">
-                <a:solidFill>
-                  <a:srgbClr val="0000FF"/>
-                </a:solidFill>
-                <a:latin typeface="Consolas"/>
-              </a:rPr>
               <a:t>class</a:t>
             </a:r>
             <a:r>
-              <a:rPr lang="en-US" sz="1400" dirty="0">
+              <a:rPr lang="en-US" sz="1400" dirty="0" smtClean="0">
                 <a:solidFill>
                   <a:prstClr val="black"/>
                 </a:solidFill>
@@ -9499,9 +9835,70 @@
           <a:lstStyle/>
           <a:p>
             <a:r>
+              <a:rPr lang="ru-RU" dirty="0" smtClean="0"/>
+              <a:t>Книги</a:t>
+            </a:r>
+          </a:p>
+          <a:p>
+            <a:pPr lvl="1"/>
+            <a:r>
               <a:rPr lang="en-US" dirty="0" smtClean="0"/>
-              <a:t>LINQ in C# 2010</a:t>
-            </a:r>
+              <a:t>LINQ </a:t>
+            </a:r>
+            <a:r>
+              <a:rPr lang="en-US" dirty="0" smtClean="0"/>
+              <a:t>in C# </a:t>
+            </a:r>
+            <a:r>
+              <a:rPr lang="en-US" dirty="0" smtClean="0"/>
+              <a:t>2010</a:t>
+            </a:r>
+            <a:endParaRPr lang="ru-RU" dirty="0" smtClean="0"/>
+          </a:p>
+          <a:p>
+            <a:pPr lvl="1"/>
+            <a:r>
+              <a:rPr lang="en-US" dirty="0"/>
+              <a:t>LINQ in Action</a:t>
+            </a:r>
+            <a:endParaRPr lang="en-US" dirty="0" smtClean="0"/>
+          </a:p>
+          <a:p>
+            <a:endParaRPr lang="en-US" dirty="0" smtClean="0"/>
+          </a:p>
+          <a:p>
+            <a:r>
+              <a:rPr lang="en-US" dirty="0" smtClean="0"/>
+              <a:t>C#/.</a:t>
+            </a:r>
+            <a:r>
+              <a:rPr lang="en-US" dirty="0"/>
+              <a:t>NET Little Wonders</a:t>
+            </a:r>
+            <a:r>
+              <a:rPr lang="en-US" dirty="0" smtClean="0"/>
+              <a:t>:</a:t>
+            </a:r>
+            <a:r>
+              <a:rPr lang="en-US" dirty="0">
+                <a:hlinkClick r:id="rId2"/>
+              </a:rPr>
+              <a:t/>
+            </a:r>
+            <a:br>
+              <a:rPr lang="en-US" dirty="0">
+                <a:hlinkClick r:id="rId2"/>
+              </a:rPr>
+            </a:br>
+            <a:r>
+              <a:rPr lang="en-US" dirty="0">
+                <a:hlinkClick r:id="rId2"/>
+              </a:rPr>
+              <a:t>http://blackrabbitcoder.net/BlackRabbitCoder/Tags/LINQ/default.aspx</a:t>
+            </a:r>
+            <a:endParaRPr lang="en-US" dirty="0" smtClean="0"/>
+          </a:p>
+          <a:p>
             <a:endParaRPr lang="en-US" dirty="0"/>
           </a:p>
         </p:txBody>
@@ -20224,14 +20621,26 @@
               <a:buNone/>
             </a:pPr>
             <a:r>
-              <a:rPr lang="ru-RU" dirty="0" smtClean="0"/>
+              <a:rPr lang="ru-RU" dirty="0" smtClean="0">
+                <a:solidFill>
+                  <a:srgbClr val="FFFF00"/>
+                </a:solidFill>
+              </a:rPr>
               <a:t>См. также </a:t>
             </a:r>
             <a:r>
-              <a:rPr lang="en-US" smtClean="0"/>
+              <a:rPr lang="en-US" dirty="0" smtClean="0">
+                <a:solidFill>
+                  <a:srgbClr val="FFFF00"/>
+                </a:solidFill>
+              </a:rPr>
               <a:t>tools-linqpad.docx</a:t>
             </a:r>
-            <a:endParaRPr lang="en-US" dirty="0"/>
+            <a:endParaRPr lang="en-US" dirty="0">
+              <a:solidFill>
+                <a:srgbClr val="FFFF00"/>
+              </a:solidFill>
+            </a:endParaRPr>
           </a:p>
         </p:txBody>
       </p:sp>
@@ -20311,7 +20720,9 @@
         </p:nvSpPr>
         <p:spPr/>
         <p:txBody>
-          <a:bodyPr/>
+          <a:bodyPr>
+            <a:normAutofit/>
+          </a:bodyPr>
           <a:lstStyle/>
           <a:p>
             <a:r>
@@ -20320,8 +20731,13 @@
             </a:r>
             <a:r>
               <a:rPr lang="en-US" dirty="0" smtClean="0"/>
-              <a:t>Objects</a:t>
-            </a:r>
+              <a:t>Objects: </a:t>
+            </a:r>
+            <a:r>
+              <a:rPr lang="ru-RU" dirty="0" smtClean="0"/>
+              <a:t>работа данными в памяти</a:t>
+            </a:r>
+            <a:endParaRPr lang="en-US" dirty="0" smtClean="0"/>
           </a:p>
           <a:p>
             <a:r>
@@ -20332,8 +20748,42 @@
               <a:rPr lang="en-US" dirty="0" smtClean="0"/>
               <a:t>XML</a:t>
             </a:r>
-          </a:p>
-          <a:p>
+            <a:r>
+              <a:rPr lang="ru-RU" dirty="0" smtClean="0"/>
+              <a:t>: работа с </a:t>
+            </a:r>
+            <a:r>
+              <a:rPr lang="en-US" dirty="0" smtClean="0"/>
+              <a:t>XML</a:t>
+            </a:r>
+          </a:p>
+          <a:p>
+            <a:r>
+              <a:rPr lang="en-US" dirty="0"/>
+              <a:t>Parallel </a:t>
+            </a:r>
+            <a:r>
+              <a:rPr lang="en-US" dirty="0" smtClean="0"/>
+              <a:t>LINQ: </a:t>
+            </a:r>
+            <a:r>
+              <a:rPr lang="ru-RU" dirty="0" smtClean="0"/>
+              <a:t>многопоточные расширения</a:t>
+            </a:r>
+            <a:endParaRPr lang="en-US" dirty="0" smtClean="0"/>
+          </a:p>
+          <a:p>
+            <a:endParaRPr lang="ru-RU" dirty="0" smtClean="0"/>
+          </a:p>
+          <a:p>
+            <a:r>
+              <a:rPr lang="ru-RU" dirty="0" smtClean="0"/>
+              <a:t>Работа с БД:</a:t>
+            </a:r>
+            <a:endParaRPr lang="en-US" dirty="0" smtClean="0"/>
+          </a:p>
+          <a:p>
+            <a:pPr lvl="1"/>
             <a:r>
               <a:rPr lang="en-US" dirty="0"/>
               <a:t>LINQ to </a:t>
@@ -20345,6 +20795,7 @@
             <a:endParaRPr lang="en-US" dirty="0" smtClean="0"/>
           </a:p>
           <a:p>
+            <a:pPr lvl="1"/>
             <a:r>
               <a:rPr lang="en-US" dirty="0"/>
               <a:t>LINQ to </a:t>
@@ -20355,6 +20806,7 @@
             </a:r>
           </a:p>
           <a:p>
+            <a:pPr lvl="1"/>
             <a:r>
               <a:rPr lang="en-US" dirty="0"/>
               <a:t>LINQ to </a:t>
@@ -20365,10 +20817,6 @@
             </a:r>
           </a:p>
           <a:p>
-            <a:r>
-              <a:rPr lang="en-US" dirty="0"/>
-              <a:t>Parallel LINQ</a:t>
-            </a:r>
             <a:endParaRPr lang="ru-RU" dirty="0"/>
           </a:p>
         </p:txBody>

</xml_diff>

<commit_message>
Corrected mistakes on slide with list of Enumerable methods
</commit_message>
<xml_diff>
--- a/Presentation/lesson-11-linq.pptx
+++ b/Presentation/lesson-11-linq.pptx
@@ -233,7 +233,7 @@
             <a:fld id="{B24A7054-7FFB-49F4-A126-5DF6E687FF53}" type="datetimeFigureOut">
               <a:rPr lang="ru-RU" smtClean="0"/>
               <a:pPr/>
-              <a:t>05.01.2016</a:t>
+              <a:t>16.02.2016</a:t>
             </a:fld>
             <a:endParaRPr lang="ru-RU"/>
           </a:p>
@@ -1517,7 +1517,7 @@
             <a:fld id="{8E6E6A2A-E9D3-4A0D-B04A-ABDD367A1E08}" type="datetimeFigureOut">
               <a:rPr lang="ru-RU" smtClean="0"/>
               <a:pPr/>
-              <a:t>05.01.2016</a:t>
+              <a:t>16.02.2016</a:t>
             </a:fld>
             <a:endParaRPr lang="ru-RU"/>
           </a:p>
@@ -2964,7 +2964,7 @@
             <a:fld id="{AC3D3127-B7C4-45E3-9797-C527EC9FDD78}" type="datetimeFigureOut">
               <a:rPr lang="ru-RU" smtClean="0"/>
               <a:pPr/>
-              <a:t>05.01.2016</a:t>
+              <a:t>16.02.2016</a:t>
             </a:fld>
             <a:endParaRPr lang="ru-RU"/>
           </a:p>
@@ -12499,7 +12499,6 @@
               <a:rPr lang="ru-RU" dirty="0" smtClean="0"/>
               <a:t>.</a:t>
             </a:r>
-            <a:endParaRPr lang="ru-RU" dirty="0" smtClean="0"/>
           </a:p>
           <a:p>
             <a:pPr marL="0" indent="0">
@@ -12589,14 +12588,14 @@
           <p:nvPr>
             <p:extLst>
               <p:ext uri="{D42A27DB-BD31-4B8C-83A1-F6EECF244321}">
-                <p14:modId xmlns:p14="http://schemas.microsoft.com/office/powerpoint/2010/main" val="1392240785"/>
+                <p14:modId xmlns:p14="http://schemas.microsoft.com/office/powerpoint/2010/main" val="842178779"/>
               </p:ext>
             </p:extLst>
           </p:nvPr>
         </p:nvGraphicFramePr>
         <p:xfrm>
           <a:off x="395536" y="886086"/>
-          <a:ext cx="8352928" cy="5798945"/>
+          <a:ext cx="8352928" cy="5459218"/>
         </p:xfrm>
         <a:graphic>
           <a:graphicData uri="http://schemas.openxmlformats.org/drawingml/2006/table">
@@ -12622,7 +12621,7 @@
                         </a:spcAft>
                       </a:pPr>
                       <a:r>
-                        <a:rPr lang="ru-RU" sz="2400" b="0" i="1" dirty="0" smtClean="0">
+                        <a:rPr lang="ru-RU" sz="2000" b="0" i="1" dirty="0" smtClean="0">
                           <a:effectLst/>
                           <a:latin typeface="Calibri"/>
                           <a:ea typeface="Calibri"/>
@@ -12631,7 +12630,7 @@
                         <a:t>Обычные</a:t>
                       </a:r>
                       <a:r>
-                        <a:rPr lang="ru-RU" sz="2400" b="0" i="1" baseline="0" dirty="0" smtClean="0">
+                        <a:rPr lang="ru-RU" sz="2000" b="0" i="1" baseline="0" dirty="0" smtClean="0">
                           <a:effectLst/>
                           <a:latin typeface="Calibri"/>
                           <a:ea typeface="Calibri"/>
@@ -12639,7 +12638,7 @@
                         </a:rPr>
                         <a:t> методы</a:t>
                       </a:r>
-                      <a:endParaRPr lang="en-US" sz="2400" b="0" i="1" dirty="0">
+                      <a:endParaRPr lang="en-US" sz="2000" b="0" i="1" dirty="0">
                         <a:effectLst/>
                         <a:latin typeface="Calibri"/>
                         <a:ea typeface="Calibri"/>
@@ -12705,15 +12704,51 @@
                         </a:spcAft>
                       </a:pPr>
                       <a:r>
-                        <a:rPr lang="en-US" sz="1800" b="0" i="0" dirty="0" smtClean="0">
+                        <a:rPr lang="en-US" sz="1600" b="0" i="0" dirty="0" smtClean="0">
                           <a:effectLst/>
                           <a:latin typeface="+mn-lt"/>
                           <a:ea typeface="Calibri"/>
                           <a:cs typeface="Times New Roman"/>
                         </a:rPr>
-                        <a:t>Range, Repeat, Empty</a:t>
-                      </a:r>
-                      <a:endParaRPr lang="en-US" sz="1800" b="0" i="0" dirty="0">
+                        <a:t>Empty,</a:t>
+                      </a:r>
+                      <a:r>
+                        <a:rPr lang="en-US" sz="1600" b="0" i="0" baseline="0" dirty="0" smtClean="0">
+                          <a:effectLst/>
+                          <a:latin typeface="+mn-lt"/>
+                          <a:ea typeface="Calibri"/>
+                          <a:cs typeface="Times New Roman"/>
+                        </a:rPr>
+                        <a:t> </a:t>
+                      </a:r>
+                      <a:r>
+                        <a:rPr lang="en-US" sz="1600" b="0" i="0" dirty="0" smtClean="0">
+                          <a:effectLst/>
+                          <a:latin typeface="+mn-lt"/>
+                          <a:ea typeface="Calibri"/>
+                          <a:cs typeface="Times New Roman"/>
+                        </a:rPr>
+                        <a:t>Range</a:t>
+                      </a:r>
+                      <a:r>
+                        <a:rPr lang="en-US" sz="1600" b="0" i="0" dirty="0" smtClean="0">
+                          <a:effectLst/>
+                          <a:latin typeface="+mn-lt"/>
+                          <a:ea typeface="Calibri"/>
+                          <a:cs typeface="Times New Roman"/>
+                        </a:rPr>
+                        <a:t>, </a:t>
+                      </a:r>
+                      <a:r>
+                        <a:rPr lang="en-US" sz="1600" b="0" i="0" dirty="0" smtClean="0">
+                          <a:effectLst/>
+                          <a:latin typeface="+mn-lt"/>
+                          <a:ea typeface="Calibri"/>
+                          <a:cs typeface="Times New Roman"/>
+                        </a:rPr>
+                        <a:t>Repeat</a:t>
+                      </a:r>
+                      <a:endParaRPr lang="en-US" sz="1600" b="0" i="0" dirty="0">
                         <a:effectLst/>
                         <a:latin typeface="Calibri"/>
                         <a:ea typeface="Calibri"/>
@@ -12842,7 +12877,7 @@
                         </a:spcAft>
                       </a:pPr>
                       <a:r>
-                        <a:rPr lang="ru-RU" sz="2400" b="0" i="1" dirty="0" smtClean="0">
+                        <a:rPr lang="ru-RU" sz="2000" b="0" i="1" dirty="0" smtClean="0">
                           <a:effectLst/>
                           <a:latin typeface="Calibri"/>
                           <a:ea typeface="Calibri"/>
@@ -12851,7 +12886,7 @@
                         <a:t>Расширяющие </a:t>
                       </a:r>
                       <a:r>
-                        <a:rPr lang="en-US" sz="2400" b="0" i="1" dirty="0" err="1" smtClean="0">
+                        <a:rPr lang="en-US" sz="2000" b="0" i="1" dirty="0" err="1" smtClean="0">
                           <a:effectLst/>
                           <a:latin typeface="Calibri"/>
                           <a:ea typeface="Calibri"/>
@@ -12859,7 +12894,7 @@
                         </a:rPr>
                         <a:t>IEnumerable</a:t>
                       </a:r>
-                      <a:endParaRPr lang="en-US" sz="2400" b="0" i="1" dirty="0">
+                      <a:endParaRPr lang="en-US" sz="2000" b="0" i="1" dirty="0">
                         <a:effectLst/>
                         <a:latin typeface="Calibri"/>
                         <a:ea typeface="Calibri"/>
@@ -12925,7 +12960,7 @@
                         </a:spcAft>
                       </a:pPr>
                       <a:r>
-                        <a:rPr lang="en-US" sz="1800" b="0" dirty="0" smtClean="0">
+                        <a:rPr lang="en-US" sz="1600" b="0" dirty="0" smtClean="0">
                           <a:effectLst/>
                           <a:latin typeface="Calibri"/>
                           <a:ea typeface="Calibri"/>
@@ -12934,7 +12969,7 @@
                         <a:t>Cast,</a:t>
                       </a:r>
                       <a:r>
-                        <a:rPr lang="en-US" sz="1800" b="0" baseline="0" dirty="0" smtClean="0">
+                        <a:rPr lang="en-US" sz="1600" b="0" baseline="0" dirty="0" smtClean="0">
                           <a:effectLst/>
                           <a:latin typeface="Calibri"/>
                           <a:ea typeface="Calibri"/>
@@ -12943,7 +12978,7 @@
                         <a:t> </a:t>
                       </a:r>
                       <a:r>
-                        <a:rPr lang="en-US" sz="1800" b="0" baseline="0" dirty="0" err="1" smtClean="0">
+                        <a:rPr lang="en-US" sz="1600" b="0" baseline="0" dirty="0" err="1" smtClean="0">
                           <a:effectLst/>
                           <a:latin typeface="Calibri"/>
                           <a:ea typeface="Calibri"/>
@@ -12951,7 +12986,7 @@
                         </a:rPr>
                         <a:t>OfType</a:t>
                       </a:r>
-                      <a:endParaRPr lang="en-US" sz="1800" b="0" dirty="0">
+                      <a:endParaRPr lang="en-US" sz="1600" b="0" dirty="0">
                         <a:effectLst/>
                         <a:latin typeface="Calibri"/>
                         <a:ea typeface="Calibri"/>
@@ -13098,7 +13133,7 @@
                         <a:defRPr/>
                       </a:pPr>
                       <a:r>
-                        <a:rPr lang="ru-RU" sz="2400" b="0" i="1" dirty="0" smtClean="0">
+                        <a:rPr lang="ru-RU" sz="2000" b="0" i="1" dirty="0" smtClean="0">
                           <a:effectLst/>
                           <a:latin typeface="+mn-lt"/>
                           <a:ea typeface="Calibri"/>
@@ -13107,7 +13142,7 @@
                         <a:t>Расширяющие </a:t>
                       </a:r>
                       <a:r>
-                        <a:rPr lang="en-US" sz="2400" b="0" i="1" dirty="0" err="1" smtClean="0">
+                        <a:rPr lang="en-US" sz="2000" b="0" i="1" dirty="0" err="1" smtClean="0">
                           <a:effectLst/>
                           <a:latin typeface="+mn-lt"/>
                           <a:ea typeface="Calibri"/>
@@ -13116,7 +13151,7 @@
                         <a:t>IEnumerable</a:t>
                       </a:r>
                       <a:r>
-                        <a:rPr lang="en-US" sz="2400" b="0" i="1" dirty="0" smtClean="0">
+                        <a:rPr lang="en-US" sz="2000" b="0" i="1" dirty="0" smtClean="0">
                           <a:effectLst/>
                           <a:latin typeface="+mn-lt"/>
                           <a:ea typeface="Calibri"/>
@@ -13125,7 +13160,52 @@
                         <a:t>&lt;</a:t>
                       </a:r>
                       <a:r>
-                        <a:rPr lang="en-US" sz="2400" b="0" i="1" dirty="0" err="1" smtClean="0">
+                        <a:rPr lang="ru-RU" sz="2000" b="0" i="1" dirty="0" smtClean="0">
+                          <a:effectLst/>
+                          <a:latin typeface="+mn-lt"/>
+                          <a:ea typeface="Calibri"/>
+                          <a:cs typeface="Times New Roman"/>
+                        </a:rPr>
+                        <a:t>Числовой_Тип</a:t>
+                      </a:r>
+                      <a:r>
+                        <a:rPr lang="en-US" sz="2000" b="0" i="1" dirty="0" smtClean="0">
+                          <a:effectLst/>
+                          <a:latin typeface="+mn-lt"/>
+                          <a:ea typeface="Calibri"/>
+                          <a:cs typeface="Times New Roman"/>
+                        </a:rPr>
+                        <a:t>&gt;</a:t>
+                      </a:r>
+                      <a:r>
+                        <a:rPr lang="ru-RU" sz="2000" b="0" i="1" dirty="0" smtClean="0">
+                          <a:effectLst/>
+                          <a:latin typeface="+mn-lt"/>
+                          <a:ea typeface="Calibri"/>
+                          <a:cs typeface="Times New Roman"/>
+                        </a:rPr>
+                        <a:t>  </a:t>
+                      </a:r>
+                      <a:r>
+                        <a:rPr lang="ru-RU" sz="1400" b="0" i="1" dirty="0" smtClean="0">
+                          <a:effectLst/>
+                          <a:latin typeface="+mn-lt"/>
+                          <a:ea typeface="Calibri"/>
+                          <a:cs typeface="Times New Roman"/>
+                        </a:rPr>
+                        <a:t>(</a:t>
+                      </a:r>
+                      <a:r>
+                        <a:rPr lang="en-US" sz="1400" b="0" i="1" dirty="0" smtClean="0">
+                          <a:effectLst/>
+                          <a:latin typeface="+mn-lt"/>
+                          <a:ea typeface="Calibri"/>
+                          <a:cs typeface="Times New Roman"/>
+                        </a:rPr>
+                        <a:t>decimal?, decimal, double?, double, float?, float, </a:t>
+                      </a:r>
+                      <a:r>
+                        <a:rPr lang="en-US" sz="1400" b="0" i="1" dirty="0" err="1" smtClean="0">
                           <a:effectLst/>
                           <a:latin typeface="+mn-lt"/>
                           <a:ea typeface="Calibri"/>
@@ -13134,15 +13214,42 @@
                         <a:t>int</a:t>
                       </a:r>
                       <a:r>
-                        <a:rPr lang="en-US" sz="2400" b="0" i="1" dirty="0" smtClean="0">
+                        <a:rPr lang="en-US" sz="1400" b="0" i="1" dirty="0" smtClean="0">
                           <a:effectLst/>
                           <a:latin typeface="+mn-lt"/>
                           <a:ea typeface="Calibri"/>
                           <a:cs typeface="Times New Roman"/>
                         </a:rPr>
-                        <a:t>&gt;</a:t>
-                      </a:r>
-                      <a:endParaRPr lang="en-US" sz="2400" b="0" i="1" dirty="0">
+                        <a:t>?, </a:t>
+                      </a:r>
+                      <a:r>
+                        <a:rPr lang="en-US" sz="1400" b="0" i="1" dirty="0" err="1" smtClean="0">
+                          <a:effectLst/>
+                          <a:latin typeface="+mn-lt"/>
+                          <a:ea typeface="Calibri"/>
+                          <a:cs typeface="Times New Roman"/>
+                        </a:rPr>
+                        <a:t>int</a:t>
+                      </a:r>
+                      <a:r>
+                        <a:rPr lang="en-US" sz="1400" b="0" i="1" dirty="0" smtClean="0">
+                          <a:effectLst/>
+                          <a:latin typeface="+mn-lt"/>
+                          <a:ea typeface="Calibri"/>
+                          <a:cs typeface="Times New Roman"/>
+                        </a:rPr>
+                        <a:t>, long?, long</a:t>
+                      </a:r>
+                      <a:r>
+                        <a:rPr lang="ru-RU" sz="2000" b="0" i="1" dirty="0" smtClean="0">
+                          <a:effectLst/>
+                          <a:latin typeface="+mn-lt"/>
+                          <a:ea typeface="Calibri"/>
+                          <a:cs typeface="Times New Roman"/>
+                        </a:rPr>
+                        <a:t>)</a:t>
+                      </a:r>
+                      <a:endParaRPr lang="en-US" sz="2000" b="0" i="1" dirty="0">
                         <a:effectLst/>
                         <a:latin typeface="Calibri"/>
                         <a:ea typeface="Calibri"/>
@@ -13208,7 +13315,7 @@
                         </a:spcAft>
                       </a:pPr>
                       <a:r>
-                        <a:rPr lang="en-US" sz="1800" b="0" dirty="0" smtClean="0">
+                        <a:rPr lang="en-US" sz="1600" b="0" dirty="0" smtClean="0">
                           <a:effectLst/>
                           <a:latin typeface="+mn-lt"/>
                           <a:ea typeface="Calibri"/>
@@ -13216,7 +13323,7 @@
                         </a:rPr>
                         <a:t>Average, Max, Min, Sum</a:t>
                       </a:r>
-                      <a:endParaRPr lang="en-US" sz="1800" b="0" dirty="0">
+                      <a:endParaRPr lang="en-US" sz="1600" b="0" dirty="0">
                         <a:effectLst/>
                         <a:latin typeface="Calibri"/>
                         <a:ea typeface="Calibri"/>
@@ -13345,7 +13452,7 @@
                         </a:spcAft>
                       </a:pPr>
                       <a:r>
-                        <a:rPr lang="ru-RU" sz="2400" b="0" i="1" dirty="0" smtClean="0">
+                        <a:rPr lang="ru-RU" sz="2000" b="0" i="1" dirty="0" smtClean="0">
                           <a:effectLst/>
                           <a:latin typeface="Calibri"/>
                           <a:ea typeface="Calibri"/>
@@ -13354,7 +13461,7 @@
                         <a:t>Расширяющие</a:t>
                       </a:r>
                       <a:r>
-                        <a:rPr lang="ru-RU" sz="2400" b="0" i="1" baseline="0" dirty="0" smtClean="0">
+                        <a:rPr lang="ru-RU" sz="2000" b="0" i="1" baseline="0" dirty="0" smtClean="0">
                           <a:effectLst/>
                           <a:latin typeface="Calibri"/>
                           <a:ea typeface="Calibri"/>
@@ -13363,7 +13470,7 @@
                         <a:t> </a:t>
                       </a:r>
                       <a:r>
-                        <a:rPr lang="en-US" sz="2400" b="0" i="1" baseline="0" dirty="0" err="1" smtClean="0">
+                        <a:rPr lang="en-US" sz="2000" b="0" i="1" baseline="0" dirty="0" err="1" smtClean="0">
                           <a:effectLst/>
                           <a:latin typeface="Calibri"/>
                           <a:ea typeface="Calibri"/>
@@ -13372,7 +13479,7 @@
                         <a:t>IEnumerable</a:t>
                       </a:r>
                       <a:r>
-                        <a:rPr lang="en-US" sz="2400" b="0" i="1" baseline="0" dirty="0" smtClean="0">
+                        <a:rPr lang="en-US" sz="2000" b="0" i="1" baseline="0" dirty="0" smtClean="0">
                           <a:effectLst/>
                           <a:latin typeface="Calibri"/>
                           <a:ea typeface="Calibri"/>
@@ -13380,7 +13487,7 @@
                         </a:rPr>
                         <a:t>&lt;T&gt;</a:t>
                       </a:r>
-                      <a:endParaRPr lang="en-US" sz="2400" b="0" i="1" dirty="0">
+                      <a:endParaRPr lang="en-US" sz="2000" b="0" i="1" dirty="0">
                         <a:effectLst/>
                         <a:latin typeface="Calibri"/>
                         <a:ea typeface="Calibri"/>
@@ -13446,7 +13553,7 @@
                         </a:spcAft>
                       </a:pPr>
                       <a:r>
-                        <a:rPr lang="en-US" sz="1800" b="0" dirty="0" smtClean="0">
+                        <a:rPr lang="en-US" sz="1600" b="0" dirty="0" smtClean="0">
                           <a:effectLst/>
                           <a:latin typeface="+mn-lt"/>
                           <a:ea typeface="Calibri"/>
@@ -13455,7 +13562,7 @@
                         <a:t>Aggregate, All, Any, </a:t>
                       </a:r>
                       <a:r>
-                        <a:rPr lang="en-US" sz="1800" b="0" dirty="0" err="1" smtClean="0">
+                        <a:rPr lang="en-US" sz="1600" b="0" dirty="0" err="1" smtClean="0">
                           <a:effectLst/>
                           <a:latin typeface="+mn-lt"/>
                           <a:ea typeface="Calibri"/>
@@ -13464,7 +13571,61 @@
                         <a:t>AsEnumerable</a:t>
                       </a:r>
                       <a:r>
-                        <a:rPr lang="en-US" sz="1800" b="0" dirty="0" smtClean="0">
+                        <a:rPr lang="en-US" sz="1600" b="0" dirty="0" smtClean="0">
+                          <a:effectLst/>
+                          <a:latin typeface="+mn-lt"/>
+                          <a:ea typeface="Calibri"/>
+                          <a:cs typeface="Times New Roman"/>
+                        </a:rPr>
+                        <a:t>, Average, </a:t>
+                      </a:r>
+                      <a:r>
+                        <a:rPr lang="en-US" sz="1600" b="0" dirty="0" err="1" smtClean="0">
+                          <a:effectLst/>
+                          <a:latin typeface="+mn-lt"/>
+                          <a:ea typeface="Calibri"/>
+                          <a:cs typeface="Times New Roman"/>
+                        </a:rPr>
+                        <a:t>Concat</a:t>
+                      </a:r>
+                      <a:r>
+                        <a:rPr lang="en-US" sz="1600" b="0" dirty="0" smtClean="0">
+                          <a:effectLst/>
+                          <a:latin typeface="+mn-lt"/>
+                          <a:ea typeface="Calibri"/>
+                          <a:cs typeface="Times New Roman"/>
+                        </a:rPr>
+                        <a:t>, Contains, Count, </a:t>
+                      </a:r>
+                      <a:r>
+                        <a:rPr lang="en-US" sz="1600" b="0" dirty="0" err="1" smtClean="0">
+                          <a:effectLst/>
+                          <a:latin typeface="+mn-lt"/>
+                          <a:ea typeface="Calibri"/>
+                          <a:cs typeface="Times New Roman"/>
+                        </a:rPr>
+                        <a:t>DefaultIfEmpty</a:t>
+                      </a:r>
+                      <a:r>
+                        <a:rPr lang="en-US" sz="1600" b="0" dirty="0" smtClean="0">
+                          <a:effectLst/>
+                          <a:latin typeface="+mn-lt"/>
+                          <a:ea typeface="Calibri"/>
+                          <a:cs typeface="Times New Roman"/>
+                        </a:rPr>
+                        <a:t>, Distinct, </a:t>
+                      </a:r>
+                      <a:r>
+                        <a:rPr lang="en-US" sz="1600" b="0" dirty="0" err="1" smtClean="0">
+                          <a:effectLst/>
+                          <a:latin typeface="+mn-lt"/>
+                          <a:ea typeface="Calibri"/>
+                          <a:cs typeface="Times New Roman"/>
+                        </a:rPr>
+                        <a:t>ElementAt</a:t>
+                      </a:r>
+                      <a:r>
+                        <a:rPr lang="en-US" sz="1600" b="0" dirty="0" smtClean="0">
                           <a:effectLst/>
                           <a:latin typeface="+mn-lt"/>
                           <a:ea typeface="Calibri"/>
@@ -13473,52 +13634,34 @@
                         <a:t>, </a:t>
                       </a:r>
                       <a:r>
-                        <a:rPr lang="en-US" sz="1800" b="0" dirty="0" err="1" smtClean="0">
+                        <a:rPr lang="en-US" sz="1600" b="0" dirty="0" err="1" smtClean="0">
                           <a:effectLst/>
                           <a:latin typeface="+mn-lt"/>
                           <a:ea typeface="Calibri"/>
                           <a:cs typeface="Times New Roman"/>
                         </a:rPr>
-                        <a:t>Concat</a:t>
-                      </a:r>
-                      <a:r>
-                        <a:rPr lang="en-US" sz="1800" b="0" dirty="0" smtClean="0">
+                        <a:t>ElementAtOrDefault</a:t>
+                      </a:r>
+                      <a:r>
+                        <a:rPr lang="en-US" sz="1600" b="0" dirty="0" smtClean="0">
                           <a:effectLst/>
                           <a:latin typeface="+mn-lt"/>
                           <a:ea typeface="Calibri"/>
                           <a:cs typeface="Times New Roman"/>
                         </a:rPr>
-                        <a:t>, Contains, Count, </a:t>
-                      </a:r>
-                      <a:r>
-                        <a:rPr lang="en-US" sz="1800" b="0" dirty="0" err="1" smtClean="0">
+                        <a:t>, Except, First, </a:t>
+                      </a:r>
+                      <a:r>
+                        <a:rPr lang="en-US" sz="1600" b="0" dirty="0" err="1" smtClean="0">
                           <a:effectLst/>
                           <a:latin typeface="+mn-lt"/>
                           <a:ea typeface="Calibri"/>
                           <a:cs typeface="Times New Roman"/>
                         </a:rPr>
-                        <a:t>DefaultIfEmpty</a:t>
-                      </a:r>
-                      <a:r>
-                        <a:rPr lang="en-US" sz="1800" b="0" dirty="0" smtClean="0">
-                          <a:effectLst/>
-                          <a:latin typeface="+mn-lt"/>
-                          <a:ea typeface="Calibri"/>
-                          <a:cs typeface="Times New Roman"/>
-                        </a:rPr>
-                        <a:t>, Distinct, </a:t>
-                      </a:r>
-                      <a:r>
-                        <a:rPr lang="en-US" sz="1800" b="0" dirty="0" err="1" smtClean="0">
-                          <a:effectLst/>
-                          <a:latin typeface="+mn-lt"/>
-                          <a:ea typeface="Calibri"/>
-                          <a:cs typeface="Times New Roman"/>
-                        </a:rPr>
-                        <a:t>ElementAt</a:t>
-                      </a:r>
-                      <a:r>
-                        <a:rPr lang="en-US" sz="1800" b="0" dirty="0" smtClean="0">
+                        <a:t>FirstOrDefault</a:t>
+                      </a:r>
+                      <a:r>
+                        <a:rPr lang="en-US" sz="1600" b="0" dirty="0" smtClean="0">
                           <a:effectLst/>
                           <a:latin typeface="+mn-lt"/>
                           <a:ea typeface="Calibri"/>
@@ -13527,34 +13670,16 @@
                         <a:t>, </a:t>
                       </a:r>
                       <a:r>
-                        <a:rPr lang="en-US" sz="1800" b="0" dirty="0" err="1" smtClean="0">
+                        <a:rPr lang="en-US" sz="1600" b="0" dirty="0" err="1" smtClean="0">
                           <a:effectLst/>
                           <a:latin typeface="+mn-lt"/>
                           <a:ea typeface="Calibri"/>
                           <a:cs typeface="Times New Roman"/>
                         </a:rPr>
-                        <a:t>ElementAtOrDefault</a:t>
-                      </a:r>
-                      <a:r>
-                        <a:rPr lang="en-US" sz="1800" b="0" dirty="0" smtClean="0">
-                          <a:effectLst/>
-                          <a:latin typeface="+mn-lt"/>
-                          <a:ea typeface="Calibri"/>
-                          <a:cs typeface="Times New Roman"/>
-                        </a:rPr>
-                        <a:t>, Except, First, </a:t>
-                      </a:r>
-                      <a:r>
-                        <a:rPr lang="en-US" sz="1800" b="0" dirty="0" err="1" smtClean="0">
-                          <a:effectLst/>
-                          <a:latin typeface="+mn-lt"/>
-                          <a:ea typeface="Calibri"/>
-                          <a:cs typeface="Times New Roman"/>
-                        </a:rPr>
-                        <a:t>FirstOrDefault</a:t>
-                      </a:r>
-                      <a:r>
-                        <a:rPr lang="en-US" sz="1800" b="0" dirty="0" smtClean="0">
+                        <a:t>GroupBy</a:t>
+                      </a:r>
+                      <a:r>
+                        <a:rPr lang="en-US" sz="1600" b="0" dirty="0" smtClean="0">
                           <a:effectLst/>
                           <a:latin typeface="+mn-lt"/>
                           <a:ea typeface="Calibri"/>
@@ -13563,16 +13688,34 @@
                         <a:t>, </a:t>
                       </a:r>
                       <a:r>
-                        <a:rPr lang="en-US" sz="1800" b="0" dirty="0" err="1" smtClean="0">
+                        <a:rPr lang="en-US" sz="1600" b="0" dirty="0" err="1" smtClean="0">
                           <a:effectLst/>
                           <a:latin typeface="+mn-lt"/>
                           <a:ea typeface="Calibri"/>
                           <a:cs typeface="Times New Roman"/>
                         </a:rPr>
-                        <a:t>GroupBy</a:t>
-                      </a:r>
-                      <a:r>
-                        <a:rPr lang="en-US" sz="1800" b="0" dirty="0" smtClean="0">
+                        <a:t>GroupJoin</a:t>
+                      </a:r>
+                      <a:r>
+                        <a:rPr lang="en-US" sz="1600" b="0" dirty="0" smtClean="0">
+                          <a:effectLst/>
+                          <a:latin typeface="+mn-lt"/>
+                          <a:ea typeface="Calibri"/>
+                          <a:cs typeface="Times New Roman"/>
+                        </a:rPr>
+                        <a:t>, Intersect, Join, Last, </a:t>
+                      </a:r>
+                      <a:r>
+                        <a:rPr lang="en-US" sz="1600" b="0" dirty="0" err="1" smtClean="0">
+                          <a:effectLst/>
+                          <a:latin typeface="+mn-lt"/>
+                          <a:ea typeface="Calibri"/>
+                          <a:cs typeface="Times New Roman"/>
+                        </a:rPr>
+                        <a:t>LastOrDefault</a:t>
+                      </a:r>
+                      <a:r>
+                        <a:rPr lang="en-US" sz="1600" b="0" dirty="0" smtClean="0">
                           <a:effectLst/>
                           <a:latin typeface="+mn-lt"/>
                           <a:ea typeface="Calibri"/>
@@ -13581,34 +13724,34 @@
                         <a:t>, </a:t>
                       </a:r>
                       <a:r>
-                        <a:rPr lang="en-US" sz="1800" b="0" dirty="0" err="1" smtClean="0">
+                        <a:rPr lang="en-US" sz="1600" b="0" dirty="0" err="1" smtClean="0">
                           <a:effectLst/>
                           <a:latin typeface="+mn-lt"/>
                           <a:ea typeface="Calibri"/>
                           <a:cs typeface="Times New Roman"/>
                         </a:rPr>
-                        <a:t>GroupJoin</a:t>
-                      </a:r>
-                      <a:r>
-                        <a:rPr lang="en-US" sz="1800" b="0" dirty="0" smtClean="0">
+                        <a:t>LongCount</a:t>
+                      </a:r>
+                      <a:r>
+                        <a:rPr lang="en-US" sz="1600" b="0" dirty="0" smtClean="0">
                           <a:effectLst/>
                           <a:latin typeface="+mn-lt"/>
                           <a:ea typeface="Calibri"/>
                           <a:cs typeface="Times New Roman"/>
                         </a:rPr>
-                        <a:t>, Intersect, Join, Last, </a:t>
-                      </a:r>
-                      <a:r>
-                        <a:rPr lang="en-US" sz="1800" b="0" dirty="0" err="1" smtClean="0">
+                        <a:t>, Max, Min, </a:t>
+                      </a:r>
+                      <a:r>
+                        <a:rPr lang="en-US" sz="1600" b="0" dirty="0" err="1" smtClean="0">
                           <a:effectLst/>
                           <a:latin typeface="+mn-lt"/>
                           <a:ea typeface="Calibri"/>
                           <a:cs typeface="Times New Roman"/>
                         </a:rPr>
-                        <a:t>LastOrDefault</a:t>
-                      </a:r>
-                      <a:r>
-                        <a:rPr lang="en-US" sz="1800" b="0" dirty="0" smtClean="0">
+                        <a:t>OrderBy</a:t>
+                      </a:r>
+                      <a:r>
+                        <a:rPr lang="en-US" sz="1600" b="0" dirty="0" smtClean="0">
                           <a:effectLst/>
                           <a:latin typeface="+mn-lt"/>
                           <a:ea typeface="Calibri"/>
@@ -13617,16 +13760,34 @@
                         <a:t>, </a:t>
                       </a:r>
                       <a:r>
-                        <a:rPr lang="en-US" sz="1800" b="0" dirty="0" err="1" smtClean="0">
+                        <a:rPr lang="en-US" sz="1600" b="0" dirty="0" err="1" smtClean="0">
                           <a:effectLst/>
                           <a:latin typeface="+mn-lt"/>
                           <a:ea typeface="Calibri"/>
                           <a:cs typeface="Times New Roman"/>
                         </a:rPr>
-                        <a:t>LongCount</a:t>
-                      </a:r>
-                      <a:r>
-                        <a:rPr lang="en-US" sz="1800" b="0" dirty="0" smtClean="0">
+                        <a:t>OrderByDescending</a:t>
+                      </a:r>
+                      <a:r>
+                        <a:rPr lang="en-US" sz="1600" b="0" dirty="0" smtClean="0">
+                          <a:effectLst/>
+                          <a:latin typeface="+mn-lt"/>
+                          <a:ea typeface="Calibri"/>
+                          <a:cs typeface="Times New Roman"/>
+                        </a:rPr>
+                        <a:t>, Reverse, Select, </a:t>
+                      </a:r>
+                      <a:r>
+                        <a:rPr lang="en-US" sz="1600" b="0" dirty="0" err="1" smtClean="0">
+                          <a:effectLst/>
+                          <a:latin typeface="+mn-lt"/>
+                          <a:ea typeface="Calibri"/>
+                          <a:cs typeface="Times New Roman"/>
+                        </a:rPr>
+                        <a:t>SelectMany</a:t>
+                      </a:r>
+                      <a:r>
+                        <a:rPr lang="en-US" sz="1600" b="0" dirty="0" smtClean="0">
                           <a:effectLst/>
                           <a:latin typeface="+mn-lt"/>
                           <a:ea typeface="Calibri"/>
@@ -13635,16 +13796,70 @@
                         <a:t>, </a:t>
                       </a:r>
                       <a:r>
-                        <a:rPr lang="en-US" sz="1800" b="0" dirty="0" err="1" smtClean="0">
+                        <a:rPr lang="en-US" sz="1600" b="0" dirty="0" err="1" smtClean="0">
                           <a:effectLst/>
                           <a:latin typeface="+mn-lt"/>
                           <a:ea typeface="Calibri"/>
                           <a:cs typeface="Times New Roman"/>
                         </a:rPr>
-                        <a:t>OrderBy</a:t>
-                      </a:r>
-                      <a:r>
-                        <a:rPr lang="en-US" sz="1800" b="0" dirty="0" smtClean="0">
+                        <a:t>SequenceEqual</a:t>
+                      </a:r>
+                      <a:r>
+                        <a:rPr lang="en-US" sz="1600" b="0" dirty="0" smtClean="0">
+                          <a:effectLst/>
+                          <a:latin typeface="+mn-lt"/>
+                          <a:ea typeface="Calibri"/>
+                          <a:cs typeface="Times New Roman"/>
+                        </a:rPr>
+                        <a:t>, Single, </a:t>
+                      </a:r>
+                      <a:r>
+                        <a:rPr lang="en-US" sz="1600" b="0" dirty="0" err="1" smtClean="0">
+                          <a:effectLst/>
+                          <a:latin typeface="+mn-lt"/>
+                          <a:ea typeface="Calibri"/>
+                          <a:cs typeface="Times New Roman"/>
+                        </a:rPr>
+                        <a:t>SingleOrDefault</a:t>
+                      </a:r>
+                      <a:r>
+                        <a:rPr lang="en-US" sz="1600" b="0" dirty="0" smtClean="0">
+                          <a:effectLst/>
+                          <a:latin typeface="+mn-lt"/>
+                          <a:ea typeface="Calibri"/>
+                          <a:cs typeface="Times New Roman"/>
+                        </a:rPr>
+                        <a:t>, Skip, </a:t>
+                      </a:r>
+                      <a:r>
+                        <a:rPr lang="en-US" sz="1600" b="0" dirty="0" err="1" smtClean="0">
+                          <a:effectLst/>
+                          <a:latin typeface="+mn-lt"/>
+                          <a:ea typeface="Calibri"/>
+                          <a:cs typeface="Times New Roman"/>
+                        </a:rPr>
+                        <a:t>SkipWhile</a:t>
+                      </a:r>
+                      <a:r>
+                        <a:rPr lang="en-US" sz="1600" b="0" dirty="0" smtClean="0">
+                          <a:effectLst/>
+                          <a:latin typeface="+mn-lt"/>
+                          <a:ea typeface="Calibri"/>
+                          <a:cs typeface="Times New Roman"/>
+                        </a:rPr>
+                        <a:t>, Sum, Take, </a:t>
+                      </a:r>
+                      <a:r>
+                        <a:rPr lang="en-US" sz="1600" b="0" dirty="0" err="1" smtClean="0">
+                          <a:effectLst/>
+                          <a:latin typeface="+mn-lt"/>
+                          <a:ea typeface="Calibri"/>
+                          <a:cs typeface="Times New Roman"/>
+                        </a:rPr>
+                        <a:t>TakeWhile</a:t>
+                      </a:r>
+                      <a:r>
+                        <a:rPr lang="en-US" sz="1600" b="0" dirty="0" smtClean="0">
                           <a:effectLst/>
                           <a:latin typeface="+mn-lt"/>
                           <a:ea typeface="Calibri"/>
@@ -13653,34 +13868,16 @@
                         <a:t>, </a:t>
                       </a:r>
                       <a:r>
-                        <a:rPr lang="en-US" sz="1800" b="0" dirty="0" err="1" smtClean="0">
+                        <a:rPr lang="en-US" sz="1600" b="0" dirty="0" err="1" smtClean="0">
                           <a:effectLst/>
                           <a:latin typeface="+mn-lt"/>
                           <a:ea typeface="Calibri"/>
                           <a:cs typeface="Times New Roman"/>
                         </a:rPr>
-                        <a:t>OrderByDescending</a:t>
-                      </a:r>
-                      <a:r>
-                        <a:rPr lang="en-US" sz="1800" b="0" dirty="0" smtClean="0">
-                          <a:effectLst/>
-                          <a:latin typeface="+mn-lt"/>
-                          <a:ea typeface="Calibri"/>
-                          <a:cs typeface="Times New Roman"/>
-                        </a:rPr>
-                        <a:t>, Reverse, Select, </a:t>
-                      </a:r>
-                      <a:r>
-                        <a:rPr lang="en-US" sz="1800" b="0" dirty="0" err="1" smtClean="0">
-                          <a:effectLst/>
-                          <a:latin typeface="+mn-lt"/>
-                          <a:ea typeface="Calibri"/>
-                          <a:cs typeface="Times New Roman"/>
-                        </a:rPr>
-                        <a:t>SelectMany</a:t>
-                      </a:r>
-                      <a:r>
-                        <a:rPr lang="en-US" sz="1800" b="0" dirty="0" smtClean="0">
+                        <a:t>ToArray</a:t>
+                      </a:r>
+                      <a:r>
+                        <a:rPr lang="en-US" sz="1600" b="0" dirty="0" smtClean="0">
                           <a:effectLst/>
                           <a:latin typeface="+mn-lt"/>
                           <a:ea typeface="Calibri"/>
@@ -13689,70 +13886,16 @@
                         <a:t>, </a:t>
                       </a:r>
                       <a:r>
-                        <a:rPr lang="en-US" sz="1800" b="0" dirty="0" err="1" smtClean="0">
+                        <a:rPr lang="en-US" sz="1600" b="0" dirty="0" err="1" smtClean="0">
                           <a:effectLst/>
                           <a:latin typeface="+mn-lt"/>
                           <a:ea typeface="Calibri"/>
                           <a:cs typeface="Times New Roman"/>
                         </a:rPr>
-                        <a:t>SequenceEqual</a:t>
-                      </a:r>
-                      <a:r>
-                        <a:rPr lang="en-US" sz="1800" b="0" dirty="0" smtClean="0">
-                          <a:effectLst/>
-                          <a:latin typeface="+mn-lt"/>
-                          <a:ea typeface="Calibri"/>
-                          <a:cs typeface="Times New Roman"/>
-                        </a:rPr>
-                        <a:t>, Single, </a:t>
-                      </a:r>
-                      <a:r>
-                        <a:rPr lang="en-US" sz="1800" b="0" dirty="0" err="1" smtClean="0">
-                          <a:effectLst/>
-                          <a:latin typeface="+mn-lt"/>
-                          <a:ea typeface="Calibri"/>
-                          <a:cs typeface="Times New Roman"/>
-                        </a:rPr>
-                        <a:t>SingleOrDefault</a:t>
-                      </a:r>
-                      <a:r>
-                        <a:rPr lang="en-US" sz="1800" b="0" dirty="0" smtClean="0">
-                          <a:effectLst/>
-                          <a:latin typeface="+mn-lt"/>
-                          <a:ea typeface="Calibri"/>
-                          <a:cs typeface="Times New Roman"/>
-                        </a:rPr>
-                        <a:t>, Skip, </a:t>
-                      </a:r>
-                      <a:r>
-                        <a:rPr lang="en-US" sz="1800" b="0" dirty="0" err="1" smtClean="0">
-                          <a:effectLst/>
-                          <a:latin typeface="+mn-lt"/>
-                          <a:ea typeface="Calibri"/>
-                          <a:cs typeface="Times New Roman"/>
-                        </a:rPr>
-                        <a:t>SkipWhile</a:t>
-                      </a:r>
-                      <a:r>
-                        <a:rPr lang="en-US" sz="1800" b="0" dirty="0" smtClean="0">
-                          <a:effectLst/>
-                          <a:latin typeface="+mn-lt"/>
-                          <a:ea typeface="Calibri"/>
-                          <a:cs typeface="Times New Roman"/>
-                        </a:rPr>
-                        <a:t>, Take, </a:t>
-                      </a:r>
-                      <a:r>
-                        <a:rPr lang="en-US" sz="1800" b="0" dirty="0" err="1" smtClean="0">
-                          <a:effectLst/>
-                          <a:latin typeface="+mn-lt"/>
-                          <a:ea typeface="Calibri"/>
-                          <a:cs typeface="Times New Roman"/>
-                        </a:rPr>
-                        <a:t>TakeWhile</a:t>
-                      </a:r>
-                      <a:r>
-                        <a:rPr lang="en-US" sz="1800" b="0" dirty="0" smtClean="0">
+                        <a:t>ToDictionary</a:t>
+                      </a:r>
+                      <a:r>
+                        <a:rPr lang="en-US" sz="1600" b="0" dirty="0" smtClean="0">
                           <a:effectLst/>
                           <a:latin typeface="+mn-lt"/>
                           <a:ea typeface="Calibri"/>
@@ -13761,16 +13904,16 @@
                         <a:t>, </a:t>
                       </a:r>
                       <a:r>
-                        <a:rPr lang="en-US" sz="1800" b="0" dirty="0" err="1" smtClean="0">
+                        <a:rPr lang="en-US" sz="1600" b="0" dirty="0" err="1" smtClean="0">
                           <a:effectLst/>
                           <a:latin typeface="+mn-lt"/>
                           <a:ea typeface="Calibri"/>
                           <a:cs typeface="Times New Roman"/>
                         </a:rPr>
-                        <a:t>ToArray</a:t>
-                      </a:r>
-                      <a:r>
-                        <a:rPr lang="en-US" sz="1800" b="0" dirty="0" smtClean="0">
+                        <a:t>ToList</a:t>
+                      </a:r>
+                      <a:r>
+                        <a:rPr lang="en-US" sz="1600" b="0" dirty="0" smtClean="0">
                           <a:effectLst/>
                           <a:latin typeface="+mn-lt"/>
                           <a:ea typeface="Calibri"/>
@@ -13779,43 +13922,7 @@
                         <a:t>, </a:t>
                       </a:r>
                       <a:r>
-                        <a:rPr lang="en-US" sz="1800" b="0" dirty="0" err="1" smtClean="0">
-                          <a:effectLst/>
-                          <a:latin typeface="+mn-lt"/>
-                          <a:ea typeface="Calibri"/>
-                          <a:cs typeface="Times New Roman"/>
-                        </a:rPr>
-                        <a:t>ToDictionary</a:t>
-                      </a:r>
-                      <a:r>
-                        <a:rPr lang="en-US" sz="1800" b="0" dirty="0" smtClean="0">
-                          <a:effectLst/>
-                          <a:latin typeface="+mn-lt"/>
-                          <a:ea typeface="Calibri"/>
-                          <a:cs typeface="Times New Roman"/>
-                        </a:rPr>
-                        <a:t>, </a:t>
-                      </a:r>
-                      <a:r>
-                        <a:rPr lang="en-US" sz="1800" b="0" dirty="0" err="1" smtClean="0">
-                          <a:effectLst/>
-                          <a:latin typeface="+mn-lt"/>
-                          <a:ea typeface="Calibri"/>
-                          <a:cs typeface="Times New Roman"/>
-                        </a:rPr>
-                        <a:t>ToList</a:t>
-                      </a:r>
-                      <a:r>
-                        <a:rPr lang="en-US" sz="1800" b="0" dirty="0" smtClean="0">
-                          <a:effectLst/>
-                          <a:latin typeface="+mn-lt"/>
-                          <a:ea typeface="Calibri"/>
-                          <a:cs typeface="Times New Roman"/>
-                        </a:rPr>
-                        <a:t>, </a:t>
-                      </a:r>
-                      <a:r>
-                        <a:rPr lang="en-US" sz="1800" b="0" dirty="0" err="1" smtClean="0">
+                        <a:rPr lang="en-US" sz="1600" b="0" dirty="0" err="1" smtClean="0">
                           <a:effectLst/>
                           <a:latin typeface="+mn-lt"/>
                           <a:ea typeface="Calibri"/>
@@ -13824,7 +13931,7 @@
                         <a:t>ToLookup</a:t>
                       </a:r>
                       <a:r>
-                        <a:rPr lang="en-US" sz="1800" b="0" dirty="0" smtClean="0">
+                        <a:rPr lang="en-US" sz="1600" b="0" dirty="0" smtClean="0">
                           <a:effectLst/>
                           <a:latin typeface="+mn-lt"/>
                           <a:ea typeface="Calibri"/>
@@ -13832,7 +13939,7 @@
                         </a:rPr>
                         <a:t>, Union, Where, Zip</a:t>
                       </a:r>
-                      <a:endParaRPr lang="en-US" sz="1800" b="0" dirty="0">
+                      <a:endParaRPr lang="en-US" sz="1600" b="0" dirty="0">
                         <a:effectLst/>
                         <a:latin typeface="Calibri"/>
                         <a:ea typeface="Calibri"/>
@@ -13979,7 +14086,7 @@
                         <a:defRPr/>
                       </a:pPr>
                       <a:r>
-                        <a:rPr lang="ru-RU" sz="2400" b="0" i="1" dirty="0" smtClean="0">
+                        <a:rPr lang="ru-RU" sz="2000" b="0" i="1" dirty="0" smtClean="0">
                           <a:effectLst/>
                           <a:latin typeface="+mn-lt"/>
                           <a:ea typeface="Calibri"/>
@@ -13988,7 +14095,7 @@
                         <a:t>Расширяющие</a:t>
                       </a:r>
                       <a:r>
-                        <a:rPr lang="ru-RU" sz="2400" b="0" i="1" baseline="0" dirty="0" smtClean="0">
+                        <a:rPr lang="ru-RU" sz="2000" b="0" i="1" baseline="0" dirty="0" smtClean="0">
                           <a:effectLst/>
                           <a:latin typeface="+mn-lt"/>
                           <a:ea typeface="Calibri"/>
@@ -13997,7 +14104,7 @@
                         <a:t> </a:t>
                       </a:r>
                       <a:r>
-                        <a:rPr lang="en-US" sz="2400" b="0" i="1" baseline="0" dirty="0" err="1" smtClean="0">
+                        <a:rPr lang="en-US" sz="2000" b="0" i="1" baseline="0" dirty="0" err="1" smtClean="0">
                           <a:effectLst/>
                           <a:latin typeface="+mn-lt"/>
                           <a:ea typeface="Calibri"/>
@@ -14006,7 +14113,7 @@
                         <a:t>IOrderedEnumerable</a:t>
                       </a:r>
                       <a:r>
-                        <a:rPr lang="en-US" sz="2400" b="0" i="1" baseline="0" dirty="0" smtClean="0">
+                        <a:rPr lang="en-US" sz="2000" b="0" i="1" baseline="0" dirty="0" smtClean="0">
                           <a:effectLst/>
                           <a:latin typeface="+mn-lt"/>
                           <a:ea typeface="Calibri"/>
@@ -14014,7 +14121,7 @@
                         </a:rPr>
                         <a:t>&lt;T&gt;</a:t>
                       </a:r>
-                      <a:endParaRPr lang="en-US" sz="2400" b="0" i="1" dirty="0">
+                      <a:endParaRPr lang="en-US" sz="2000" b="0" i="1" dirty="0">
                         <a:effectLst/>
                         <a:latin typeface="Calibri"/>
                         <a:ea typeface="Calibri"/>
@@ -14080,7 +14187,7 @@
                         </a:spcAft>
                       </a:pPr>
                       <a:r>
-                        <a:rPr lang="en-US" sz="1800" b="0" dirty="0" err="1" smtClean="0">
+                        <a:rPr lang="en-US" sz="1600" b="0" dirty="0" err="1" smtClean="0">
                           <a:effectLst/>
                           <a:latin typeface="+mn-lt"/>
                           <a:ea typeface="Calibri"/>
@@ -14089,7 +14196,7 @@
                         <a:t>ThenBy</a:t>
                       </a:r>
                       <a:r>
-                        <a:rPr lang="en-US" sz="1800" b="0" dirty="0" smtClean="0">
+                        <a:rPr lang="en-US" sz="1600" b="0" dirty="0" smtClean="0">
                           <a:effectLst/>
                           <a:latin typeface="+mn-lt"/>
                           <a:ea typeface="Calibri"/>
@@ -14098,7 +14205,7 @@
                         <a:t>, </a:t>
                       </a:r>
                       <a:r>
-                        <a:rPr lang="en-US" sz="1800" b="0" dirty="0" err="1" smtClean="0">
+                        <a:rPr lang="en-US" sz="1600" b="0" dirty="0" err="1" smtClean="0">
                           <a:effectLst/>
                           <a:latin typeface="+mn-lt"/>
                           <a:ea typeface="Calibri"/>
@@ -14106,7 +14213,7 @@
                         </a:rPr>
                         <a:t>ThenByDescending</a:t>
                       </a:r>
-                      <a:endParaRPr lang="en-US" sz="1800" b="0" dirty="0">
+                      <a:endParaRPr lang="en-US" sz="1600" b="0" dirty="0">
                         <a:effectLst/>
                         <a:latin typeface="Calibri"/>
                         <a:ea typeface="Calibri"/>
@@ -14343,7 +14450,7 @@
             </a:pPr>
             <a:r>
               <a:rPr lang="ru-RU" dirty="0" smtClean="0"/>
-              <a:t>…</a:t>
+              <a:t>Проекция из одного типа в другой</a:t>
             </a:r>
             <a:endParaRPr lang="en-US" dirty="0"/>
           </a:p>

</xml_diff>

<commit_message>
Minor fix in Shuffle method
</commit_message>
<xml_diff>
--- a/Presentation/lesson-11-linq.pptx
+++ b/Presentation/lesson-11-linq.pptx
@@ -233,7 +233,7 @@
             <a:fld id="{B24A7054-7FFB-49F4-A126-5DF6E687FF53}" type="datetimeFigureOut">
               <a:rPr lang="ru-RU" smtClean="0"/>
               <a:pPr/>
-              <a:t>16.02.2016</a:t>
+              <a:t>07.05.2016</a:t>
             </a:fld>
             <a:endParaRPr lang="ru-RU"/>
           </a:p>
@@ -1517,7 +1517,7 @@
             <a:fld id="{8E6E6A2A-E9D3-4A0D-B04A-ABDD367A1E08}" type="datetimeFigureOut">
               <a:rPr lang="ru-RU" smtClean="0"/>
               <a:pPr/>
-              <a:t>16.02.2016</a:t>
+              <a:t>07.05.2016</a:t>
             </a:fld>
             <a:endParaRPr lang="ru-RU"/>
           </a:p>
@@ -2964,7 +2964,7 @@
             <a:fld id="{AC3D3127-B7C4-45E3-9797-C527EC9FDD78}" type="datetimeFigureOut">
               <a:rPr lang="ru-RU" smtClean="0"/>
               <a:pPr/>
-              <a:t>16.02.2016</a:t>
+              <a:t>07.05.2016</a:t>
             </a:fld>
             <a:endParaRPr lang="ru-RU"/>
           </a:p>
@@ -5280,7 +5280,7 @@
           </a:p>
           <a:p>
             <a:r>
-              <a:rPr lang="ru-RU" sz="1400" dirty="0">
+              <a:rPr lang="ru-RU" sz="1400" dirty="0" smtClean="0">
                 <a:solidFill>
                   <a:srgbClr val="000000"/>
                 </a:solidFill>
@@ -5291,19 +5291,28 @@
               </a:rPr>
               <a:t>{</a:t>
             </a:r>
+            <a:endParaRPr lang="en-US" sz="1400" dirty="0" smtClean="0">
+              <a:solidFill>
+                <a:srgbClr val="000000"/>
+              </a:solidFill>
+              <a:highlight>
+                <a:srgbClr val="FFFFFF"/>
+              </a:highlight>
+              <a:latin typeface="Consolas"/>
+            </a:endParaRPr>
           </a:p>
           <a:p>
             <a:r>
               <a:rPr lang="en-US" sz="1400" dirty="0" smtClean="0">
                 <a:solidFill>
-                  <a:srgbClr val="0000FF"/>
+                  <a:srgbClr val="2B91AF"/>
                 </a:solidFill>
                 <a:highlight>
                   <a:srgbClr val="FFFFFF"/>
                 </a:highlight>
                 <a:latin typeface="Consolas"/>
               </a:rPr>
-              <a:t>    public</a:t>
+              <a:t>    static Random</a:t>
             </a:r>
             <a:r>
               <a:rPr lang="en-US" sz="1400" dirty="0" smtClean="0">
@@ -5318,16 +5327,16 @@
               <a:t> </a:t>
             </a:r>
             <a:r>
-              <a:rPr lang="en-US" sz="1400" dirty="0">
-                <a:solidFill>
-                  <a:srgbClr val="0000FF"/>
+              <a:rPr lang="en-US" sz="1400" dirty="0" err="1">
+                <a:solidFill>
+                  <a:srgbClr val="000000"/>
                 </a:solidFill>
                 <a:highlight>
                   <a:srgbClr val="FFFFFF"/>
                 </a:highlight>
                 <a:latin typeface="Consolas"/>
               </a:rPr>
-              <a:t>static</a:t>
+              <a:t>rnd</a:t>
             </a:r>
             <a:r>
               <a:rPr lang="en-US" sz="1400" dirty="0">
@@ -5339,7 +5348,7 @@
                 </a:highlight>
                 <a:latin typeface="Consolas"/>
               </a:rPr>
-              <a:t> </a:t>
+              <a:t> = </a:t>
             </a:r>
             <a:r>
               <a:rPr lang="en-US" sz="1400" dirty="0">
@@ -5351,7 +5360,7 @@
                 </a:highlight>
                 <a:latin typeface="Consolas"/>
               </a:rPr>
-              <a:t>void</a:t>
+              <a:t>new</a:t>
             </a:r>
             <a:r>
               <a:rPr lang="en-US" sz="1400" dirty="0">
@@ -5363,19 +5372,19 @@
                 </a:highlight>
                 <a:latin typeface="Consolas"/>
               </a:rPr>
-              <a:t> Shuffle&lt;T&gt;(</a:t>
+              <a:t> </a:t>
             </a:r>
             <a:r>
               <a:rPr lang="en-US" sz="1400" dirty="0">
                 <a:solidFill>
-                  <a:srgbClr val="0000FF"/>
+                  <a:srgbClr val="2B91AF"/>
                 </a:solidFill>
                 <a:highlight>
                   <a:srgbClr val="FFFFFF"/>
                 </a:highlight>
                 <a:latin typeface="Consolas"/>
               </a:rPr>
-              <a:t>this</a:t>
+              <a:t>Random</a:t>
             </a:r>
             <a:r>
               <a:rPr lang="en-US" sz="1400" dirty="0">
@@ -5387,57 +5396,7 @@
                 </a:highlight>
                 <a:latin typeface="Consolas"/>
               </a:rPr>
-              <a:t> </a:t>
-            </a:r>
-            <a:r>
-              <a:rPr lang="en-US" sz="1400" dirty="0" err="1">
-                <a:solidFill>
-                  <a:srgbClr val="2B91AF"/>
-                </a:solidFill>
-                <a:highlight>
-                  <a:srgbClr val="FFFFFF"/>
-                </a:highlight>
-                <a:latin typeface="Consolas"/>
-              </a:rPr>
-              <a:t>IList</a:t>
-            </a:r>
-            <a:r>
-              <a:rPr lang="en-US" sz="1400" dirty="0">
-                <a:solidFill>
-                  <a:srgbClr val="000000"/>
-                </a:solidFill>
-                <a:highlight>
-                  <a:srgbClr val="FFFFFF"/>
-                </a:highlight>
-                <a:latin typeface="Consolas"/>
-              </a:rPr>
-              <a:t>&lt;T&gt; list)</a:t>
-            </a:r>
-          </a:p>
-          <a:p>
-            <a:r>
-              <a:rPr lang="en-US" sz="1400" dirty="0" smtClean="0">
-                <a:solidFill>
-                  <a:srgbClr val="000000"/>
-                </a:solidFill>
-                <a:highlight>
-                  <a:srgbClr val="FFFFFF"/>
-                </a:highlight>
-                <a:latin typeface="Consolas"/>
-              </a:rPr>
-              <a:t>    </a:t>
-            </a:r>
-            <a:r>
-              <a:rPr lang="ru-RU" sz="1400" dirty="0" smtClean="0">
-                <a:solidFill>
-                  <a:srgbClr val="000000"/>
-                </a:solidFill>
-                <a:highlight>
-                  <a:srgbClr val="FFFFFF"/>
-                </a:highlight>
-                <a:latin typeface="Consolas"/>
-              </a:rPr>
-              <a:t>{</a:t>
+              <a:t>();</a:t>
             </a:r>
             <a:endParaRPr lang="ru-RU" sz="1400" dirty="0">
               <a:solidFill>
@@ -5453,14 +5412,14 @@
             <a:r>
               <a:rPr lang="en-US" sz="1400" dirty="0" smtClean="0">
                 <a:solidFill>
-                  <a:srgbClr val="2B91AF"/>
+                  <a:srgbClr val="0000FF"/>
                 </a:solidFill>
                 <a:highlight>
                   <a:srgbClr val="FFFFFF"/>
                 </a:highlight>
                 <a:latin typeface="Consolas"/>
               </a:rPr>
-              <a:t>        Random</a:t>
+              <a:t>    public</a:t>
             </a:r>
             <a:r>
               <a:rPr lang="en-US" sz="1400" dirty="0" smtClean="0">
@@ -5475,16 +5434,16 @@
               <a:t> </a:t>
             </a:r>
             <a:r>
-              <a:rPr lang="en-US" sz="1400" dirty="0" err="1">
-                <a:solidFill>
-                  <a:srgbClr val="000000"/>
+              <a:rPr lang="en-US" sz="1400" dirty="0">
+                <a:solidFill>
+                  <a:srgbClr val="0000FF"/>
                 </a:solidFill>
                 <a:highlight>
                   <a:srgbClr val="FFFFFF"/>
                 </a:highlight>
                 <a:latin typeface="Consolas"/>
               </a:rPr>
-              <a:t>rnd</a:t>
+              <a:t>static</a:t>
             </a:r>
             <a:r>
               <a:rPr lang="en-US" sz="1400" dirty="0">
@@ -5496,7 +5455,7 @@
                 </a:highlight>
                 <a:latin typeface="Consolas"/>
               </a:rPr>
-              <a:t> = </a:t>
+              <a:t> </a:t>
             </a:r>
             <a:r>
               <a:rPr lang="en-US" sz="1400" dirty="0">
@@ -5508,7 +5467,7 @@
                 </a:highlight>
                 <a:latin typeface="Consolas"/>
               </a:rPr>
-              <a:t>new</a:t>
+              <a:t>void</a:t>
             </a:r>
             <a:r>
               <a:rPr lang="en-US" sz="1400" dirty="0">
@@ -5520,19 +5479,19 @@
                 </a:highlight>
                 <a:latin typeface="Consolas"/>
               </a:rPr>
-              <a:t> </a:t>
+              <a:t> Shuffle&lt;T&gt;(</a:t>
             </a:r>
             <a:r>
               <a:rPr lang="en-US" sz="1400" dirty="0">
                 <a:solidFill>
-                  <a:srgbClr val="2B91AF"/>
+                  <a:srgbClr val="0000FF"/>
                 </a:solidFill>
                 <a:highlight>
                   <a:srgbClr val="FFFFFF"/>
                 </a:highlight>
                 <a:latin typeface="Consolas"/>
               </a:rPr>
-              <a:t>Random</a:t>
+              <a:t>this</a:t>
             </a:r>
             <a:r>
               <a:rPr lang="en-US" sz="1400" dirty="0">
@@ -5544,24 +5503,83 @@
                 </a:highlight>
                 <a:latin typeface="Consolas"/>
               </a:rPr>
-              <a:t>();</a:t>
-            </a:r>
-          </a:p>
-          <a:p>
-            <a:r>
-              <a:rPr lang="nn-NO" sz="1400" dirty="0" smtClean="0">
-                <a:solidFill>
-                  <a:srgbClr val="0000FF"/>
+              <a:t> </a:t>
+            </a:r>
+            <a:r>
+              <a:rPr lang="en-US" sz="1400" dirty="0" err="1">
+                <a:solidFill>
+                  <a:srgbClr val="2B91AF"/>
                 </a:solidFill>
                 <a:highlight>
                   <a:srgbClr val="FFFFFF"/>
                 </a:highlight>
                 <a:latin typeface="Consolas"/>
               </a:rPr>
+              <a:t>IList</a:t>
+            </a:r>
+            <a:r>
+              <a:rPr lang="en-US" sz="1400" dirty="0">
+                <a:solidFill>
+                  <a:srgbClr val="000000"/>
+                </a:solidFill>
+                <a:highlight>
+                  <a:srgbClr val="FFFFFF"/>
+                </a:highlight>
+                <a:latin typeface="Consolas"/>
+              </a:rPr>
+              <a:t>&lt;T&gt; list)</a:t>
+            </a:r>
+          </a:p>
+          <a:p>
+            <a:r>
+              <a:rPr lang="en-US" sz="1400" dirty="0" smtClean="0">
+                <a:solidFill>
+                  <a:srgbClr val="000000"/>
+                </a:solidFill>
+                <a:highlight>
+                  <a:srgbClr val="FFFFFF"/>
+                </a:highlight>
+                <a:latin typeface="Consolas"/>
+              </a:rPr>
+              <a:t>    </a:t>
+            </a:r>
+            <a:r>
+              <a:rPr lang="ru-RU" sz="1400" dirty="0" smtClean="0">
+                <a:solidFill>
+                  <a:srgbClr val="000000"/>
+                </a:solidFill>
+                <a:highlight>
+                  <a:srgbClr val="FFFFFF"/>
+                </a:highlight>
+                <a:latin typeface="Consolas"/>
+              </a:rPr>
+              <a:t>{</a:t>
+            </a:r>
+            <a:endParaRPr lang="ru-RU" sz="1400" dirty="0">
+              <a:solidFill>
+                <a:srgbClr val="000000"/>
+              </a:solidFill>
+              <a:highlight>
+                <a:srgbClr val="FFFFFF"/>
+              </a:highlight>
+              <a:latin typeface="Consolas"/>
+            </a:endParaRPr>
+          </a:p>
+          <a:p>
+            <a:r>
+              <a:rPr lang="nn-NO" sz="1400" smtClean="0">
+                <a:solidFill>
+                  <a:srgbClr val="0000FF"/>
+                </a:solidFill>
+                <a:highlight>
+                  <a:srgbClr val="FFFFFF"/>
+                </a:highlight>
+                <a:latin typeface="Consolas"/>
+              </a:rPr>
               <a:t>        for</a:t>
             </a:r>
             <a:r>
-              <a:rPr lang="nn-NO" sz="1400" dirty="0" smtClean="0">
+              <a:rPr lang="nn-NO" sz="1400" smtClean="0">
                 <a:solidFill>
                   <a:srgbClr val="000000"/>
                 </a:solidFill>
@@ -12728,25 +12746,7 @@
                           <a:ea typeface="Calibri"/>
                           <a:cs typeface="Times New Roman"/>
                         </a:rPr>
-                        <a:t>Range</a:t>
-                      </a:r>
-                      <a:r>
-                        <a:rPr lang="en-US" sz="1600" b="0" i="0" dirty="0" smtClean="0">
-                          <a:effectLst/>
-                          <a:latin typeface="+mn-lt"/>
-                          <a:ea typeface="Calibri"/>
-                          <a:cs typeface="Times New Roman"/>
-                        </a:rPr>
-                        <a:t>, </a:t>
-                      </a:r>
-                      <a:r>
-                        <a:rPr lang="en-US" sz="1600" b="0" i="0" dirty="0" smtClean="0">
-                          <a:effectLst/>
-                          <a:latin typeface="+mn-lt"/>
-                          <a:ea typeface="Calibri"/>
-                          <a:cs typeface="Times New Roman"/>
-                        </a:rPr>
-                        <a:t>Repeat</a:t>
+                        <a:t>Range, Repeat</a:t>
                       </a:r>
                       <a:endParaRPr lang="en-US" sz="1600" b="0" i="0" dirty="0">
                         <a:effectLst/>

</xml_diff>

<commit_message>
More details about anonymous types
</commit_message>
<xml_diff>
--- a/Presentation/lesson-11-linq.pptx
+++ b/Presentation/lesson-11-linq.pptx
@@ -233,7 +233,7 @@
             <a:fld id="{B24A7054-7FFB-49F4-A126-5DF6E687FF53}" type="datetimeFigureOut">
               <a:rPr lang="ru-RU" smtClean="0"/>
               <a:pPr/>
-              <a:t>07.05.2016</a:t>
+              <a:t>08.05.2016</a:t>
             </a:fld>
             <a:endParaRPr lang="ru-RU"/>
           </a:p>
@@ -1517,7 +1517,7 @@
             <a:fld id="{8E6E6A2A-E9D3-4A0D-B04A-ABDD367A1E08}" type="datetimeFigureOut">
               <a:rPr lang="ru-RU" smtClean="0"/>
               <a:pPr/>
-              <a:t>07.05.2016</a:t>
+              <a:t>08.05.2016</a:t>
             </a:fld>
             <a:endParaRPr lang="ru-RU"/>
           </a:p>
@@ -2964,7 +2964,7 @@
             <a:fld id="{AC3D3127-B7C4-45E3-9797-C527EC9FDD78}" type="datetimeFigureOut">
               <a:rPr lang="ru-RU" smtClean="0"/>
               <a:pPr/>
-              <a:t>07.05.2016</a:t>
+              <a:t>08.05.2016</a:t>
             </a:fld>
             <a:endParaRPr lang="ru-RU"/>
           </a:p>
@@ -26196,8 +26196,13 @@
             </a:r>
             <a:r>
               <a:rPr lang="en-US" dirty="0" smtClean="0"/>
-              <a:t>SQL</a:t>
-            </a:r>
+              <a:t>SQL (</a:t>
+            </a:r>
+            <a:r>
+              <a:rPr lang="ru-RU" dirty="0" smtClean="0"/>
+              <a:t>устарел)</a:t>
+            </a:r>
+            <a:endParaRPr lang="en-US" dirty="0" smtClean="0"/>
           </a:p>
           <a:p>
             <a:pPr lvl="1"/>
@@ -28001,7 +28006,7 @@
         <p:spPr>
           <a:xfrm>
             <a:off x="457200" y="3212976"/>
-            <a:ext cx="8219256" cy="1631216"/>
+            <a:ext cx="8219256" cy="3785652"/>
           </a:xfrm>
           <a:prstGeom prst="rect">
             <a:avLst/>
@@ -28014,52 +28019,113 @@
           </a:bodyPr>
           <a:lstStyle/>
           <a:p>
-            <a:pPr marL="457200" indent="-457200">
+            <a:r>
+              <a:rPr lang="ru-RU" sz="2000" dirty="0"/>
+              <a:t>Компилятор автоматически создает объявление </a:t>
+            </a:r>
+            <a:r>
+              <a:rPr lang="ru-RU" sz="2000" dirty="0" smtClean="0"/>
+              <a:t>класса со свойствами указанными при инициализации. Тип  свойства совпадает с типом значения использованного при инициализации. </a:t>
+            </a:r>
+            <a:r>
+              <a:rPr lang="ru-RU" sz="2000" dirty="0"/>
+              <a:t>Разные экземпляры анонимного типа будут иметь одинаковый тип, если названия, типы и порядок свойств </a:t>
+            </a:r>
+            <a:r>
+              <a:rPr lang="ru-RU" sz="2000" dirty="0" smtClean="0"/>
+              <a:t>совпадает.</a:t>
+            </a:r>
+          </a:p>
+          <a:p>
+            <a:endParaRPr lang="ru-RU" sz="2000" dirty="0"/>
+          </a:p>
+          <a:p>
+            <a:r>
+              <a:rPr lang="ru-RU" sz="2000" dirty="0" smtClean="0"/>
+              <a:t>Анонимный тип обладает следующей функциональностью:</a:t>
+            </a:r>
+          </a:p>
+          <a:p>
+            <a:pPr marL="342900" indent="-342900">
               <a:buFont typeface="Arial" panose="020B0604020202020204" pitchFamily="34" charset="0"/>
               <a:buChar char="•"/>
             </a:pPr>
             <a:r>
               <a:rPr lang="ru-RU" sz="2000" dirty="0" smtClean="0"/>
-              <a:t>Создаются используя</a:t>
+              <a:t>Объявляется</a:t>
+            </a:r>
+            <a:r>
+              <a:rPr lang="ru-RU" sz="2000" dirty="0" smtClean="0"/>
+              <a:t> как </a:t>
             </a:r>
             <a:r>
               <a:rPr lang="en-US" sz="2000" dirty="0" smtClean="0"/>
-              <a:t> </a:t>
-            </a:r>
-            <a:r>
-              <a:rPr lang="ru-RU" sz="2000" dirty="0" smtClean="0"/>
-              <a:t>синтаксис инициализатора объектов</a:t>
-            </a:r>
-          </a:p>
-          <a:p>
-            <a:pPr marL="457200" indent="-457200">
+              <a:t>class</a:t>
+            </a:r>
+            <a:endParaRPr lang="ru-RU" sz="2000" dirty="0" smtClean="0"/>
+          </a:p>
+          <a:p>
+            <a:pPr marL="342900" indent="-342900">
               <a:buFont typeface="Arial" panose="020B0604020202020204" pitchFamily="34" charset="0"/>
               <a:buChar char="•"/>
             </a:pPr>
             <a:r>
               <a:rPr lang="ru-RU" sz="2000" dirty="0" smtClean="0"/>
-              <a:t>Компилятор автоматически создает объявление класса</a:t>
-            </a:r>
-          </a:p>
-          <a:p>
-            <a:pPr marL="457200" indent="-457200">
+              <a:t>Свойства доступны </a:t>
+            </a:r>
+            <a:r>
+              <a:rPr lang="ru-RU" sz="2000" dirty="0" smtClean="0"/>
+              <a:t>только для </a:t>
+            </a:r>
+            <a:r>
+              <a:rPr lang="ru-RU" sz="2000" dirty="0" smtClean="0"/>
+              <a:t>чтения</a:t>
+            </a:r>
+          </a:p>
+          <a:p>
+            <a:pPr marL="342900" indent="-342900">
               <a:buFont typeface="Arial" panose="020B0604020202020204" pitchFamily="34" charset="0"/>
               <a:buChar char="•"/>
             </a:pPr>
             <a:r>
               <a:rPr lang="ru-RU" sz="2000" dirty="0" smtClean="0"/>
-              <a:t>Разные экземпляры анонимного типа будут иметь одинаковый тип, если названия, типы и порядок свойств совпадает</a:t>
-            </a:r>
-          </a:p>
-          <a:p>
-            <a:pPr marL="457200" indent="-457200">
+              <a:t>В классе переопределя</a:t>
+            </a:r>
+            <a:r>
+              <a:rPr lang="ru-RU" sz="2000" dirty="0"/>
+              <a:t>ю</a:t>
+            </a:r>
+            <a:r>
+              <a:rPr lang="ru-RU" sz="2000" dirty="0" smtClean="0"/>
+              <a:t>тся </a:t>
+            </a:r>
+            <a:r>
+              <a:rPr lang="en-US" sz="2000" dirty="0" smtClean="0"/>
+              <a:t>Equals </a:t>
+            </a:r>
+            <a:r>
+              <a:rPr lang="ru-RU" sz="2000" dirty="0" smtClean="0"/>
+              <a:t>и </a:t>
+            </a:r>
+            <a:r>
+              <a:rPr lang="en-US" sz="2000" dirty="0" err="1" smtClean="0"/>
+              <a:t>GetHashCode</a:t>
+            </a:r>
+            <a:endParaRPr lang="ru-RU" sz="2000" dirty="0" smtClean="0"/>
+          </a:p>
+          <a:p>
+            <a:pPr marL="342900" indent="-342900">
               <a:buFont typeface="Arial" panose="020B0604020202020204" pitchFamily="34" charset="0"/>
               <a:buChar char="•"/>
             </a:pPr>
-            <a:r>
-              <a:rPr lang="ru-RU" sz="2000" dirty="0" smtClean="0"/>
-              <a:t>Поля объекта анонимного типа доступны только для чтения</a:t>
-            </a:r>
+            <a:endParaRPr lang="ru-RU" sz="2000" dirty="0" smtClean="0"/>
+          </a:p>
+          <a:p>
+            <a:pPr marL="800100" lvl="1" indent="-342900">
+              <a:buFont typeface="Arial" panose="020B0604020202020204" pitchFamily="34" charset="0"/>
+              <a:buChar char="•"/>
+            </a:pPr>
+            <a:endParaRPr lang="ru-RU" sz="2000" dirty="0" smtClean="0"/>
           </a:p>
         </p:txBody>
       </p:sp>

</xml_diff>

<commit_message>
Clarification about extension methods
</commit_message>
<xml_diff>
--- a/Presentation/lesson-11-linq.pptx
+++ b/Presentation/lesson-11-linq.pptx
@@ -147,6 +147,22 @@
       </a:defRPr>
     </a:lvl9pPr>
   </p:defaultTextStyle>
+  <p:extLst>
+    <p:ext uri="{EFAFB233-063F-42B5-8137-9DF3F51BA10A}">
+      <p15:sldGuideLst xmlns:p15="http://schemas.microsoft.com/office/powerpoint/2012/main">
+        <p15:guide id="1" orient="horz" pos="2160">
+          <p15:clr>
+            <a:srgbClr val="A4A3A4"/>
+          </p15:clr>
+        </p15:guide>
+        <p15:guide id="2" pos="2880">
+          <p15:clr>
+            <a:srgbClr val="A4A3A4"/>
+          </p15:clr>
+        </p15:guide>
+      </p15:sldGuideLst>
+    </p:ext>
+  </p:extLst>
 </p:presentation>
 </file>
 
@@ -233,7 +249,7 @@
             <a:fld id="{B24A7054-7FFB-49F4-A126-5DF6E687FF53}" type="datetimeFigureOut">
               <a:rPr lang="ru-RU" smtClean="0"/>
               <a:pPr/>
-              <a:t>15.10.2016</a:t>
+              <a:t>11.02.2017</a:t>
             </a:fld>
             <a:endParaRPr lang="ru-RU"/>
           </a:p>
@@ -1517,7 +1533,7 @@
             <a:fld id="{8E6E6A2A-E9D3-4A0D-B04A-ABDD367A1E08}" type="datetimeFigureOut">
               <a:rPr lang="ru-RU" smtClean="0"/>
               <a:pPr/>
-              <a:t>15.10.2016</a:t>
+              <a:t>11.02.2017</a:t>
             </a:fld>
             <a:endParaRPr lang="ru-RU"/>
           </a:p>
@@ -2964,7 +2980,7 @@
             <a:fld id="{AC3D3127-B7C4-45E3-9797-C527EC9FDD78}" type="datetimeFigureOut">
               <a:rPr lang="ru-RU" smtClean="0"/>
               <a:pPr/>
-              <a:t>15.10.2016</a:t>
+              <a:t>11.02.2017</a:t>
             </a:fld>
             <a:endParaRPr lang="ru-RU"/>
           </a:p>
@@ -5057,7 +5073,7 @@
         </p:spPr>
         <p:txBody>
           <a:bodyPr>
-            <a:normAutofit/>
+            <a:normAutofit lnSpcReduction="10000"/>
           </a:bodyPr>
           <a:lstStyle/>
           <a:p>
@@ -5134,8 +5150,17 @@
               <a:rPr lang="en-US" sz="2000" dirty="0" smtClean="0">
                 <a:cs typeface="Courier New" pitchFamily="49" charset="0"/>
               </a:rPr>
-              <a:t>Extensions</a:t>
-            </a:r>
+              <a:t>Extensions. </a:t>
+            </a:r>
+            <a:r>
+              <a:rPr lang="ru-RU" sz="2000" dirty="0" smtClean="0">
+                <a:cs typeface="Courier New" pitchFamily="49" charset="0"/>
+              </a:rPr>
+              <a:t>Класс не может быть вложенным в другой.</a:t>
+            </a:r>
+            <a:endParaRPr lang="en-US" sz="2000" dirty="0" smtClean="0">
+              <a:cs typeface="Courier New" pitchFamily="49" charset="0"/>
+            </a:endParaRPr>
           </a:p>
           <a:p>
             <a:pPr marL="457200" indent="-457200">
@@ -5192,7 +5217,7 @@
         </p:nvSpPr>
         <p:spPr>
           <a:xfrm>
-            <a:off x="457200" y="3284984"/>
+            <a:off x="457200" y="3344793"/>
             <a:ext cx="7931224" cy="3108543"/>
           </a:xfrm>
           <a:prstGeom prst="rect">

</xml_diff>

<commit_message>
.NET 6 and OrDefault methods
</commit_message>
<xml_diff>
--- a/Presentation/lesson-11-linq.pptx
+++ b/Presentation/lesson-11-linq.pptx
@@ -226,7 +226,7 @@
       </p14:sectionLst>
     </p:ext>
     <p:ext uri="{EFAFB233-063F-42B5-8137-9DF3F51BA10A}">
-      <p15:sldGuideLst xmlns:p15="http://schemas.microsoft.com/office/powerpoint/2012/main" xmlns="">
+      <p15:sldGuideLst xmlns="" xmlns:p15="http://schemas.microsoft.com/office/powerpoint/2012/main">
         <p15:guide id="1" orient="horz" pos="2160">
           <p15:clr>
             <a:srgbClr val="A4A3A4"/>
@@ -326,7 +326,7 @@
             <a:fld id="{B24A7054-7FFB-49F4-A126-5DF6E687FF53}" type="datetimeFigureOut">
               <a:rPr lang="ru-RU" smtClean="0"/>
               <a:pPr/>
-              <a:t>22.02.2019</a:t>
+              <a:t>11.07.2022</a:t>
             </a:fld>
             <a:endParaRPr lang="ru-RU"/>
           </a:p>
@@ -1102,7 +1102,7 @@
             <a:fld id="{8E6E6A2A-E9D3-4A0D-B04A-ABDD367A1E08}" type="datetimeFigureOut">
               <a:rPr lang="ru-RU" smtClean="0"/>
               <a:pPr/>
-              <a:t>22.02.2019</a:t>
+              <a:t>11.07.2022</a:t>
             </a:fld>
             <a:endParaRPr lang="ru-RU"/>
           </a:p>
@@ -2639,7 +2639,7 @@
             <a:fld id="{AC3D3127-B7C4-45E3-9797-C527EC9FDD78}" type="datetimeFigureOut">
               <a:rPr lang="ru-RU" smtClean="0"/>
               <a:pPr/>
-              <a:t>22.02.2019</a:t>
+              <a:t>11.07.2022</a:t>
             </a:fld>
             <a:endParaRPr lang="ru-RU"/>
           </a:p>
@@ -3102,7 +3102,7 @@
           <p:cNvPr id="8" name="TextBox 7">
             <a:extLst>
               <a:ext uri="{FF2B5EF4-FFF2-40B4-BE49-F238E27FC236}">
-                <a16:creationId xmlns:a16="http://schemas.microsoft.com/office/drawing/2014/main" xmlns="" id="{EE547DC5-A497-3E42-88A1-79D1A1F23884}"/>
+                <a16:creationId xmlns="" xmlns:a16="http://schemas.microsoft.com/office/drawing/2014/main" id="{EE547DC5-A497-3E42-88A1-79D1A1F23884}"/>
               </a:ext>
             </a:extLst>
           </p:cNvPr>
@@ -12172,7 +12172,7 @@
           <p:cNvPr id="2" name="Title 1">
             <a:extLst>
               <a:ext uri="{FF2B5EF4-FFF2-40B4-BE49-F238E27FC236}">
-                <a16:creationId xmlns:a16="http://schemas.microsoft.com/office/drawing/2014/main" xmlns="" id="{41A03462-EDF4-E147-9862-EB3ED9B55CDF}"/>
+                <a16:creationId xmlns="" xmlns:a16="http://schemas.microsoft.com/office/drawing/2014/main" id="{41A03462-EDF4-E147-9862-EB3ED9B55CDF}"/>
               </a:ext>
             </a:extLst>
           </p:cNvPr>
@@ -12201,7 +12201,7 @@
           <p:cNvPr id="3" name="Content Placeholder 2">
             <a:extLst>
               <a:ext uri="{FF2B5EF4-FFF2-40B4-BE49-F238E27FC236}">
-                <a16:creationId xmlns:a16="http://schemas.microsoft.com/office/drawing/2014/main" xmlns="" id="{1CC08D06-877D-C340-9132-B1B1AE7EAFAF}"/>
+                <a16:creationId xmlns="" xmlns:a16="http://schemas.microsoft.com/office/drawing/2014/main" id="{1CC08D06-877D-C340-9132-B1B1AE7EAFAF}"/>
               </a:ext>
             </a:extLst>
           </p:cNvPr>
@@ -12434,14 +12434,14 @@
                 <a:gridCol w="1013284">
                   <a:extLst>
                     <a:ext uri="{9D8B030D-6E8A-4147-A177-3AD203B41FA5}">
-                      <a16:colId xmlns:a16="http://schemas.microsoft.com/office/drawing/2014/main" xmlns="" val="20000"/>
+                      <a16:colId xmlns="" xmlns:a16="http://schemas.microsoft.com/office/drawing/2014/main" val="20000"/>
                     </a:ext>
                   </a:extLst>
                 </a:gridCol>
                 <a:gridCol w="7061956">
                   <a:extLst>
                     <a:ext uri="{9D8B030D-6E8A-4147-A177-3AD203B41FA5}">
-                      <a16:colId xmlns:a16="http://schemas.microsoft.com/office/drawing/2014/main" xmlns="" val="20001"/>
+                      <a16:colId xmlns="" xmlns:a16="http://schemas.microsoft.com/office/drawing/2014/main" val="20001"/>
                     </a:ext>
                   </a:extLst>
                 </a:gridCol>
@@ -12555,7 +12555,7 @@
                 </a:tc>
                 <a:extLst>
                   <a:ext uri="{0D108BD9-81ED-4DB2-BD59-A6C34878D82A}">
-                    <a16:rowId xmlns:a16="http://schemas.microsoft.com/office/drawing/2014/main" xmlns="" val="10000"/>
+                    <a16:rowId xmlns="" xmlns:a16="http://schemas.microsoft.com/office/drawing/2014/main" val="10000"/>
                   </a:ext>
                 </a:extLst>
               </a:tr>
@@ -12696,7 +12696,7 @@
                 </a:tc>
                 <a:extLst>
                   <a:ext uri="{0D108BD9-81ED-4DB2-BD59-A6C34878D82A}">
-                    <a16:rowId xmlns:a16="http://schemas.microsoft.com/office/drawing/2014/main" xmlns="" val="10001"/>
+                    <a16:rowId xmlns="" xmlns:a16="http://schemas.microsoft.com/office/drawing/2014/main" val="10001"/>
                   </a:ext>
                 </a:extLst>
               </a:tr>
@@ -12825,7 +12825,7 @@
                 </a:tc>
                 <a:extLst>
                   <a:ext uri="{0D108BD9-81ED-4DB2-BD59-A6C34878D82A}">
-                    <a16:rowId xmlns:a16="http://schemas.microsoft.com/office/drawing/2014/main" xmlns="" val="10002"/>
+                    <a16:rowId xmlns="" xmlns:a16="http://schemas.microsoft.com/office/drawing/2014/main" val="10002"/>
                   </a:ext>
                 </a:extLst>
               </a:tr>
@@ -12946,7 +12946,7 @@
                 </a:tc>
                 <a:extLst>
                   <a:ext uri="{0D108BD9-81ED-4DB2-BD59-A6C34878D82A}">
-                    <a16:rowId xmlns:a16="http://schemas.microsoft.com/office/drawing/2014/main" xmlns="" val="10003"/>
+                    <a16:rowId xmlns="" xmlns:a16="http://schemas.microsoft.com/office/drawing/2014/main" val="10003"/>
                   </a:ext>
                 </a:extLst>
               </a:tr>
@@ -13074,7 +13074,7 @@
                 </a:tc>
                 <a:extLst>
                   <a:ext uri="{0D108BD9-81ED-4DB2-BD59-A6C34878D82A}">
-                    <a16:rowId xmlns:a16="http://schemas.microsoft.com/office/drawing/2014/main" xmlns="" val="10004"/>
+                    <a16:rowId xmlns="" xmlns:a16="http://schemas.microsoft.com/office/drawing/2014/main" val="10004"/>
                   </a:ext>
                 </a:extLst>
               </a:tr>
@@ -13235,7 +13235,7 @@
                 </a:tc>
                 <a:extLst>
                   <a:ext uri="{0D108BD9-81ED-4DB2-BD59-A6C34878D82A}">
-                    <a16:rowId xmlns:a16="http://schemas.microsoft.com/office/drawing/2014/main" xmlns="" val="10005"/>
+                    <a16:rowId xmlns="" xmlns:a16="http://schemas.microsoft.com/office/drawing/2014/main" val="10005"/>
                   </a:ext>
                 </a:extLst>
               </a:tr>
@@ -13380,7 +13380,7 @@
                 </a:tc>
                 <a:extLst>
                   <a:ext uri="{0D108BD9-81ED-4DB2-BD59-A6C34878D82A}">
-                    <a16:rowId xmlns:a16="http://schemas.microsoft.com/office/drawing/2014/main" xmlns="" val="10006"/>
+                    <a16:rowId xmlns="" xmlns:a16="http://schemas.microsoft.com/office/drawing/2014/main" val="10006"/>
                   </a:ext>
                 </a:extLst>
               </a:tr>
@@ -13493,7 +13493,7 @@
                 </a:tc>
                 <a:extLst>
                   <a:ext uri="{0D108BD9-81ED-4DB2-BD59-A6C34878D82A}">
-                    <a16:rowId xmlns:a16="http://schemas.microsoft.com/office/drawing/2014/main" xmlns="" val="10007"/>
+                    <a16:rowId xmlns="" xmlns:a16="http://schemas.microsoft.com/office/drawing/2014/main" val="10007"/>
                   </a:ext>
                 </a:extLst>
               </a:tr>
@@ -13605,7 +13605,7 @@
                 </a:tc>
                 <a:extLst>
                   <a:ext uri="{0D108BD9-81ED-4DB2-BD59-A6C34878D82A}">
-                    <a16:rowId xmlns:a16="http://schemas.microsoft.com/office/drawing/2014/main" xmlns="" val="10008"/>
+                    <a16:rowId xmlns="" xmlns:a16="http://schemas.microsoft.com/office/drawing/2014/main" val="10008"/>
                   </a:ext>
                 </a:extLst>
               </a:tr>
@@ -13710,7 +13710,7 @@
                 </a:tc>
                 <a:extLst>
                   <a:ext uri="{0D108BD9-81ED-4DB2-BD59-A6C34878D82A}">
-                    <a16:rowId xmlns:a16="http://schemas.microsoft.com/office/drawing/2014/main" xmlns="" val="10009"/>
+                    <a16:rowId xmlns="" xmlns:a16="http://schemas.microsoft.com/office/drawing/2014/main" val="10009"/>
                   </a:ext>
                 </a:extLst>
               </a:tr>
@@ -13815,7 +13815,7 @@
                 </a:tc>
                 <a:extLst>
                   <a:ext uri="{0D108BD9-81ED-4DB2-BD59-A6C34878D82A}">
-                    <a16:rowId xmlns:a16="http://schemas.microsoft.com/office/drawing/2014/main" xmlns="" val="10010"/>
+                    <a16:rowId xmlns="" xmlns:a16="http://schemas.microsoft.com/office/drawing/2014/main" val="10010"/>
                   </a:ext>
                 </a:extLst>
               </a:tr>
@@ -13927,7 +13927,7 @@
                 </a:tc>
                 <a:extLst>
                   <a:ext uri="{0D108BD9-81ED-4DB2-BD59-A6C34878D82A}">
-                    <a16:rowId xmlns:a16="http://schemas.microsoft.com/office/drawing/2014/main" xmlns="" val="10011"/>
+                    <a16:rowId xmlns="" xmlns:a16="http://schemas.microsoft.com/office/drawing/2014/main" val="10011"/>
                   </a:ext>
                 </a:extLst>
               </a:tr>
@@ -14060,7 +14060,7 @@
                 </a:tc>
                 <a:extLst>
                   <a:ext uri="{0D108BD9-81ED-4DB2-BD59-A6C34878D82A}">
-                    <a16:rowId xmlns:a16="http://schemas.microsoft.com/office/drawing/2014/main" xmlns="" val="10012"/>
+                    <a16:rowId xmlns="" xmlns:a16="http://schemas.microsoft.com/office/drawing/2014/main" val="10012"/>
                   </a:ext>
                 </a:extLst>
               </a:tr>
@@ -14165,7 +14165,7 @@
                 </a:tc>
                 <a:extLst>
                   <a:ext uri="{0D108BD9-81ED-4DB2-BD59-A6C34878D82A}">
-                    <a16:rowId xmlns:a16="http://schemas.microsoft.com/office/drawing/2014/main" xmlns="" val="10013"/>
+                    <a16:rowId xmlns="" xmlns:a16="http://schemas.microsoft.com/office/drawing/2014/main" val="10013"/>
                   </a:ext>
                 </a:extLst>
               </a:tr>
@@ -14358,7 +14358,7 @@
         </p:nvGraphicFramePr>
         <p:xfrm>
           <a:off x="395536" y="886086"/>
-          <a:ext cx="8352928" cy="5416040"/>
+          <a:ext cx="8352928" cy="5644066"/>
         </p:xfrm>
         <a:graphic>
           <a:graphicData uri="http://schemas.openxmlformats.org/drawingml/2006/table">
@@ -14370,7 +14370,7 @@
                 <a:gridCol w="8352928">
                   <a:extLst>
                     <a:ext uri="{9D8B030D-6E8A-4147-A177-3AD203B41FA5}">
-                      <a16:colId xmlns:a16="http://schemas.microsoft.com/office/drawing/2014/main" xmlns="" val="20000"/>
+                      <a16:colId xmlns="" xmlns:a16="http://schemas.microsoft.com/office/drawing/2014/main" val="20000"/>
                     </a:ext>
                   </a:extLst>
                 </a:gridCol>
@@ -14459,7 +14459,7 @@
                 </a:tc>
                 <a:extLst>
                   <a:ext uri="{0D108BD9-81ED-4DB2-BD59-A6C34878D82A}">
-                    <a16:rowId xmlns:a16="http://schemas.microsoft.com/office/drawing/2014/main" xmlns="" val="10000"/>
+                    <a16:rowId xmlns="" xmlns:a16="http://schemas.microsoft.com/office/drawing/2014/main" val="10000"/>
                   </a:ext>
                 </a:extLst>
               </a:tr>
@@ -14556,7 +14556,7 @@
                 </a:tc>
                 <a:extLst>
                   <a:ext uri="{0D108BD9-81ED-4DB2-BD59-A6C34878D82A}">
-                    <a16:rowId xmlns:a16="http://schemas.microsoft.com/office/drawing/2014/main" xmlns="" val="10001"/>
+                    <a16:rowId xmlns="" xmlns:a16="http://schemas.microsoft.com/office/drawing/2014/main" val="10001"/>
                   </a:ext>
                 </a:extLst>
               </a:tr>
@@ -14624,7 +14624,7 @@
                 </a:tc>
                 <a:extLst>
                   <a:ext uri="{0D108BD9-81ED-4DB2-BD59-A6C34878D82A}">
-                    <a16:rowId xmlns:a16="http://schemas.microsoft.com/office/drawing/2014/main" xmlns="" val="10002"/>
+                    <a16:rowId xmlns="" xmlns:a16="http://schemas.microsoft.com/office/drawing/2014/main" val="10002"/>
                   </a:ext>
                 </a:extLst>
               </a:tr>
@@ -14712,7 +14712,7 @@
                 </a:tc>
                 <a:extLst>
                   <a:ext uri="{0D108BD9-81ED-4DB2-BD59-A6C34878D82A}">
-                    <a16:rowId xmlns:a16="http://schemas.microsoft.com/office/drawing/2014/main" xmlns="" val="10003"/>
+                    <a16:rowId xmlns="" xmlns:a16="http://schemas.microsoft.com/office/drawing/2014/main" val="10003"/>
                   </a:ext>
                 </a:extLst>
               </a:tr>
@@ -14809,7 +14809,7 @@
                 </a:tc>
                 <a:extLst>
                   <a:ext uri="{0D108BD9-81ED-4DB2-BD59-A6C34878D82A}">
-                    <a16:rowId xmlns:a16="http://schemas.microsoft.com/office/drawing/2014/main" xmlns="" val="10004"/>
+                    <a16:rowId xmlns="" xmlns:a16="http://schemas.microsoft.com/office/drawing/2014/main" val="10004"/>
                   </a:ext>
                 </a:extLst>
               </a:tr>
@@ -14886,7 +14886,7 @@
                 </a:tc>
                 <a:extLst>
                   <a:ext uri="{0D108BD9-81ED-4DB2-BD59-A6C34878D82A}">
-                    <a16:rowId xmlns:a16="http://schemas.microsoft.com/office/drawing/2014/main" xmlns="" val="10005"/>
+                    <a16:rowId xmlns="" xmlns:a16="http://schemas.microsoft.com/office/drawing/2014/main" val="10005"/>
                   </a:ext>
                 </a:extLst>
               </a:tr>
@@ -15082,7 +15082,7 @@
                 </a:tc>
                 <a:extLst>
                   <a:ext uri="{0D108BD9-81ED-4DB2-BD59-A6C34878D82A}">
-                    <a16:rowId xmlns:a16="http://schemas.microsoft.com/office/drawing/2014/main" xmlns="" val="10006"/>
+                    <a16:rowId xmlns="" xmlns:a16="http://schemas.microsoft.com/office/drawing/2014/main" val="10006"/>
                   </a:ext>
                 </a:extLst>
               </a:tr>
@@ -15161,7 +15161,7 @@
                 </a:tc>
                 <a:extLst>
                   <a:ext uri="{0D108BD9-81ED-4DB2-BD59-A6C34878D82A}">
-                    <a16:rowId xmlns:a16="http://schemas.microsoft.com/office/drawing/2014/main" xmlns="" val="10007"/>
+                    <a16:rowId xmlns="" xmlns:a16="http://schemas.microsoft.com/office/drawing/2014/main" val="10007"/>
                   </a:ext>
                 </a:extLst>
               </a:tr>
@@ -15229,7 +15229,7 @@
                 </a:tc>
                 <a:extLst>
                   <a:ext uri="{0D108BD9-81ED-4DB2-BD59-A6C34878D82A}">
-                    <a16:rowId xmlns:a16="http://schemas.microsoft.com/office/drawing/2014/main" xmlns="" val="10008"/>
+                    <a16:rowId xmlns="" xmlns:a16="http://schemas.microsoft.com/office/drawing/2014/main" val="10008"/>
                   </a:ext>
                 </a:extLst>
               </a:tr>
@@ -15335,7 +15335,7 @@
                 </a:tc>
                 <a:extLst>
                   <a:ext uri="{0D108BD9-81ED-4DB2-BD59-A6C34878D82A}">
-                    <a16:rowId xmlns:a16="http://schemas.microsoft.com/office/drawing/2014/main" xmlns="" val="10009"/>
+                    <a16:rowId xmlns="" xmlns:a16="http://schemas.microsoft.com/office/drawing/2014/main" val="10009"/>
                   </a:ext>
                 </a:extLst>
               </a:tr>
@@ -15792,7 +15792,7 @@
                 </a:tc>
                 <a:extLst>
                   <a:ext uri="{0D108BD9-81ED-4DB2-BD59-A6C34878D82A}">
-                    <a16:rowId xmlns:a16="http://schemas.microsoft.com/office/drawing/2014/main" xmlns="" val="10010"/>
+                    <a16:rowId xmlns="" xmlns:a16="http://schemas.microsoft.com/office/drawing/2014/main" val="10010"/>
                   </a:ext>
                 </a:extLst>
               </a:tr>
@@ -15869,7 +15869,7 @@
                 </a:tc>
                 <a:extLst>
                   <a:ext uri="{0D108BD9-81ED-4DB2-BD59-A6C34878D82A}">
-                    <a16:rowId xmlns:a16="http://schemas.microsoft.com/office/drawing/2014/main" xmlns="" val="10011"/>
+                    <a16:rowId xmlns="" xmlns:a16="http://schemas.microsoft.com/office/drawing/2014/main" val="10011"/>
                   </a:ext>
                 </a:extLst>
               </a:tr>
@@ -15984,7 +15984,7 @@
                 </a:tc>
                 <a:extLst>
                   <a:ext uri="{0D108BD9-81ED-4DB2-BD59-A6C34878D82A}">
-                    <a16:rowId xmlns:a16="http://schemas.microsoft.com/office/drawing/2014/main" xmlns="" val="10012"/>
+                    <a16:rowId xmlns="" xmlns:a16="http://schemas.microsoft.com/office/drawing/2014/main" val="10012"/>
                   </a:ext>
                 </a:extLst>
               </a:tr>
@@ -16081,7 +16081,7 @@
                 </a:tc>
                 <a:extLst>
                   <a:ext uri="{0D108BD9-81ED-4DB2-BD59-A6C34878D82A}">
-                    <a16:rowId xmlns:a16="http://schemas.microsoft.com/office/drawing/2014/main" xmlns="" val="10013"/>
+                    <a16:rowId xmlns="" xmlns:a16="http://schemas.microsoft.com/office/drawing/2014/main" val="10013"/>
                   </a:ext>
                 </a:extLst>
               </a:tr>
@@ -16562,11 +16562,11 @@
   <p:clrMapOvr>
     <a:masterClrMapping/>
   </p:clrMapOvr>
-  <mc:AlternateContent xmlns:mc="http://schemas.openxmlformats.org/markup-compatibility/2006">
-    <mc:Choice xmlns:p14="http://schemas.microsoft.com/office/powerpoint/2010/main" Requires="p14">
+  <mc:AlternateContent xmlns:mc="http://schemas.openxmlformats.org/markup-compatibility/2006" xmlns:p14="http://schemas.microsoft.com/office/powerpoint/2010/main">
+    <mc:Choice Requires="p14">
       <p:transition spd="slow" p14:dur="2000"/>
     </mc:Choice>
-    <mc:Fallback>
+    <mc:Fallback xmlns="">
       <p:transition spd="slow"/>
     </mc:Fallback>
   </mc:AlternateContent>
@@ -16887,7 +16887,7 @@
         <p:spPr/>
         <p:txBody>
           <a:bodyPr>
-            <a:normAutofit fontScale="92500" lnSpcReduction="10000"/>
+            <a:normAutofit fontScale="85000" lnSpcReduction="10000"/>
           </a:bodyPr>
           <a:lstStyle/>
           <a:p>
@@ -16954,8 +16954,36 @@
               <a:t>value </a:t>
             </a:r>
             <a:r>
-              <a:rPr lang="ru-RU" dirty="0"/>
-              <a:t>типов.</a:t>
+              <a:rPr lang="ru-RU" dirty="0" smtClean="0"/>
+              <a:t>типов. </a:t>
+            </a:r>
+            <a:r>
+              <a:rPr lang="ru-RU" dirty="0" smtClean="0"/>
+              <a:t>Начиная с </a:t>
+            </a:r>
+            <a:r>
+              <a:rPr lang="en-US" dirty="0" smtClean="0"/>
+              <a:t>.NET 6 </a:t>
+            </a:r>
+            <a:r>
+              <a:rPr lang="ru-RU" dirty="0" smtClean="0"/>
+              <a:t>есть возможность указать значение по умолчанию для </a:t>
+            </a:r>
+            <a:r>
+              <a:rPr lang="en-US" dirty="0" smtClean="0"/>
+              <a:t>***</a:t>
+            </a:r>
+            <a:r>
+              <a:rPr lang="en-US" dirty="0" err="1" smtClean="0"/>
+              <a:t>OrDefault</a:t>
+            </a:r>
+            <a:r>
+              <a:rPr lang="en-US" dirty="0" smtClean="0"/>
+              <a:t> </a:t>
+            </a:r>
+            <a:r>
+              <a:rPr lang="ru-RU" dirty="0" smtClean="0"/>
+              <a:t>методов.</a:t>
             </a:r>
             <a:endParaRPr lang="en-US" dirty="0"/>
           </a:p>
@@ -17032,7 +17060,7 @@
         <p:spPr/>
         <p:txBody>
           <a:bodyPr>
-            <a:normAutofit lnSpcReduction="10000"/>
+            <a:normAutofit fontScale="92500" lnSpcReduction="20000"/>
           </a:bodyPr>
           <a:lstStyle/>
           <a:p>
@@ -17044,12 +17072,8 @@
               <a:t>Метод </a:t>
             </a:r>
             <a:r>
-              <a:rPr lang="en-US"/>
-              <a:t>Single</a:t>
-            </a:r>
-            <a:r>
               <a:rPr lang="en-US" dirty="0"/>
-              <a:t>() </a:t>
+              <a:t>Single() </a:t>
             </a:r>
             <a:r>
               <a:rPr lang="ru-RU" dirty="0"/>
@@ -17079,9 +17103,38 @@
               <a:t>SingleOrDefault</a:t>
             </a:r>
             <a:r>
+              <a:rPr lang="en-US" dirty="0" smtClean="0"/>
+              <a:t>().</a:t>
+            </a:r>
+            <a:r>
+              <a:rPr lang="ru-RU" dirty="0"/>
+              <a:t> Начиная с </a:t>
+            </a:r>
+            <a:r>
               <a:rPr lang="en-US" dirty="0"/>
-              <a:t>().</a:t>
-            </a:r>
+              <a:t>.NET 6 </a:t>
+            </a:r>
+            <a:r>
+              <a:rPr lang="ru-RU" dirty="0"/>
+              <a:t>есть возможность указать значение по умолчанию для </a:t>
+            </a:r>
+            <a:r>
+              <a:rPr lang="en-US" dirty="0"/>
+              <a:t>***</a:t>
+            </a:r>
+            <a:r>
+              <a:rPr lang="en-US" dirty="0" err="1"/>
+              <a:t>OrDefault</a:t>
+            </a:r>
+            <a:r>
+              <a:rPr lang="en-US" dirty="0"/>
+              <a:t> </a:t>
+            </a:r>
+            <a:r>
+              <a:rPr lang="ru-RU" dirty="0"/>
+              <a:t>методов.</a:t>
+            </a:r>
+            <a:endParaRPr lang="en-US" dirty="0"/>
           </a:p>
         </p:txBody>
       </p:sp>
@@ -18502,7 +18555,7 @@
           <p:cNvPr id="3" name="Content Placeholder 2">
             <a:extLst>
               <a:ext uri="{FF2B5EF4-FFF2-40B4-BE49-F238E27FC236}">
-                <a16:creationId xmlns:a16="http://schemas.microsoft.com/office/drawing/2014/main" xmlns="" id="{01C788F6-B19F-8449-8F85-422BB61BFAB9}"/>
+                <a16:creationId xmlns="" xmlns:a16="http://schemas.microsoft.com/office/drawing/2014/main" id="{01C788F6-B19F-8449-8F85-422BB61BFAB9}"/>
               </a:ext>
             </a:extLst>
           </p:cNvPr>
@@ -20590,7 +20643,7 @@
         </p:nvGraphicFramePr>
         <p:xfrm>
           <a:off x="395536" y="886086"/>
-          <a:ext cx="8352928" cy="5538746"/>
+          <a:ext cx="8352928" cy="5673594"/>
         </p:xfrm>
         <a:graphic>
           <a:graphicData uri="http://schemas.openxmlformats.org/drawingml/2006/table">
@@ -20602,14 +20655,14 @@
                 <a:gridCol w="1368152">
                   <a:extLst>
                     <a:ext uri="{9D8B030D-6E8A-4147-A177-3AD203B41FA5}">
-                      <a16:colId xmlns:a16="http://schemas.microsoft.com/office/drawing/2014/main" xmlns="" val="20000"/>
+                      <a16:colId xmlns="" xmlns:a16="http://schemas.microsoft.com/office/drawing/2014/main" val="20000"/>
                     </a:ext>
                   </a:extLst>
                 </a:gridCol>
                 <a:gridCol w="6984776">
                   <a:extLst>
                     <a:ext uri="{9D8B030D-6E8A-4147-A177-3AD203B41FA5}">
-                      <a16:colId xmlns:a16="http://schemas.microsoft.com/office/drawing/2014/main" xmlns="" val="20001"/>
+                      <a16:colId xmlns="" xmlns:a16="http://schemas.microsoft.com/office/drawing/2014/main" val="20001"/>
                     </a:ext>
                   </a:extLst>
                 </a:gridCol>
@@ -20771,7 +20824,7 @@
                 </a:tc>
                 <a:extLst>
                   <a:ext uri="{0D108BD9-81ED-4DB2-BD59-A6C34878D82A}">
-                    <a16:rowId xmlns:a16="http://schemas.microsoft.com/office/drawing/2014/main" xmlns="" val="10000"/>
+                    <a16:rowId xmlns="" xmlns:a16="http://schemas.microsoft.com/office/drawing/2014/main" val="10000"/>
                   </a:ext>
                 </a:extLst>
               </a:tr>
@@ -20920,7 +20973,7 @@
                 </a:tc>
                 <a:extLst>
                   <a:ext uri="{0D108BD9-81ED-4DB2-BD59-A6C34878D82A}">
-                    <a16:rowId xmlns:a16="http://schemas.microsoft.com/office/drawing/2014/main" xmlns="" val="10001"/>
+                    <a16:rowId xmlns="" xmlns:a16="http://schemas.microsoft.com/office/drawing/2014/main" val="10001"/>
                   </a:ext>
                 </a:extLst>
               </a:tr>
@@ -21069,7 +21122,7 @@
                 </a:tc>
                 <a:extLst>
                   <a:ext uri="{0D108BD9-81ED-4DB2-BD59-A6C34878D82A}">
-                    <a16:rowId xmlns:a16="http://schemas.microsoft.com/office/drawing/2014/main" xmlns="" val="10002"/>
+                    <a16:rowId xmlns="" xmlns:a16="http://schemas.microsoft.com/office/drawing/2014/main" val="10002"/>
                   </a:ext>
                 </a:extLst>
               </a:tr>
@@ -21218,7 +21271,7 @@
                 </a:tc>
                 <a:extLst>
                   <a:ext uri="{0D108BD9-81ED-4DB2-BD59-A6C34878D82A}">
-                    <a16:rowId xmlns:a16="http://schemas.microsoft.com/office/drawing/2014/main" xmlns="" val="10003"/>
+                    <a16:rowId xmlns="" xmlns:a16="http://schemas.microsoft.com/office/drawing/2014/main" val="10003"/>
                   </a:ext>
                 </a:extLst>
               </a:tr>
@@ -21367,7 +21420,7 @@
                 </a:tc>
                 <a:extLst>
                   <a:ext uri="{0D108BD9-81ED-4DB2-BD59-A6C34878D82A}">
-                    <a16:rowId xmlns:a16="http://schemas.microsoft.com/office/drawing/2014/main" xmlns="" val="10004"/>
+                    <a16:rowId xmlns="" xmlns:a16="http://schemas.microsoft.com/office/drawing/2014/main" val="10004"/>
                   </a:ext>
                 </a:extLst>
               </a:tr>
@@ -21516,7 +21569,7 @@
                 </a:tc>
                 <a:extLst>
                   <a:ext uri="{0D108BD9-81ED-4DB2-BD59-A6C34878D82A}">
-                    <a16:rowId xmlns:a16="http://schemas.microsoft.com/office/drawing/2014/main" xmlns="" val="10005"/>
+                    <a16:rowId xmlns="" xmlns:a16="http://schemas.microsoft.com/office/drawing/2014/main" val="10005"/>
                   </a:ext>
                 </a:extLst>
               </a:tr>
@@ -21665,7 +21718,7 @@
                 </a:tc>
                 <a:extLst>
                   <a:ext uri="{0D108BD9-81ED-4DB2-BD59-A6C34878D82A}">
-                    <a16:rowId xmlns:a16="http://schemas.microsoft.com/office/drawing/2014/main" xmlns="" val="10006"/>
+                    <a16:rowId xmlns="" xmlns:a16="http://schemas.microsoft.com/office/drawing/2014/main" val="10006"/>
                   </a:ext>
                 </a:extLst>
               </a:tr>
@@ -21814,7 +21867,7 @@
                 </a:tc>
                 <a:extLst>
                   <a:ext uri="{0D108BD9-81ED-4DB2-BD59-A6C34878D82A}">
-                    <a16:rowId xmlns:a16="http://schemas.microsoft.com/office/drawing/2014/main" xmlns="" val="10007"/>
+                    <a16:rowId xmlns="" xmlns:a16="http://schemas.microsoft.com/office/drawing/2014/main" val="10007"/>
                   </a:ext>
                 </a:extLst>
               </a:tr>
@@ -21963,7 +22016,7 @@
                 </a:tc>
                 <a:extLst>
                   <a:ext uri="{0D108BD9-81ED-4DB2-BD59-A6C34878D82A}">
-                    <a16:rowId xmlns:a16="http://schemas.microsoft.com/office/drawing/2014/main" xmlns="" val="10008"/>
+                    <a16:rowId xmlns="" xmlns:a16="http://schemas.microsoft.com/office/drawing/2014/main" val="10008"/>
                   </a:ext>
                 </a:extLst>
               </a:tr>
@@ -22124,7 +22177,7 @@
                 </a:tc>
                 <a:extLst>
                   <a:ext uri="{0D108BD9-81ED-4DB2-BD59-A6C34878D82A}">
-                    <a16:rowId xmlns:a16="http://schemas.microsoft.com/office/drawing/2014/main" xmlns="" val="10009"/>
+                    <a16:rowId xmlns="" xmlns:a16="http://schemas.microsoft.com/office/drawing/2014/main" val="10009"/>
                   </a:ext>
                 </a:extLst>
               </a:tr>
@@ -22273,7 +22326,7 @@
                 </a:tc>
                 <a:extLst>
                   <a:ext uri="{0D108BD9-81ED-4DB2-BD59-A6C34878D82A}">
-                    <a16:rowId xmlns:a16="http://schemas.microsoft.com/office/drawing/2014/main" xmlns="" val="10010"/>
+                    <a16:rowId xmlns="" xmlns:a16="http://schemas.microsoft.com/office/drawing/2014/main" val="10010"/>
                   </a:ext>
                 </a:extLst>
               </a:tr>
@@ -22422,7 +22475,7 @@
                 </a:tc>
                 <a:extLst>
                   <a:ext uri="{0D108BD9-81ED-4DB2-BD59-A6C34878D82A}">
-                    <a16:rowId xmlns:a16="http://schemas.microsoft.com/office/drawing/2014/main" xmlns="" val="10011"/>
+                    <a16:rowId xmlns="" xmlns:a16="http://schemas.microsoft.com/office/drawing/2014/main" val="10011"/>
                   </a:ext>
                 </a:extLst>
               </a:tr>
@@ -22571,7 +22624,7 @@
                 </a:tc>
                 <a:extLst>
                   <a:ext uri="{0D108BD9-81ED-4DB2-BD59-A6C34878D82A}">
-                    <a16:rowId xmlns:a16="http://schemas.microsoft.com/office/drawing/2014/main" xmlns="" val="10012"/>
+                    <a16:rowId xmlns="" xmlns:a16="http://schemas.microsoft.com/office/drawing/2014/main" val="10012"/>
                   </a:ext>
                 </a:extLst>
               </a:tr>
@@ -22720,7 +22773,7 @@
                 </a:tc>
                 <a:extLst>
                   <a:ext uri="{0D108BD9-81ED-4DB2-BD59-A6C34878D82A}">
-                    <a16:rowId xmlns:a16="http://schemas.microsoft.com/office/drawing/2014/main" xmlns="" val="10013"/>
+                    <a16:rowId xmlns="" xmlns:a16="http://schemas.microsoft.com/office/drawing/2014/main" val="10013"/>
                   </a:ext>
                 </a:extLst>
               </a:tr>
@@ -22869,7 +22922,7 @@
                 </a:tc>
                 <a:extLst>
                   <a:ext uri="{0D108BD9-81ED-4DB2-BD59-A6C34878D82A}">
-                    <a16:rowId xmlns:a16="http://schemas.microsoft.com/office/drawing/2014/main" xmlns="" val="10014"/>
+                    <a16:rowId xmlns="" xmlns:a16="http://schemas.microsoft.com/office/drawing/2014/main" val="10014"/>
                   </a:ext>
                 </a:extLst>
               </a:tr>
@@ -23027,7 +23080,7 @@
                 </a:tc>
                 <a:extLst>
                   <a:ext uri="{0D108BD9-81ED-4DB2-BD59-A6C34878D82A}">
-                    <a16:rowId xmlns:a16="http://schemas.microsoft.com/office/drawing/2014/main" xmlns="" val="10015"/>
+                    <a16:rowId xmlns="" xmlns:a16="http://schemas.microsoft.com/office/drawing/2014/main" val="10015"/>
                   </a:ext>
                 </a:extLst>
               </a:tr>
@@ -23176,7 +23229,7 @@
                 </a:tc>
                 <a:extLst>
                   <a:ext uri="{0D108BD9-81ED-4DB2-BD59-A6C34878D82A}">
-                    <a16:rowId xmlns:a16="http://schemas.microsoft.com/office/drawing/2014/main" xmlns="" val="10016"/>
+                    <a16:rowId xmlns="" xmlns:a16="http://schemas.microsoft.com/office/drawing/2014/main" val="10016"/>
                   </a:ext>
                 </a:extLst>
               </a:tr>
@@ -23278,14 +23331,14 @@
                 <a:gridCol w="1440160">
                   <a:extLst>
                     <a:ext uri="{9D8B030D-6E8A-4147-A177-3AD203B41FA5}">
-                      <a16:colId xmlns:a16="http://schemas.microsoft.com/office/drawing/2014/main" xmlns="" val="20000"/>
+                      <a16:colId xmlns="" xmlns:a16="http://schemas.microsoft.com/office/drawing/2014/main" val="20000"/>
                     </a:ext>
                   </a:extLst>
                 </a:gridCol>
                 <a:gridCol w="6984776">
                   <a:extLst>
                     <a:ext uri="{9D8B030D-6E8A-4147-A177-3AD203B41FA5}">
-                      <a16:colId xmlns:a16="http://schemas.microsoft.com/office/drawing/2014/main" xmlns="" val="20001"/>
+                      <a16:colId xmlns="" xmlns:a16="http://schemas.microsoft.com/office/drawing/2014/main" val="20001"/>
                     </a:ext>
                   </a:extLst>
                 </a:gridCol>
@@ -23443,7 +23496,7 @@
                 </a:tc>
                 <a:extLst>
                   <a:ext uri="{0D108BD9-81ED-4DB2-BD59-A6C34878D82A}">
-                    <a16:rowId xmlns:a16="http://schemas.microsoft.com/office/drawing/2014/main" xmlns="" val="10000"/>
+                    <a16:rowId xmlns="" xmlns:a16="http://schemas.microsoft.com/office/drawing/2014/main" val="10000"/>
                   </a:ext>
                 </a:extLst>
               </a:tr>
@@ -23600,7 +23653,7 @@
                 </a:tc>
                 <a:extLst>
                   <a:ext uri="{0D108BD9-81ED-4DB2-BD59-A6C34878D82A}">
-                    <a16:rowId xmlns:a16="http://schemas.microsoft.com/office/drawing/2014/main" xmlns="" val="10001"/>
+                    <a16:rowId xmlns="" xmlns:a16="http://schemas.microsoft.com/office/drawing/2014/main" val="10001"/>
                   </a:ext>
                 </a:extLst>
               </a:tr>
@@ -23733,7 +23786,7 @@
                 </a:tc>
                 <a:extLst>
                   <a:ext uri="{0D108BD9-81ED-4DB2-BD59-A6C34878D82A}">
-                    <a16:rowId xmlns:a16="http://schemas.microsoft.com/office/drawing/2014/main" xmlns="" val="10002"/>
+                    <a16:rowId xmlns="" xmlns:a16="http://schemas.microsoft.com/office/drawing/2014/main" val="10002"/>
                   </a:ext>
                 </a:extLst>
               </a:tr>
@@ -23926,7 +23979,7 @@
                 </a:tc>
                 <a:extLst>
                   <a:ext uri="{0D108BD9-81ED-4DB2-BD59-A6C34878D82A}">
-                    <a16:rowId xmlns:a16="http://schemas.microsoft.com/office/drawing/2014/main" xmlns="" val="10003"/>
+                    <a16:rowId xmlns="" xmlns:a16="http://schemas.microsoft.com/office/drawing/2014/main" val="10003"/>
                   </a:ext>
                 </a:extLst>
               </a:tr>
@@ -24059,7 +24112,7 @@
                 </a:tc>
                 <a:extLst>
                   <a:ext uri="{0D108BD9-81ED-4DB2-BD59-A6C34878D82A}">
-                    <a16:rowId xmlns:a16="http://schemas.microsoft.com/office/drawing/2014/main" xmlns="" val="10004"/>
+                    <a16:rowId xmlns="" xmlns:a16="http://schemas.microsoft.com/office/drawing/2014/main" val="10004"/>
                   </a:ext>
                 </a:extLst>
               </a:tr>
@@ -24204,7 +24257,7 @@
                 </a:tc>
                 <a:extLst>
                   <a:ext uri="{0D108BD9-81ED-4DB2-BD59-A6C34878D82A}">
-                    <a16:rowId xmlns:a16="http://schemas.microsoft.com/office/drawing/2014/main" xmlns="" val="10005"/>
+                    <a16:rowId xmlns="" xmlns:a16="http://schemas.microsoft.com/office/drawing/2014/main" val="10005"/>
                   </a:ext>
                 </a:extLst>
               </a:tr>
@@ -24349,7 +24402,7 @@
                 </a:tc>
                 <a:extLst>
                   <a:ext uri="{0D108BD9-81ED-4DB2-BD59-A6C34878D82A}">
-                    <a16:rowId xmlns:a16="http://schemas.microsoft.com/office/drawing/2014/main" xmlns="" val="10006"/>
+                    <a16:rowId xmlns="" xmlns:a16="http://schemas.microsoft.com/office/drawing/2014/main" val="10006"/>
                   </a:ext>
                 </a:extLst>
               </a:tr>
@@ -24488,7 +24541,7 @@
                 </a:tc>
                 <a:extLst>
                   <a:ext uri="{0D108BD9-81ED-4DB2-BD59-A6C34878D82A}">
-                    <a16:rowId xmlns:a16="http://schemas.microsoft.com/office/drawing/2014/main" xmlns="" val="10007"/>
+                    <a16:rowId xmlns="" xmlns:a16="http://schemas.microsoft.com/office/drawing/2014/main" val="10007"/>
                   </a:ext>
                 </a:extLst>
               </a:tr>
@@ -24633,7 +24686,7 @@
                 </a:tc>
                 <a:extLst>
                   <a:ext uri="{0D108BD9-81ED-4DB2-BD59-A6C34878D82A}">
-                    <a16:rowId xmlns:a16="http://schemas.microsoft.com/office/drawing/2014/main" xmlns="" val="10008"/>
+                    <a16:rowId xmlns="" xmlns:a16="http://schemas.microsoft.com/office/drawing/2014/main" val="10008"/>
                   </a:ext>
                 </a:extLst>
               </a:tr>
@@ -24766,7 +24819,7 @@
                 </a:tc>
                 <a:extLst>
                   <a:ext uri="{0D108BD9-81ED-4DB2-BD59-A6C34878D82A}">
-                    <a16:rowId xmlns:a16="http://schemas.microsoft.com/office/drawing/2014/main" xmlns="" val="10009"/>
+                    <a16:rowId xmlns="" xmlns:a16="http://schemas.microsoft.com/office/drawing/2014/main" val="10009"/>
                   </a:ext>
                 </a:extLst>
               </a:tr>
@@ -24917,7 +24970,7 @@
                 </a:tc>
                 <a:extLst>
                   <a:ext uri="{0D108BD9-81ED-4DB2-BD59-A6C34878D82A}">
-                    <a16:rowId xmlns:a16="http://schemas.microsoft.com/office/drawing/2014/main" xmlns="" val="10010"/>
+                    <a16:rowId xmlns="" xmlns:a16="http://schemas.microsoft.com/office/drawing/2014/main" val="10010"/>
                   </a:ext>
                 </a:extLst>
               </a:tr>
@@ -25062,7 +25115,7 @@
                 </a:tc>
                 <a:extLst>
                   <a:ext uri="{0D108BD9-81ED-4DB2-BD59-A6C34878D82A}">
-                    <a16:rowId xmlns:a16="http://schemas.microsoft.com/office/drawing/2014/main" xmlns="" val="10011"/>
+                    <a16:rowId xmlns="" xmlns:a16="http://schemas.microsoft.com/office/drawing/2014/main" val="10011"/>
                   </a:ext>
                 </a:extLst>
               </a:tr>
@@ -25207,7 +25260,7 @@
                 </a:tc>
                 <a:extLst>
                   <a:ext uri="{0D108BD9-81ED-4DB2-BD59-A6C34878D82A}">
-                    <a16:rowId xmlns:a16="http://schemas.microsoft.com/office/drawing/2014/main" xmlns="" val="10012"/>
+                    <a16:rowId xmlns="" xmlns:a16="http://schemas.microsoft.com/office/drawing/2014/main" val="10012"/>
                   </a:ext>
                 </a:extLst>
               </a:tr>
@@ -25307,7 +25360,7 @@
                 <a:gridCol w="8352928">
                   <a:extLst>
                     <a:ext uri="{9D8B030D-6E8A-4147-A177-3AD203B41FA5}">
-                      <a16:colId xmlns:a16="http://schemas.microsoft.com/office/drawing/2014/main" xmlns="" val="20000"/>
+                      <a16:colId xmlns="" xmlns:a16="http://schemas.microsoft.com/office/drawing/2014/main" val="20000"/>
                     </a:ext>
                   </a:extLst>
                 </a:gridCol>
@@ -25396,7 +25449,7 @@
                 </a:tc>
                 <a:extLst>
                   <a:ext uri="{0D108BD9-81ED-4DB2-BD59-A6C34878D82A}">
-                    <a16:rowId xmlns:a16="http://schemas.microsoft.com/office/drawing/2014/main" xmlns="" val="10000"/>
+                    <a16:rowId xmlns="" xmlns:a16="http://schemas.microsoft.com/office/drawing/2014/main" val="10000"/>
                   </a:ext>
                 </a:extLst>
               </a:tr>
@@ -25484,7 +25537,7 @@
                 </a:tc>
                 <a:extLst>
                   <a:ext uri="{0D108BD9-81ED-4DB2-BD59-A6C34878D82A}">
-                    <a16:rowId xmlns:a16="http://schemas.microsoft.com/office/drawing/2014/main" xmlns="" val="10001"/>
+                    <a16:rowId xmlns="" xmlns:a16="http://schemas.microsoft.com/office/drawing/2014/main" val="10001"/>
                   </a:ext>
                 </a:extLst>
               </a:tr>
@@ -25552,7 +25605,7 @@
                 </a:tc>
                 <a:extLst>
                   <a:ext uri="{0D108BD9-81ED-4DB2-BD59-A6C34878D82A}">
-                    <a16:rowId xmlns:a16="http://schemas.microsoft.com/office/drawing/2014/main" xmlns="" val="10002"/>
+                    <a16:rowId xmlns="" xmlns:a16="http://schemas.microsoft.com/office/drawing/2014/main" val="10002"/>
                   </a:ext>
                 </a:extLst>
               </a:tr>
@@ -25640,7 +25693,7 @@
                 </a:tc>
                 <a:extLst>
                   <a:ext uri="{0D108BD9-81ED-4DB2-BD59-A6C34878D82A}">
-                    <a16:rowId xmlns:a16="http://schemas.microsoft.com/office/drawing/2014/main" xmlns="" val="10003"/>
+                    <a16:rowId xmlns="" xmlns:a16="http://schemas.microsoft.com/office/drawing/2014/main" val="10003"/>
                   </a:ext>
                 </a:extLst>
               </a:tr>
@@ -25719,7 +25772,7 @@
                 </a:tc>
                 <a:extLst>
                   <a:ext uri="{0D108BD9-81ED-4DB2-BD59-A6C34878D82A}">
-                    <a16:rowId xmlns:a16="http://schemas.microsoft.com/office/drawing/2014/main" xmlns="" val="10004"/>
+                    <a16:rowId xmlns="" xmlns:a16="http://schemas.microsoft.com/office/drawing/2014/main" val="10004"/>
                   </a:ext>
                 </a:extLst>
               </a:tr>
@@ -25796,7 +25849,7 @@
                 </a:tc>
                 <a:extLst>
                   <a:ext uri="{0D108BD9-81ED-4DB2-BD59-A6C34878D82A}">
-                    <a16:rowId xmlns:a16="http://schemas.microsoft.com/office/drawing/2014/main" xmlns="" val="10005"/>
+                    <a16:rowId xmlns="" xmlns:a16="http://schemas.microsoft.com/office/drawing/2014/main" val="10005"/>
                   </a:ext>
                 </a:extLst>
               </a:tr>
@@ -25902,7 +25955,7 @@
                 </a:tc>
                 <a:extLst>
                   <a:ext uri="{0D108BD9-81ED-4DB2-BD59-A6C34878D82A}">
-                    <a16:rowId xmlns:a16="http://schemas.microsoft.com/office/drawing/2014/main" xmlns="" val="10006"/>
+                    <a16:rowId xmlns="" xmlns:a16="http://schemas.microsoft.com/office/drawing/2014/main" val="10006"/>
                   </a:ext>
                 </a:extLst>
               </a:tr>
@@ -26332,7 +26385,7 @@
                 </a:tc>
                 <a:extLst>
                   <a:ext uri="{0D108BD9-81ED-4DB2-BD59-A6C34878D82A}">
-                    <a16:rowId xmlns:a16="http://schemas.microsoft.com/office/drawing/2014/main" xmlns="" val="10007"/>
+                    <a16:rowId xmlns="" xmlns:a16="http://schemas.microsoft.com/office/drawing/2014/main" val="10007"/>
                   </a:ext>
                 </a:extLst>
               </a:tr>

</xml_diff>

<commit_message>
Add ToHashSet and TryGetNonEnumeratedCount
</commit_message>
<xml_diff>
--- a/Presentation/lesson-11-linq.pptx
+++ b/Presentation/lesson-11-linq.pptx
@@ -226,7 +226,7 @@
       </p14:sectionLst>
     </p:ext>
     <p:ext uri="{EFAFB233-063F-42B5-8137-9DF3F51BA10A}">
-      <p15:sldGuideLst xmlns="" xmlns:p15="http://schemas.microsoft.com/office/powerpoint/2012/main">
+      <p15:sldGuideLst xmlns:p15="http://schemas.microsoft.com/office/powerpoint/2012/main" xmlns="">
         <p15:guide id="1" orient="horz" pos="2160">
           <p15:clr>
             <a:srgbClr val="A4A3A4"/>
@@ -326,7 +326,7 @@
             <a:fld id="{B24A7054-7FFB-49F4-A126-5DF6E687FF53}" type="datetimeFigureOut">
               <a:rPr lang="ru-RU" smtClean="0"/>
               <a:pPr/>
-              <a:t>11.07.2022</a:t>
+              <a:t>18.11.2022</a:t>
             </a:fld>
             <a:endParaRPr lang="ru-RU"/>
           </a:p>
@@ -1102,7 +1102,7 @@
             <a:fld id="{8E6E6A2A-E9D3-4A0D-B04A-ABDD367A1E08}" type="datetimeFigureOut">
               <a:rPr lang="ru-RU" smtClean="0"/>
               <a:pPr/>
-              <a:t>11.07.2022</a:t>
+              <a:t>18.11.2022</a:t>
             </a:fld>
             <a:endParaRPr lang="ru-RU"/>
           </a:p>
@@ -2639,7 +2639,7 @@
             <a:fld id="{AC3D3127-B7C4-45E3-9797-C527EC9FDD78}" type="datetimeFigureOut">
               <a:rPr lang="ru-RU" smtClean="0"/>
               <a:pPr/>
-              <a:t>11.07.2022</a:t>
+              <a:t>18.11.2022</a:t>
             </a:fld>
             <a:endParaRPr lang="ru-RU"/>
           </a:p>
@@ -3102,7 +3102,7 @@
           <p:cNvPr id="8" name="TextBox 7">
             <a:extLst>
               <a:ext uri="{FF2B5EF4-FFF2-40B4-BE49-F238E27FC236}">
-                <a16:creationId xmlns="" xmlns:a16="http://schemas.microsoft.com/office/drawing/2014/main" id="{EE547DC5-A497-3E42-88A1-79D1A1F23884}"/>
+                <a16:creationId xmlns:a16="http://schemas.microsoft.com/office/drawing/2014/main" xmlns="" id="{EE547DC5-A497-3E42-88A1-79D1A1F23884}"/>
               </a:ext>
             </a:extLst>
           </p:cNvPr>
@@ -12172,7 +12172,7 @@
           <p:cNvPr id="2" name="Title 1">
             <a:extLst>
               <a:ext uri="{FF2B5EF4-FFF2-40B4-BE49-F238E27FC236}">
-                <a16:creationId xmlns="" xmlns:a16="http://schemas.microsoft.com/office/drawing/2014/main" id="{41A03462-EDF4-E147-9862-EB3ED9B55CDF}"/>
+                <a16:creationId xmlns:a16="http://schemas.microsoft.com/office/drawing/2014/main" xmlns="" id="{41A03462-EDF4-E147-9862-EB3ED9B55CDF}"/>
               </a:ext>
             </a:extLst>
           </p:cNvPr>
@@ -12201,7 +12201,7 @@
           <p:cNvPr id="3" name="Content Placeholder 2">
             <a:extLst>
               <a:ext uri="{FF2B5EF4-FFF2-40B4-BE49-F238E27FC236}">
-                <a16:creationId xmlns="" xmlns:a16="http://schemas.microsoft.com/office/drawing/2014/main" id="{1CC08D06-877D-C340-9132-B1B1AE7EAFAF}"/>
+                <a16:creationId xmlns:a16="http://schemas.microsoft.com/office/drawing/2014/main" xmlns="" id="{1CC08D06-877D-C340-9132-B1B1AE7EAFAF}"/>
               </a:ext>
             </a:extLst>
           </p:cNvPr>
@@ -12434,14 +12434,14 @@
                 <a:gridCol w="1013284">
                   <a:extLst>
                     <a:ext uri="{9D8B030D-6E8A-4147-A177-3AD203B41FA5}">
-                      <a16:colId xmlns="" xmlns:a16="http://schemas.microsoft.com/office/drawing/2014/main" val="20000"/>
+                      <a16:colId xmlns:a16="http://schemas.microsoft.com/office/drawing/2014/main" xmlns="" val="20000"/>
                     </a:ext>
                   </a:extLst>
                 </a:gridCol>
                 <a:gridCol w="7061956">
                   <a:extLst>
                     <a:ext uri="{9D8B030D-6E8A-4147-A177-3AD203B41FA5}">
-                      <a16:colId xmlns="" xmlns:a16="http://schemas.microsoft.com/office/drawing/2014/main" val="20001"/>
+                      <a16:colId xmlns:a16="http://schemas.microsoft.com/office/drawing/2014/main" xmlns="" val="20001"/>
                     </a:ext>
                   </a:extLst>
                 </a:gridCol>
@@ -12555,7 +12555,7 @@
                 </a:tc>
                 <a:extLst>
                   <a:ext uri="{0D108BD9-81ED-4DB2-BD59-A6C34878D82A}">
-                    <a16:rowId xmlns="" xmlns:a16="http://schemas.microsoft.com/office/drawing/2014/main" val="10000"/>
+                    <a16:rowId xmlns:a16="http://schemas.microsoft.com/office/drawing/2014/main" xmlns="" val="10000"/>
                   </a:ext>
                 </a:extLst>
               </a:tr>
@@ -12696,7 +12696,7 @@
                 </a:tc>
                 <a:extLst>
                   <a:ext uri="{0D108BD9-81ED-4DB2-BD59-A6C34878D82A}">
-                    <a16:rowId xmlns="" xmlns:a16="http://schemas.microsoft.com/office/drawing/2014/main" val="10001"/>
+                    <a16:rowId xmlns:a16="http://schemas.microsoft.com/office/drawing/2014/main" xmlns="" val="10001"/>
                   </a:ext>
                 </a:extLst>
               </a:tr>
@@ -12825,7 +12825,7 @@
                 </a:tc>
                 <a:extLst>
                   <a:ext uri="{0D108BD9-81ED-4DB2-BD59-A6C34878D82A}">
-                    <a16:rowId xmlns="" xmlns:a16="http://schemas.microsoft.com/office/drawing/2014/main" val="10002"/>
+                    <a16:rowId xmlns:a16="http://schemas.microsoft.com/office/drawing/2014/main" xmlns="" val="10002"/>
                   </a:ext>
                 </a:extLst>
               </a:tr>
@@ -12946,7 +12946,7 @@
                 </a:tc>
                 <a:extLst>
                   <a:ext uri="{0D108BD9-81ED-4DB2-BD59-A6C34878D82A}">
-                    <a16:rowId xmlns="" xmlns:a16="http://schemas.microsoft.com/office/drawing/2014/main" val="10003"/>
+                    <a16:rowId xmlns:a16="http://schemas.microsoft.com/office/drawing/2014/main" xmlns="" val="10003"/>
                   </a:ext>
                 </a:extLst>
               </a:tr>
@@ -13074,7 +13074,7 @@
                 </a:tc>
                 <a:extLst>
                   <a:ext uri="{0D108BD9-81ED-4DB2-BD59-A6C34878D82A}">
-                    <a16:rowId xmlns="" xmlns:a16="http://schemas.microsoft.com/office/drawing/2014/main" val="10004"/>
+                    <a16:rowId xmlns:a16="http://schemas.microsoft.com/office/drawing/2014/main" xmlns="" val="10004"/>
                   </a:ext>
                 </a:extLst>
               </a:tr>
@@ -13235,7 +13235,7 @@
                 </a:tc>
                 <a:extLst>
                   <a:ext uri="{0D108BD9-81ED-4DB2-BD59-A6C34878D82A}">
-                    <a16:rowId xmlns="" xmlns:a16="http://schemas.microsoft.com/office/drawing/2014/main" val="10005"/>
+                    <a16:rowId xmlns:a16="http://schemas.microsoft.com/office/drawing/2014/main" xmlns="" val="10005"/>
                   </a:ext>
                 </a:extLst>
               </a:tr>
@@ -13380,7 +13380,7 @@
                 </a:tc>
                 <a:extLst>
                   <a:ext uri="{0D108BD9-81ED-4DB2-BD59-A6C34878D82A}">
-                    <a16:rowId xmlns="" xmlns:a16="http://schemas.microsoft.com/office/drawing/2014/main" val="10006"/>
+                    <a16:rowId xmlns:a16="http://schemas.microsoft.com/office/drawing/2014/main" xmlns="" val="10006"/>
                   </a:ext>
                 </a:extLst>
               </a:tr>
@@ -13493,7 +13493,7 @@
                 </a:tc>
                 <a:extLst>
                   <a:ext uri="{0D108BD9-81ED-4DB2-BD59-A6C34878D82A}">
-                    <a16:rowId xmlns="" xmlns:a16="http://schemas.microsoft.com/office/drawing/2014/main" val="10007"/>
+                    <a16:rowId xmlns:a16="http://schemas.microsoft.com/office/drawing/2014/main" xmlns="" val="10007"/>
                   </a:ext>
                 </a:extLst>
               </a:tr>
@@ -13605,7 +13605,7 @@
                 </a:tc>
                 <a:extLst>
                   <a:ext uri="{0D108BD9-81ED-4DB2-BD59-A6C34878D82A}">
-                    <a16:rowId xmlns="" xmlns:a16="http://schemas.microsoft.com/office/drawing/2014/main" val="10008"/>
+                    <a16:rowId xmlns:a16="http://schemas.microsoft.com/office/drawing/2014/main" xmlns="" val="10008"/>
                   </a:ext>
                 </a:extLst>
               </a:tr>
@@ -13710,7 +13710,7 @@
                 </a:tc>
                 <a:extLst>
                   <a:ext uri="{0D108BD9-81ED-4DB2-BD59-A6C34878D82A}">
-                    <a16:rowId xmlns="" xmlns:a16="http://schemas.microsoft.com/office/drawing/2014/main" val="10009"/>
+                    <a16:rowId xmlns:a16="http://schemas.microsoft.com/office/drawing/2014/main" xmlns="" val="10009"/>
                   </a:ext>
                 </a:extLst>
               </a:tr>
@@ -13815,7 +13815,7 @@
                 </a:tc>
                 <a:extLst>
                   <a:ext uri="{0D108BD9-81ED-4DB2-BD59-A6C34878D82A}">
-                    <a16:rowId xmlns="" xmlns:a16="http://schemas.microsoft.com/office/drawing/2014/main" val="10010"/>
+                    <a16:rowId xmlns:a16="http://schemas.microsoft.com/office/drawing/2014/main" xmlns="" val="10010"/>
                   </a:ext>
                 </a:extLst>
               </a:tr>
@@ -13927,7 +13927,7 @@
                 </a:tc>
                 <a:extLst>
                   <a:ext uri="{0D108BD9-81ED-4DB2-BD59-A6C34878D82A}">
-                    <a16:rowId xmlns="" xmlns:a16="http://schemas.microsoft.com/office/drawing/2014/main" val="10011"/>
+                    <a16:rowId xmlns:a16="http://schemas.microsoft.com/office/drawing/2014/main" xmlns="" val="10011"/>
                   </a:ext>
                 </a:extLst>
               </a:tr>
@@ -14060,7 +14060,7 @@
                 </a:tc>
                 <a:extLst>
                   <a:ext uri="{0D108BD9-81ED-4DB2-BD59-A6C34878D82A}">
-                    <a16:rowId xmlns="" xmlns:a16="http://schemas.microsoft.com/office/drawing/2014/main" val="10012"/>
+                    <a16:rowId xmlns:a16="http://schemas.microsoft.com/office/drawing/2014/main" xmlns="" val="10012"/>
                   </a:ext>
                 </a:extLst>
               </a:tr>
@@ -14165,7 +14165,7 @@
                 </a:tc>
                 <a:extLst>
                   <a:ext uri="{0D108BD9-81ED-4DB2-BD59-A6C34878D82A}">
-                    <a16:rowId xmlns="" xmlns:a16="http://schemas.microsoft.com/office/drawing/2014/main" val="10013"/>
+                    <a16:rowId xmlns:a16="http://schemas.microsoft.com/office/drawing/2014/main" xmlns="" val="10013"/>
                   </a:ext>
                 </a:extLst>
               </a:tr>
@@ -14370,7 +14370,7 @@
                 <a:gridCol w="8352928">
                   <a:extLst>
                     <a:ext uri="{9D8B030D-6E8A-4147-A177-3AD203B41FA5}">
-                      <a16:colId xmlns="" xmlns:a16="http://schemas.microsoft.com/office/drawing/2014/main" val="20000"/>
+                      <a16:colId xmlns:a16="http://schemas.microsoft.com/office/drawing/2014/main" xmlns="" val="20000"/>
                     </a:ext>
                   </a:extLst>
                 </a:gridCol>
@@ -14459,7 +14459,7 @@
                 </a:tc>
                 <a:extLst>
                   <a:ext uri="{0D108BD9-81ED-4DB2-BD59-A6C34878D82A}">
-                    <a16:rowId xmlns="" xmlns:a16="http://schemas.microsoft.com/office/drawing/2014/main" val="10000"/>
+                    <a16:rowId xmlns:a16="http://schemas.microsoft.com/office/drawing/2014/main" xmlns="" val="10000"/>
                   </a:ext>
                 </a:extLst>
               </a:tr>
@@ -14556,7 +14556,7 @@
                 </a:tc>
                 <a:extLst>
                   <a:ext uri="{0D108BD9-81ED-4DB2-BD59-A6C34878D82A}">
-                    <a16:rowId xmlns="" xmlns:a16="http://schemas.microsoft.com/office/drawing/2014/main" val="10001"/>
+                    <a16:rowId xmlns:a16="http://schemas.microsoft.com/office/drawing/2014/main" xmlns="" val="10001"/>
                   </a:ext>
                 </a:extLst>
               </a:tr>
@@ -14624,7 +14624,7 @@
                 </a:tc>
                 <a:extLst>
                   <a:ext uri="{0D108BD9-81ED-4DB2-BD59-A6C34878D82A}">
-                    <a16:rowId xmlns="" xmlns:a16="http://schemas.microsoft.com/office/drawing/2014/main" val="10002"/>
+                    <a16:rowId xmlns:a16="http://schemas.microsoft.com/office/drawing/2014/main" xmlns="" val="10002"/>
                   </a:ext>
                 </a:extLst>
               </a:tr>
@@ -14712,7 +14712,7 @@
                 </a:tc>
                 <a:extLst>
                   <a:ext uri="{0D108BD9-81ED-4DB2-BD59-A6C34878D82A}">
-                    <a16:rowId xmlns="" xmlns:a16="http://schemas.microsoft.com/office/drawing/2014/main" val="10003"/>
+                    <a16:rowId xmlns:a16="http://schemas.microsoft.com/office/drawing/2014/main" xmlns="" val="10003"/>
                   </a:ext>
                 </a:extLst>
               </a:tr>
@@ -14809,7 +14809,7 @@
                 </a:tc>
                 <a:extLst>
                   <a:ext uri="{0D108BD9-81ED-4DB2-BD59-A6C34878D82A}">
-                    <a16:rowId xmlns="" xmlns:a16="http://schemas.microsoft.com/office/drawing/2014/main" val="10004"/>
+                    <a16:rowId xmlns:a16="http://schemas.microsoft.com/office/drawing/2014/main" xmlns="" val="10004"/>
                   </a:ext>
                 </a:extLst>
               </a:tr>
@@ -14886,7 +14886,7 @@
                 </a:tc>
                 <a:extLst>
                   <a:ext uri="{0D108BD9-81ED-4DB2-BD59-A6C34878D82A}">
-                    <a16:rowId xmlns="" xmlns:a16="http://schemas.microsoft.com/office/drawing/2014/main" val="10005"/>
+                    <a16:rowId xmlns:a16="http://schemas.microsoft.com/office/drawing/2014/main" xmlns="" val="10005"/>
                   </a:ext>
                 </a:extLst>
               </a:tr>
@@ -15082,7 +15082,7 @@
                 </a:tc>
                 <a:extLst>
                   <a:ext uri="{0D108BD9-81ED-4DB2-BD59-A6C34878D82A}">
-                    <a16:rowId xmlns="" xmlns:a16="http://schemas.microsoft.com/office/drawing/2014/main" val="10006"/>
+                    <a16:rowId xmlns:a16="http://schemas.microsoft.com/office/drawing/2014/main" xmlns="" val="10006"/>
                   </a:ext>
                 </a:extLst>
               </a:tr>
@@ -15161,7 +15161,7 @@
                 </a:tc>
                 <a:extLst>
                   <a:ext uri="{0D108BD9-81ED-4DB2-BD59-A6C34878D82A}">
-                    <a16:rowId xmlns="" xmlns:a16="http://schemas.microsoft.com/office/drawing/2014/main" val="10007"/>
+                    <a16:rowId xmlns:a16="http://schemas.microsoft.com/office/drawing/2014/main" xmlns="" val="10007"/>
                   </a:ext>
                 </a:extLst>
               </a:tr>
@@ -15229,7 +15229,7 @@
                 </a:tc>
                 <a:extLst>
                   <a:ext uri="{0D108BD9-81ED-4DB2-BD59-A6C34878D82A}">
-                    <a16:rowId xmlns="" xmlns:a16="http://schemas.microsoft.com/office/drawing/2014/main" val="10008"/>
+                    <a16:rowId xmlns:a16="http://schemas.microsoft.com/office/drawing/2014/main" xmlns="" val="10008"/>
                   </a:ext>
                 </a:extLst>
               </a:tr>
@@ -15335,7 +15335,7 @@
                 </a:tc>
                 <a:extLst>
                   <a:ext uri="{0D108BD9-81ED-4DB2-BD59-A6C34878D82A}">
-                    <a16:rowId xmlns="" xmlns:a16="http://schemas.microsoft.com/office/drawing/2014/main" val="10009"/>
+                    <a16:rowId xmlns:a16="http://schemas.microsoft.com/office/drawing/2014/main" xmlns="" val="10009"/>
                   </a:ext>
                 </a:extLst>
               </a:tr>
@@ -15792,7 +15792,7 @@
                 </a:tc>
                 <a:extLst>
                   <a:ext uri="{0D108BD9-81ED-4DB2-BD59-A6C34878D82A}">
-                    <a16:rowId xmlns="" xmlns:a16="http://schemas.microsoft.com/office/drawing/2014/main" val="10010"/>
+                    <a16:rowId xmlns:a16="http://schemas.microsoft.com/office/drawing/2014/main" xmlns="" val="10010"/>
                   </a:ext>
                 </a:extLst>
               </a:tr>
@@ -15869,7 +15869,7 @@
                 </a:tc>
                 <a:extLst>
                   <a:ext uri="{0D108BD9-81ED-4DB2-BD59-A6C34878D82A}">
-                    <a16:rowId xmlns="" xmlns:a16="http://schemas.microsoft.com/office/drawing/2014/main" val="10011"/>
+                    <a16:rowId xmlns:a16="http://schemas.microsoft.com/office/drawing/2014/main" xmlns="" val="10011"/>
                   </a:ext>
                 </a:extLst>
               </a:tr>
@@ -15984,7 +15984,7 @@
                 </a:tc>
                 <a:extLst>
                   <a:ext uri="{0D108BD9-81ED-4DB2-BD59-A6C34878D82A}">
-                    <a16:rowId xmlns="" xmlns:a16="http://schemas.microsoft.com/office/drawing/2014/main" val="10012"/>
+                    <a16:rowId xmlns:a16="http://schemas.microsoft.com/office/drawing/2014/main" xmlns="" val="10012"/>
                   </a:ext>
                 </a:extLst>
               </a:tr>
@@ -16081,7 +16081,7 @@
                 </a:tc>
                 <a:extLst>
                   <a:ext uri="{0D108BD9-81ED-4DB2-BD59-A6C34878D82A}">
-                    <a16:rowId xmlns="" xmlns:a16="http://schemas.microsoft.com/office/drawing/2014/main" val="10013"/>
+                    <a16:rowId xmlns:a16="http://schemas.microsoft.com/office/drawing/2014/main" xmlns="" val="10013"/>
                   </a:ext>
                 </a:extLst>
               </a:tr>
@@ -16955,11 +16955,7 @@
             </a:r>
             <a:r>
               <a:rPr lang="ru-RU" dirty="0" smtClean="0"/>
-              <a:t>типов. </a:t>
-            </a:r>
-            <a:r>
-              <a:rPr lang="ru-RU" dirty="0" smtClean="0"/>
-              <a:t>Начиная с </a:t>
+              <a:t>типов. Начиная с </a:t>
             </a:r>
             <a:r>
               <a:rPr lang="en-US" dirty="0" smtClean="0"/>
@@ -18555,7 +18551,7 @@
           <p:cNvPr id="3" name="Content Placeholder 2">
             <a:extLst>
               <a:ext uri="{FF2B5EF4-FFF2-40B4-BE49-F238E27FC236}">
-                <a16:creationId xmlns="" xmlns:a16="http://schemas.microsoft.com/office/drawing/2014/main" id="{01C788F6-B19F-8449-8F85-422BB61BFAB9}"/>
+                <a16:creationId xmlns:a16="http://schemas.microsoft.com/office/drawing/2014/main" xmlns="" id="{01C788F6-B19F-8449-8F85-422BB61BFAB9}"/>
               </a:ext>
             </a:extLst>
           </p:cNvPr>
@@ -19340,26 +19336,32 @@
         </p:nvSpPr>
         <p:spPr/>
         <p:txBody>
-          <a:bodyPr/>
+          <a:bodyPr>
+            <a:normAutofit/>
+          </a:bodyPr>
           <a:lstStyle/>
           <a:p>
             <a:r>
-              <a:rPr lang="ru-RU" dirty="0"/>
+              <a:rPr lang="ru-RU" sz="2800" dirty="0"/>
               <a:t>Методы </a:t>
             </a:r>
             <a:r>
-              <a:rPr lang="en-US" dirty="0"/>
+              <a:rPr lang="en-US" sz="2800" dirty="0"/>
               <a:t>Count()/</a:t>
             </a:r>
             <a:r>
-              <a:rPr lang="en-US" dirty="0" err="1"/>
+              <a:rPr lang="en-US" sz="2800" dirty="0" err="1"/>
               <a:t>LongCount</a:t>
             </a:r>
             <a:r>
-              <a:rPr lang="en-US" dirty="0"/>
-              <a:t>()</a:t>
-            </a:r>
-            <a:endParaRPr lang="ru-RU" dirty="0"/>
+              <a:rPr lang="en-US" sz="2800" dirty="0" smtClean="0"/>
+              <a:t>()/</a:t>
+            </a:r>
+            <a:r>
+              <a:rPr lang="en-US" sz="2800" dirty="0" err="1" smtClean="0"/>
+              <a:t>TryGetNonEnumeratedCount</a:t>
+            </a:r>
+            <a:endParaRPr lang="ru-RU" sz="2800" dirty="0"/>
           </a:p>
         </p:txBody>
       </p:sp>
@@ -19998,7 +20000,7 @@
         </p:spPr>
         <p:txBody>
           <a:bodyPr vert="horz" lIns="91440" tIns="45720" rIns="91440" bIns="45720" rtlCol="0">
-            <a:normAutofit/>
+            <a:normAutofit fontScale="92500" lnSpcReduction="20000"/>
           </a:bodyPr>
           <a:lstStyle>
             <a:lvl1pPr marL="342900" indent="-342900" algn="l" defTabSz="914400" rtl="0" eaLnBrk="1" latinLnBrk="0" hangingPunct="1">
@@ -20139,21 +20141,48 @@
           </a:lstStyle>
           <a:p>
             <a:pPr marL="0" indent="0">
+              <a:buNone/>
+            </a:pPr>
+            <a:r>
+              <a:rPr lang="ru-RU" sz="2400" dirty="0"/>
+              <a:t>Если у коллекции есть свойство </a:t>
+            </a:r>
+            <a:r>
+              <a:rPr lang="en-US" sz="2400" dirty="0"/>
+              <a:t>Length/Count, </a:t>
+            </a:r>
+            <a:r>
+              <a:rPr lang="ru-RU" sz="2400" dirty="0"/>
+              <a:t>то лучше использовать его</a:t>
+            </a:r>
+            <a:r>
+              <a:rPr lang="ru-RU" sz="2400" dirty="0" smtClean="0"/>
+              <a:t>.</a:t>
+            </a:r>
+            <a:r>
+              <a:rPr lang="en-US" sz="2400" dirty="0" smtClean="0"/>
+              <a:t> </a:t>
+            </a:r>
+            <a:r>
+              <a:rPr lang="ru-RU" sz="2400" dirty="0" smtClean="0"/>
+              <a:t>Метод </a:t>
+            </a:r>
+            <a:r>
+              <a:rPr lang="en-US" sz="2400" dirty="0" err="1" smtClean="0"/>
+              <a:t>TryGetNonEnumeratedCount</a:t>
+            </a:r>
+            <a:r>
+              <a:rPr lang="ru-RU" sz="2400" smtClean="0"/>
+              <a:t> пробует получить количество элементов без перебора коллекции.</a:t>
+            </a:r>
+            <a:endParaRPr lang="en-US" sz="2400" dirty="0"/>
+          </a:p>
+          <a:p>
+            <a:pPr marL="0" indent="0">
               <a:buFont typeface="Arial" pitchFamily="34" charset="0"/>
               <a:buNone/>
             </a:pPr>
-            <a:r>
-              <a:rPr lang="ru-RU" sz="2400" dirty="0"/>
-              <a:t>Если у коллекции есть свойство </a:t>
-            </a:r>
-            <a:r>
-              <a:rPr lang="en-US" sz="2400" dirty="0"/>
-              <a:t>Length/Count, </a:t>
-            </a:r>
-            <a:r>
-              <a:rPr lang="ru-RU" sz="2400" dirty="0"/>
-              <a:t>то лучше использовать его.</a:t>
-            </a:r>
+            <a:endParaRPr lang="ru-RU" sz="2400" dirty="0"/>
           </a:p>
         </p:txBody>
       </p:sp>
@@ -20235,7 +20264,7 @@
         <p:spPr/>
         <p:txBody>
           <a:bodyPr>
-            <a:normAutofit/>
+            <a:normAutofit lnSpcReduction="10000"/>
           </a:bodyPr>
           <a:lstStyle/>
           <a:p>
@@ -20340,6 +20369,99 @@
               <a:t>TValue</a:t>
             </a:r>
             <a:r>
+              <a:rPr lang="en-US" sz="2800" dirty="0" smtClean="0"/>
+              <a:t>&gt;</a:t>
+            </a:r>
+          </a:p>
+          <a:p>
+            <a:r>
+              <a:rPr lang="en-US" sz="2800" dirty="0" err="1" smtClean="0"/>
+              <a:t>ToHashSet</a:t>
+            </a:r>
+            <a:r>
+              <a:rPr lang="en-US" sz="2800" dirty="0" smtClean="0"/>
+              <a:t>() -</a:t>
+            </a:r>
+            <a:r>
+              <a:rPr lang="en-US" sz="2800" dirty="0"/>
+              <a:t> </a:t>
+            </a:r>
+            <a:r>
+              <a:rPr lang="ru-RU" sz="2800" dirty="0"/>
+              <a:t>преобразование </a:t>
+            </a:r>
+            <a:r>
+              <a:rPr lang="en-US" sz="2800" dirty="0" err="1"/>
+              <a:t>IEnumerable</a:t>
+            </a:r>
+            <a:r>
+              <a:rPr lang="en-US" sz="2800" dirty="0"/>
+              <a:t>&lt;T&gt; </a:t>
+            </a:r>
+            <a:r>
+              <a:rPr lang="ru-RU" sz="2800" dirty="0"/>
+              <a:t>в </a:t>
+            </a:r>
+            <a:r>
+              <a:rPr lang="en-US" sz="2800" dirty="0" err="1" smtClean="0"/>
+              <a:t>HashSet</a:t>
+            </a:r>
+            <a:r>
+              <a:rPr lang="en-US" sz="2800" dirty="0" smtClean="0"/>
+              <a:t>&lt;T&gt;</a:t>
+            </a:r>
+            <a:endParaRPr lang="en-US" sz="2800" dirty="0"/>
+          </a:p>
+          <a:p>
+            <a:r>
+              <a:rPr lang="en-US" sz="2800" dirty="0" err="1"/>
+              <a:t>ToLookup</a:t>
+            </a:r>
+            <a:r>
+              <a:rPr lang="en-US" sz="2800" dirty="0"/>
+              <a:t>()</a:t>
+            </a:r>
+            <a:r>
+              <a:rPr lang="ru-RU" sz="2800" dirty="0"/>
+              <a:t> </a:t>
+            </a:r>
+            <a:r>
+              <a:rPr lang="en-US" sz="2800" dirty="0"/>
+              <a:t>- </a:t>
+            </a:r>
+            <a:r>
+              <a:rPr lang="ru-RU" sz="2800" dirty="0"/>
+              <a:t>преобразование </a:t>
+            </a:r>
+            <a:r>
+              <a:rPr lang="en-US" sz="2800" dirty="0" err="1"/>
+              <a:t>IEnumerable</a:t>
+            </a:r>
+            <a:r>
+              <a:rPr lang="en-US" sz="2800" dirty="0"/>
+              <a:t>&lt;T&gt; </a:t>
+            </a:r>
+            <a:r>
+              <a:rPr lang="ru-RU" sz="2800" dirty="0"/>
+              <a:t>в </a:t>
+            </a:r>
+            <a:r>
+              <a:rPr lang="en-US" sz="2800" dirty="0"/>
+              <a:t>Lookup&lt;</a:t>
+            </a:r>
+            <a:r>
+              <a:rPr lang="en-US" sz="2800" dirty="0" err="1"/>
+              <a:t>TKey</a:t>
+            </a:r>
+            <a:r>
+              <a:rPr lang="en-US" sz="2800" dirty="0"/>
+              <a:t>, </a:t>
+            </a:r>
+            <a:r>
+              <a:rPr lang="en-US" sz="2800" dirty="0" err="1"/>
+              <a:t>TElement</a:t>
+            </a:r>
+            <a:r>
               <a:rPr lang="en-US" sz="2800" dirty="0"/>
               <a:t>&gt;</a:t>
             </a:r>
@@ -20347,66 +20469,29 @@
           <a:p>
             <a:r>
               <a:rPr lang="en-US" sz="2800" dirty="0" err="1"/>
-              <a:t>ToLookup</a:t>
+              <a:t>ToEnumerable</a:t>
             </a:r>
             <a:r>
               <a:rPr lang="en-US" sz="2800" dirty="0"/>
-              <a:t>()</a:t>
-            </a:r>
-            <a:r>
-              <a:rPr lang="ru-RU" sz="2800" dirty="0"/>
-              <a:t> </a:t>
-            </a:r>
-            <a:r>
-              <a:rPr lang="en-US" sz="2800" dirty="0"/>
-              <a:t>- </a:t>
+              <a:t>() - </a:t>
             </a:r>
             <a:r>
               <a:rPr lang="ru-RU" sz="2800" dirty="0"/>
               <a:t>преобразование </a:t>
             </a:r>
             <a:r>
-              <a:rPr lang="en-US" sz="2800" dirty="0" err="1"/>
+              <a:rPr lang="ru-RU" sz="2800" dirty="0" smtClean="0"/>
+              <a:t>в тип </a:t>
+            </a:r>
+            <a:r>
+              <a:rPr lang="en-US" sz="2800" dirty="0" err="1" smtClean="0"/>
               <a:t>IEnumerable</a:t>
             </a:r>
             <a:r>
-              <a:rPr lang="en-US" sz="2800" dirty="0"/>
-              <a:t>&lt;T&gt; </a:t>
-            </a:r>
-            <a:r>
-              <a:rPr lang="ru-RU" sz="2800" dirty="0"/>
-              <a:t>в </a:t>
-            </a:r>
-            <a:r>
-              <a:rPr lang="en-US" sz="2800" dirty="0"/>
-              <a:t>Lookup&lt;</a:t>
-            </a:r>
-            <a:r>
-              <a:rPr lang="en-US" sz="2800" dirty="0" err="1"/>
-              <a:t>TKey</a:t>
-            </a:r>
-            <a:r>
-              <a:rPr lang="en-US" sz="2800" dirty="0"/>
-              <a:t>, </a:t>
-            </a:r>
-            <a:r>
-              <a:rPr lang="en-US" sz="2800" dirty="0" err="1"/>
-              <a:t>TElement</a:t>
-            </a:r>
-            <a:r>
-              <a:rPr lang="en-US" sz="2800" dirty="0"/>
-              <a:t>&gt;</a:t>
-            </a:r>
-          </a:p>
-          <a:p>
-            <a:r>
-              <a:rPr lang="en-US" sz="2800" dirty="0" err="1"/>
-              <a:t>ToEnumerable</a:t>
-            </a:r>
-            <a:r>
-              <a:rPr lang="en-US" sz="2800" dirty="0"/>
-              <a:t>()</a:t>
-            </a:r>
+              <a:rPr lang="en-US" sz="2800" dirty="0" smtClean="0"/>
+              <a:t>&lt;T&gt;</a:t>
+            </a:r>
+            <a:endParaRPr lang="en-US" sz="2800" dirty="0"/>
           </a:p>
         </p:txBody>
       </p:sp>
@@ -20655,14 +20740,14 @@
                 <a:gridCol w="1368152">
                   <a:extLst>
                     <a:ext uri="{9D8B030D-6E8A-4147-A177-3AD203B41FA5}">
-                      <a16:colId xmlns="" xmlns:a16="http://schemas.microsoft.com/office/drawing/2014/main" val="20000"/>
+                      <a16:colId xmlns:a16="http://schemas.microsoft.com/office/drawing/2014/main" xmlns="" val="20000"/>
                     </a:ext>
                   </a:extLst>
                 </a:gridCol>
                 <a:gridCol w="6984776">
                   <a:extLst>
                     <a:ext uri="{9D8B030D-6E8A-4147-A177-3AD203B41FA5}">
-                      <a16:colId xmlns="" xmlns:a16="http://schemas.microsoft.com/office/drawing/2014/main" val="20001"/>
+                      <a16:colId xmlns:a16="http://schemas.microsoft.com/office/drawing/2014/main" xmlns="" val="20001"/>
                     </a:ext>
                   </a:extLst>
                 </a:gridCol>
@@ -20824,7 +20909,7 @@
                 </a:tc>
                 <a:extLst>
                   <a:ext uri="{0D108BD9-81ED-4DB2-BD59-A6C34878D82A}">
-                    <a16:rowId xmlns="" xmlns:a16="http://schemas.microsoft.com/office/drawing/2014/main" val="10000"/>
+                    <a16:rowId xmlns:a16="http://schemas.microsoft.com/office/drawing/2014/main" xmlns="" val="10000"/>
                   </a:ext>
                 </a:extLst>
               </a:tr>
@@ -20973,7 +21058,7 @@
                 </a:tc>
                 <a:extLst>
                   <a:ext uri="{0D108BD9-81ED-4DB2-BD59-A6C34878D82A}">
-                    <a16:rowId xmlns="" xmlns:a16="http://schemas.microsoft.com/office/drawing/2014/main" val="10001"/>
+                    <a16:rowId xmlns:a16="http://schemas.microsoft.com/office/drawing/2014/main" xmlns="" val="10001"/>
                   </a:ext>
                 </a:extLst>
               </a:tr>
@@ -21122,7 +21207,7 @@
                 </a:tc>
                 <a:extLst>
                   <a:ext uri="{0D108BD9-81ED-4DB2-BD59-A6C34878D82A}">
-                    <a16:rowId xmlns="" xmlns:a16="http://schemas.microsoft.com/office/drawing/2014/main" val="10002"/>
+                    <a16:rowId xmlns:a16="http://schemas.microsoft.com/office/drawing/2014/main" xmlns="" val="10002"/>
                   </a:ext>
                 </a:extLst>
               </a:tr>
@@ -21271,7 +21356,7 @@
                 </a:tc>
                 <a:extLst>
                   <a:ext uri="{0D108BD9-81ED-4DB2-BD59-A6C34878D82A}">
-                    <a16:rowId xmlns="" xmlns:a16="http://schemas.microsoft.com/office/drawing/2014/main" val="10003"/>
+                    <a16:rowId xmlns:a16="http://schemas.microsoft.com/office/drawing/2014/main" xmlns="" val="10003"/>
                   </a:ext>
                 </a:extLst>
               </a:tr>
@@ -21420,7 +21505,7 @@
                 </a:tc>
                 <a:extLst>
                   <a:ext uri="{0D108BD9-81ED-4DB2-BD59-A6C34878D82A}">
-                    <a16:rowId xmlns="" xmlns:a16="http://schemas.microsoft.com/office/drawing/2014/main" val="10004"/>
+                    <a16:rowId xmlns:a16="http://schemas.microsoft.com/office/drawing/2014/main" xmlns="" val="10004"/>
                   </a:ext>
                 </a:extLst>
               </a:tr>
@@ -21569,7 +21654,7 @@
                 </a:tc>
                 <a:extLst>
                   <a:ext uri="{0D108BD9-81ED-4DB2-BD59-A6C34878D82A}">
-                    <a16:rowId xmlns="" xmlns:a16="http://schemas.microsoft.com/office/drawing/2014/main" val="10005"/>
+                    <a16:rowId xmlns:a16="http://schemas.microsoft.com/office/drawing/2014/main" xmlns="" val="10005"/>
                   </a:ext>
                 </a:extLst>
               </a:tr>
@@ -21718,7 +21803,7 @@
                 </a:tc>
                 <a:extLst>
                   <a:ext uri="{0D108BD9-81ED-4DB2-BD59-A6C34878D82A}">
-                    <a16:rowId xmlns="" xmlns:a16="http://schemas.microsoft.com/office/drawing/2014/main" val="10006"/>
+                    <a16:rowId xmlns:a16="http://schemas.microsoft.com/office/drawing/2014/main" xmlns="" val="10006"/>
                   </a:ext>
                 </a:extLst>
               </a:tr>
@@ -21867,7 +21952,7 @@
                 </a:tc>
                 <a:extLst>
                   <a:ext uri="{0D108BD9-81ED-4DB2-BD59-A6C34878D82A}">
-                    <a16:rowId xmlns="" xmlns:a16="http://schemas.microsoft.com/office/drawing/2014/main" val="10007"/>
+                    <a16:rowId xmlns:a16="http://schemas.microsoft.com/office/drawing/2014/main" xmlns="" val="10007"/>
                   </a:ext>
                 </a:extLst>
               </a:tr>
@@ -22016,7 +22101,7 @@
                 </a:tc>
                 <a:extLst>
                   <a:ext uri="{0D108BD9-81ED-4DB2-BD59-A6C34878D82A}">
-                    <a16:rowId xmlns="" xmlns:a16="http://schemas.microsoft.com/office/drawing/2014/main" val="10008"/>
+                    <a16:rowId xmlns:a16="http://schemas.microsoft.com/office/drawing/2014/main" xmlns="" val="10008"/>
                   </a:ext>
                 </a:extLst>
               </a:tr>
@@ -22177,7 +22262,7 @@
                 </a:tc>
                 <a:extLst>
                   <a:ext uri="{0D108BD9-81ED-4DB2-BD59-A6C34878D82A}">
-                    <a16:rowId xmlns="" xmlns:a16="http://schemas.microsoft.com/office/drawing/2014/main" val="10009"/>
+                    <a16:rowId xmlns:a16="http://schemas.microsoft.com/office/drawing/2014/main" xmlns="" val="10009"/>
                   </a:ext>
                 </a:extLst>
               </a:tr>
@@ -22326,7 +22411,7 @@
                 </a:tc>
                 <a:extLst>
                   <a:ext uri="{0D108BD9-81ED-4DB2-BD59-A6C34878D82A}">
-                    <a16:rowId xmlns="" xmlns:a16="http://schemas.microsoft.com/office/drawing/2014/main" val="10010"/>
+                    <a16:rowId xmlns:a16="http://schemas.microsoft.com/office/drawing/2014/main" xmlns="" val="10010"/>
                   </a:ext>
                 </a:extLst>
               </a:tr>
@@ -22475,7 +22560,7 @@
                 </a:tc>
                 <a:extLst>
                   <a:ext uri="{0D108BD9-81ED-4DB2-BD59-A6C34878D82A}">
-                    <a16:rowId xmlns="" xmlns:a16="http://schemas.microsoft.com/office/drawing/2014/main" val="10011"/>
+                    <a16:rowId xmlns:a16="http://schemas.microsoft.com/office/drawing/2014/main" xmlns="" val="10011"/>
                   </a:ext>
                 </a:extLst>
               </a:tr>
@@ -22624,7 +22709,7 @@
                 </a:tc>
                 <a:extLst>
                   <a:ext uri="{0D108BD9-81ED-4DB2-BD59-A6C34878D82A}">
-                    <a16:rowId xmlns="" xmlns:a16="http://schemas.microsoft.com/office/drawing/2014/main" val="10012"/>
+                    <a16:rowId xmlns:a16="http://schemas.microsoft.com/office/drawing/2014/main" xmlns="" val="10012"/>
                   </a:ext>
                 </a:extLst>
               </a:tr>
@@ -22773,7 +22858,7 @@
                 </a:tc>
                 <a:extLst>
                   <a:ext uri="{0D108BD9-81ED-4DB2-BD59-A6C34878D82A}">
-                    <a16:rowId xmlns="" xmlns:a16="http://schemas.microsoft.com/office/drawing/2014/main" val="10013"/>
+                    <a16:rowId xmlns:a16="http://schemas.microsoft.com/office/drawing/2014/main" xmlns="" val="10013"/>
                   </a:ext>
                 </a:extLst>
               </a:tr>
@@ -22922,7 +23007,7 @@
                 </a:tc>
                 <a:extLst>
                   <a:ext uri="{0D108BD9-81ED-4DB2-BD59-A6C34878D82A}">
-                    <a16:rowId xmlns="" xmlns:a16="http://schemas.microsoft.com/office/drawing/2014/main" val="10014"/>
+                    <a16:rowId xmlns:a16="http://schemas.microsoft.com/office/drawing/2014/main" xmlns="" val="10014"/>
                   </a:ext>
                 </a:extLst>
               </a:tr>
@@ -23080,7 +23165,7 @@
                 </a:tc>
                 <a:extLst>
                   <a:ext uri="{0D108BD9-81ED-4DB2-BD59-A6C34878D82A}">
-                    <a16:rowId xmlns="" xmlns:a16="http://schemas.microsoft.com/office/drawing/2014/main" val="10015"/>
+                    <a16:rowId xmlns:a16="http://schemas.microsoft.com/office/drawing/2014/main" xmlns="" val="10015"/>
                   </a:ext>
                 </a:extLst>
               </a:tr>
@@ -23229,7 +23314,7 @@
                 </a:tc>
                 <a:extLst>
                   <a:ext uri="{0D108BD9-81ED-4DB2-BD59-A6C34878D82A}">
-                    <a16:rowId xmlns="" xmlns:a16="http://schemas.microsoft.com/office/drawing/2014/main" val="10016"/>
+                    <a16:rowId xmlns:a16="http://schemas.microsoft.com/office/drawing/2014/main" xmlns="" val="10016"/>
                   </a:ext>
                 </a:extLst>
               </a:tr>
@@ -23331,14 +23416,14 @@
                 <a:gridCol w="1440160">
                   <a:extLst>
                     <a:ext uri="{9D8B030D-6E8A-4147-A177-3AD203B41FA5}">
-                      <a16:colId xmlns="" xmlns:a16="http://schemas.microsoft.com/office/drawing/2014/main" val="20000"/>
+                      <a16:colId xmlns:a16="http://schemas.microsoft.com/office/drawing/2014/main" xmlns="" val="20000"/>
                     </a:ext>
                   </a:extLst>
                 </a:gridCol>
                 <a:gridCol w="6984776">
                   <a:extLst>
                     <a:ext uri="{9D8B030D-6E8A-4147-A177-3AD203B41FA5}">
-                      <a16:colId xmlns="" xmlns:a16="http://schemas.microsoft.com/office/drawing/2014/main" val="20001"/>
+                      <a16:colId xmlns:a16="http://schemas.microsoft.com/office/drawing/2014/main" xmlns="" val="20001"/>
                     </a:ext>
                   </a:extLst>
                 </a:gridCol>
@@ -23496,7 +23581,7 @@
                 </a:tc>
                 <a:extLst>
                   <a:ext uri="{0D108BD9-81ED-4DB2-BD59-A6C34878D82A}">
-                    <a16:rowId xmlns="" xmlns:a16="http://schemas.microsoft.com/office/drawing/2014/main" val="10000"/>
+                    <a16:rowId xmlns:a16="http://schemas.microsoft.com/office/drawing/2014/main" xmlns="" val="10000"/>
                   </a:ext>
                 </a:extLst>
               </a:tr>
@@ -23653,7 +23738,7 @@
                 </a:tc>
                 <a:extLst>
                   <a:ext uri="{0D108BD9-81ED-4DB2-BD59-A6C34878D82A}">
-                    <a16:rowId xmlns="" xmlns:a16="http://schemas.microsoft.com/office/drawing/2014/main" val="10001"/>
+                    <a16:rowId xmlns:a16="http://schemas.microsoft.com/office/drawing/2014/main" xmlns="" val="10001"/>
                   </a:ext>
                 </a:extLst>
               </a:tr>
@@ -23786,7 +23871,7 @@
                 </a:tc>
                 <a:extLst>
                   <a:ext uri="{0D108BD9-81ED-4DB2-BD59-A6C34878D82A}">
-                    <a16:rowId xmlns="" xmlns:a16="http://schemas.microsoft.com/office/drawing/2014/main" val="10002"/>
+                    <a16:rowId xmlns:a16="http://schemas.microsoft.com/office/drawing/2014/main" xmlns="" val="10002"/>
                   </a:ext>
                 </a:extLst>
               </a:tr>
@@ -23979,7 +24064,7 @@
                 </a:tc>
                 <a:extLst>
                   <a:ext uri="{0D108BD9-81ED-4DB2-BD59-A6C34878D82A}">
-                    <a16:rowId xmlns="" xmlns:a16="http://schemas.microsoft.com/office/drawing/2014/main" val="10003"/>
+                    <a16:rowId xmlns:a16="http://schemas.microsoft.com/office/drawing/2014/main" xmlns="" val="10003"/>
                   </a:ext>
                 </a:extLst>
               </a:tr>
@@ -24112,7 +24197,7 @@
                 </a:tc>
                 <a:extLst>
                   <a:ext uri="{0D108BD9-81ED-4DB2-BD59-A6C34878D82A}">
-                    <a16:rowId xmlns="" xmlns:a16="http://schemas.microsoft.com/office/drawing/2014/main" val="10004"/>
+                    <a16:rowId xmlns:a16="http://schemas.microsoft.com/office/drawing/2014/main" xmlns="" val="10004"/>
                   </a:ext>
                 </a:extLst>
               </a:tr>
@@ -24257,7 +24342,7 @@
                 </a:tc>
                 <a:extLst>
                   <a:ext uri="{0D108BD9-81ED-4DB2-BD59-A6C34878D82A}">
-                    <a16:rowId xmlns="" xmlns:a16="http://schemas.microsoft.com/office/drawing/2014/main" val="10005"/>
+                    <a16:rowId xmlns:a16="http://schemas.microsoft.com/office/drawing/2014/main" xmlns="" val="10005"/>
                   </a:ext>
                 </a:extLst>
               </a:tr>
@@ -24402,7 +24487,7 @@
                 </a:tc>
                 <a:extLst>
                   <a:ext uri="{0D108BD9-81ED-4DB2-BD59-A6C34878D82A}">
-                    <a16:rowId xmlns="" xmlns:a16="http://schemas.microsoft.com/office/drawing/2014/main" val="10006"/>
+                    <a16:rowId xmlns:a16="http://schemas.microsoft.com/office/drawing/2014/main" xmlns="" val="10006"/>
                   </a:ext>
                 </a:extLst>
               </a:tr>
@@ -24541,7 +24626,7 @@
                 </a:tc>
                 <a:extLst>
                   <a:ext uri="{0D108BD9-81ED-4DB2-BD59-A6C34878D82A}">
-                    <a16:rowId xmlns="" xmlns:a16="http://schemas.microsoft.com/office/drawing/2014/main" val="10007"/>
+                    <a16:rowId xmlns:a16="http://schemas.microsoft.com/office/drawing/2014/main" xmlns="" val="10007"/>
                   </a:ext>
                 </a:extLst>
               </a:tr>
@@ -24686,7 +24771,7 @@
                 </a:tc>
                 <a:extLst>
                   <a:ext uri="{0D108BD9-81ED-4DB2-BD59-A6C34878D82A}">
-                    <a16:rowId xmlns="" xmlns:a16="http://schemas.microsoft.com/office/drawing/2014/main" val="10008"/>
+                    <a16:rowId xmlns:a16="http://schemas.microsoft.com/office/drawing/2014/main" xmlns="" val="10008"/>
                   </a:ext>
                 </a:extLst>
               </a:tr>
@@ -24819,7 +24904,7 @@
                 </a:tc>
                 <a:extLst>
                   <a:ext uri="{0D108BD9-81ED-4DB2-BD59-A6C34878D82A}">
-                    <a16:rowId xmlns="" xmlns:a16="http://schemas.microsoft.com/office/drawing/2014/main" val="10009"/>
+                    <a16:rowId xmlns:a16="http://schemas.microsoft.com/office/drawing/2014/main" xmlns="" val="10009"/>
                   </a:ext>
                 </a:extLst>
               </a:tr>
@@ -24970,7 +25055,7 @@
                 </a:tc>
                 <a:extLst>
                   <a:ext uri="{0D108BD9-81ED-4DB2-BD59-A6C34878D82A}">
-                    <a16:rowId xmlns="" xmlns:a16="http://schemas.microsoft.com/office/drawing/2014/main" val="10010"/>
+                    <a16:rowId xmlns:a16="http://schemas.microsoft.com/office/drawing/2014/main" xmlns="" val="10010"/>
                   </a:ext>
                 </a:extLst>
               </a:tr>
@@ -25115,7 +25200,7 @@
                 </a:tc>
                 <a:extLst>
                   <a:ext uri="{0D108BD9-81ED-4DB2-BD59-A6C34878D82A}">
-                    <a16:rowId xmlns="" xmlns:a16="http://schemas.microsoft.com/office/drawing/2014/main" val="10011"/>
+                    <a16:rowId xmlns:a16="http://schemas.microsoft.com/office/drawing/2014/main" xmlns="" val="10011"/>
                   </a:ext>
                 </a:extLst>
               </a:tr>
@@ -25260,7 +25345,7 @@
                 </a:tc>
                 <a:extLst>
                   <a:ext uri="{0D108BD9-81ED-4DB2-BD59-A6C34878D82A}">
-                    <a16:rowId xmlns="" xmlns:a16="http://schemas.microsoft.com/office/drawing/2014/main" val="10012"/>
+                    <a16:rowId xmlns:a16="http://schemas.microsoft.com/office/drawing/2014/main" xmlns="" val="10012"/>
                   </a:ext>
                 </a:extLst>
               </a:tr>
@@ -25348,7 +25433,7 @@
         </p:nvGraphicFramePr>
         <p:xfrm>
           <a:off x="395536" y="886086"/>
-          <a:ext cx="8352928" cy="3529819"/>
+          <a:ext cx="8352928" cy="3674026"/>
         </p:xfrm>
         <a:graphic>
           <a:graphicData uri="http://schemas.openxmlformats.org/drawingml/2006/table">
@@ -25360,7 +25445,7 @@
                 <a:gridCol w="8352928">
                   <a:extLst>
                     <a:ext uri="{9D8B030D-6E8A-4147-A177-3AD203B41FA5}">
-                      <a16:colId xmlns="" xmlns:a16="http://schemas.microsoft.com/office/drawing/2014/main" val="20000"/>
+                      <a16:colId xmlns:a16="http://schemas.microsoft.com/office/drawing/2014/main" xmlns="" val="20000"/>
                     </a:ext>
                   </a:extLst>
                 </a:gridCol>
@@ -25449,7 +25534,7 @@
                 </a:tc>
                 <a:extLst>
                   <a:ext uri="{0D108BD9-81ED-4DB2-BD59-A6C34878D82A}">
-                    <a16:rowId xmlns="" xmlns:a16="http://schemas.microsoft.com/office/drawing/2014/main" val="10000"/>
+                    <a16:rowId xmlns:a16="http://schemas.microsoft.com/office/drawing/2014/main" xmlns="" val="10000"/>
                   </a:ext>
                 </a:extLst>
               </a:tr>
@@ -25537,7 +25622,7 @@
                 </a:tc>
                 <a:extLst>
                   <a:ext uri="{0D108BD9-81ED-4DB2-BD59-A6C34878D82A}">
-                    <a16:rowId xmlns="" xmlns:a16="http://schemas.microsoft.com/office/drawing/2014/main" val="10001"/>
+                    <a16:rowId xmlns:a16="http://schemas.microsoft.com/office/drawing/2014/main" xmlns="" val="10001"/>
                   </a:ext>
                 </a:extLst>
               </a:tr>
@@ -25605,7 +25690,7 @@
                 </a:tc>
                 <a:extLst>
                   <a:ext uri="{0D108BD9-81ED-4DB2-BD59-A6C34878D82A}">
-                    <a16:rowId xmlns="" xmlns:a16="http://schemas.microsoft.com/office/drawing/2014/main" val="10002"/>
+                    <a16:rowId xmlns:a16="http://schemas.microsoft.com/office/drawing/2014/main" xmlns="" val="10002"/>
                   </a:ext>
                 </a:extLst>
               </a:tr>
@@ -25693,7 +25778,7 @@
                 </a:tc>
                 <a:extLst>
                   <a:ext uri="{0D108BD9-81ED-4DB2-BD59-A6C34878D82A}">
-                    <a16:rowId xmlns="" xmlns:a16="http://schemas.microsoft.com/office/drawing/2014/main" val="10003"/>
+                    <a16:rowId xmlns:a16="http://schemas.microsoft.com/office/drawing/2014/main" xmlns="" val="10003"/>
                   </a:ext>
                 </a:extLst>
               </a:tr>
@@ -25772,7 +25857,7 @@
                 </a:tc>
                 <a:extLst>
                   <a:ext uri="{0D108BD9-81ED-4DB2-BD59-A6C34878D82A}">
-                    <a16:rowId xmlns="" xmlns:a16="http://schemas.microsoft.com/office/drawing/2014/main" val="10004"/>
+                    <a16:rowId xmlns:a16="http://schemas.microsoft.com/office/drawing/2014/main" xmlns="" val="10004"/>
                   </a:ext>
                 </a:extLst>
               </a:tr>
@@ -25849,7 +25934,7 @@
                 </a:tc>
                 <a:extLst>
                   <a:ext uri="{0D108BD9-81ED-4DB2-BD59-A6C34878D82A}">
-                    <a16:rowId xmlns="" xmlns:a16="http://schemas.microsoft.com/office/drawing/2014/main" val="10005"/>
+                    <a16:rowId xmlns:a16="http://schemas.microsoft.com/office/drawing/2014/main" xmlns="" val="10005"/>
                   </a:ext>
                 </a:extLst>
               </a:tr>
@@ -25955,7 +26040,7 @@
                 </a:tc>
                 <a:extLst>
                   <a:ext uri="{0D108BD9-81ED-4DB2-BD59-A6C34878D82A}">
-                    <a16:rowId xmlns="" xmlns:a16="http://schemas.microsoft.com/office/drawing/2014/main" val="10006"/>
+                    <a16:rowId xmlns:a16="http://schemas.microsoft.com/office/drawing/2014/main" xmlns="" val="10006"/>
                   </a:ext>
                 </a:extLst>
               </a:tr>
@@ -26385,7 +26470,7 @@
                 </a:tc>
                 <a:extLst>
                   <a:ext uri="{0D108BD9-81ED-4DB2-BD59-A6C34878D82A}">
-                    <a16:rowId xmlns="" xmlns:a16="http://schemas.microsoft.com/office/drawing/2014/main" val="10007"/>
+                    <a16:rowId xmlns:a16="http://schemas.microsoft.com/office/drawing/2014/main" xmlns="" val="10007"/>
                   </a:ext>
                 </a:extLst>
               </a:tr>

</xml_diff>